<commit_message>
Citations added; Ppt updated; More data added
</commit_message>
<xml_diff>
--- a/190425_Verdegaal_EEB723_project.pptx
+++ b/190425_Verdegaal_EEB723_project.pptx
@@ -5,20 +5,28 @@
     <p:sldMasterId id="2147483648" r:id="rId1"/>
   </p:sldMasterIdLst>
   <p:sldIdLst>
-    <p:sldId id="256" r:id="rId2"/>
-    <p:sldId id="269" r:id="rId3"/>
-    <p:sldId id="264" r:id="rId4"/>
-    <p:sldId id="267" r:id="rId5"/>
-    <p:sldId id="265" r:id="rId6"/>
-    <p:sldId id="266" r:id="rId7"/>
-    <p:sldId id="268" r:id="rId8"/>
-    <p:sldId id="258" r:id="rId9"/>
-    <p:sldId id="257" r:id="rId10"/>
-    <p:sldId id="259" r:id="rId11"/>
-    <p:sldId id="260" r:id="rId12"/>
-    <p:sldId id="261" r:id="rId13"/>
-    <p:sldId id="262" r:id="rId14"/>
-    <p:sldId id="263" r:id="rId15"/>
+    <p:sldId id="276" r:id="rId2"/>
+    <p:sldId id="256" r:id="rId3"/>
+    <p:sldId id="270" r:id="rId4"/>
+    <p:sldId id="277" r:id="rId5"/>
+    <p:sldId id="278" r:id="rId6"/>
+    <p:sldId id="264" r:id="rId7"/>
+    <p:sldId id="267" r:id="rId8"/>
+    <p:sldId id="265" r:id="rId9"/>
+    <p:sldId id="266" r:id="rId10"/>
+    <p:sldId id="268" r:id="rId11"/>
+    <p:sldId id="272" r:id="rId12"/>
+    <p:sldId id="258" r:id="rId13"/>
+    <p:sldId id="257" r:id="rId14"/>
+    <p:sldId id="271" r:id="rId15"/>
+    <p:sldId id="259" r:id="rId16"/>
+    <p:sldId id="273" r:id="rId17"/>
+    <p:sldId id="274" r:id="rId18"/>
+    <p:sldId id="262" r:id="rId19"/>
+    <p:sldId id="263" r:id="rId20"/>
+    <p:sldId id="261" r:id="rId21"/>
+    <p:sldId id="275" r:id="rId22"/>
+    <p:sldId id="260" r:id="rId23"/>
   </p:sldIdLst>
   <p:sldSz cx="12192000" cy="6858000"/>
   <p:notesSz cx="6858000" cy="9144000"/>
@@ -117,6 +125,11 @@
       </a:defRPr>
     </a:lvl9pPr>
   </p:defaultTextStyle>
+  <p:extLst>
+    <p:ext uri="{EFAFB233-063F-42B5-8137-9DF3F51BA10A}">
+      <p15:sldGuideLst xmlns:p15="http://schemas.microsoft.com/office/powerpoint/2012/main"/>
+    </p:ext>
+  </p:extLst>
 </p:presentation>
 </file>
 
@@ -3320,6 +3333,14 @@
 <file path=ppt/slides/slide1.xml><?xml version="1.0" encoding="utf-8"?>
 <p:sld xmlns:a="http://schemas.openxmlformats.org/drawingml/2006/main" xmlns:r="http://schemas.openxmlformats.org/officeDocument/2006/relationships" xmlns:p="http://schemas.openxmlformats.org/presentationml/2006/main">
   <p:cSld>
+    <p:bg>
+      <p:bgPr>
+        <a:solidFill>
+          <a:schemeClr val="bg1"/>
+        </a:solidFill>
+        <a:effectLst/>
+      </p:bgPr>
+    </p:bg>
     <p:spTree>
       <p:nvGrpSpPr>
         <p:cNvPr id="1" name=""/>
@@ -3339,55 +3360,194 @@
           <p:cNvPr id="2" name="Title 1">
             <a:extLst>
               <a:ext uri="{FF2B5EF4-FFF2-40B4-BE49-F238E27FC236}">
-                <a16:creationId xmlns:a16="http://schemas.microsoft.com/office/drawing/2014/main" id="{A2B7C226-3A32-4BC9-B5E9-45226324263E}"/>
-              </a:ext>
-            </a:extLst>
-          </p:cNvPr>
-          <p:cNvSpPr>
-            <a:spLocks noGrp="1"/>
-          </p:cNvSpPr>
-          <p:nvPr>
-            <p:ph type="ctrTitle"/>
-          </p:nvPr>
-        </p:nvSpPr>
-        <p:spPr/>
-        <p:txBody>
-          <a:bodyPr/>
-          <a:lstStyle/>
-          <a:p>
-            <a:endParaRPr lang="en-US"/>
-          </a:p>
-        </p:txBody>
-      </p:sp>
-      <p:sp>
-        <p:nvSpPr>
-          <p:cNvPr id="3" name="Subtitle 2">
-            <a:extLst>
-              <a:ext uri="{FF2B5EF4-FFF2-40B4-BE49-F238E27FC236}">
-                <a16:creationId xmlns:a16="http://schemas.microsoft.com/office/drawing/2014/main" id="{9E5B2CA3-804C-4D31-806B-7F8176EBF04B}"/>
-              </a:ext>
-            </a:extLst>
-          </p:cNvPr>
-          <p:cNvSpPr>
-            <a:spLocks noGrp="1"/>
-          </p:cNvSpPr>
-          <p:nvPr>
-            <p:ph type="subTitle" idx="1"/>
-          </p:nvPr>
-        </p:nvSpPr>
-        <p:spPr/>
-        <p:txBody>
-          <a:bodyPr/>
-          <a:lstStyle/>
-          <a:p>
-            <a:endParaRPr lang="en-US"/>
+                <a16:creationId xmlns:a16="http://schemas.microsoft.com/office/drawing/2014/main" id="{01A76F32-DFE4-47C8-AEA2-4265CB61F1DA}"/>
+              </a:ext>
+            </a:extLst>
+          </p:cNvPr>
+          <p:cNvSpPr>
+            <a:spLocks noGrp="1"/>
+          </p:cNvSpPr>
+          <p:nvPr>
+            <p:ph type="title"/>
+          </p:nvPr>
+        </p:nvSpPr>
+        <p:spPr>
+          <a:xfrm>
+            <a:off x="648929" y="629266"/>
+            <a:ext cx="3651467" cy="1676603"/>
+          </a:xfrm>
+        </p:spPr>
+        <p:txBody>
+          <a:bodyPr>
+            <a:normAutofit/>
+          </a:bodyPr>
+          <a:lstStyle/>
+          <a:p>
+            <a:r>
+              <a:rPr lang="en-US" i="1" dirty="0"/>
+              <a:t>Salmonella enterica</a:t>
+            </a:r>
+          </a:p>
+        </p:txBody>
+      </p:sp>
+      <p:sp>
+        <p:nvSpPr>
+          <p:cNvPr id="3" name="Content Placeholder 2">
+            <a:extLst>
+              <a:ext uri="{FF2B5EF4-FFF2-40B4-BE49-F238E27FC236}">
+                <a16:creationId xmlns:a16="http://schemas.microsoft.com/office/drawing/2014/main" id="{71E6DF57-B48C-47A7-8E53-F6831229337E}"/>
+              </a:ext>
+            </a:extLst>
+          </p:cNvPr>
+          <p:cNvSpPr>
+            <a:spLocks noGrp="1"/>
+          </p:cNvSpPr>
+          <p:nvPr>
+            <p:ph idx="1"/>
+          </p:nvPr>
+        </p:nvSpPr>
+        <p:spPr>
+          <a:xfrm>
+            <a:off x="648931" y="2438400"/>
+            <a:ext cx="3651466" cy="3008243"/>
+          </a:xfrm>
+        </p:spPr>
+        <p:txBody>
+          <a:bodyPr>
+            <a:normAutofit/>
+          </a:bodyPr>
+          <a:lstStyle/>
+          <a:p>
+            <a:r>
+              <a:rPr lang="en-US" sz="2000" dirty="0"/>
+              <a:t>Gram (-) Bacteria</a:t>
+            </a:r>
+          </a:p>
+          <a:p>
+            <a:r>
+              <a:rPr lang="en-US" sz="2000" dirty="0"/>
+              <a:t>1.2 million cases of Salmonella related illness/year in U.S. alone</a:t>
+            </a:r>
+          </a:p>
+          <a:p>
+            <a:r>
+              <a:rPr lang="en-US" sz="2000" dirty="0"/>
+              <a:t>Three types of sicknesses:</a:t>
+            </a:r>
+          </a:p>
+          <a:p>
+            <a:pPr marL="457200" lvl="1" indent="0">
+              <a:buNone/>
+            </a:pPr>
+            <a:r>
+              <a:rPr lang="en-US" sz="2000" dirty="0"/>
+              <a:t>1) Salmonellosis (non paratyphoid/ typhoid)</a:t>
+            </a:r>
+          </a:p>
+          <a:p>
+            <a:pPr marL="457200" lvl="1" indent="0">
+              <a:buNone/>
+            </a:pPr>
+            <a:r>
+              <a:rPr lang="en-US" sz="2000" dirty="0"/>
+              <a:t>2) Paratyphoid fever</a:t>
+            </a:r>
+          </a:p>
+          <a:p>
+            <a:pPr marL="457200" lvl="1" indent="0">
+              <a:buNone/>
+            </a:pPr>
+            <a:r>
+              <a:rPr lang="en-US" sz="2000" dirty="0"/>
+              <a:t>3) Typhoid fever</a:t>
+            </a:r>
+          </a:p>
+        </p:txBody>
+      </p:sp>
+      <p:pic>
+        <p:nvPicPr>
+          <p:cNvPr id="5122" name="Picture 2" descr="Salmonella">
+            <a:extLst>
+              <a:ext uri="{FF2B5EF4-FFF2-40B4-BE49-F238E27FC236}">
+                <a16:creationId xmlns:a16="http://schemas.microsoft.com/office/drawing/2014/main" id="{2E5E1A03-C024-4DD9-9AFD-D9A00A96C04C}"/>
+              </a:ext>
+            </a:extLst>
+          </p:cNvPr>
+          <p:cNvPicPr>
+            <a:picLocks noChangeAspect="1" noChangeArrowheads="1"/>
+          </p:cNvPicPr>
+          <p:nvPr/>
+        </p:nvPicPr>
+        <p:blipFill rotWithShape="1">
+          <a:blip r:embed="rId2">
+            <a:extLst>
+              <a:ext uri="{28A0092B-C50C-407E-A947-70E740481C1C}">
+                <a14:useLocalDpi xmlns:a14="http://schemas.microsoft.com/office/drawing/2010/main" val="0"/>
+              </a:ext>
+            </a:extLst>
+          </a:blip>
+          <a:srcRect l="1247" r="-2" b="-2"/>
+          <a:stretch/>
+        </p:blipFill>
+        <p:spPr bwMode="auto">
+          <a:xfrm>
+            <a:off x="4639056" y="10"/>
+            <a:ext cx="7552944" cy="6857990"/>
+          </a:xfrm>
+          <a:prstGeom prst="rect">
+            <a:avLst/>
+          </a:prstGeom>
+          <a:noFill/>
+          <a:effectLst/>
+          <a:extLst>
+            <a:ext uri="{909E8E84-426E-40DD-AFC4-6F175D3DCCD1}">
+              <a14:hiddenFill xmlns:a14="http://schemas.microsoft.com/office/drawing/2010/main">
+                <a:solidFill>
+                  <a:srgbClr val="FFFFFF"/>
+                </a:solidFill>
+              </a14:hiddenFill>
+            </a:ext>
+          </a:extLst>
+        </p:spPr>
+      </p:pic>
+      <p:sp>
+        <p:nvSpPr>
+          <p:cNvPr id="4" name="Rectangle 3">
+            <a:extLst>
+              <a:ext uri="{FF2B5EF4-FFF2-40B4-BE49-F238E27FC236}">
+                <a16:creationId xmlns:a16="http://schemas.microsoft.com/office/drawing/2014/main" id="{E5B601C6-36F3-4C38-BAEF-80EFE4CD5514}"/>
+              </a:ext>
+            </a:extLst>
+          </p:cNvPr>
+          <p:cNvSpPr/>
+          <p:nvPr/>
+        </p:nvSpPr>
+        <p:spPr>
+          <a:xfrm>
+            <a:off x="0" y="6356350"/>
+            <a:ext cx="4595038" cy="461665"/>
+          </a:xfrm>
+          <a:prstGeom prst="rect">
+            <a:avLst/>
+          </a:prstGeom>
+        </p:spPr>
+        <p:txBody>
+          <a:bodyPr wrap="square">
+            <a:spAutoFit/>
+          </a:bodyPr>
+          <a:lstStyle/>
+          <a:p>
+            <a:r>
+              <a:rPr lang="en-US" sz="1200" dirty="0"/>
+              <a:t>http://www.cidrap.umn.edu/news-perspective/2016/12/cdc-resistant-salmonella-causes-6200-illnesses-year</a:t>
+            </a:r>
           </a:p>
         </p:txBody>
       </p:sp>
     </p:spTree>
     <p:extLst>
       <p:ext uri="{BB962C8B-B14F-4D97-AF65-F5344CB8AC3E}">
-        <p14:creationId xmlns:p14="http://schemas.microsoft.com/office/powerpoint/2010/main" val="3042011893"/>
+        <p14:creationId xmlns:p14="http://schemas.microsoft.com/office/powerpoint/2010/main" val="1298375012"/>
       </p:ext>
     </p:extLst>
   </p:cSld>
@@ -3398,6 +3558,525 @@
 </file>
 
 <file path=ppt/slides/slide10.xml><?xml version="1.0" encoding="utf-8"?>
+<p:sld xmlns:a="http://schemas.openxmlformats.org/drawingml/2006/main" xmlns:r="http://schemas.openxmlformats.org/officeDocument/2006/relationships" xmlns:p="http://schemas.openxmlformats.org/presentationml/2006/main">
+  <p:cSld>
+    <p:spTree>
+      <p:nvGrpSpPr>
+        <p:cNvPr id="1" name=""/>
+        <p:cNvGrpSpPr/>
+        <p:nvPr/>
+      </p:nvGrpSpPr>
+      <p:grpSpPr>
+        <a:xfrm>
+          <a:off x="0" y="0"/>
+          <a:ext cx="0" cy="0"/>
+          <a:chOff x="0" y="0"/>
+          <a:chExt cx="0" cy="0"/>
+        </a:xfrm>
+      </p:grpSpPr>
+      <p:sp>
+        <p:nvSpPr>
+          <p:cNvPr id="3" name="Content Placeholder 2">
+            <a:extLst>
+              <a:ext uri="{FF2B5EF4-FFF2-40B4-BE49-F238E27FC236}">
+                <a16:creationId xmlns:a16="http://schemas.microsoft.com/office/drawing/2014/main" id="{55149057-A66C-4935-8C9B-9203C8226A52}"/>
+              </a:ext>
+            </a:extLst>
+          </p:cNvPr>
+          <p:cNvSpPr>
+            <a:spLocks noGrp="1"/>
+          </p:cNvSpPr>
+          <p:nvPr>
+            <p:ph idx="1"/>
+          </p:nvPr>
+        </p:nvSpPr>
+        <p:spPr>
+          <a:xfrm>
+            <a:off x="838200" y="2152357"/>
+            <a:ext cx="10515600" cy="4024606"/>
+          </a:xfrm>
+        </p:spPr>
+        <p:txBody>
+          <a:bodyPr/>
+          <a:lstStyle/>
+          <a:p>
+            <a:r>
+              <a:rPr lang="en-US" dirty="0"/>
+              <a:t>Provide reference protein database (</a:t>
+            </a:r>
+            <a:r>
+              <a:rPr lang="en-US" i="1" dirty="0"/>
+              <a:t>S. enterica </a:t>
+            </a:r>
+            <a:r>
+              <a:rPr lang="en-US" dirty="0"/>
+              <a:t>Typhimurium SL1344)</a:t>
+            </a:r>
+          </a:p>
+          <a:p>
+            <a:pPr lvl="1"/>
+            <a:r>
+              <a:rPr lang="en-US" dirty="0"/>
+              <a:t>Searches with </a:t>
+            </a:r>
+            <a:r>
+              <a:rPr lang="en-US" dirty="0" err="1"/>
+              <a:t>BLASTp</a:t>
+            </a:r>
+            <a:endParaRPr lang="en-US" dirty="0"/>
+          </a:p>
+          <a:p>
+            <a:r>
+              <a:rPr lang="en-US" dirty="0"/>
+              <a:t>Then, searches multiple databases to annotate genome in succession</a:t>
+            </a:r>
+          </a:p>
+          <a:p>
+            <a:pPr lvl="1"/>
+            <a:r>
+              <a:rPr lang="en-US" dirty="0" err="1"/>
+              <a:t>UniProt</a:t>
+            </a:r>
+            <a:r>
+              <a:rPr lang="en-US" dirty="0"/>
+              <a:t>, using BLAST+</a:t>
+            </a:r>
+          </a:p>
+          <a:p>
+            <a:pPr lvl="1"/>
+            <a:r>
+              <a:rPr lang="en-US" dirty="0" err="1"/>
+              <a:t>RefSeq</a:t>
+            </a:r>
+            <a:r>
+              <a:rPr lang="en-US" dirty="0"/>
+              <a:t> (finished bacterial genomes for a genus) [Salmonella]</a:t>
+            </a:r>
+          </a:p>
+          <a:p>
+            <a:pPr lvl="1"/>
+            <a:r>
+              <a:rPr lang="en-US" dirty="0"/>
+              <a:t>HMMER3.1 hidden Markov model profile </a:t>
+            </a:r>
+            <a:r>
+              <a:rPr lang="en-US" dirty="0" err="1"/>
+              <a:t>db’s</a:t>
+            </a:r>
+            <a:r>
+              <a:rPr lang="en-US" dirty="0"/>
+              <a:t> (</a:t>
+            </a:r>
+            <a:r>
+              <a:rPr lang="en-US" dirty="0" err="1"/>
+              <a:t>Pfam</a:t>
+            </a:r>
+            <a:r>
+              <a:rPr lang="en-US" dirty="0"/>
+              <a:t>)</a:t>
+            </a:r>
+          </a:p>
+          <a:p>
+            <a:pPr lvl="2"/>
+            <a:r>
+              <a:rPr lang="en-US" dirty="0"/>
+              <a:t>Basically searches for homologues to known proteins</a:t>
+            </a:r>
+          </a:p>
+          <a:p>
+            <a:r>
+              <a:rPr lang="en-US" dirty="0"/>
+              <a:t>Failing to annotate everything, will fill in remaining CDS with “hypothetical protein”</a:t>
+            </a:r>
+          </a:p>
+        </p:txBody>
+      </p:sp>
+      <p:pic>
+        <p:nvPicPr>
+          <p:cNvPr id="4" name="Picture 3">
+            <a:extLst>
+              <a:ext uri="{FF2B5EF4-FFF2-40B4-BE49-F238E27FC236}">
+                <a16:creationId xmlns:a16="http://schemas.microsoft.com/office/drawing/2014/main" id="{3C0A3D6C-8C9A-48A4-9D0A-7C996A798543}"/>
+              </a:ext>
+            </a:extLst>
+          </p:cNvPr>
+          <p:cNvPicPr>
+            <a:picLocks noChangeAspect="1"/>
+          </p:cNvPicPr>
+          <p:nvPr/>
+        </p:nvPicPr>
+        <p:blipFill>
+          <a:blip r:embed="rId2"/>
+          <a:stretch>
+            <a:fillRect/>
+          </a:stretch>
+        </p:blipFill>
+        <p:spPr>
+          <a:xfrm>
+            <a:off x="838200" y="225425"/>
+            <a:ext cx="9220200" cy="1600200"/>
+          </a:xfrm>
+          <a:prstGeom prst="rect">
+            <a:avLst/>
+          </a:prstGeom>
+        </p:spPr>
+      </p:pic>
+    </p:spTree>
+    <p:extLst>
+      <p:ext uri="{BB962C8B-B14F-4D97-AF65-F5344CB8AC3E}">
+        <p14:creationId xmlns:p14="http://schemas.microsoft.com/office/powerpoint/2010/main" val="4060716384"/>
+      </p:ext>
+    </p:extLst>
+  </p:cSld>
+  <p:clrMapOvr>
+    <a:masterClrMapping/>
+  </p:clrMapOvr>
+</p:sld>
+</file>
+
+<file path=ppt/slides/slide11.xml><?xml version="1.0" encoding="utf-8"?>
+<p:sld xmlns:a="http://schemas.openxmlformats.org/drawingml/2006/main" xmlns:r="http://schemas.openxmlformats.org/officeDocument/2006/relationships" xmlns:p="http://schemas.openxmlformats.org/presentationml/2006/main">
+  <p:cSld>
+    <p:spTree>
+      <p:nvGrpSpPr>
+        <p:cNvPr id="1" name=""/>
+        <p:cNvGrpSpPr/>
+        <p:nvPr/>
+      </p:nvGrpSpPr>
+      <p:grpSpPr>
+        <a:xfrm>
+          <a:off x="0" y="0"/>
+          <a:ext cx="0" cy="0"/>
+          <a:chOff x="0" y="0"/>
+          <a:chExt cx="0" cy="0"/>
+        </a:xfrm>
+      </p:grpSpPr>
+      <p:sp>
+        <p:nvSpPr>
+          <p:cNvPr id="2" name="Title 1">
+            <a:extLst>
+              <a:ext uri="{FF2B5EF4-FFF2-40B4-BE49-F238E27FC236}">
+                <a16:creationId xmlns:a16="http://schemas.microsoft.com/office/drawing/2014/main" id="{965BACA4-ACA3-4F7D-8CBE-E5D77250CEEE}"/>
+              </a:ext>
+            </a:extLst>
+          </p:cNvPr>
+          <p:cNvSpPr>
+            <a:spLocks noGrp="1"/>
+          </p:cNvSpPr>
+          <p:nvPr>
+            <p:ph type="title"/>
+          </p:nvPr>
+        </p:nvSpPr>
+        <p:spPr/>
+        <p:txBody>
+          <a:bodyPr/>
+          <a:lstStyle/>
+          <a:p>
+            <a:endParaRPr lang="en-US"/>
+          </a:p>
+        </p:txBody>
+      </p:sp>
+      <p:sp>
+        <p:nvSpPr>
+          <p:cNvPr id="3" name="Content Placeholder 2">
+            <a:extLst>
+              <a:ext uri="{FF2B5EF4-FFF2-40B4-BE49-F238E27FC236}">
+                <a16:creationId xmlns:a16="http://schemas.microsoft.com/office/drawing/2014/main" id="{25E32652-4C30-4BF1-A9B1-2B1BD17E5E0D}"/>
+              </a:ext>
+            </a:extLst>
+          </p:cNvPr>
+          <p:cNvSpPr>
+            <a:spLocks noGrp="1"/>
+          </p:cNvSpPr>
+          <p:nvPr>
+            <p:ph idx="1"/>
+          </p:nvPr>
+        </p:nvSpPr>
+        <p:spPr/>
+        <p:txBody>
+          <a:bodyPr/>
+          <a:lstStyle/>
+          <a:p>
+            <a:endParaRPr lang="en-US"/>
+          </a:p>
+        </p:txBody>
+      </p:sp>
+      <p:pic>
+        <p:nvPicPr>
+          <p:cNvPr id="4" name="Picture 3">
+            <a:extLst>
+              <a:ext uri="{FF2B5EF4-FFF2-40B4-BE49-F238E27FC236}">
+                <a16:creationId xmlns:a16="http://schemas.microsoft.com/office/drawing/2014/main" id="{DCA9B072-7411-4D6F-8129-76BF0B6048D9}"/>
+              </a:ext>
+            </a:extLst>
+          </p:cNvPr>
+          <p:cNvPicPr>
+            <a:picLocks noChangeAspect="1"/>
+          </p:cNvPicPr>
+          <p:nvPr/>
+        </p:nvPicPr>
+        <p:blipFill>
+          <a:blip r:embed="rId2"/>
+          <a:stretch>
+            <a:fillRect/>
+          </a:stretch>
+        </p:blipFill>
+        <p:spPr>
+          <a:xfrm>
+            <a:off x="838200" y="156542"/>
+            <a:ext cx="7200900" cy="2171700"/>
+          </a:xfrm>
+          <a:prstGeom prst="rect">
+            <a:avLst/>
+          </a:prstGeom>
+        </p:spPr>
+      </p:pic>
+    </p:spTree>
+    <p:extLst>
+      <p:ext uri="{BB962C8B-B14F-4D97-AF65-F5344CB8AC3E}">
+        <p14:creationId xmlns:p14="http://schemas.microsoft.com/office/powerpoint/2010/main" val="3226868972"/>
+      </p:ext>
+    </p:extLst>
+  </p:cSld>
+  <p:clrMapOvr>
+    <a:masterClrMapping/>
+  </p:clrMapOvr>
+</p:sld>
+</file>
+
+<file path=ppt/slides/slide12.xml><?xml version="1.0" encoding="utf-8"?>
+<p:sld xmlns:a="http://schemas.openxmlformats.org/drawingml/2006/main" xmlns:r="http://schemas.openxmlformats.org/officeDocument/2006/relationships" xmlns:p="http://schemas.openxmlformats.org/presentationml/2006/main">
+  <p:cSld>
+    <p:spTree>
+      <p:nvGrpSpPr>
+        <p:cNvPr id="1" name=""/>
+        <p:cNvGrpSpPr/>
+        <p:nvPr/>
+      </p:nvGrpSpPr>
+      <p:grpSpPr>
+        <a:xfrm>
+          <a:off x="0" y="0"/>
+          <a:ext cx="0" cy="0"/>
+          <a:chOff x="0" y="0"/>
+          <a:chExt cx="0" cy="0"/>
+        </a:xfrm>
+      </p:grpSpPr>
+      <p:pic>
+        <p:nvPicPr>
+          <p:cNvPr id="4" name="Content Placeholder 3">
+            <a:extLst>
+              <a:ext uri="{FF2B5EF4-FFF2-40B4-BE49-F238E27FC236}">
+                <a16:creationId xmlns:a16="http://schemas.microsoft.com/office/drawing/2014/main" id="{7A065A41-0924-426F-B777-01CA56B10B48}"/>
+              </a:ext>
+            </a:extLst>
+          </p:cNvPr>
+          <p:cNvPicPr>
+            <a:picLocks noGrp="1" noChangeAspect="1"/>
+          </p:cNvPicPr>
+          <p:nvPr>
+            <p:ph idx="1"/>
+          </p:nvPr>
+        </p:nvPicPr>
+        <p:blipFill>
+          <a:blip r:embed="rId2"/>
+          <a:stretch>
+            <a:fillRect/>
+          </a:stretch>
+        </p:blipFill>
+        <p:spPr>
+          <a:xfrm>
+            <a:off x="161363" y="689317"/>
+            <a:ext cx="11496387" cy="5748193"/>
+          </a:xfrm>
+          <a:prstGeom prst="rect">
+            <a:avLst/>
+          </a:prstGeom>
+        </p:spPr>
+      </p:pic>
+    </p:spTree>
+    <p:extLst>
+      <p:ext uri="{BB962C8B-B14F-4D97-AF65-F5344CB8AC3E}">
+        <p14:creationId xmlns:p14="http://schemas.microsoft.com/office/powerpoint/2010/main" val="3352240278"/>
+      </p:ext>
+    </p:extLst>
+  </p:cSld>
+  <p:clrMapOvr>
+    <a:masterClrMapping/>
+  </p:clrMapOvr>
+</p:sld>
+</file>
+
+<file path=ppt/slides/slide13.xml><?xml version="1.0" encoding="utf-8"?>
+<p:sld xmlns:a="http://schemas.openxmlformats.org/drawingml/2006/main" xmlns:r="http://schemas.openxmlformats.org/officeDocument/2006/relationships" xmlns:p="http://schemas.openxmlformats.org/presentationml/2006/main">
+  <p:cSld>
+    <p:spTree>
+      <p:nvGrpSpPr>
+        <p:cNvPr id="1" name=""/>
+        <p:cNvGrpSpPr/>
+        <p:nvPr/>
+      </p:nvGrpSpPr>
+      <p:grpSpPr>
+        <a:xfrm>
+          <a:off x="0" y="0"/>
+          <a:ext cx="0" cy="0"/>
+          <a:chOff x="0" y="0"/>
+          <a:chExt cx="0" cy="0"/>
+        </a:xfrm>
+      </p:grpSpPr>
+      <p:pic>
+        <p:nvPicPr>
+          <p:cNvPr id="5" name="Picture 4">
+            <a:extLst>
+              <a:ext uri="{FF2B5EF4-FFF2-40B4-BE49-F238E27FC236}">
+                <a16:creationId xmlns:a16="http://schemas.microsoft.com/office/drawing/2014/main" id="{D3904ACB-765F-4623-8781-ADBBBFD4DC4D}"/>
+              </a:ext>
+            </a:extLst>
+          </p:cNvPr>
+          <p:cNvPicPr>
+            <a:picLocks noChangeAspect="1"/>
+          </p:cNvPicPr>
+          <p:nvPr/>
+        </p:nvPicPr>
+        <p:blipFill>
+          <a:blip r:embed="rId2"/>
+          <a:stretch>
+            <a:fillRect/>
+          </a:stretch>
+        </p:blipFill>
+        <p:spPr>
+          <a:xfrm>
+            <a:off x="576777" y="742657"/>
+            <a:ext cx="10745372" cy="5372685"/>
+          </a:xfrm>
+          <a:prstGeom prst="rect">
+            <a:avLst/>
+          </a:prstGeom>
+        </p:spPr>
+      </p:pic>
+    </p:spTree>
+    <p:extLst>
+      <p:ext uri="{BB962C8B-B14F-4D97-AF65-F5344CB8AC3E}">
+        <p14:creationId xmlns:p14="http://schemas.microsoft.com/office/powerpoint/2010/main" val="2328160473"/>
+      </p:ext>
+    </p:extLst>
+  </p:cSld>
+  <p:clrMapOvr>
+    <a:masterClrMapping/>
+  </p:clrMapOvr>
+</p:sld>
+</file>
+
+<file path=ppt/slides/slide14.xml><?xml version="1.0" encoding="utf-8"?>
+<p:sld xmlns:a="http://schemas.openxmlformats.org/drawingml/2006/main" xmlns:r="http://schemas.openxmlformats.org/officeDocument/2006/relationships" xmlns:p="http://schemas.openxmlformats.org/presentationml/2006/main">
+  <p:cSld>
+    <p:spTree>
+      <p:nvGrpSpPr>
+        <p:cNvPr id="1" name=""/>
+        <p:cNvGrpSpPr/>
+        <p:nvPr/>
+      </p:nvGrpSpPr>
+      <p:grpSpPr>
+        <a:xfrm>
+          <a:off x="0" y="0"/>
+          <a:ext cx="0" cy="0"/>
+          <a:chOff x="0" y="0"/>
+          <a:chExt cx="0" cy="0"/>
+        </a:xfrm>
+      </p:grpSpPr>
+      <p:sp>
+        <p:nvSpPr>
+          <p:cNvPr id="2" name="Title 1">
+            <a:extLst>
+              <a:ext uri="{FF2B5EF4-FFF2-40B4-BE49-F238E27FC236}">
+                <a16:creationId xmlns:a16="http://schemas.microsoft.com/office/drawing/2014/main" id="{1BFA6E77-6747-44EA-8BBE-B06166AF6E84}"/>
+              </a:ext>
+            </a:extLst>
+          </p:cNvPr>
+          <p:cNvSpPr>
+            <a:spLocks noGrp="1"/>
+          </p:cNvSpPr>
+          <p:nvPr>
+            <p:ph type="title"/>
+          </p:nvPr>
+        </p:nvSpPr>
+        <p:spPr/>
+        <p:txBody>
+          <a:bodyPr/>
+          <a:lstStyle/>
+          <a:p>
+            <a:endParaRPr lang="en-US"/>
+          </a:p>
+        </p:txBody>
+      </p:sp>
+      <p:sp>
+        <p:nvSpPr>
+          <p:cNvPr id="3" name="Content Placeholder 2">
+            <a:extLst>
+              <a:ext uri="{FF2B5EF4-FFF2-40B4-BE49-F238E27FC236}">
+                <a16:creationId xmlns:a16="http://schemas.microsoft.com/office/drawing/2014/main" id="{EE07B58A-E355-44B6-BD3F-28CFB311B8E5}"/>
+              </a:ext>
+            </a:extLst>
+          </p:cNvPr>
+          <p:cNvSpPr>
+            <a:spLocks noGrp="1"/>
+          </p:cNvSpPr>
+          <p:nvPr>
+            <p:ph idx="1"/>
+          </p:nvPr>
+        </p:nvSpPr>
+        <p:spPr/>
+        <p:txBody>
+          <a:bodyPr/>
+          <a:lstStyle/>
+          <a:p>
+            <a:endParaRPr lang="en-US"/>
+          </a:p>
+        </p:txBody>
+      </p:sp>
+      <p:pic>
+        <p:nvPicPr>
+          <p:cNvPr id="4" name="Picture 3">
+            <a:extLst>
+              <a:ext uri="{FF2B5EF4-FFF2-40B4-BE49-F238E27FC236}">
+                <a16:creationId xmlns:a16="http://schemas.microsoft.com/office/drawing/2014/main" id="{006A46AB-6958-4518-A05B-ABA0A6564853}"/>
+              </a:ext>
+            </a:extLst>
+          </p:cNvPr>
+          <p:cNvPicPr>
+            <a:picLocks noChangeAspect="1"/>
+          </p:cNvPicPr>
+          <p:nvPr/>
+        </p:nvPicPr>
+        <p:blipFill>
+          <a:blip r:embed="rId2"/>
+          <a:stretch>
+            <a:fillRect/>
+          </a:stretch>
+        </p:blipFill>
+        <p:spPr>
+          <a:xfrm>
+            <a:off x="838200" y="116371"/>
+            <a:ext cx="7362825" cy="2305050"/>
+          </a:xfrm>
+          <a:prstGeom prst="rect">
+            <a:avLst/>
+          </a:prstGeom>
+        </p:spPr>
+      </p:pic>
+    </p:spTree>
+    <p:extLst>
+      <p:ext uri="{BB962C8B-B14F-4D97-AF65-F5344CB8AC3E}">
+        <p14:creationId xmlns:p14="http://schemas.microsoft.com/office/powerpoint/2010/main" val="3428685186"/>
+      </p:ext>
+    </p:extLst>
+  </p:cSld>
+  <p:clrMapOvr>
+    <a:masterClrMapping/>
+  </p:clrMapOvr>
+</p:sld>
+</file>
+
+<file path=ppt/slides/slide15.xml><?xml version="1.0" encoding="utf-8"?>
 <p:sld xmlns:a="http://schemas.openxmlformats.org/drawingml/2006/main" xmlns:r="http://schemas.openxmlformats.org/officeDocument/2006/relationships" xmlns:p="http://schemas.openxmlformats.org/presentationml/2006/main">
   <p:cSld>
     <p:spTree>
@@ -3463,7 +4142,7 @@
 </p:sld>
 </file>
 
-<file path=ppt/slides/slide11.xml><?xml version="1.0" encoding="utf-8"?>
+<file path=ppt/slides/slide16.xml><?xml version="1.0" encoding="utf-8"?>
 <p:sld xmlns:a="http://schemas.openxmlformats.org/drawingml/2006/main" xmlns:r="http://schemas.openxmlformats.org/officeDocument/2006/relationships" xmlns:p="http://schemas.openxmlformats.org/presentationml/2006/main">
   <p:cSld>
     <p:spTree>
@@ -3485,7 +4164,7 @@
           <p:cNvPr id="2" name="Title 1">
             <a:extLst>
               <a:ext uri="{FF2B5EF4-FFF2-40B4-BE49-F238E27FC236}">
-                <a16:creationId xmlns:a16="http://schemas.microsoft.com/office/drawing/2014/main" id="{B8A73EC2-D547-4DDF-818F-F356ABCC64D1}"/>
+                <a16:creationId xmlns:a16="http://schemas.microsoft.com/office/drawing/2014/main" id="{4309C141-D331-42D9-8777-FFB51BFF2B54}"/>
               </a:ext>
             </a:extLst>
           </p:cNvPr>
@@ -3496,12 +4175,33 @@
             <p:ph type="title"/>
           </p:nvPr>
         </p:nvSpPr>
-        <p:spPr/>
+        <p:spPr>
+          <a:xfrm>
+            <a:off x="371983" y="111906"/>
+            <a:ext cx="10515600" cy="1325563"/>
+          </a:xfrm>
+        </p:spPr>
         <p:txBody>
           <a:bodyPr/>
           <a:lstStyle/>
           <a:p>
-            <a:endParaRPr lang="en-US"/>
+            <a:r>
+              <a:rPr lang="en-US" dirty="0"/>
+              <a:t>Viewing </a:t>
+            </a:r>
+            <a:r>
+              <a:rPr lang="en-US" dirty="0" err="1"/>
+              <a:t>ClustAGE</a:t>
+            </a:r>
+            <a:r>
+              <a:rPr lang="en-US" dirty="0"/>
+              <a:t> Analysis of Similarity in Salmonella serovars with </a:t>
+            </a:r>
+            <a:r>
+              <a:rPr lang="en-US" dirty="0" err="1"/>
+              <a:t>iTOL</a:t>
+            </a:r>
+            <a:endParaRPr lang="en-US" dirty="0"/>
           </a:p>
         </p:txBody>
       </p:sp>
@@ -3510,7 +4210,7 @@
           <p:cNvPr id="5" name="Content Placeholder 4" descr="A screenshot of a cell phone&#10;&#10;Description automatically generated">
             <a:extLst>
               <a:ext uri="{FF2B5EF4-FFF2-40B4-BE49-F238E27FC236}">
-                <a16:creationId xmlns:a16="http://schemas.microsoft.com/office/drawing/2014/main" id="{EA0EEE6D-6550-4E2E-B300-2210E55CA376}"/>
+                <a16:creationId xmlns:a16="http://schemas.microsoft.com/office/drawing/2014/main" id="{3EA231A8-3ADB-466C-855D-2D93F556D0A1}"/>
               </a:ext>
             </a:extLst>
           </p:cNvPr>
@@ -3535,15 +4235,15 @@
         </p:blipFill>
         <p:spPr>
           <a:xfrm>
-            <a:off x="1955171" y="2193799"/>
-            <a:ext cx="7619048" cy="2952381"/>
+            <a:off x="966386" y="774687"/>
+            <a:ext cx="10259227" cy="5774781"/>
           </a:xfrm>
         </p:spPr>
       </p:pic>
     </p:spTree>
     <p:extLst>
       <p:ext uri="{BB962C8B-B14F-4D97-AF65-F5344CB8AC3E}">
-        <p14:creationId xmlns:p14="http://schemas.microsoft.com/office/powerpoint/2010/main" val="3226484819"/>
+        <p14:creationId xmlns:p14="http://schemas.microsoft.com/office/powerpoint/2010/main" val="3746403430"/>
       </p:ext>
     </p:extLst>
   </p:cSld>
@@ -3553,7 +4253,7 @@
 </p:sld>
 </file>
 
-<file path=ppt/slides/slide12.xml><?xml version="1.0" encoding="utf-8"?>
+<file path=ppt/slides/slide17.xml><?xml version="1.0" encoding="utf-8"?>
 <p:sld xmlns:a="http://schemas.openxmlformats.org/drawingml/2006/main" xmlns:r="http://schemas.openxmlformats.org/officeDocument/2006/relationships" xmlns:p="http://schemas.openxmlformats.org/presentationml/2006/main">
   <p:cSld>
     <p:spTree>
@@ -3575,7 +4275,7 @@
           <p:cNvPr id="2" name="Title 1">
             <a:extLst>
               <a:ext uri="{FF2B5EF4-FFF2-40B4-BE49-F238E27FC236}">
-                <a16:creationId xmlns:a16="http://schemas.microsoft.com/office/drawing/2014/main" id="{21409146-FD05-4552-990A-0FBEC104B494}"/>
+                <a16:creationId xmlns:a16="http://schemas.microsoft.com/office/drawing/2014/main" id="{D6054A5C-B595-46B8-9589-470E7CDB9EDB}"/>
               </a:ext>
             </a:extLst>
           </p:cNvPr>
@@ -3591,49 +4291,50 @@
           <a:bodyPr/>
           <a:lstStyle/>
           <a:p>
-            <a:endParaRPr lang="en-US"/>
-          </a:p>
-        </p:txBody>
-      </p:sp>
-      <p:pic>
-        <p:nvPicPr>
-          <p:cNvPr id="5" name="Content Placeholder 4" descr="A screenshot of a cell phone&#10;&#10;Description automatically generated">
-            <a:extLst>
-              <a:ext uri="{FF2B5EF4-FFF2-40B4-BE49-F238E27FC236}">
-                <a16:creationId xmlns:a16="http://schemas.microsoft.com/office/drawing/2014/main" id="{5FB7A9B5-36E2-49A4-977B-0FF80C93700F}"/>
-              </a:ext>
-            </a:extLst>
-          </p:cNvPr>
-          <p:cNvPicPr>
-            <a:picLocks noGrp="1" noChangeAspect="1"/>
-          </p:cNvPicPr>
+            <a:r>
+              <a:rPr lang="en-US" dirty="0"/>
+              <a:t>Depiction of </a:t>
+            </a:r>
+            <a:r>
+              <a:rPr lang="en-US" dirty="0" err="1"/>
+              <a:t>ClustAGE</a:t>
+            </a:r>
+            <a:r>
+              <a:rPr lang="en-US" dirty="0"/>
+              <a:t> Phylogenetic Relationships alongside Host Adaptation</a:t>
+            </a:r>
+          </a:p>
+        </p:txBody>
+      </p:sp>
+      <p:sp>
+        <p:nvSpPr>
+          <p:cNvPr id="3" name="Content Placeholder 2">
+            <a:extLst>
+              <a:ext uri="{FF2B5EF4-FFF2-40B4-BE49-F238E27FC236}">
+                <a16:creationId xmlns:a16="http://schemas.microsoft.com/office/drawing/2014/main" id="{6A9D549D-0502-452F-913A-B04F6274EEDE}"/>
+              </a:ext>
+            </a:extLst>
+          </p:cNvPr>
+          <p:cNvSpPr>
+            <a:spLocks noGrp="1"/>
+          </p:cNvSpPr>
           <p:nvPr>
             <p:ph idx="1"/>
           </p:nvPr>
-        </p:nvPicPr>
-        <p:blipFill>
-          <a:blip r:embed="rId2">
-            <a:extLst>
-              <a:ext uri="{28A0092B-C50C-407E-A947-70E740481C1C}">
-                <a14:useLocalDpi xmlns:a14="http://schemas.microsoft.com/office/drawing/2010/main" val="0"/>
-              </a:ext>
-            </a:extLst>
-          </a:blip>
-          <a:stretch>
-            <a:fillRect/>
-          </a:stretch>
-        </p:blipFill>
-        <p:spPr>
-          <a:xfrm>
-            <a:off x="2286476" y="2525103"/>
-            <a:ext cx="7619048" cy="2952381"/>
-          </a:xfrm>
-        </p:spPr>
-      </p:pic>
+        </p:nvSpPr>
+        <p:spPr/>
+        <p:txBody>
+          <a:bodyPr/>
+          <a:lstStyle/>
+          <a:p>
+            <a:endParaRPr lang="en-US" dirty="0"/>
+          </a:p>
+        </p:txBody>
+      </p:sp>
     </p:spTree>
     <p:extLst>
       <p:ext uri="{BB962C8B-B14F-4D97-AF65-F5344CB8AC3E}">
-        <p14:creationId xmlns:p14="http://schemas.microsoft.com/office/powerpoint/2010/main" val="4119337235"/>
+        <p14:creationId xmlns:p14="http://schemas.microsoft.com/office/powerpoint/2010/main" val="338791742"/>
       </p:ext>
     </p:extLst>
   </p:cSld>
@@ -3643,7 +4344,7 @@
 </p:sld>
 </file>
 
-<file path=ppt/slides/slide13.xml><?xml version="1.0" encoding="utf-8"?>
+<file path=ppt/slides/slide18.xml><?xml version="1.0" encoding="utf-8"?>
 <p:sld xmlns:a="http://schemas.openxmlformats.org/drawingml/2006/main" xmlns:r="http://schemas.openxmlformats.org/officeDocument/2006/relationships" xmlns:p="http://schemas.openxmlformats.org/presentationml/2006/main">
   <p:cSld>
     <p:spTree>
@@ -3681,7 +4382,27 @@
           <a:bodyPr/>
           <a:lstStyle/>
           <a:p>
-            <a:endParaRPr lang="en-US"/>
+            <a:r>
+              <a:rPr lang="en-US" dirty="0"/>
+              <a:t>Shared genes between all </a:t>
+            </a:r>
+            <a:r>
+              <a:rPr lang="en-US" i="1" dirty="0"/>
+              <a:t>Salmonella</a:t>
+            </a:r>
+            <a:r>
+              <a:rPr lang="en-US" dirty="0"/>
+              <a:t> sp. except </a:t>
+            </a:r>
+            <a:r>
+              <a:rPr lang="en-US" i="1" dirty="0"/>
+              <a:t>S. </a:t>
+            </a:r>
+            <a:r>
+              <a:rPr lang="en-US" i="1" dirty="0" err="1"/>
+              <a:t>bongori</a:t>
+            </a:r>
+            <a:endParaRPr lang="en-US" dirty="0"/>
           </a:p>
         </p:txBody>
       </p:sp>
@@ -3715,11 +4436,50 @@
         </p:blipFill>
         <p:spPr>
           <a:xfrm>
-            <a:off x="2286476" y="2525103"/>
-            <a:ext cx="7619048" cy="2952381"/>
+            <a:off x="838200" y="2521091"/>
+            <a:ext cx="9772377" cy="3786796"/>
           </a:xfrm>
         </p:spPr>
       </p:pic>
+      <p:sp>
+        <p:nvSpPr>
+          <p:cNvPr id="3" name="TextBox 2">
+            <a:extLst>
+              <a:ext uri="{FF2B5EF4-FFF2-40B4-BE49-F238E27FC236}">
+                <a16:creationId xmlns:a16="http://schemas.microsoft.com/office/drawing/2014/main" id="{CB5190C9-3731-475E-AB4E-5477DD3CC61C}"/>
+              </a:ext>
+            </a:extLst>
+          </p:cNvPr>
+          <p:cNvSpPr txBox="1"/>
+          <p:nvPr/>
+        </p:nvSpPr>
+        <p:spPr>
+          <a:xfrm>
+            <a:off x="1741161" y="2151759"/>
+            <a:ext cx="8869416" cy="369332"/>
+          </a:xfrm>
+          <a:prstGeom prst="rect">
+            <a:avLst/>
+          </a:prstGeom>
+          <a:noFill/>
+        </p:spPr>
+        <p:txBody>
+          <a:bodyPr wrap="none" rtlCol="0">
+            <a:spAutoFit/>
+          </a:bodyPr>
+          <a:lstStyle/>
+          <a:p>
+            <a:r>
+              <a:rPr lang="en-US" b="1" dirty="0"/>
+              <a:t>Type III Secretion System Effector Proteins </a:t>
+            </a:r>
+            <a:r>
+              <a:rPr lang="en-US" dirty="0"/>
+              <a:t>(necessary for virulence and invasion of host cells)</a:t>
+            </a:r>
+          </a:p>
+        </p:txBody>
+      </p:sp>
     </p:spTree>
     <p:extLst>
       <p:ext uri="{BB962C8B-B14F-4D97-AF65-F5344CB8AC3E}">
@@ -3733,7 +4493,7 @@
 </p:sld>
 </file>
 
-<file path=ppt/slides/slide14.xml><?xml version="1.0" encoding="utf-8"?>
+<file path=ppt/slides/slide19.xml><?xml version="1.0" encoding="utf-8"?>
 <p:sld xmlns:a="http://schemas.openxmlformats.org/drawingml/2006/main" xmlns:r="http://schemas.openxmlformats.org/officeDocument/2006/relationships" xmlns:p="http://schemas.openxmlformats.org/presentationml/2006/main">
   <p:cSld>
     <p:spTree>
@@ -3771,7 +4531,22 @@
           <a:bodyPr/>
           <a:lstStyle/>
           <a:p>
-            <a:endParaRPr lang="en-US"/>
+            <a:r>
+              <a:rPr lang="en-US" i="1" dirty="0"/>
+              <a:t>Salmonella enterica </a:t>
+            </a:r>
+            <a:r>
+              <a:rPr lang="en-US" dirty="0"/>
+              <a:t>serovar </a:t>
+            </a:r>
+            <a:r>
+              <a:rPr lang="en-US" dirty="0" err="1"/>
+              <a:t>Abortusovis</a:t>
+            </a:r>
+            <a:r>
+              <a:rPr lang="en-US" dirty="0"/>
+              <a:t> SR44, new unique gene set?</a:t>
+            </a:r>
           </a:p>
         </p:txBody>
       </p:sp>
@@ -3805,11 +4580,46 @@
         </p:blipFill>
         <p:spPr>
           <a:xfrm>
-            <a:off x="2286476" y="2525103"/>
-            <a:ext cx="7619048" cy="2952381"/>
+            <a:off x="938266" y="2454723"/>
+            <a:ext cx="9772377" cy="3786796"/>
           </a:xfrm>
         </p:spPr>
       </p:pic>
+      <p:sp>
+        <p:nvSpPr>
+          <p:cNvPr id="3" name="TextBox 2">
+            <a:extLst>
+              <a:ext uri="{FF2B5EF4-FFF2-40B4-BE49-F238E27FC236}">
+                <a16:creationId xmlns:a16="http://schemas.microsoft.com/office/drawing/2014/main" id="{96714CCA-E636-4CDB-9A5B-CEBB74F372E3}"/>
+              </a:ext>
+            </a:extLst>
+          </p:cNvPr>
+          <p:cNvSpPr txBox="1"/>
+          <p:nvPr/>
+        </p:nvSpPr>
+        <p:spPr>
+          <a:xfrm>
+            <a:off x="5115339" y="2040044"/>
+            <a:ext cx="2448363" cy="369332"/>
+          </a:xfrm>
+          <a:prstGeom prst="rect">
+            <a:avLst/>
+          </a:prstGeom>
+          <a:noFill/>
+        </p:spPr>
+        <p:txBody>
+          <a:bodyPr wrap="none" rtlCol="0">
+            <a:spAutoFit/>
+          </a:bodyPr>
+          <a:lstStyle/>
+          <a:p>
+            <a:r>
+              <a:rPr lang="en-US" dirty="0"/>
+              <a:t>“Hypothetical Proteins” </a:t>
+            </a:r>
+          </a:p>
+        </p:txBody>
+      </p:sp>
     </p:spTree>
     <p:extLst>
       <p:ext uri="{BB962C8B-B14F-4D97-AF65-F5344CB8AC3E}">
@@ -3842,10 +4652,10 @@
       </p:grpSpPr>
       <p:pic>
         <p:nvPicPr>
-          <p:cNvPr id="4" name="Picture 3">
-            <a:extLst>
-              <a:ext uri="{FF2B5EF4-FFF2-40B4-BE49-F238E27FC236}">
-                <a16:creationId xmlns:a16="http://schemas.microsoft.com/office/drawing/2014/main" id="{5BD057ED-F3AC-4A48-9995-2C2A23F6B088}"/>
+          <p:cNvPr id="5" name="Picture 4">
+            <a:extLst>
+              <a:ext uri="{FF2B5EF4-FFF2-40B4-BE49-F238E27FC236}">
+                <a16:creationId xmlns:a16="http://schemas.microsoft.com/office/drawing/2014/main" id="{7EBE794F-A93C-4D1B-B2A4-FB24BE695ED2}"/>
               </a:ext>
             </a:extLst>
           </p:cNvPr>
@@ -3862,18 +4672,732 @@
         </p:blipFill>
         <p:spPr>
           <a:xfrm>
-            <a:off x="838200" y="400343"/>
-            <a:ext cx="7210425" cy="1752600"/>
+            <a:off x="2569352" y="80963"/>
+            <a:ext cx="7672274" cy="6858000"/>
           </a:xfrm>
           <a:prstGeom prst="rect">
             <a:avLst/>
           </a:prstGeom>
         </p:spPr>
       </p:pic>
+      <p:sp>
+        <p:nvSpPr>
+          <p:cNvPr id="7" name="TextBox 6">
+            <a:extLst>
+              <a:ext uri="{FF2B5EF4-FFF2-40B4-BE49-F238E27FC236}">
+                <a16:creationId xmlns:a16="http://schemas.microsoft.com/office/drawing/2014/main" id="{49B30982-090F-4A95-B09F-D92053E1848C}"/>
+              </a:ext>
+            </a:extLst>
+          </p:cNvPr>
+          <p:cNvSpPr txBox="1"/>
+          <p:nvPr/>
+        </p:nvSpPr>
+        <p:spPr>
+          <a:xfrm>
+            <a:off x="10277180" y="6084148"/>
+            <a:ext cx="1914820" cy="646331"/>
+          </a:xfrm>
+          <a:prstGeom prst="rect">
+            <a:avLst/>
+          </a:prstGeom>
+          <a:noFill/>
+        </p:spPr>
+        <p:txBody>
+          <a:bodyPr wrap="none" rtlCol="0">
+            <a:spAutoFit/>
+          </a:bodyPr>
+          <a:lstStyle/>
+          <a:p>
+            <a:r>
+              <a:rPr lang="en-US" dirty="0" err="1"/>
+              <a:t>Feasey</a:t>
+            </a:r>
+            <a:r>
+              <a:rPr lang="en-US" dirty="0"/>
+              <a:t> et al. </a:t>
+            </a:r>
+          </a:p>
+          <a:p>
+            <a:r>
+              <a:rPr lang="en-US" dirty="0"/>
+              <a:t>(</a:t>
+            </a:r>
+            <a:r>
+              <a:rPr lang="en-US" i="1" dirty="0"/>
+              <a:t>The Lancet</a:t>
+            </a:r>
+            <a:r>
+              <a:rPr lang="en-US" dirty="0"/>
+              <a:t>, 2012)</a:t>
+            </a:r>
+          </a:p>
+        </p:txBody>
+      </p:sp>
     </p:spTree>
     <p:extLst>
       <p:ext uri="{BB962C8B-B14F-4D97-AF65-F5344CB8AC3E}">
-        <p14:creationId xmlns:p14="http://schemas.microsoft.com/office/powerpoint/2010/main" val="649556130"/>
+        <p14:creationId xmlns:p14="http://schemas.microsoft.com/office/powerpoint/2010/main" val="3042011893"/>
+      </p:ext>
+    </p:extLst>
+  </p:cSld>
+  <p:clrMapOvr>
+    <a:masterClrMapping/>
+  </p:clrMapOvr>
+</p:sld>
+</file>
+
+<file path=ppt/slides/slide20.xml><?xml version="1.0" encoding="utf-8"?>
+<p:sld xmlns:a="http://schemas.openxmlformats.org/drawingml/2006/main" xmlns:r="http://schemas.openxmlformats.org/officeDocument/2006/relationships" xmlns:p="http://schemas.openxmlformats.org/presentationml/2006/main">
+  <p:cSld>
+    <p:spTree>
+      <p:nvGrpSpPr>
+        <p:cNvPr id="1" name=""/>
+        <p:cNvGrpSpPr/>
+        <p:nvPr/>
+      </p:nvGrpSpPr>
+      <p:grpSpPr>
+        <a:xfrm>
+          <a:off x="0" y="0"/>
+          <a:ext cx="0" cy="0"/>
+          <a:chOff x="0" y="0"/>
+          <a:chExt cx="0" cy="0"/>
+        </a:xfrm>
+      </p:grpSpPr>
+      <p:sp>
+        <p:nvSpPr>
+          <p:cNvPr id="2" name="Title 1">
+            <a:extLst>
+              <a:ext uri="{FF2B5EF4-FFF2-40B4-BE49-F238E27FC236}">
+                <a16:creationId xmlns:a16="http://schemas.microsoft.com/office/drawing/2014/main" id="{21409146-FD05-4552-990A-0FBEC104B494}"/>
+              </a:ext>
+            </a:extLst>
+          </p:cNvPr>
+          <p:cNvSpPr>
+            <a:spLocks noGrp="1"/>
+          </p:cNvSpPr>
+          <p:nvPr>
+            <p:ph type="title"/>
+          </p:nvPr>
+        </p:nvSpPr>
+        <p:spPr/>
+        <p:txBody>
+          <a:bodyPr/>
+          <a:lstStyle/>
+          <a:p>
+            <a:r>
+              <a:rPr lang="en-US" dirty="0"/>
+              <a:t>Chloramphenicol resistance (continued)</a:t>
+            </a:r>
+          </a:p>
+        </p:txBody>
+      </p:sp>
+      <p:pic>
+        <p:nvPicPr>
+          <p:cNvPr id="5" name="Content Placeholder 4" descr="A screenshot of a cell phone&#10;&#10;Description automatically generated">
+            <a:extLst>
+              <a:ext uri="{FF2B5EF4-FFF2-40B4-BE49-F238E27FC236}">
+                <a16:creationId xmlns:a16="http://schemas.microsoft.com/office/drawing/2014/main" id="{5FB7A9B5-36E2-49A4-977B-0FF80C93700F}"/>
+              </a:ext>
+            </a:extLst>
+          </p:cNvPr>
+          <p:cNvPicPr>
+            <a:picLocks noGrp="1" noChangeAspect="1"/>
+          </p:cNvPicPr>
+          <p:nvPr>
+            <p:ph idx="1"/>
+          </p:nvPr>
+        </p:nvPicPr>
+        <p:blipFill>
+          <a:blip r:embed="rId2">
+            <a:extLst>
+              <a:ext uri="{28A0092B-C50C-407E-A947-70E740481C1C}">
+                <a14:useLocalDpi xmlns:a14="http://schemas.microsoft.com/office/drawing/2010/main" val="0"/>
+              </a:ext>
+            </a:extLst>
+          </a:blip>
+          <a:stretch>
+            <a:fillRect/>
+          </a:stretch>
+        </p:blipFill>
+        <p:spPr>
+          <a:xfrm>
+            <a:off x="1318306" y="2516428"/>
+            <a:ext cx="9343353" cy="3620549"/>
+          </a:xfrm>
+        </p:spPr>
+      </p:pic>
+      <p:sp>
+        <p:nvSpPr>
+          <p:cNvPr id="3" name="Rectangle 2">
+            <a:extLst>
+              <a:ext uri="{FF2B5EF4-FFF2-40B4-BE49-F238E27FC236}">
+                <a16:creationId xmlns:a16="http://schemas.microsoft.com/office/drawing/2014/main" id="{23891935-48FD-4197-B597-6BAB5BB077BF}"/>
+              </a:ext>
+            </a:extLst>
+          </p:cNvPr>
+          <p:cNvSpPr/>
+          <p:nvPr/>
+        </p:nvSpPr>
+        <p:spPr>
+          <a:xfrm>
+            <a:off x="7441791" y="1755572"/>
+            <a:ext cx="1744772" cy="923330"/>
+          </a:xfrm>
+          <a:prstGeom prst="rect">
+            <a:avLst/>
+          </a:prstGeom>
+        </p:spPr>
+        <p:txBody>
+          <a:bodyPr wrap="none">
+            <a:spAutoFit/>
+          </a:bodyPr>
+          <a:lstStyle/>
+          <a:p>
+            <a:pPr algn="ctr"/>
+            <a:r>
+              <a:rPr lang="en-US" dirty="0"/>
+              <a:t>SCH_012 </a:t>
+            </a:r>
+          </a:p>
+          <a:p>
+            <a:pPr algn="ctr"/>
+            <a:r>
+              <a:rPr lang="en-US" dirty="0"/>
+              <a:t>(</a:t>
+            </a:r>
+            <a:r>
+              <a:rPr lang="en-US" i="1" dirty="0"/>
+              <a:t>unknown </a:t>
+            </a:r>
+            <a:r>
+              <a:rPr lang="en-US" i="1" dirty="0" err="1"/>
+              <a:t>fxn</a:t>
+            </a:r>
+            <a:r>
+              <a:rPr lang="en-US" i="1" dirty="0"/>
+              <a:t>, </a:t>
+            </a:r>
+          </a:p>
+          <a:p>
+            <a:pPr algn="ctr"/>
+            <a:r>
+              <a:rPr lang="en-US" i="1" dirty="0"/>
+              <a:t>topoisomerase?)</a:t>
+            </a:r>
+            <a:endParaRPr lang="en-US" dirty="0"/>
+          </a:p>
+        </p:txBody>
+      </p:sp>
+      <p:sp>
+        <p:nvSpPr>
+          <p:cNvPr id="6" name="Rectangle 5">
+            <a:extLst>
+              <a:ext uri="{FF2B5EF4-FFF2-40B4-BE49-F238E27FC236}">
+                <a16:creationId xmlns:a16="http://schemas.microsoft.com/office/drawing/2014/main" id="{BAF98180-BD18-4572-8178-735086B0161F}"/>
+              </a:ext>
+            </a:extLst>
+          </p:cNvPr>
+          <p:cNvSpPr/>
+          <p:nvPr/>
+        </p:nvSpPr>
+        <p:spPr>
+          <a:xfrm>
+            <a:off x="4310896" y="1755572"/>
+            <a:ext cx="1785104" cy="923330"/>
+          </a:xfrm>
+          <a:prstGeom prst="rect">
+            <a:avLst/>
+          </a:prstGeom>
+        </p:spPr>
+        <p:txBody>
+          <a:bodyPr wrap="none">
+            <a:spAutoFit/>
+          </a:bodyPr>
+          <a:lstStyle/>
+          <a:p>
+            <a:pPr algn="ctr"/>
+            <a:r>
+              <a:rPr lang="en-US" i="1" dirty="0"/>
+              <a:t>cat2</a:t>
+            </a:r>
+          </a:p>
+          <a:p>
+            <a:pPr algn="ctr"/>
+            <a:r>
+              <a:rPr lang="en-US" dirty="0"/>
+              <a:t>Chloramphenicol</a:t>
+            </a:r>
+          </a:p>
+          <a:p>
+            <a:pPr algn="ctr"/>
+            <a:r>
+              <a:rPr lang="en-US" dirty="0"/>
+              <a:t>acetyltransferase</a:t>
+            </a:r>
+          </a:p>
+        </p:txBody>
+      </p:sp>
+    </p:spTree>
+    <p:extLst>
+      <p:ext uri="{BB962C8B-B14F-4D97-AF65-F5344CB8AC3E}">
+        <p14:creationId xmlns:p14="http://schemas.microsoft.com/office/powerpoint/2010/main" val="4119337235"/>
+      </p:ext>
+    </p:extLst>
+  </p:cSld>
+  <p:clrMapOvr>
+    <a:masterClrMapping/>
+  </p:clrMapOvr>
+</p:sld>
+</file>
+
+<file path=ppt/slides/slide21.xml><?xml version="1.0" encoding="utf-8"?>
+<p:sld xmlns:a="http://schemas.openxmlformats.org/drawingml/2006/main" xmlns:r="http://schemas.openxmlformats.org/officeDocument/2006/relationships" xmlns:p="http://schemas.openxmlformats.org/presentationml/2006/main">
+  <p:cSld>
+    <p:spTree>
+      <p:nvGrpSpPr>
+        <p:cNvPr id="1" name=""/>
+        <p:cNvGrpSpPr/>
+        <p:nvPr/>
+      </p:nvGrpSpPr>
+      <p:grpSpPr>
+        <a:xfrm>
+          <a:off x="0" y="0"/>
+          <a:ext cx="0" cy="0"/>
+          <a:chOff x="0" y="0"/>
+          <a:chExt cx="0" cy="0"/>
+        </a:xfrm>
+      </p:grpSpPr>
+      <p:sp>
+        <p:nvSpPr>
+          <p:cNvPr id="2" name="Title 1">
+            <a:extLst>
+              <a:ext uri="{FF2B5EF4-FFF2-40B4-BE49-F238E27FC236}">
+                <a16:creationId xmlns:a16="http://schemas.microsoft.com/office/drawing/2014/main" id="{F1EAB0B9-913D-4C06-9CBC-7540188F75FB}"/>
+              </a:ext>
+            </a:extLst>
+          </p:cNvPr>
+          <p:cNvSpPr>
+            <a:spLocks noGrp="1"/>
+          </p:cNvSpPr>
+          <p:nvPr>
+            <p:ph type="title"/>
+          </p:nvPr>
+        </p:nvSpPr>
+        <p:spPr>
+          <a:xfrm>
+            <a:off x="838200" y="351872"/>
+            <a:ext cx="10515600" cy="1325563"/>
+          </a:xfrm>
+        </p:spPr>
+        <p:txBody>
+          <a:bodyPr/>
+          <a:lstStyle/>
+          <a:p>
+            <a:r>
+              <a:rPr lang="en-US" dirty="0"/>
+              <a:t>Chloramphenicol and Chloramphenicol Acetyltransferase</a:t>
+            </a:r>
+          </a:p>
+        </p:txBody>
+      </p:sp>
+      <p:sp>
+        <p:nvSpPr>
+          <p:cNvPr id="3" name="Content Placeholder 2">
+            <a:extLst>
+              <a:ext uri="{FF2B5EF4-FFF2-40B4-BE49-F238E27FC236}">
+                <a16:creationId xmlns:a16="http://schemas.microsoft.com/office/drawing/2014/main" id="{25A5BF37-265A-453C-BF18-04D43966FBAF}"/>
+              </a:ext>
+            </a:extLst>
+          </p:cNvPr>
+          <p:cNvSpPr>
+            <a:spLocks noGrp="1"/>
+          </p:cNvSpPr>
+          <p:nvPr>
+            <p:ph idx="1"/>
+          </p:nvPr>
+        </p:nvSpPr>
+        <p:spPr>
+          <a:xfrm>
+            <a:off x="599661" y="1677435"/>
+            <a:ext cx="10515600" cy="4351338"/>
+          </a:xfrm>
+        </p:spPr>
+        <p:txBody>
+          <a:bodyPr/>
+          <a:lstStyle/>
+          <a:p>
+            <a:r>
+              <a:rPr lang="en-US" dirty="0"/>
+              <a:t>Chloramphenicol</a:t>
+            </a:r>
+          </a:p>
+          <a:p>
+            <a:pPr lvl="1"/>
+            <a:r>
+              <a:rPr lang="en-US" dirty="0"/>
+              <a:t>Widespread action against Gram (+) and Gram (-) Bacteria</a:t>
+            </a:r>
+          </a:p>
+          <a:p>
+            <a:pPr lvl="1"/>
+            <a:r>
+              <a:rPr lang="en-US" dirty="0"/>
+              <a:t>Inhibits Ribosomal 50S subunit, no protein translation</a:t>
+            </a:r>
+          </a:p>
+          <a:p>
+            <a:pPr marL="457200" lvl="1" indent="0">
+              <a:buNone/>
+            </a:pPr>
+            <a:endParaRPr lang="en-US" dirty="0"/>
+          </a:p>
+          <a:p>
+            <a:endParaRPr lang="en-US" dirty="0"/>
+          </a:p>
+          <a:p>
+            <a:endParaRPr lang="en-US" dirty="0"/>
+          </a:p>
+        </p:txBody>
+      </p:sp>
+      <p:pic>
+        <p:nvPicPr>
+          <p:cNvPr id="5" name="Picture 4" descr="A screenshot of a social media post&#10;&#10;Description automatically generated">
+            <a:extLst>
+              <a:ext uri="{FF2B5EF4-FFF2-40B4-BE49-F238E27FC236}">
+                <a16:creationId xmlns:a16="http://schemas.microsoft.com/office/drawing/2014/main" id="{8AA2DA3D-E964-4F23-BD59-9C402CC4B963}"/>
+              </a:ext>
+            </a:extLst>
+          </p:cNvPr>
+          <p:cNvPicPr>
+            <a:picLocks noChangeAspect="1"/>
+          </p:cNvPicPr>
+          <p:nvPr/>
+        </p:nvPicPr>
+        <p:blipFill>
+          <a:blip r:embed="rId2">
+            <a:extLst>
+              <a:ext uri="{28A0092B-C50C-407E-A947-70E740481C1C}">
+                <a14:useLocalDpi xmlns:a14="http://schemas.microsoft.com/office/drawing/2010/main" val="0"/>
+              </a:ext>
+            </a:extLst>
+          </a:blip>
+          <a:stretch>
+            <a:fillRect/>
+          </a:stretch>
+        </p:blipFill>
+        <p:spPr>
+          <a:xfrm>
+            <a:off x="1315889" y="1590183"/>
+            <a:ext cx="9315506" cy="5152667"/>
+          </a:xfrm>
+          <a:prstGeom prst="rect">
+            <a:avLst/>
+          </a:prstGeom>
+        </p:spPr>
+      </p:pic>
+      <p:sp>
+        <p:nvSpPr>
+          <p:cNvPr id="6" name="TextBox 5">
+            <a:extLst>
+              <a:ext uri="{FF2B5EF4-FFF2-40B4-BE49-F238E27FC236}">
+                <a16:creationId xmlns:a16="http://schemas.microsoft.com/office/drawing/2014/main" id="{DB4F6670-0DEF-4068-ABA1-1A9539183FCF}"/>
+              </a:ext>
+            </a:extLst>
+          </p:cNvPr>
+          <p:cNvSpPr txBox="1"/>
+          <p:nvPr/>
+        </p:nvSpPr>
+        <p:spPr>
+          <a:xfrm>
+            <a:off x="10519864" y="6321462"/>
+            <a:ext cx="1655518" cy="369332"/>
+          </a:xfrm>
+          <a:prstGeom prst="rect">
+            <a:avLst/>
+          </a:prstGeom>
+          <a:noFill/>
+        </p:spPr>
+        <p:txBody>
+          <a:bodyPr wrap="none" rtlCol="0">
+            <a:spAutoFit/>
+          </a:bodyPr>
+          <a:lstStyle/>
+          <a:p>
+            <a:r>
+              <a:rPr lang="en-US" dirty="0"/>
+              <a:t>Source: </a:t>
+            </a:r>
+            <a:r>
+              <a:rPr lang="en-US" dirty="0" err="1"/>
+              <a:t>UniProt</a:t>
+            </a:r>
+            <a:endParaRPr lang="en-US" dirty="0"/>
+          </a:p>
+        </p:txBody>
+      </p:sp>
+    </p:spTree>
+    <p:extLst>
+      <p:ext uri="{BB962C8B-B14F-4D97-AF65-F5344CB8AC3E}">
+        <p14:creationId xmlns:p14="http://schemas.microsoft.com/office/powerpoint/2010/main" val="2439351727"/>
+      </p:ext>
+    </p:extLst>
+  </p:cSld>
+  <p:clrMapOvr>
+    <a:masterClrMapping/>
+  </p:clrMapOvr>
+  <p:timing>
+    <p:tnLst>
+      <p:par>
+        <p:cTn id="1" dur="indefinite" restart="never" nodeType="tmRoot">
+          <p:childTnLst>
+            <p:seq concurrent="1" nextAc="seek">
+              <p:cTn id="2" dur="indefinite" nodeType="mainSeq">
+                <p:childTnLst>
+                  <p:par>
+                    <p:cTn id="3" fill="hold">
+                      <p:stCondLst>
+                        <p:cond delay="indefinite"/>
+                      </p:stCondLst>
+                      <p:childTnLst>
+                        <p:par>
+                          <p:cTn id="4" fill="hold">
+                            <p:stCondLst>
+                              <p:cond delay="0"/>
+                            </p:stCondLst>
+                            <p:childTnLst>
+                              <p:par>
+                                <p:cTn id="5" presetID="1" presetClass="entr" presetSubtype="0" fill="hold" nodeType="clickEffect">
+                                  <p:stCondLst>
+                                    <p:cond delay="0"/>
+                                  </p:stCondLst>
+                                  <p:childTnLst>
+                                    <p:set>
+                                      <p:cBhvr>
+                                        <p:cTn id="6" dur="1" fill="hold">
+                                          <p:stCondLst>
+                                            <p:cond delay="0"/>
+                                          </p:stCondLst>
+                                        </p:cTn>
+                                        <p:tgtEl>
+                                          <p:spTgt spid="5"/>
+                                        </p:tgtEl>
+                                        <p:attrNameLst>
+                                          <p:attrName>style.visibility</p:attrName>
+                                        </p:attrNameLst>
+                                      </p:cBhvr>
+                                      <p:to>
+                                        <p:strVal val="visible"/>
+                                      </p:to>
+                                    </p:set>
+                                  </p:childTnLst>
+                                </p:cTn>
+                              </p:par>
+                              <p:par>
+                                <p:cTn id="7" presetID="1" presetClass="entr" presetSubtype="0" fill="hold" grpId="0" nodeType="withEffect">
+                                  <p:stCondLst>
+                                    <p:cond delay="0"/>
+                                  </p:stCondLst>
+                                  <p:childTnLst>
+                                    <p:set>
+                                      <p:cBhvr>
+                                        <p:cTn id="8" dur="1" fill="hold">
+                                          <p:stCondLst>
+                                            <p:cond delay="0"/>
+                                          </p:stCondLst>
+                                        </p:cTn>
+                                        <p:tgtEl>
+                                          <p:spTgt spid="6"/>
+                                        </p:tgtEl>
+                                        <p:attrNameLst>
+                                          <p:attrName>style.visibility</p:attrName>
+                                        </p:attrNameLst>
+                                      </p:cBhvr>
+                                      <p:to>
+                                        <p:strVal val="visible"/>
+                                      </p:to>
+                                    </p:set>
+                                  </p:childTnLst>
+                                </p:cTn>
+                              </p:par>
+                            </p:childTnLst>
+                          </p:cTn>
+                        </p:par>
+                      </p:childTnLst>
+                    </p:cTn>
+                  </p:par>
+                </p:childTnLst>
+              </p:cTn>
+              <p:prevCondLst>
+                <p:cond evt="onPrev" delay="0">
+                  <p:tgtEl>
+                    <p:sldTgt/>
+                  </p:tgtEl>
+                </p:cond>
+              </p:prevCondLst>
+              <p:nextCondLst>
+                <p:cond evt="onNext" delay="0">
+                  <p:tgtEl>
+                    <p:sldTgt/>
+                  </p:tgtEl>
+                </p:cond>
+              </p:nextCondLst>
+            </p:seq>
+          </p:childTnLst>
+        </p:cTn>
+      </p:par>
+    </p:tnLst>
+    <p:bldLst>
+      <p:bldP spid="6" grpId="0"/>
+    </p:bldLst>
+  </p:timing>
+</p:sld>
+</file>
+
+<file path=ppt/slides/slide22.xml><?xml version="1.0" encoding="utf-8"?>
+<p:sld xmlns:a="http://schemas.openxmlformats.org/drawingml/2006/main" xmlns:r="http://schemas.openxmlformats.org/officeDocument/2006/relationships" xmlns:p="http://schemas.openxmlformats.org/presentationml/2006/main">
+  <p:cSld>
+    <p:spTree>
+      <p:nvGrpSpPr>
+        <p:cNvPr id="1" name=""/>
+        <p:cNvGrpSpPr/>
+        <p:nvPr/>
+      </p:nvGrpSpPr>
+      <p:grpSpPr>
+        <a:xfrm>
+          <a:off x="0" y="0"/>
+          <a:ext cx="0" cy="0"/>
+          <a:chOff x="0" y="0"/>
+          <a:chExt cx="0" cy="0"/>
+        </a:xfrm>
+      </p:grpSpPr>
+      <p:sp>
+        <p:nvSpPr>
+          <p:cNvPr id="2" name="Title 1">
+            <a:extLst>
+              <a:ext uri="{FF2B5EF4-FFF2-40B4-BE49-F238E27FC236}">
+                <a16:creationId xmlns:a16="http://schemas.microsoft.com/office/drawing/2014/main" id="{B8A73EC2-D547-4DDF-818F-F356ABCC64D1}"/>
+              </a:ext>
+            </a:extLst>
+          </p:cNvPr>
+          <p:cNvSpPr>
+            <a:spLocks noGrp="1"/>
+          </p:cNvSpPr>
+          <p:nvPr>
+            <p:ph type="title"/>
+          </p:nvPr>
+        </p:nvSpPr>
+        <p:spPr>
+          <a:xfrm>
+            <a:off x="692426" y="0"/>
+            <a:ext cx="10515600" cy="1660623"/>
+          </a:xfrm>
+        </p:spPr>
+        <p:txBody>
+          <a:bodyPr>
+            <a:normAutofit fontScale="90000"/>
+          </a:bodyPr>
+          <a:lstStyle/>
+          <a:p>
+            <a:r>
+              <a:rPr lang="en-US"/>
+              <a:t>Chloramphenicol resistance: </a:t>
+            </a:r>
+            <a:br>
+              <a:rPr lang="en-US"/>
+            </a:br>
+            <a:r>
+              <a:rPr lang="en-US" sz="3600"/>
+              <a:t>Shared by Choleraesuis SCB67 and Schwarzengrund CVM19633</a:t>
+            </a:r>
+            <a:endParaRPr lang="en-US" dirty="0"/>
+          </a:p>
+        </p:txBody>
+      </p:sp>
+      <p:pic>
+        <p:nvPicPr>
+          <p:cNvPr id="5" name="Content Placeholder 4" descr="A screenshot of a cell phone&#10;&#10;Description automatically generated">
+            <a:extLst>
+              <a:ext uri="{FF2B5EF4-FFF2-40B4-BE49-F238E27FC236}">
+                <a16:creationId xmlns:a16="http://schemas.microsoft.com/office/drawing/2014/main" id="{EA0EEE6D-6550-4E2E-B300-2210E55CA376}"/>
+              </a:ext>
+            </a:extLst>
+          </p:cNvPr>
+          <p:cNvPicPr>
+            <a:picLocks noGrp="1" noChangeAspect="1"/>
+          </p:cNvPicPr>
+          <p:nvPr>
+            <p:ph idx="1"/>
+          </p:nvPr>
+        </p:nvPicPr>
+        <p:blipFill>
+          <a:blip r:embed="rId2">
+            <a:extLst>
+              <a:ext uri="{28A0092B-C50C-407E-A947-70E740481C1C}">
+                <a14:useLocalDpi xmlns:a14="http://schemas.microsoft.com/office/drawing/2010/main" val="0"/>
+              </a:ext>
+            </a:extLst>
+          </a:blip>
+          <a:stretch>
+            <a:fillRect/>
+          </a:stretch>
+        </p:blipFill>
+        <p:spPr>
+          <a:xfrm>
+            <a:off x="1034420" y="2635348"/>
+            <a:ext cx="9831611" cy="3809749"/>
+          </a:xfrm>
+        </p:spPr>
+      </p:pic>
+      <p:sp>
+        <p:nvSpPr>
+          <p:cNvPr id="3" name="Rectangle 2">
+            <a:extLst>
+              <a:ext uri="{FF2B5EF4-FFF2-40B4-BE49-F238E27FC236}">
+                <a16:creationId xmlns:a16="http://schemas.microsoft.com/office/drawing/2014/main" id="{74193424-A562-46E8-9839-F463D1F67256}"/>
+              </a:ext>
+            </a:extLst>
+          </p:cNvPr>
+          <p:cNvSpPr/>
+          <p:nvPr/>
+        </p:nvSpPr>
+        <p:spPr>
+          <a:xfrm>
+            <a:off x="4574436" y="2266016"/>
+            <a:ext cx="4249112" cy="369332"/>
+          </a:xfrm>
+          <a:prstGeom prst="rect">
+            <a:avLst/>
+          </a:prstGeom>
+        </p:spPr>
+        <p:txBody>
+          <a:bodyPr wrap="none">
+            <a:spAutoFit/>
+          </a:bodyPr>
+          <a:lstStyle/>
+          <a:p>
+            <a:r>
+              <a:rPr lang="en-US" dirty="0" err="1"/>
+              <a:t>Bcr</a:t>
+            </a:r>
+            <a:r>
+              <a:rPr lang="en-US" dirty="0"/>
+              <a:t>/</a:t>
+            </a:r>
+            <a:r>
+              <a:rPr lang="en-US" dirty="0" err="1"/>
+              <a:t>CflA</a:t>
+            </a:r>
+            <a:r>
+              <a:rPr lang="en-US" dirty="0"/>
+              <a:t> family efflux transporter (putative)</a:t>
+            </a:r>
+          </a:p>
+        </p:txBody>
+      </p:sp>
+    </p:spTree>
+    <p:extLst>
+      <p:ext uri="{BB962C8B-B14F-4D97-AF65-F5344CB8AC3E}">
+        <p14:creationId xmlns:p14="http://schemas.microsoft.com/office/powerpoint/2010/main" val="3226484819"/>
       </p:ext>
     </p:extLst>
   </p:cSld>
@@ -3905,7 +5429,7 @@
           <p:cNvPr id="2" name="Title 1">
             <a:extLst>
               <a:ext uri="{FF2B5EF4-FFF2-40B4-BE49-F238E27FC236}">
-                <a16:creationId xmlns:a16="http://schemas.microsoft.com/office/drawing/2014/main" id="{5C2998F2-303E-41EF-BFB0-DECF094AF76B}"/>
+                <a16:creationId xmlns:a16="http://schemas.microsoft.com/office/drawing/2014/main" id="{B3964E01-09B3-42E4-87BE-5B36428BF6D8}"/>
               </a:ext>
             </a:extLst>
           </p:cNvPr>
@@ -3925,42 +5449,106 @@
           </a:p>
         </p:txBody>
       </p:sp>
-      <p:pic>
-        <p:nvPicPr>
-          <p:cNvPr id="4" name="Content Placeholder 3">
-            <a:extLst>
-              <a:ext uri="{FF2B5EF4-FFF2-40B4-BE49-F238E27FC236}">
-                <a16:creationId xmlns:a16="http://schemas.microsoft.com/office/drawing/2014/main" id="{C93FCDED-27AB-4AE5-989F-F11DB38075F4}"/>
-              </a:ext>
-            </a:extLst>
-          </p:cNvPr>
-          <p:cNvPicPr>
-            <a:picLocks noGrp="1" noChangeAspect="1"/>
-          </p:cNvPicPr>
+      <p:sp>
+        <p:nvSpPr>
+          <p:cNvPr id="3" name="Content Placeholder 2">
+            <a:extLst>
+              <a:ext uri="{FF2B5EF4-FFF2-40B4-BE49-F238E27FC236}">
+                <a16:creationId xmlns:a16="http://schemas.microsoft.com/office/drawing/2014/main" id="{76077117-D935-47B2-98FC-9D6C5E927721}"/>
+              </a:ext>
+            </a:extLst>
+          </p:cNvPr>
+          <p:cNvSpPr>
+            <a:spLocks noGrp="1"/>
+          </p:cNvSpPr>
           <p:nvPr>
             <p:ph idx="1"/>
           </p:nvPr>
-        </p:nvPicPr>
-        <p:blipFill>
-          <a:blip r:embed="rId2"/>
-          <a:stretch>
-            <a:fillRect/>
-          </a:stretch>
-        </p:blipFill>
-        <p:spPr>
-          <a:xfrm>
-            <a:off x="3602412" y="1083502"/>
-            <a:ext cx="4987175" cy="5271184"/>
-          </a:xfrm>
-          <a:prstGeom prst="rect">
-            <a:avLst/>
-          </a:prstGeom>
-        </p:spPr>
-      </p:pic>
+        </p:nvSpPr>
+        <p:spPr/>
+        <p:txBody>
+          <a:bodyPr/>
+          <a:lstStyle/>
+          <a:p>
+            <a:endParaRPr lang="en-US"/>
+          </a:p>
+        </p:txBody>
+      </p:sp>
+      <p:graphicFrame>
+        <p:nvGraphicFramePr>
+          <p:cNvPr id="4" name="Object 3">
+            <a:hlinkClick r:id="" action="ppaction://ole?verb=0"/>
+            <a:extLst>
+              <a:ext uri="{FF2B5EF4-FFF2-40B4-BE49-F238E27FC236}">
+                <a16:creationId xmlns:a16="http://schemas.microsoft.com/office/drawing/2014/main" id="{E30A2D0D-0AFD-47D3-AC19-8F25B81BB762}"/>
+              </a:ext>
+            </a:extLst>
+          </p:cNvPr>
+          <p:cNvGraphicFramePr>
+            <a:graphicFrameLocks noChangeAspect="1"/>
+          </p:cNvGraphicFramePr>
+          <p:nvPr>
+            <p:extLst>
+              <p:ext uri="{D42A27DB-BD31-4B8C-83A1-F6EECF244321}">
+                <p14:modId xmlns:p14="http://schemas.microsoft.com/office/powerpoint/2010/main" val="3182269243"/>
+              </p:ext>
+            </p:extLst>
+          </p:nvPr>
+        </p:nvGraphicFramePr>
+        <p:xfrm>
+          <a:off x="705679" y="0"/>
+          <a:ext cx="10515600" cy="6858000"/>
+        </p:xfrm>
+        <a:graphic>
+          <a:graphicData uri="http://schemas.openxmlformats.org/presentationml/2006/ole">
+            <mc:AlternateContent xmlns:mc="http://schemas.openxmlformats.org/markup-compatibility/2006">
+              <mc:Choice xmlns:v="urn:schemas-microsoft-com:vml" Requires="v">
+                <p:oleObj spid="_x0000_s4115" name="Presentation" r:id="rId3" imgW="5038285" imgH="3777990" progId="PowerPoint.Show.8">
+                  <p:embed/>
+                </p:oleObj>
+              </mc:Choice>
+              <mc:Fallback>
+                <p:oleObj name="Presentation" r:id="rId3" imgW="5038285" imgH="3777990" progId="PowerPoint.Show.8">
+                  <p:embed/>
+                  <p:pic>
+                    <p:nvPicPr>
+                      <p:cNvPr id="4" name="Object 3">
+                        <a:hlinkClick r:id="" action="ppaction://ole?verb=0"/>
+                        <a:extLst>
+                          <a:ext uri="{FF2B5EF4-FFF2-40B4-BE49-F238E27FC236}">
+                            <a16:creationId xmlns:a16="http://schemas.microsoft.com/office/drawing/2014/main" id="{F958ACCF-DDFF-4DE0-8FB6-8488CE272002}"/>
+                          </a:ext>
+                        </a:extLst>
+                      </p:cNvPr>
+                      <p:cNvPicPr/>
+                      <p:nvPr/>
+                    </p:nvPicPr>
+                    <p:blipFill>
+                      <a:blip r:embed="rId4"/>
+                      <a:stretch>
+                        <a:fillRect/>
+                      </a:stretch>
+                    </p:blipFill>
+                    <p:spPr>
+                      <a:xfrm>
+                        <a:off x="705679" y="0"/>
+                        <a:ext cx="10515600" cy="6858000"/>
+                      </a:xfrm>
+                      <a:prstGeom prst="rect">
+                        <a:avLst/>
+                      </a:prstGeom>
+                    </p:spPr>
+                  </p:pic>
+                </p:oleObj>
+              </mc:Fallback>
+            </mc:AlternateContent>
+          </a:graphicData>
+        </a:graphic>
+      </p:graphicFrame>
     </p:spTree>
     <p:extLst>
       <p:ext uri="{BB962C8B-B14F-4D97-AF65-F5344CB8AC3E}">
-        <p14:creationId xmlns:p14="http://schemas.microsoft.com/office/powerpoint/2010/main" val="586477179"/>
+        <p14:creationId xmlns:p14="http://schemas.microsoft.com/office/powerpoint/2010/main" val="3785324348"/>
       </p:ext>
     </p:extLst>
   </p:cSld>
@@ -3992,6 +5580,1172 @@
           <p:cNvPr id="2" name="Title 1">
             <a:extLst>
               <a:ext uri="{FF2B5EF4-FFF2-40B4-BE49-F238E27FC236}">
+                <a16:creationId xmlns:a16="http://schemas.microsoft.com/office/drawing/2014/main" id="{553838DF-AFD5-461D-9013-9C1BAE95472F}"/>
+              </a:ext>
+            </a:extLst>
+          </p:cNvPr>
+          <p:cNvSpPr>
+            <a:spLocks noGrp="1"/>
+          </p:cNvSpPr>
+          <p:nvPr>
+            <p:ph type="title"/>
+          </p:nvPr>
+        </p:nvSpPr>
+        <p:spPr/>
+        <p:txBody>
+          <a:bodyPr/>
+          <a:lstStyle/>
+          <a:p>
+            <a:r>
+              <a:rPr lang="en-US" dirty="0"/>
+              <a:t>What can we learn from comparing </a:t>
+            </a:r>
+            <a:r>
+              <a:rPr lang="en-US" i="1" dirty="0"/>
+              <a:t>Salmonella</a:t>
+            </a:r>
+            <a:r>
+              <a:rPr lang="en-US" dirty="0"/>
+              <a:t> serovar genomes?</a:t>
+            </a:r>
+          </a:p>
+        </p:txBody>
+      </p:sp>
+      <p:sp>
+        <p:nvSpPr>
+          <p:cNvPr id="3" name="Content Placeholder 2">
+            <a:extLst>
+              <a:ext uri="{FF2B5EF4-FFF2-40B4-BE49-F238E27FC236}">
+                <a16:creationId xmlns:a16="http://schemas.microsoft.com/office/drawing/2014/main" id="{76139877-8AB0-4725-A0A4-0359089E6876}"/>
+              </a:ext>
+            </a:extLst>
+          </p:cNvPr>
+          <p:cNvSpPr>
+            <a:spLocks noGrp="1"/>
+          </p:cNvSpPr>
+          <p:nvPr>
+            <p:ph idx="1"/>
+          </p:nvPr>
+        </p:nvSpPr>
+        <p:spPr>
+          <a:xfrm>
+            <a:off x="944217" y="1942753"/>
+            <a:ext cx="10515600" cy="4351338"/>
+          </a:xfrm>
+        </p:spPr>
+        <p:txBody>
+          <a:bodyPr/>
+          <a:lstStyle/>
+          <a:p>
+            <a:r>
+              <a:rPr lang="en-US" dirty="0"/>
+              <a:t>Requirement for host specificity/ adaptation</a:t>
+            </a:r>
+          </a:p>
+          <a:p>
+            <a:r>
+              <a:rPr lang="en-US" dirty="0"/>
+              <a:t>Mechanisms of virulence in different environments/ hosts</a:t>
+            </a:r>
+          </a:p>
+          <a:p>
+            <a:pPr lvl="1"/>
+            <a:r>
+              <a:rPr lang="en-US" dirty="0"/>
+              <a:t>Type III Secretion/ Invasion</a:t>
+            </a:r>
+          </a:p>
+          <a:p>
+            <a:pPr lvl="1"/>
+            <a:r>
+              <a:rPr lang="en-US" dirty="0"/>
+              <a:t>Attachment</a:t>
+            </a:r>
+          </a:p>
+          <a:p>
+            <a:pPr lvl="1"/>
+            <a:r>
+              <a:rPr lang="en-US" dirty="0"/>
+              <a:t>Antibiotic resistance</a:t>
+            </a:r>
+          </a:p>
+          <a:p>
+            <a:r>
+              <a:rPr lang="en-US" dirty="0"/>
+              <a:t>Understand the core genome of </a:t>
+            </a:r>
+            <a:r>
+              <a:rPr lang="en-US" i="1" dirty="0"/>
+              <a:t>Salmonella enterica</a:t>
+            </a:r>
+            <a:r>
+              <a:rPr lang="en-US" dirty="0"/>
+              <a:t> and accessory genomic elements for each serovar responsible for these phenotypes</a:t>
+            </a:r>
+          </a:p>
+          <a:p>
+            <a:pPr lvl="1"/>
+            <a:r>
+              <a:rPr lang="en-US" dirty="0"/>
+              <a:t>Use these to inform on relevant pathogenic accessory genomic elements of newly sequenced serovars</a:t>
+            </a:r>
+          </a:p>
+          <a:p>
+            <a:pPr lvl="1"/>
+            <a:r>
+              <a:rPr lang="en-US" dirty="0" err="1"/>
+              <a:t>ClustAGE</a:t>
+            </a:r>
+            <a:r>
+              <a:rPr lang="en-US" dirty="0"/>
+              <a:t> Pipeline</a:t>
+            </a:r>
+          </a:p>
+        </p:txBody>
+      </p:sp>
+    </p:spTree>
+    <p:extLst>
+      <p:ext uri="{BB962C8B-B14F-4D97-AF65-F5344CB8AC3E}">
+        <p14:creationId xmlns:p14="http://schemas.microsoft.com/office/powerpoint/2010/main" val="746231506"/>
+      </p:ext>
+    </p:extLst>
+  </p:cSld>
+  <p:clrMapOvr>
+    <a:masterClrMapping/>
+  </p:clrMapOvr>
+</p:sld>
+</file>
+
+<file path=ppt/slides/slide5.xml><?xml version="1.0" encoding="utf-8"?>
+<p:sld xmlns:a="http://schemas.openxmlformats.org/drawingml/2006/main" xmlns:r="http://schemas.openxmlformats.org/officeDocument/2006/relationships" xmlns:p="http://schemas.openxmlformats.org/presentationml/2006/main">
+  <p:cSld>
+    <p:spTree>
+      <p:nvGrpSpPr>
+        <p:cNvPr id="1" name=""/>
+        <p:cNvGrpSpPr/>
+        <p:nvPr/>
+      </p:nvGrpSpPr>
+      <p:grpSpPr>
+        <a:xfrm>
+          <a:off x="0" y="0"/>
+          <a:ext cx="0" cy="0"/>
+          <a:chOff x="0" y="0"/>
+          <a:chExt cx="0" cy="0"/>
+        </a:xfrm>
+      </p:grpSpPr>
+      <p:sp>
+        <p:nvSpPr>
+          <p:cNvPr id="2" name="Title 1">
+            <a:extLst>
+              <a:ext uri="{FF2B5EF4-FFF2-40B4-BE49-F238E27FC236}">
+                <a16:creationId xmlns:a16="http://schemas.microsoft.com/office/drawing/2014/main" id="{7CA7D053-572A-4602-AC30-52CDA0AF9453}"/>
+              </a:ext>
+            </a:extLst>
+          </p:cNvPr>
+          <p:cNvSpPr>
+            <a:spLocks noGrp="1"/>
+          </p:cNvSpPr>
+          <p:nvPr>
+            <p:ph type="title"/>
+          </p:nvPr>
+        </p:nvSpPr>
+        <p:spPr/>
+        <p:txBody>
+          <a:bodyPr/>
+          <a:lstStyle/>
+          <a:p>
+            <a:r>
+              <a:rPr lang="en-US" dirty="0"/>
+              <a:t>Pipeline</a:t>
+            </a:r>
+          </a:p>
+        </p:txBody>
+      </p:sp>
+      <p:sp>
+        <p:nvSpPr>
+          <p:cNvPr id="4" name="TextBox 3">
+            <a:extLst>
+              <a:ext uri="{FF2B5EF4-FFF2-40B4-BE49-F238E27FC236}">
+                <a16:creationId xmlns:a16="http://schemas.microsoft.com/office/drawing/2014/main" id="{D0D55D82-A319-45E3-9020-F1E267793597}"/>
+              </a:ext>
+            </a:extLst>
+          </p:cNvPr>
+          <p:cNvSpPr txBox="1"/>
+          <p:nvPr/>
+        </p:nvSpPr>
+        <p:spPr>
+          <a:xfrm>
+            <a:off x="718931" y="2270947"/>
+            <a:ext cx="1991507" cy="923330"/>
+          </a:xfrm>
+          <a:prstGeom prst="rect">
+            <a:avLst/>
+          </a:prstGeom>
+          <a:noFill/>
+        </p:spPr>
+        <p:txBody>
+          <a:bodyPr wrap="none" rtlCol="0">
+            <a:spAutoFit/>
+          </a:bodyPr>
+          <a:lstStyle/>
+          <a:p>
+            <a:pPr algn="ctr"/>
+            <a:r>
+              <a:rPr lang="en-US" dirty="0"/>
+              <a:t>18 </a:t>
+            </a:r>
+            <a:r>
+              <a:rPr lang="en-US" i="1" dirty="0"/>
+              <a:t>Salmonella</a:t>
+            </a:r>
+            <a:r>
+              <a:rPr lang="en-US" dirty="0"/>
+              <a:t> </a:t>
+            </a:r>
+          </a:p>
+          <a:p>
+            <a:pPr algn="ctr"/>
+            <a:r>
+              <a:rPr lang="en-US" dirty="0"/>
+              <a:t>reference genomes</a:t>
+            </a:r>
+          </a:p>
+          <a:p>
+            <a:pPr algn="ctr"/>
+            <a:r>
+              <a:rPr lang="en-US" dirty="0"/>
+              <a:t>(NCBI Database)</a:t>
+            </a:r>
+          </a:p>
+        </p:txBody>
+      </p:sp>
+      <p:sp>
+        <p:nvSpPr>
+          <p:cNvPr id="5" name="TextBox 4">
+            <a:extLst>
+              <a:ext uri="{FF2B5EF4-FFF2-40B4-BE49-F238E27FC236}">
+                <a16:creationId xmlns:a16="http://schemas.microsoft.com/office/drawing/2014/main" id="{3E1EFF87-BCB4-48D7-92C1-25B4CA2A8F43}"/>
+              </a:ext>
+            </a:extLst>
+          </p:cNvPr>
+          <p:cNvSpPr txBox="1"/>
+          <p:nvPr/>
+        </p:nvSpPr>
+        <p:spPr>
+          <a:xfrm>
+            <a:off x="4314650" y="2152893"/>
+            <a:ext cx="2809462" cy="646331"/>
+          </a:xfrm>
+          <a:prstGeom prst="rect">
+            <a:avLst/>
+          </a:prstGeom>
+          <a:noFill/>
+        </p:spPr>
+        <p:txBody>
+          <a:bodyPr wrap="square" rtlCol="0">
+            <a:spAutoFit/>
+          </a:bodyPr>
+          <a:lstStyle/>
+          <a:p>
+            <a:r>
+              <a:rPr lang="en-US" dirty="0"/>
+              <a:t>Determine core genome components</a:t>
+            </a:r>
+          </a:p>
+        </p:txBody>
+      </p:sp>
+      <p:sp>
+        <p:nvSpPr>
+          <p:cNvPr id="8" name="Arrow: Right 7">
+            <a:extLst>
+              <a:ext uri="{FF2B5EF4-FFF2-40B4-BE49-F238E27FC236}">
+                <a16:creationId xmlns:a16="http://schemas.microsoft.com/office/drawing/2014/main" id="{BCA9EE14-14C4-4B15-8B03-F795F265BF48}"/>
+              </a:ext>
+            </a:extLst>
+          </p:cNvPr>
+          <p:cNvSpPr/>
+          <p:nvPr/>
+        </p:nvSpPr>
+        <p:spPr>
+          <a:xfrm>
+            <a:off x="2973033" y="2654032"/>
+            <a:ext cx="1046921" cy="250784"/>
+          </a:xfrm>
+          <a:prstGeom prst="rightArrow">
+            <a:avLst/>
+          </a:prstGeom>
+          <a:ln>
+            <a:solidFill>
+              <a:schemeClr val="tx1"/>
+            </a:solidFill>
+          </a:ln>
+        </p:spPr>
+        <p:style>
+          <a:lnRef idx="2">
+            <a:schemeClr val="accent1">
+              <a:shade val="50000"/>
+            </a:schemeClr>
+          </a:lnRef>
+          <a:fillRef idx="1">
+            <a:schemeClr val="accent1"/>
+          </a:fillRef>
+          <a:effectRef idx="0">
+            <a:schemeClr val="accent1"/>
+          </a:effectRef>
+          <a:fontRef idx="minor">
+            <a:schemeClr val="lt1"/>
+          </a:fontRef>
+        </p:style>
+        <p:txBody>
+          <a:bodyPr rtlCol="0" anchor="ctr"/>
+          <a:lstStyle/>
+          <a:p>
+            <a:pPr algn="ctr"/>
+            <a:endParaRPr lang="en-US"/>
+          </a:p>
+        </p:txBody>
+      </p:sp>
+      <p:sp>
+        <p:nvSpPr>
+          <p:cNvPr id="9" name="TextBox 8">
+            <a:extLst>
+              <a:ext uri="{FF2B5EF4-FFF2-40B4-BE49-F238E27FC236}">
+                <a16:creationId xmlns:a16="http://schemas.microsoft.com/office/drawing/2014/main" id="{34952BCE-815F-4E03-805B-DCF884260BA0}"/>
+              </a:ext>
+            </a:extLst>
+          </p:cNvPr>
+          <p:cNvSpPr txBox="1"/>
+          <p:nvPr/>
+        </p:nvSpPr>
+        <p:spPr>
+          <a:xfrm>
+            <a:off x="3023145" y="2207925"/>
+            <a:ext cx="891591" cy="461665"/>
+          </a:xfrm>
+          <a:prstGeom prst="rect">
+            <a:avLst/>
+          </a:prstGeom>
+          <a:noFill/>
+        </p:spPr>
+        <p:txBody>
+          <a:bodyPr wrap="none" rtlCol="0">
+            <a:spAutoFit/>
+          </a:bodyPr>
+          <a:lstStyle/>
+          <a:p>
+            <a:r>
+              <a:rPr lang="en-US" sz="2400" b="1" dirty="0"/>
+              <a:t>Spine</a:t>
+            </a:r>
+          </a:p>
+        </p:txBody>
+      </p:sp>
+      <p:sp>
+        <p:nvSpPr>
+          <p:cNvPr id="10" name="TextBox 9">
+            <a:extLst>
+              <a:ext uri="{FF2B5EF4-FFF2-40B4-BE49-F238E27FC236}">
+                <a16:creationId xmlns:a16="http://schemas.microsoft.com/office/drawing/2014/main" id="{8C2B1DB0-A069-4699-9395-FCEB2237B285}"/>
+              </a:ext>
+            </a:extLst>
+          </p:cNvPr>
+          <p:cNvSpPr txBox="1"/>
+          <p:nvPr/>
+        </p:nvSpPr>
+        <p:spPr>
+          <a:xfrm>
+            <a:off x="238736" y="4505699"/>
+            <a:ext cx="2304278" cy="923330"/>
+          </a:xfrm>
+          <a:prstGeom prst="rect">
+            <a:avLst/>
+          </a:prstGeom>
+          <a:noFill/>
+        </p:spPr>
+        <p:txBody>
+          <a:bodyPr wrap="square" rtlCol="0">
+            <a:spAutoFit/>
+          </a:bodyPr>
+          <a:lstStyle/>
+          <a:p>
+            <a:r>
+              <a:rPr lang="en-US" dirty="0"/>
+              <a:t>Two Draft </a:t>
+            </a:r>
+            <a:r>
+              <a:rPr lang="en-US" i="1" dirty="0"/>
+              <a:t>Salmonella</a:t>
+            </a:r>
+            <a:r>
+              <a:rPr lang="en-US" dirty="0"/>
+              <a:t> genomes,</a:t>
+            </a:r>
+          </a:p>
+          <a:p>
+            <a:r>
+              <a:rPr lang="en-US" dirty="0"/>
+              <a:t>One only as .</a:t>
+            </a:r>
+            <a:r>
+              <a:rPr lang="en-US" dirty="0" err="1"/>
+              <a:t>fastq</a:t>
+            </a:r>
+            <a:r>
+              <a:rPr lang="en-US" dirty="0"/>
+              <a:t> files</a:t>
+            </a:r>
+          </a:p>
+        </p:txBody>
+      </p:sp>
+      <p:sp>
+        <p:nvSpPr>
+          <p:cNvPr id="11" name="Arrow: Right 10">
+            <a:extLst>
+              <a:ext uri="{FF2B5EF4-FFF2-40B4-BE49-F238E27FC236}">
+                <a16:creationId xmlns:a16="http://schemas.microsoft.com/office/drawing/2014/main" id="{2E944554-DDBA-4D70-A500-189935566800}"/>
+              </a:ext>
+            </a:extLst>
+          </p:cNvPr>
+          <p:cNvSpPr/>
+          <p:nvPr/>
+        </p:nvSpPr>
+        <p:spPr>
+          <a:xfrm rot="2447409">
+            <a:off x="1447878" y="5867281"/>
+            <a:ext cx="1046921" cy="250784"/>
+          </a:xfrm>
+          <a:prstGeom prst="rightArrow">
+            <a:avLst/>
+          </a:prstGeom>
+          <a:solidFill>
+            <a:schemeClr val="accent2"/>
+          </a:solidFill>
+          <a:ln>
+            <a:solidFill>
+              <a:schemeClr val="tx1"/>
+            </a:solidFill>
+          </a:ln>
+        </p:spPr>
+        <p:style>
+          <a:lnRef idx="2">
+            <a:schemeClr val="accent1">
+              <a:shade val="50000"/>
+            </a:schemeClr>
+          </a:lnRef>
+          <a:fillRef idx="1">
+            <a:schemeClr val="accent1"/>
+          </a:fillRef>
+          <a:effectRef idx="0">
+            <a:schemeClr val="accent1"/>
+          </a:effectRef>
+          <a:fontRef idx="minor">
+            <a:schemeClr val="lt1"/>
+          </a:fontRef>
+        </p:style>
+        <p:txBody>
+          <a:bodyPr rtlCol="0" anchor="ctr"/>
+          <a:lstStyle/>
+          <a:p>
+            <a:pPr algn="ctr"/>
+            <a:endParaRPr lang="en-US"/>
+          </a:p>
+        </p:txBody>
+      </p:sp>
+      <p:sp>
+        <p:nvSpPr>
+          <p:cNvPr id="12" name="TextBox 11">
+            <a:extLst>
+              <a:ext uri="{FF2B5EF4-FFF2-40B4-BE49-F238E27FC236}">
+                <a16:creationId xmlns:a16="http://schemas.microsoft.com/office/drawing/2014/main" id="{A4819870-6A84-4B00-AD0E-63DC0B2E3410}"/>
+              </a:ext>
+            </a:extLst>
+          </p:cNvPr>
+          <p:cNvSpPr txBox="1"/>
+          <p:nvPr/>
+        </p:nvSpPr>
+        <p:spPr>
+          <a:xfrm flipH="1">
+            <a:off x="1996572" y="5555766"/>
+            <a:ext cx="905999" cy="461665"/>
+          </a:xfrm>
+          <a:prstGeom prst="rect">
+            <a:avLst/>
+          </a:prstGeom>
+          <a:noFill/>
+        </p:spPr>
+        <p:txBody>
+          <a:bodyPr wrap="square" rtlCol="0">
+            <a:spAutoFit/>
+          </a:bodyPr>
+          <a:lstStyle/>
+          <a:p>
+            <a:r>
+              <a:rPr lang="en-US" sz="2400" b="1" dirty="0"/>
+              <a:t>Ray</a:t>
+            </a:r>
+          </a:p>
+        </p:txBody>
+      </p:sp>
+      <p:sp>
+        <p:nvSpPr>
+          <p:cNvPr id="13" name="TextBox 12">
+            <a:extLst>
+              <a:ext uri="{FF2B5EF4-FFF2-40B4-BE49-F238E27FC236}">
+                <a16:creationId xmlns:a16="http://schemas.microsoft.com/office/drawing/2014/main" id="{DC79FA95-2439-4CAE-A247-12A4917F718B}"/>
+              </a:ext>
+            </a:extLst>
+          </p:cNvPr>
+          <p:cNvSpPr txBox="1"/>
+          <p:nvPr/>
+        </p:nvSpPr>
+        <p:spPr>
+          <a:xfrm>
+            <a:off x="2506818" y="6017971"/>
+            <a:ext cx="2815835" cy="646331"/>
+          </a:xfrm>
+          <a:prstGeom prst="rect">
+            <a:avLst/>
+          </a:prstGeom>
+          <a:noFill/>
+        </p:spPr>
+        <p:txBody>
+          <a:bodyPr wrap="none" rtlCol="0">
+            <a:spAutoFit/>
+          </a:bodyPr>
+          <a:lstStyle/>
+          <a:p>
+            <a:r>
+              <a:rPr lang="en-US" dirty="0"/>
+              <a:t>Assembled genome</a:t>
+            </a:r>
+          </a:p>
+          <a:p>
+            <a:r>
+              <a:rPr lang="en-US" dirty="0"/>
+              <a:t>Serovar Typhimurium ST313</a:t>
+            </a:r>
+          </a:p>
+        </p:txBody>
+      </p:sp>
+      <p:sp>
+        <p:nvSpPr>
+          <p:cNvPr id="17" name="Arrow: Right 16">
+            <a:extLst>
+              <a:ext uri="{FF2B5EF4-FFF2-40B4-BE49-F238E27FC236}">
+                <a16:creationId xmlns:a16="http://schemas.microsoft.com/office/drawing/2014/main" id="{0796729D-4EDC-4448-8DEF-17CDF86DCB5E}"/>
+              </a:ext>
+            </a:extLst>
+          </p:cNvPr>
+          <p:cNvSpPr/>
+          <p:nvPr/>
+        </p:nvSpPr>
+        <p:spPr>
+          <a:xfrm>
+            <a:off x="2622218" y="4790186"/>
+            <a:ext cx="1046921" cy="250784"/>
+          </a:xfrm>
+          <a:prstGeom prst="rightArrow">
+            <a:avLst/>
+          </a:prstGeom>
+          <a:solidFill>
+            <a:srgbClr val="FF0000"/>
+          </a:solidFill>
+          <a:ln>
+            <a:solidFill>
+              <a:schemeClr val="tx1"/>
+            </a:solidFill>
+          </a:ln>
+        </p:spPr>
+        <p:style>
+          <a:lnRef idx="2">
+            <a:schemeClr val="accent1">
+              <a:shade val="50000"/>
+            </a:schemeClr>
+          </a:lnRef>
+          <a:fillRef idx="1">
+            <a:schemeClr val="accent1"/>
+          </a:fillRef>
+          <a:effectRef idx="0">
+            <a:schemeClr val="accent1"/>
+          </a:effectRef>
+          <a:fontRef idx="minor">
+            <a:schemeClr val="lt1"/>
+          </a:fontRef>
+        </p:style>
+        <p:txBody>
+          <a:bodyPr rtlCol="0" anchor="ctr"/>
+          <a:lstStyle/>
+          <a:p>
+            <a:pPr algn="ctr"/>
+            <a:endParaRPr lang="en-US"/>
+          </a:p>
+        </p:txBody>
+      </p:sp>
+      <p:sp>
+        <p:nvSpPr>
+          <p:cNvPr id="19" name="TextBox 18">
+            <a:extLst>
+              <a:ext uri="{FF2B5EF4-FFF2-40B4-BE49-F238E27FC236}">
+                <a16:creationId xmlns:a16="http://schemas.microsoft.com/office/drawing/2014/main" id="{1A91D7E7-57E4-4E8B-BECC-DA441D1AF8F6}"/>
+              </a:ext>
+            </a:extLst>
+          </p:cNvPr>
+          <p:cNvSpPr txBox="1"/>
+          <p:nvPr/>
+        </p:nvSpPr>
+        <p:spPr>
+          <a:xfrm>
+            <a:off x="3830498" y="3990061"/>
+            <a:ext cx="982705" cy="461665"/>
+          </a:xfrm>
+          <a:prstGeom prst="rect">
+            <a:avLst/>
+          </a:prstGeom>
+          <a:noFill/>
+        </p:spPr>
+        <p:txBody>
+          <a:bodyPr wrap="none" rtlCol="0">
+            <a:spAutoFit/>
+          </a:bodyPr>
+          <a:lstStyle/>
+          <a:p>
+            <a:r>
+              <a:rPr lang="en-US" sz="2400" b="1" dirty="0" err="1"/>
+              <a:t>AGEnt</a:t>
+            </a:r>
+            <a:endParaRPr lang="en-US" sz="2400" b="1" dirty="0"/>
+          </a:p>
+        </p:txBody>
+      </p:sp>
+      <p:sp>
+        <p:nvSpPr>
+          <p:cNvPr id="21" name="Rectangle 20">
+            <a:extLst>
+              <a:ext uri="{FF2B5EF4-FFF2-40B4-BE49-F238E27FC236}">
+                <a16:creationId xmlns:a16="http://schemas.microsoft.com/office/drawing/2014/main" id="{8E9140F0-4806-416E-A43F-C4A8889AEA83}"/>
+              </a:ext>
+            </a:extLst>
+          </p:cNvPr>
+          <p:cNvSpPr/>
+          <p:nvPr/>
+        </p:nvSpPr>
+        <p:spPr>
+          <a:xfrm>
+            <a:off x="4314650" y="2889855"/>
+            <a:ext cx="2281007" cy="923330"/>
+          </a:xfrm>
+          <a:prstGeom prst="rect">
+            <a:avLst/>
+          </a:prstGeom>
+        </p:spPr>
+        <p:txBody>
+          <a:bodyPr wrap="square">
+            <a:spAutoFit/>
+          </a:bodyPr>
+          <a:lstStyle/>
+          <a:p>
+            <a:r>
+              <a:rPr lang="en-US" dirty="0"/>
+              <a:t>Determine </a:t>
+            </a:r>
+            <a:r>
+              <a:rPr lang="en-US" i="1" dirty="0"/>
+              <a:t>A</a:t>
+            </a:r>
+            <a:r>
+              <a:rPr lang="en-US" dirty="0"/>
+              <a:t>ccessory </a:t>
+            </a:r>
+            <a:r>
+              <a:rPr lang="en-US" i="1" dirty="0"/>
+              <a:t>G</a:t>
+            </a:r>
+            <a:r>
+              <a:rPr lang="en-US" dirty="0"/>
+              <a:t>enomic </a:t>
+            </a:r>
+            <a:r>
+              <a:rPr lang="en-US" i="1" dirty="0"/>
+              <a:t>E</a:t>
+            </a:r>
+            <a:r>
+              <a:rPr lang="en-US" dirty="0"/>
+              <a:t>lements (AGE)</a:t>
+            </a:r>
+          </a:p>
+        </p:txBody>
+      </p:sp>
+      <p:sp>
+        <p:nvSpPr>
+          <p:cNvPr id="24" name="Arrow: Right 23">
+            <a:extLst>
+              <a:ext uri="{FF2B5EF4-FFF2-40B4-BE49-F238E27FC236}">
+                <a16:creationId xmlns:a16="http://schemas.microsoft.com/office/drawing/2014/main" id="{C35C5110-7EB7-4F48-B5BC-8E3BDB4B188A}"/>
+              </a:ext>
+            </a:extLst>
+          </p:cNvPr>
+          <p:cNvSpPr/>
+          <p:nvPr/>
+        </p:nvSpPr>
+        <p:spPr>
+          <a:xfrm>
+            <a:off x="7049945" y="2598596"/>
+            <a:ext cx="1046921" cy="250784"/>
+          </a:xfrm>
+          <a:prstGeom prst="rightArrow">
+            <a:avLst/>
+          </a:prstGeom>
+          <a:solidFill>
+            <a:schemeClr val="accent2"/>
+          </a:solidFill>
+          <a:ln>
+            <a:solidFill>
+              <a:schemeClr val="tx1"/>
+            </a:solidFill>
+          </a:ln>
+        </p:spPr>
+        <p:style>
+          <a:lnRef idx="2">
+            <a:schemeClr val="accent1">
+              <a:shade val="50000"/>
+            </a:schemeClr>
+          </a:lnRef>
+          <a:fillRef idx="1">
+            <a:schemeClr val="accent1"/>
+          </a:fillRef>
+          <a:effectRef idx="0">
+            <a:schemeClr val="accent1"/>
+          </a:effectRef>
+          <a:fontRef idx="minor">
+            <a:schemeClr val="lt1"/>
+          </a:fontRef>
+        </p:style>
+        <p:txBody>
+          <a:bodyPr rtlCol="0" anchor="ctr"/>
+          <a:lstStyle/>
+          <a:p>
+            <a:pPr algn="ctr"/>
+            <a:endParaRPr lang="en-US"/>
+          </a:p>
+        </p:txBody>
+      </p:sp>
+      <p:sp>
+        <p:nvSpPr>
+          <p:cNvPr id="25" name="TextBox 24">
+            <a:extLst>
+              <a:ext uri="{FF2B5EF4-FFF2-40B4-BE49-F238E27FC236}">
+                <a16:creationId xmlns:a16="http://schemas.microsoft.com/office/drawing/2014/main" id="{0393F927-430F-44C1-A7B8-32DF7460A4FB}"/>
+              </a:ext>
+            </a:extLst>
+          </p:cNvPr>
+          <p:cNvSpPr txBox="1"/>
+          <p:nvPr/>
+        </p:nvSpPr>
+        <p:spPr>
+          <a:xfrm>
+            <a:off x="6901203" y="2136931"/>
+            <a:ext cx="1344407" cy="461665"/>
+          </a:xfrm>
+          <a:prstGeom prst="rect">
+            <a:avLst/>
+          </a:prstGeom>
+          <a:noFill/>
+        </p:spPr>
+        <p:txBody>
+          <a:bodyPr wrap="none" rtlCol="0">
+            <a:spAutoFit/>
+          </a:bodyPr>
+          <a:lstStyle/>
+          <a:p>
+            <a:r>
+              <a:rPr lang="en-US" sz="2400" b="1" dirty="0" err="1"/>
+              <a:t>ClustAGE</a:t>
+            </a:r>
+            <a:endParaRPr lang="en-US" sz="2400" b="1" dirty="0"/>
+          </a:p>
+        </p:txBody>
+      </p:sp>
+      <p:sp>
+        <p:nvSpPr>
+          <p:cNvPr id="26" name="TextBox 25">
+            <a:extLst>
+              <a:ext uri="{FF2B5EF4-FFF2-40B4-BE49-F238E27FC236}">
+                <a16:creationId xmlns:a16="http://schemas.microsoft.com/office/drawing/2014/main" id="{AC1E8D57-55EA-418C-AE5C-EFC5C379FE67}"/>
+              </a:ext>
+            </a:extLst>
+          </p:cNvPr>
+          <p:cNvSpPr txBox="1"/>
+          <p:nvPr/>
+        </p:nvSpPr>
+        <p:spPr>
+          <a:xfrm>
+            <a:off x="8433628" y="1612154"/>
+            <a:ext cx="3195877" cy="2585323"/>
+          </a:xfrm>
+          <a:prstGeom prst="rect">
+            <a:avLst/>
+          </a:prstGeom>
+          <a:noFill/>
+        </p:spPr>
+        <p:txBody>
+          <a:bodyPr wrap="square" rtlCol="0">
+            <a:spAutoFit/>
+          </a:bodyPr>
+          <a:lstStyle/>
+          <a:p>
+            <a:r>
+              <a:rPr lang="en-US" dirty="0"/>
+              <a:t>Comparison of AGE’s with one another</a:t>
+            </a:r>
+          </a:p>
+          <a:p>
+            <a:endParaRPr lang="en-US" dirty="0"/>
+          </a:p>
+          <a:p>
+            <a:r>
+              <a:rPr lang="en-US" dirty="0"/>
+              <a:t>Create phylogenetic relationships based on AGE</a:t>
+            </a:r>
+          </a:p>
+          <a:p>
+            <a:endParaRPr lang="en-US" dirty="0"/>
+          </a:p>
+          <a:p>
+            <a:r>
+              <a:rPr lang="en-US" dirty="0"/>
+              <a:t>Create bins of accessory elements shared between serovars</a:t>
+            </a:r>
+          </a:p>
+        </p:txBody>
+      </p:sp>
+      <p:sp>
+        <p:nvSpPr>
+          <p:cNvPr id="27" name="TextBox 26">
+            <a:extLst>
+              <a:ext uri="{FF2B5EF4-FFF2-40B4-BE49-F238E27FC236}">
+                <a16:creationId xmlns:a16="http://schemas.microsoft.com/office/drawing/2014/main" id="{7AB75BE8-13FE-4D35-BAF7-B805995E6973}"/>
+              </a:ext>
+            </a:extLst>
+          </p:cNvPr>
+          <p:cNvSpPr txBox="1"/>
+          <p:nvPr/>
+        </p:nvSpPr>
+        <p:spPr>
+          <a:xfrm>
+            <a:off x="2592893" y="4337177"/>
+            <a:ext cx="1061957" cy="461665"/>
+          </a:xfrm>
+          <a:prstGeom prst="rect">
+            <a:avLst/>
+          </a:prstGeom>
+          <a:noFill/>
+        </p:spPr>
+        <p:txBody>
+          <a:bodyPr wrap="none" rtlCol="0">
+            <a:spAutoFit/>
+          </a:bodyPr>
+          <a:lstStyle/>
+          <a:p>
+            <a:r>
+              <a:rPr lang="en-US" sz="2400" b="1" dirty="0" err="1"/>
+              <a:t>Prokka</a:t>
+            </a:r>
+            <a:endParaRPr lang="en-US" sz="2400" b="1" dirty="0"/>
+          </a:p>
+        </p:txBody>
+      </p:sp>
+      <p:sp>
+        <p:nvSpPr>
+          <p:cNvPr id="28" name="Arrow: Right 27">
+            <a:extLst>
+              <a:ext uri="{FF2B5EF4-FFF2-40B4-BE49-F238E27FC236}">
+                <a16:creationId xmlns:a16="http://schemas.microsoft.com/office/drawing/2014/main" id="{2C165456-2086-47E9-9C2E-FA3BC90835F4}"/>
+              </a:ext>
+            </a:extLst>
+          </p:cNvPr>
+          <p:cNvSpPr/>
+          <p:nvPr/>
+        </p:nvSpPr>
+        <p:spPr>
+          <a:xfrm rot="18087215">
+            <a:off x="3090910" y="5486552"/>
+            <a:ext cx="914116" cy="275067"/>
+          </a:xfrm>
+          <a:prstGeom prst="rightArrow">
+            <a:avLst/>
+          </a:prstGeom>
+          <a:solidFill>
+            <a:srgbClr val="FF0000"/>
+          </a:solidFill>
+          <a:ln>
+            <a:solidFill>
+              <a:schemeClr val="tx1"/>
+            </a:solidFill>
+          </a:ln>
+        </p:spPr>
+        <p:style>
+          <a:lnRef idx="2">
+            <a:schemeClr val="accent1">
+              <a:shade val="50000"/>
+            </a:schemeClr>
+          </a:lnRef>
+          <a:fillRef idx="1">
+            <a:schemeClr val="accent1"/>
+          </a:fillRef>
+          <a:effectRef idx="0">
+            <a:schemeClr val="accent1"/>
+          </a:effectRef>
+          <a:fontRef idx="minor">
+            <a:schemeClr val="lt1"/>
+          </a:fontRef>
+        </p:style>
+        <p:txBody>
+          <a:bodyPr rtlCol="0" anchor="ctr"/>
+          <a:lstStyle/>
+          <a:p>
+            <a:pPr algn="ctr"/>
+            <a:endParaRPr lang="en-US"/>
+          </a:p>
+        </p:txBody>
+      </p:sp>
+      <p:sp>
+        <p:nvSpPr>
+          <p:cNvPr id="29" name="TextBox 28">
+            <a:extLst>
+              <a:ext uri="{FF2B5EF4-FFF2-40B4-BE49-F238E27FC236}">
+                <a16:creationId xmlns:a16="http://schemas.microsoft.com/office/drawing/2014/main" id="{7B7B4438-0438-4CE8-8324-FD74E970B6B6}"/>
+              </a:ext>
+            </a:extLst>
+          </p:cNvPr>
+          <p:cNvSpPr txBox="1"/>
+          <p:nvPr/>
+        </p:nvSpPr>
+        <p:spPr>
+          <a:xfrm>
+            <a:off x="3748343" y="4782698"/>
+            <a:ext cx="2592954" cy="369332"/>
+          </a:xfrm>
+          <a:prstGeom prst="rect">
+            <a:avLst/>
+          </a:prstGeom>
+          <a:noFill/>
+        </p:spPr>
+        <p:txBody>
+          <a:bodyPr wrap="none" rtlCol="0">
+            <a:spAutoFit/>
+          </a:bodyPr>
+          <a:lstStyle/>
+          <a:p>
+            <a:r>
+              <a:rPr lang="en-US" dirty="0"/>
+              <a:t>Annotated draft genomes</a:t>
+            </a:r>
+          </a:p>
+        </p:txBody>
+      </p:sp>
+      <p:sp>
+        <p:nvSpPr>
+          <p:cNvPr id="30" name="Arrow: Right 29">
+            <a:extLst>
+              <a:ext uri="{FF2B5EF4-FFF2-40B4-BE49-F238E27FC236}">
+                <a16:creationId xmlns:a16="http://schemas.microsoft.com/office/drawing/2014/main" id="{BB277062-BA5A-4436-90B7-174FCFDF463D}"/>
+              </a:ext>
+            </a:extLst>
+          </p:cNvPr>
+          <p:cNvSpPr/>
+          <p:nvPr/>
+        </p:nvSpPr>
+        <p:spPr>
+          <a:xfrm rot="17100000">
+            <a:off x="4510682" y="4112687"/>
+            <a:ext cx="760619" cy="299801"/>
+          </a:xfrm>
+          <a:prstGeom prst="rightArrow">
+            <a:avLst/>
+          </a:prstGeom>
+          <a:ln>
+            <a:solidFill>
+              <a:schemeClr val="tx1"/>
+            </a:solidFill>
+          </a:ln>
+        </p:spPr>
+        <p:style>
+          <a:lnRef idx="2">
+            <a:schemeClr val="accent1">
+              <a:shade val="50000"/>
+            </a:schemeClr>
+          </a:lnRef>
+          <a:fillRef idx="1">
+            <a:schemeClr val="accent1"/>
+          </a:fillRef>
+          <a:effectRef idx="0">
+            <a:schemeClr val="accent1"/>
+          </a:effectRef>
+          <a:fontRef idx="minor">
+            <a:schemeClr val="lt1"/>
+          </a:fontRef>
+        </p:style>
+        <p:txBody>
+          <a:bodyPr rtlCol="0" anchor="ctr"/>
+          <a:lstStyle/>
+          <a:p>
+            <a:pPr algn="ctr"/>
+            <a:endParaRPr lang="en-US"/>
+          </a:p>
+        </p:txBody>
+      </p:sp>
+    </p:spTree>
+    <p:extLst>
+      <p:ext uri="{BB962C8B-B14F-4D97-AF65-F5344CB8AC3E}">
+        <p14:creationId xmlns:p14="http://schemas.microsoft.com/office/powerpoint/2010/main" val="3512942060"/>
+      </p:ext>
+    </p:extLst>
+  </p:cSld>
+  <p:clrMapOvr>
+    <a:masterClrMapping/>
+  </p:clrMapOvr>
+</p:sld>
+</file>
+
+<file path=ppt/slides/slide6.xml><?xml version="1.0" encoding="utf-8"?>
+<p:sld xmlns:a="http://schemas.openxmlformats.org/drawingml/2006/main" xmlns:r="http://schemas.openxmlformats.org/officeDocument/2006/relationships" xmlns:p="http://schemas.openxmlformats.org/presentationml/2006/main">
+  <p:cSld>
+    <p:spTree>
+      <p:nvGrpSpPr>
+        <p:cNvPr id="1" name=""/>
+        <p:cNvGrpSpPr/>
+        <p:nvPr/>
+      </p:nvGrpSpPr>
+      <p:grpSpPr>
+        <a:xfrm>
+          <a:off x="0" y="0"/>
+          <a:ext cx="0" cy="0"/>
+          <a:chOff x="0" y="0"/>
+          <a:chExt cx="0" cy="0"/>
+        </a:xfrm>
+      </p:grpSpPr>
+      <p:sp>
+        <p:nvSpPr>
+          <p:cNvPr id="2" name="Title 1">
+            <a:extLst>
+              <a:ext uri="{FF2B5EF4-FFF2-40B4-BE49-F238E27FC236}">
+                <a16:creationId xmlns:a16="http://schemas.microsoft.com/office/drawing/2014/main" id="{5C2998F2-303E-41EF-BFB0-DECF094AF76B}"/>
+              </a:ext>
+            </a:extLst>
+          </p:cNvPr>
+          <p:cNvSpPr>
+            <a:spLocks noGrp="1"/>
+          </p:cNvSpPr>
+          <p:nvPr>
+            <p:ph type="title"/>
+          </p:nvPr>
+        </p:nvSpPr>
+        <p:spPr/>
+        <p:txBody>
+          <a:bodyPr/>
+          <a:lstStyle/>
+          <a:p>
+            <a:endParaRPr lang="en-US"/>
+          </a:p>
+        </p:txBody>
+      </p:sp>
+      <p:pic>
+        <p:nvPicPr>
+          <p:cNvPr id="4" name="Content Placeholder 3">
+            <a:extLst>
+              <a:ext uri="{FF2B5EF4-FFF2-40B4-BE49-F238E27FC236}">
+                <a16:creationId xmlns:a16="http://schemas.microsoft.com/office/drawing/2014/main" id="{C93FCDED-27AB-4AE5-989F-F11DB38075F4}"/>
+              </a:ext>
+            </a:extLst>
+          </p:cNvPr>
+          <p:cNvPicPr>
+            <a:picLocks noGrp="1" noChangeAspect="1"/>
+          </p:cNvPicPr>
+          <p:nvPr>
+            <p:ph idx="1"/>
+          </p:nvPr>
+        </p:nvPicPr>
+        <p:blipFill>
+          <a:blip r:embed="rId2"/>
+          <a:stretch>
+            <a:fillRect/>
+          </a:stretch>
+        </p:blipFill>
+        <p:spPr>
+          <a:xfrm>
+            <a:off x="3602412" y="1690688"/>
+            <a:ext cx="4987175" cy="5271184"/>
+          </a:xfrm>
+          <a:prstGeom prst="rect">
+            <a:avLst/>
+          </a:prstGeom>
+        </p:spPr>
+      </p:pic>
+      <p:pic>
+        <p:nvPicPr>
+          <p:cNvPr id="5" name="Picture 4">
+            <a:extLst>
+              <a:ext uri="{FF2B5EF4-FFF2-40B4-BE49-F238E27FC236}">
+                <a16:creationId xmlns:a16="http://schemas.microsoft.com/office/drawing/2014/main" id="{0697CE0B-4745-4383-93B6-2EA1A6464F1E}"/>
+              </a:ext>
+            </a:extLst>
+          </p:cNvPr>
+          <p:cNvPicPr>
+            <a:picLocks noChangeAspect="1"/>
+          </p:cNvPicPr>
+          <p:nvPr/>
+        </p:nvPicPr>
+        <p:blipFill>
+          <a:blip r:embed="rId3"/>
+          <a:stretch>
+            <a:fillRect/>
+          </a:stretch>
+        </p:blipFill>
+        <p:spPr>
+          <a:xfrm>
+            <a:off x="387627" y="151606"/>
+            <a:ext cx="7210425" cy="1752600"/>
+          </a:xfrm>
+          <a:prstGeom prst="rect">
+            <a:avLst/>
+          </a:prstGeom>
+        </p:spPr>
+      </p:pic>
+    </p:spTree>
+    <p:extLst>
+      <p:ext uri="{BB962C8B-B14F-4D97-AF65-F5344CB8AC3E}">
+        <p14:creationId xmlns:p14="http://schemas.microsoft.com/office/powerpoint/2010/main" val="586477179"/>
+      </p:ext>
+    </p:extLst>
+  </p:cSld>
+  <p:clrMapOvr>
+    <a:masterClrMapping/>
+  </p:clrMapOvr>
+</p:sld>
+</file>
+
+<file path=ppt/slides/slide7.xml><?xml version="1.0" encoding="utf-8"?>
+<p:sld xmlns:a="http://schemas.openxmlformats.org/drawingml/2006/main" xmlns:r="http://schemas.openxmlformats.org/officeDocument/2006/relationships" xmlns:p="http://schemas.openxmlformats.org/presentationml/2006/main">
+  <p:cSld>
+    <p:spTree>
+      <p:nvGrpSpPr>
+        <p:cNvPr id="1" name=""/>
+        <p:cNvGrpSpPr/>
+        <p:nvPr/>
+      </p:nvGrpSpPr>
+      <p:grpSpPr>
+        <a:xfrm>
+          <a:off x="0" y="0"/>
+          <a:ext cx="0" cy="0"/>
+          <a:chOff x="0" y="0"/>
+          <a:chExt cx="0" cy="0"/>
+        </a:xfrm>
+      </p:grpSpPr>
+      <p:sp>
+        <p:nvSpPr>
+          <p:cNvPr id="2" name="Title 1">
+            <a:extLst>
+              <a:ext uri="{FF2B5EF4-FFF2-40B4-BE49-F238E27FC236}">
                 <a16:creationId xmlns:a16="http://schemas.microsoft.com/office/drawing/2014/main" id="{552CBC2E-3407-48AC-8A12-C436D18C5D56}"/>
               </a:ext>
             </a:extLst>
@@ -4065,7 +6819,7 @@
           <a:graphicData uri="http://schemas.openxmlformats.org/presentationml/2006/ole">
             <mc:AlternateContent xmlns:mc="http://schemas.openxmlformats.org/markup-compatibility/2006">
               <mc:Choice xmlns:v="urn:schemas-microsoft-com:vml" Requires="v">
-                <p:oleObj spid="_x0000_s3077" name="Acrobat Document" r:id="rId3" imgW="4800230" imgH="3562037" progId="AcroExch.Document.DC">
+                <p:oleObj spid="_x0000_s3094" name="Acrobat Document" r:id="rId3" imgW="4800230" imgH="3562037" progId="AcroExch.Document.DC">
                   <p:embed/>
                 </p:oleObj>
               </mc:Choice>
@@ -4113,7 +6867,7 @@
 </p:sld>
 </file>
 
-<file path=ppt/slides/slide5.xml><?xml version="1.0" encoding="utf-8"?>
+<file path=ppt/slides/slide8.xml><?xml version="1.0" encoding="utf-8"?>
 <p:sld xmlns:a="http://schemas.openxmlformats.org/drawingml/2006/main" xmlns:r="http://schemas.openxmlformats.org/officeDocument/2006/relationships" xmlns:p="http://schemas.openxmlformats.org/presentationml/2006/main">
   <p:cSld>
     <p:spTree>
@@ -4208,7 +6962,7 @@
           <a:graphicData uri="http://schemas.openxmlformats.org/presentationml/2006/ole">
             <mc:AlternateContent xmlns:mc="http://schemas.openxmlformats.org/markup-compatibility/2006">
               <mc:Choice xmlns:v="urn:schemas-microsoft-com:vml" Requires="v">
-                <p:oleObj spid="_x0000_s1030" name="Acrobat Document" r:id="rId3" imgW="4552639" imgH="3562037" progId="AcroExch.Document.DC">
+                <p:oleObj spid="_x0000_s1047" name="Acrobat Document" r:id="rId3" imgW="4552639" imgH="3562037" progId="AcroExch.Document.DC">
                   <p:embed/>
                 </p:oleObj>
               </mc:Choice>
@@ -4256,7 +7010,7 @@
 </p:sld>
 </file>
 
-<file path=ppt/slides/slide6.xml><?xml version="1.0" encoding="utf-8"?>
+<file path=ppt/slides/slide9.xml><?xml version="1.0" encoding="utf-8"?>
 <p:sld xmlns:a="http://schemas.openxmlformats.org/drawingml/2006/main" xmlns:r="http://schemas.openxmlformats.org/officeDocument/2006/relationships" xmlns:p="http://schemas.openxmlformats.org/presentationml/2006/main">
   <p:cSld>
     <p:spTree>
@@ -4351,7 +7105,7 @@
           <a:graphicData uri="http://schemas.openxmlformats.org/presentationml/2006/ole">
             <mc:AlternateContent xmlns:mc="http://schemas.openxmlformats.org/markup-compatibility/2006">
               <mc:Choice xmlns:v="urn:schemas-microsoft-com:vml" Requires="v">
-                <p:oleObj spid="_x0000_s2054" name="Acrobat Document" r:id="rId3" imgW="4914762" imgH="3562037" progId="AcroExch.Document.DC">
+                <p:oleObj spid="_x0000_s2071" name="Acrobat Document" r:id="rId3" imgW="4914762" imgH="3562037" progId="AcroExch.Document.DC">
                   <p:embed/>
                 </p:oleObj>
               </mc:Choice>
@@ -4390,305 +7144,6 @@
     <p:extLst>
       <p:ext uri="{BB962C8B-B14F-4D97-AF65-F5344CB8AC3E}">
         <p14:creationId xmlns:p14="http://schemas.microsoft.com/office/powerpoint/2010/main" val="2872794351"/>
-      </p:ext>
-    </p:extLst>
-  </p:cSld>
-  <p:clrMapOvr>
-    <a:masterClrMapping/>
-  </p:clrMapOvr>
-</p:sld>
-</file>
-
-<file path=ppt/slides/slide7.xml><?xml version="1.0" encoding="utf-8"?>
-<p:sld xmlns:a="http://schemas.openxmlformats.org/drawingml/2006/main" xmlns:r="http://schemas.openxmlformats.org/officeDocument/2006/relationships" xmlns:p="http://schemas.openxmlformats.org/presentationml/2006/main">
-  <p:cSld>
-    <p:spTree>
-      <p:nvGrpSpPr>
-        <p:cNvPr id="1" name=""/>
-        <p:cNvGrpSpPr/>
-        <p:nvPr/>
-      </p:nvGrpSpPr>
-      <p:grpSpPr>
-        <a:xfrm>
-          <a:off x="0" y="0"/>
-          <a:ext cx="0" cy="0"/>
-          <a:chOff x="0" y="0"/>
-          <a:chExt cx="0" cy="0"/>
-        </a:xfrm>
-      </p:grpSpPr>
-      <p:sp>
-        <p:nvSpPr>
-          <p:cNvPr id="3" name="Content Placeholder 2">
-            <a:extLst>
-              <a:ext uri="{FF2B5EF4-FFF2-40B4-BE49-F238E27FC236}">
-                <a16:creationId xmlns:a16="http://schemas.microsoft.com/office/drawing/2014/main" id="{55149057-A66C-4935-8C9B-9203C8226A52}"/>
-              </a:ext>
-            </a:extLst>
-          </p:cNvPr>
-          <p:cNvSpPr>
-            <a:spLocks noGrp="1"/>
-          </p:cNvSpPr>
-          <p:nvPr>
-            <p:ph idx="1"/>
-          </p:nvPr>
-        </p:nvSpPr>
-        <p:spPr>
-          <a:xfrm>
-            <a:off x="838200" y="2152357"/>
-            <a:ext cx="10515600" cy="4024606"/>
-          </a:xfrm>
-        </p:spPr>
-        <p:txBody>
-          <a:bodyPr/>
-          <a:lstStyle/>
-          <a:p>
-            <a:r>
-              <a:rPr lang="en-US" dirty="0"/>
-              <a:t>Provide reference protein database (</a:t>
-            </a:r>
-            <a:r>
-              <a:rPr lang="en-US" i="1" dirty="0"/>
-              <a:t>S. enterica </a:t>
-            </a:r>
-            <a:r>
-              <a:rPr lang="en-US" dirty="0"/>
-              <a:t>Typhimurium SL1344)</a:t>
-            </a:r>
-          </a:p>
-          <a:p>
-            <a:pPr lvl="1"/>
-            <a:r>
-              <a:rPr lang="en-US" dirty="0"/>
-              <a:t>Searches with </a:t>
-            </a:r>
-            <a:r>
-              <a:rPr lang="en-US" dirty="0" err="1"/>
-              <a:t>BLASTp</a:t>
-            </a:r>
-            <a:endParaRPr lang="en-US" dirty="0"/>
-          </a:p>
-          <a:p>
-            <a:r>
-              <a:rPr lang="en-US" dirty="0"/>
-              <a:t>Then, searches multiple databases to annotate genome in succession</a:t>
-            </a:r>
-          </a:p>
-          <a:p>
-            <a:pPr lvl="1"/>
-            <a:r>
-              <a:rPr lang="en-US" dirty="0" err="1"/>
-              <a:t>UniProt</a:t>
-            </a:r>
-            <a:r>
-              <a:rPr lang="en-US" dirty="0"/>
-              <a:t>, using BLAST+</a:t>
-            </a:r>
-          </a:p>
-          <a:p>
-            <a:pPr lvl="1"/>
-            <a:r>
-              <a:rPr lang="en-US" dirty="0" err="1"/>
-              <a:t>RefSeq</a:t>
-            </a:r>
-            <a:r>
-              <a:rPr lang="en-US" dirty="0"/>
-              <a:t> (finished bacterial genomes for a genus) [Salmonella]</a:t>
-            </a:r>
-          </a:p>
-          <a:p>
-            <a:pPr lvl="1"/>
-            <a:r>
-              <a:rPr lang="en-US" dirty="0"/>
-              <a:t>HMMER3.1 hidden Markov model profile </a:t>
-            </a:r>
-            <a:r>
-              <a:rPr lang="en-US" dirty="0" err="1"/>
-              <a:t>db’s</a:t>
-            </a:r>
-            <a:r>
-              <a:rPr lang="en-US" dirty="0"/>
-              <a:t> (</a:t>
-            </a:r>
-            <a:r>
-              <a:rPr lang="en-US" dirty="0" err="1"/>
-              <a:t>Pfam</a:t>
-            </a:r>
-            <a:r>
-              <a:rPr lang="en-US" dirty="0"/>
-              <a:t>)</a:t>
-            </a:r>
-          </a:p>
-          <a:p>
-            <a:pPr lvl="2"/>
-            <a:r>
-              <a:rPr lang="en-US" dirty="0"/>
-              <a:t>Basically searches for homologues to known proteins</a:t>
-            </a:r>
-          </a:p>
-          <a:p>
-            <a:r>
-              <a:rPr lang="en-US" dirty="0"/>
-              <a:t>Failing to annotate everything, will fill in remaining CDS with “hypothetical protein”</a:t>
-            </a:r>
-          </a:p>
-        </p:txBody>
-      </p:sp>
-      <p:pic>
-        <p:nvPicPr>
-          <p:cNvPr id="4" name="Picture 3">
-            <a:extLst>
-              <a:ext uri="{FF2B5EF4-FFF2-40B4-BE49-F238E27FC236}">
-                <a16:creationId xmlns:a16="http://schemas.microsoft.com/office/drawing/2014/main" id="{3C0A3D6C-8C9A-48A4-9D0A-7C996A798543}"/>
-              </a:ext>
-            </a:extLst>
-          </p:cNvPr>
-          <p:cNvPicPr>
-            <a:picLocks noChangeAspect="1"/>
-          </p:cNvPicPr>
-          <p:nvPr/>
-        </p:nvPicPr>
-        <p:blipFill>
-          <a:blip r:embed="rId2"/>
-          <a:stretch>
-            <a:fillRect/>
-          </a:stretch>
-        </p:blipFill>
-        <p:spPr>
-          <a:xfrm>
-            <a:off x="838200" y="225425"/>
-            <a:ext cx="9220200" cy="1600200"/>
-          </a:xfrm>
-          <a:prstGeom prst="rect">
-            <a:avLst/>
-          </a:prstGeom>
-        </p:spPr>
-      </p:pic>
-    </p:spTree>
-    <p:extLst>
-      <p:ext uri="{BB962C8B-B14F-4D97-AF65-F5344CB8AC3E}">
-        <p14:creationId xmlns:p14="http://schemas.microsoft.com/office/powerpoint/2010/main" val="4060716384"/>
-      </p:ext>
-    </p:extLst>
-  </p:cSld>
-  <p:clrMapOvr>
-    <a:masterClrMapping/>
-  </p:clrMapOvr>
-</p:sld>
-</file>
-
-<file path=ppt/slides/slide8.xml><?xml version="1.0" encoding="utf-8"?>
-<p:sld xmlns:a="http://schemas.openxmlformats.org/drawingml/2006/main" xmlns:r="http://schemas.openxmlformats.org/officeDocument/2006/relationships" xmlns:p="http://schemas.openxmlformats.org/presentationml/2006/main">
-  <p:cSld>
-    <p:spTree>
-      <p:nvGrpSpPr>
-        <p:cNvPr id="1" name=""/>
-        <p:cNvGrpSpPr/>
-        <p:nvPr/>
-      </p:nvGrpSpPr>
-      <p:grpSpPr>
-        <a:xfrm>
-          <a:off x="0" y="0"/>
-          <a:ext cx="0" cy="0"/>
-          <a:chOff x="0" y="0"/>
-          <a:chExt cx="0" cy="0"/>
-        </a:xfrm>
-      </p:grpSpPr>
-      <p:pic>
-        <p:nvPicPr>
-          <p:cNvPr id="4" name="Content Placeholder 3">
-            <a:extLst>
-              <a:ext uri="{FF2B5EF4-FFF2-40B4-BE49-F238E27FC236}">
-                <a16:creationId xmlns:a16="http://schemas.microsoft.com/office/drawing/2014/main" id="{7A065A41-0924-426F-B777-01CA56B10B48}"/>
-              </a:ext>
-            </a:extLst>
-          </p:cNvPr>
-          <p:cNvPicPr>
-            <a:picLocks noGrp="1" noChangeAspect="1"/>
-          </p:cNvPicPr>
-          <p:nvPr>
-            <p:ph idx="1"/>
-          </p:nvPr>
-        </p:nvPicPr>
-        <p:blipFill>
-          <a:blip r:embed="rId2"/>
-          <a:stretch>
-            <a:fillRect/>
-          </a:stretch>
-        </p:blipFill>
-        <p:spPr>
-          <a:xfrm>
-            <a:off x="161363" y="689317"/>
-            <a:ext cx="11496387" cy="5748193"/>
-          </a:xfrm>
-          <a:prstGeom prst="rect">
-            <a:avLst/>
-          </a:prstGeom>
-        </p:spPr>
-      </p:pic>
-    </p:spTree>
-    <p:extLst>
-      <p:ext uri="{BB962C8B-B14F-4D97-AF65-F5344CB8AC3E}">
-        <p14:creationId xmlns:p14="http://schemas.microsoft.com/office/powerpoint/2010/main" val="3352240278"/>
-      </p:ext>
-    </p:extLst>
-  </p:cSld>
-  <p:clrMapOvr>
-    <a:masterClrMapping/>
-  </p:clrMapOvr>
-</p:sld>
-</file>
-
-<file path=ppt/slides/slide9.xml><?xml version="1.0" encoding="utf-8"?>
-<p:sld xmlns:a="http://schemas.openxmlformats.org/drawingml/2006/main" xmlns:r="http://schemas.openxmlformats.org/officeDocument/2006/relationships" xmlns:p="http://schemas.openxmlformats.org/presentationml/2006/main">
-  <p:cSld>
-    <p:spTree>
-      <p:nvGrpSpPr>
-        <p:cNvPr id="1" name=""/>
-        <p:cNvGrpSpPr/>
-        <p:nvPr/>
-      </p:nvGrpSpPr>
-      <p:grpSpPr>
-        <a:xfrm>
-          <a:off x="0" y="0"/>
-          <a:ext cx="0" cy="0"/>
-          <a:chOff x="0" y="0"/>
-          <a:chExt cx="0" cy="0"/>
-        </a:xfrm>
-      </p:grpSpPr>
-      <p:pic>
-        <p:nvPicPr>
-          <p:cNvPr id="5" name="Picture 4">
-            <a:extLst>
-              <a:ext uri="{FF2B5EF4-FFF2-40B4-BE49-F238E27FC236}">
-                <a16:creationId xmlns:a16="http://schemas.microsoft.com/office/drawing/2014/main" id="{D3904ACB-765F-4623-8781-ADBBBFD4DC4D}"/>
-              </a:ext>
-            </a:extLst>
-          </p:cNvPr>
-          <p:cNvPicPr>
-            <a:picLocks noChangeAspect="1"/>
-          </p:cNvPicPr>
-          <p:nvPr/>
-        </p:nvPicPr>
-        <p:blipFill>
-          <a:blip r:embed="rId2"/>
-          <a:stretch>
-            <a:fillRect/>
-          </a:stretch>
-        </p:blipFill>
-        <p:spPr>
-          <a:xfrm>
-            <a:off x="576777" y="742657"/>
-            <a:ext cx="10745372" cy="5372685"/>
-          </a:xfrm>
-          <a:prstGeom prst="rect">
-            <a:avLst/>
-          </a:prstGeom>
-        </p:spPr>
-      </p:pic>
-    </p:spTree>
-    <p:extLst>
-      <p:ext uri="{BB962C8B-B14F-4D97-AF65-F5344CB8AC3E}">
-        <p14:creationId xmlns:p14="http://schemas.microsoft.com/office/powerpoint/2010/main" val="2328160473"/>
       </p:ext>
     </p:extLst>
   </p:cSld>

</xml_diff>

<commit_message>
Added to ppt; Citations
</commit_message>
<xml_diff>
--- a/190425_Verdegaal_EEB723_project.pptx
+++ b/190425_Verdegaal_EEB723_project.pptx
@@ -5,28 +5,30 @@
     <p:sldMasterId id="2147483648" r:id="rId1"/>
   </p:sldMasterIdLst>
   <p:sldIdLst>
-    <p:sldId id="276" r:id="rId2"/>
-    <p:sldId id="256" r:id="rId3"/>
-    <p:sldId id="270" r:id="rId4"/>
-    <p:sldId id="277" r:id="rId5"/>
-    <p:sldId id="278" r:id="rId6"/>
-    <p:sldId id="264" r:id="rId7"/>
-    <p:sldId id="267" r:id="rId8"/>
-    <p:sldId id="265" r:id="rId9"/>
-    <p:sldId id="266" r:id="rId10"/>
-    <p:sldId id="268" r:id="rId11"/>
-    <p:sldId id="272" r:id="rId12"/>
-    <p:sldId id="258" r:id="rId13"/>
-    <p:sldId id="257" r:id="rId14"/>
-    <p:sldId id="271" r:id="rId15"/>
-    <p:sldId id="259" r:id="rId16"/>
-    <p:sldId id="273" r:id="rId17"/>
-    <p:sldId id="274" r:id="rId18"/>
-    <p:sldId id="262" r:id="rId19"/>
-    <p:sldId id="263" r:id="rId20"/>
-    <p:sldId id="261" r:id="rId21"/>
-    <p:sldId id="275" r:id="rId22"/>
-    <p:sldId id="260" r:id="rId23"/>
+    <p:sldId id="280" r:id="rId2"/>
+    <p:sldId id="276" r:id="rId3"/>
+    <p:sldId id="256" r:id="rId4"/>
+    <p:sldId id="270" r:id="rId5"/>
+    <p:sldId id="277" r:id="rId6"/>
+    <p:sldId id="278" r:id="rId7"/>
+    <p:sldId id="264" r:id="rId8"/>
+    <p:sldId id="267" r:id="rId9"/>
+    <p:sldId id="265" r:id="rId10"/>
+    <p:sldId id="266" r:id="rId11"/>
+    <p:sldId id="268" r:id="rId12"/>
+    <p:sldId id="272" r:id="rId13"/>
+    <p:sldId id="258" r:id="rId14"/>
+    <p:sldId id="257" r:id="rId15"/>
+    <p:sldId id="271" r:id="rId16"/>
+    <p:sldId id="259" r:id="rId17"/>
+    <p:sldId id="273" r:id="rId18"/>
+    <p:sldId id="281" r:id="rId19"/>
+    <p:sldId id="274" r:id="rId20"/>
+    <p:sldId id="262" r:id="rId21"/>
+    <p:sldId id="263" r:id="rId22"/>
+    <p:sldId id="261" r:id="rId23"/>
+    <p:sldId id="275" r:id="rId24"/>
+    <p:sldId id="260" r:id="rId25"/>
   </p:sldIdLst>
   <p:sldSz cx="12192000" cy="6858000"/>
   <p:notesSz cx="6858000" cy="9144000"/>
@@ -280,7 +282,7 @@
           <a:p>
             <a:fld id="{324A5D12-1C84-4738-8CCF-DFBF95DC265C}" type="datetimeFigureOut">
               <a:rPr lang="en-US" smtClean="0"/>
-              <a:t>4/19/2019</a:t>
+              <a:t>4/20/2019</a:t>
             </a:fld>
             <a:endParaRPr lang="en-US"/>
           </a:p>
@@ -478,7 +480,7 @@
           <a:p>
             <a:fld id="{324A5D12-1C84-4738-8CCF-DFBF95DC265C}" type="datetimeFigureOut">
               <a:rPr lang="en-US" smtClean="0"/>
-              <a:t>4/19/2019</a:t>
+              <a:t>4/20/2019</a:t>
             </a:fld>
             <a:endParaRPr lang="en-US"/>
           </a:p>
@@ -686,7 +688,7 @@
           <a:p>
             <a:fld id="{324A5D12-1C84-4738-8CCF-DFBF95DC265C}" type="datetimeFigureOut">
               <a:rPr lang="en-US" smtClean="0"/>
-              <a:t>4/19/2019</a:t>
+              <a:t>4/20/2019</a:t>
             </a:fld>
             <a:endParaRPr lang="en-US"/>
           </a:p>
@@ -884,7 +886,7 @@
           <a:p>
             <a:fld id="{324A5D12-1C84-4738-8CCF-DFBF95DC265C}" type="datetimeFigureOut">
               <a:rPr lang="en-US" smtClean="0"/>
-              <a:t>4/19/2019</a:t>
+              <a:t>4/20/2019</a:t>
             </a:fld>
             <a:endParaRPr lang="en-US"/>
           </a:p>
@@ -1159,7 +1161,7 @@
           <a:p>
             <a:fld id="{324A5D12-1C84-4738-8CCF-DFBF95DC265C}" type="datetimeFigureOut">
               <a:rPr lang="en-US" smtClean="0"/>
-              <a:t>4/19/2019</a:t>
+              <a:t>4/20/2019</a:t>
             </a:fld>
             <a:endParaRPr lang="en-US"/>
           </a:p>
@@ -1424,7 +1426,7 @@
           <a:p>
             <a:fld id="{324A5D12-1C84-4738-8CCF-DFBF95DC265C}" type="datetimeFigureOut">
               <a:rPr lang="en-US" smtClean="0"/>
-              <a:t>4/19/2019</a:t>
+              <a:t>4/20/2019</a:t>
             </a:fld>
             <a:endParaRPr lang="en-US"/>
           </a:p>
@@ -1836,7 +1838,7 @@
           <a:p>
             <a:fld id="{324A5D12-1C84-4738-8CCF-DFBF95DC265C}" type="datetimeFigureOut">
               <a:rPr lang="en-US" smtClean="0"/>
-              <a:t>4/19/2019</a:t>
+              <a:t>4/20/2019</a:t>
             </a:fld>
             <a:endParaRPr lang="en-US"/>
           </a:p>
@@ -1977,7 +1979,7 @@
           <a:p>
             <a:fld id="{324A5D12-1C84-4738-8CCF-DFBF95DC265C}" type="datetimeFigureOut">
               <a:rPr lang="en-US" smtClean="0"/>
-              <a:t>4/19/2019</a:t>
+              <a:t>4/20/2019</a:t>
             </a:fld>
             <a:endParaRPr lang="en-US"/>
           </a:p>
@@ -2090,7 +2092,7 @@
           <a:p>
             <a:fld id="{324A5D12-1C84-4738-8CCF-DFBF95DC265C}" type="datetimeFigureOut">
               <a:rPr lang="en-US" smtClean="0"/>
-              <a:t>4/19/2019</a:t>
+              <a:t>4/20/2019</a:t>
             </a:fld>
             <a:endParaRPr lang="en-US"/>
           </a:p>
@@ -2401,7 +2403,7 @@
           <a:p>
             <a:fld id="{324A5D12-1C84-4738-8CCF-DFBF95DC265C}" type="datetimeFigureOut">
               <a:rPr lang="en-US" smtClean="0"/>
-              <a:t>4/19/2019</a:t>
+              <a:t>4/20/2019</a:t>
             </a:fld>
             <a:endParaRPr lang="en-US"/>
           </a:p>
@@ -2689,7 +2691,7 @@
           <a:p>
             <a:fld id="{324A5D12-1C84-4738-8CCF-DFBF95DC265C}" type="datetimeFigureOut">
               <a:rPr lang="en-US" smtClean="0"/>
-              <a:t>4/19/2019</a:t>
+              <a:t>4/20/2019</a:t>
             </a:fld>
             <a:endParaRPr lang="en-US"/>
           </a:p>
@@ -2930,7 +2932,7 @@
           <a:p>
             <a:fld id="{324A5D12-1C84-4738-8CCF-DFBF95DC265C}" type="datetimeFigureOut">
               <a:rPr lang="en-US" smtClean="0"/>
-              <a:t>4/19/2019</a:t>
+              <a:t>4/20/2019</a:t>
             </a:fld>
             <a:endParaRPr lang="en-US"/>
           </a:p>
@@ -3336,7 +3338,9 @@
     <p:bg>
       <p:bgPr>
         <a:solidFill>
-          <a:schemeClr val="bg1"/>
+          <a:schemeClr val="bg1">
+            <a:lumMod val="95000"/>
+          </a:schemeClr>
         </a:solidFill>
         <a:effectLst/>
       </p:bgPr>
@@ -3360,7 +3364,7 @@
           <p:cNvPr id="2" name="Title 1">
             <a:extLst>
               <a:ext uri="{FF2B5EF4-FFF2-40B4-BE49-F238E27FC236}">
-                <a16:creationId xmlns:a16="http://schemas.microsoft.com/office/drawing/2014/main" id="{01A76F32-DFE4-47C8-AEA2-4265CB61F1DA}"/>
+                <a16:creationId xmlns:a16="http://schemas.microsoft.com/office/drawing/2014/main" id="{34F2C168-58AB-43B4-92BD-9A87961BDD88}"/>
               </a:ext>
             </a:extLst>
           </p:cNvPr>
@@ -3368,34 +3372,37 @@
             <a:spLocks noGrp="1"/>
           </p:cNvSpPr>
           <p:nvPr>
-            <p:ph type="title"/>
+            <p:ph type="ctrTitle"/>
           </p:nvPr>
         </p:nvSpPr>
-        <p:spPr>
-          <a:xfrm>
-            <a:off x="648929" y="629266"/>
-            <a:ext cx="3651467" cy="1676603"/>
-          </a:xfrm>
-        </p:spPr>
+        <p:spPr/>
         <p:txBody>
           <a:bodyPr>
-            <a:normAutofit/>
+            <a:normAutofit fontScale="90000"/>
           </a:bodyPr>
           <a:lstStyle/>
           <a:p>
-            <a:r>
-              <a:rPr lang="en-US" i="1" dirty="0"/>
-              <a:t>Salmonella enterica</a:t>
-            </a:r>
-          </a:p>
-        </p:txBody>
-      </p:sp>
-      <p:sp>
-        <p:nvSpPr>
-          <p:cNvPr id="3" name="Content Placeholder 2">
-            <a:extLst>
-              <a:ext uri="{FF2B5EF4-FFF2-40B4-BE49-F238E27FC236}">
-                <a16:creationId xmlns:a16="http://schemas.microsoft.com/office/drawing/2014/main" id="{71E6DF57-B48C-47A7-8E53-F6831229337E}"/>
+            <a:br>
+              <a:rPr lang="en-US" dirty="0"/>
+            </a:br>
+            <a:r>
+              <a:rPr lang="en-US" sz="5300" dirty="0"/>
+              <a:t>Comparative Functional Genomics on accessory genomic elements in </a:t>
+            </a:r>
+            <a:r>
+              <a:rPr lang="en-US" sz="5300" i="1" dirty="0"/>
+              <a:t>Salmonella</a:t>
+            </a:r>
+            <a:endParaRPr lang="en-US" i="1" dirty="0"/>
+          </a:p>
+        </p:txBody>
+      </p:sp>
+      <p:sp>
+        <p:nvSpPr>
+          <p:cNvPr id="3" name="Subtitle 2">
+            <a:extLst>
+              <a:ext uri="{FF2B5EF4-FFF2-40B4-BE49-F238E27FC236}">
+                <a16:creationId xmlns:a16="http://schemas.microsoft.com/office/drawing/2014/main" id="{5E1066EC-7B76-41C6-8461-B8BD668B62D9}"/>
               </a:ext>
             </a:extLst>
           </p:cNvPr>
@@ -3403,143 +3410,34 @@
             <a:spLocks noGrp="1"/>
           </p:cNvSpPr>
           <p:nvPr>
-            <p:ph idx="1"/>
+            <p:ph type="subTitle" idx="1"/>
           </p:nvPr>
         </p:nvSpPr>
         <p:spPr>
           <a:xfrm>
-            <a:off x="648931" y="2438400"/>
-            <a:ext cx="3651466" cy="3008243"/>
-          </a:xfrm>
-        </p:spPr>
-        <p:txBody>
-          <a:bodyPr>
-            <a:normAutofit/>
-          </a:bodyPr>
-          <a:lstStyle/>
-          <a:p>
-            <a:r>
-              <a:rPr lang="en-US" sz="2000" dirty="0"/>
-              <a:t>Gram (-) Bacteria</a:t>
-            </a:r>
-          </a:p>
-          <a:p>
-            <a:r>
-              <a:rPr lang="en-US" sz="2000" dirty="0"/>
-              <a:t>1.2 million cases of Salmonella related illness/year in U.S. alone</a:t>
-            </a:r>
-          </a:p>
-          <a:p>
-            <a:r>
-              <a:rPr lang="en-US" sz="2000" dirty="0"/>
-              <a:t>Three types of sicknesses:</a:t>
-            </a:r>
-          </a:p>
-          <a:p>
-            <a:pPr marL="457200" lvl="1" indent="0">
-              <a:buNone/>
-            </a:pPr>
-            <a:r>
-              <a:rPr lang="en-US" sz="2000" dirty="0"/>
-              <a:t>1) Salmonellosis (non paratyphoid/ typhoid)</a:t>
-            </a:r>
-          </a:p>
-          <a:p>
-            <a:pPr marL="457200" lvl="1" indent="0">
-              <a:buNone/>
-            </a:pPr>
-            <a:r>
-              <a:rPr lang="en-US" sz="2000" dirty="0"/>
-              <a:t>2) Paratyphoid fever</a:t>
-            </a:r>
-          </a:p>
-          <a:p>
-            <a:pPr marL="457200" lvl="1" indent="0">
-              <a:buNone/>
-            </a:pPr>
-            <a:r>
-              <a:rPr lang="en-US" sz="2000" dirty="0"/>
-              <a:t>3) Typhoid fever</a:t>
-            </a:r>
-          </a:p>
-        </p:txBody>
-      </p:sp>
-      <p:pic>
-        <p:nvPicPr>
-          <p:cNvPr id="5122" name="Picture 2" descr="Salmonella">
-            <a:extLst>
-              <a:ext uri="{FF2B5EF4-FFF2-40B4-BE49-F238E27FC236}">
-                <a16:creationId xmlns:a16="http://schemas.microsoft.com/office/drawing/2014/main" id="{2E5E1A03-C024-4DD9-9AFD-D9A00A96C04C}"/>
-              </a:ext>
-            </a:extLst>
-          </p:cNvPr>
-          <p:cNvPicPr>
-            <a:picLocks noChangeAspect="1" noChangeArrowheads="1"/>
-          </p:cNvPicPr>
-          <p:nvPr/>
-        </p:nvPicPr>
-        <p:blipFill rotWithShape="1">
-          <a:blip r:embed="rId2">
-            <a:extLst>
-              <a:ext uri="{28A0092B-C50C-407E-A947-70E740481C1C}">
-                <a14:useLocalDpi xmlns:a14="http://schemas.microsoft.com/office/drawing/2010/main" val="0"/>
-              </a:ext>
-            </a:extLst>
-          </a:blip>
-          <a:srcRect l="1247" r="-2" b="-2"/>
-          <a:stretch/>
-        </p:blipFill>
-        <p:spPr bwMode="auto">
-          <a:xfrm>
-            <a:off x="4639056" y="10"/>
-            <a:ext cx="7552944" cy="6857990"/>
-          </a:xfrm>
-          <a:prstGeom prst="rect">
-            <a:avLst/>
-          </a:prstGeom>
-          <a:noFill/>
-          <a:effectLst/>
-          <a:extLst>
-            <a:ext uri="{909E8E84-426E-40DD-AFC4-6F175D3DCCD1}">
-              <a14:hiddenFill xmlns:a14="http://schemas.microsoft.com/office/drawing/2010/main">
-                <a:solidFill>
-                  <a:srgbClr val="FFFFFF"/>
-                </a:solidFill>
-              </a14:hiddenFill>
-            </a:ext>
-          </a:extLst>
-        </p:spPr>
-      </p:pic>
-      <p:sp>
-        <p:nvSpPr>
-          <p:cNvPr id="4" name="Rectangle 3">
-            <a:extLst>
-              <a:ext uri="{FF2B5EF4-FFF2-40B4-BE49-F238E27FC236}">
-                <a16:creationId xmlns:a16="http://schemas.microsoft.com/office/drawing/2014/main" id="{E5B601C6-36F3-4C38-BAEF-80EFE4CD5514}"/>
-              </a:ext>
-            </a:extLst>
-          </p:cNvPr>
-          <p:cNvSpPr/>
-          <p:nvPr/>
-        </p:nvSpPr>
-        <p:spPr>
-          <a:xfrm>
-            <a:off x="0" y="6356350"/>
-            <a:ext cx="4595038" cy="461665"/>
-          </a:xfrm>
-          <a:prstGeom prst="rect">
-            <a:avLst/>
-          </a:prstGeom>
-        </p:spPr>
-        <p:txBody>
-          <a:bodyPr wrap="square">
-            <a:spAutoFit/>
-          </a:bodyPr>
-          <a:lstStyle/>
-          <a:p>
-            <a:r>
-              <a:rPr lang="en-US" sz="1200" dirty="0"/>
-              <a:t>http://www.cidrap.umn.edu/news-perspective/2016/12/cdc-resistant-salmonella-causes-6200-illnesses-year</a:t>
+            <a:off x="1524000" y="4079875"/>
+            <a:ext cx="9144000" cy="1655762"/>
+          </a:xfrm>
+        </p:spPr>
+        <p:txBody>
+          <a:bodyPr/>
+          <a:lstStyle/>
+          <a:p>
+            <a:r>
+              <a:rPr lang="en-US" dirty="0"/>
+              <a:t>Andrew Verdegaal</a:t>
+            </a:r>
+          </a:p>
+          <a:p>
+            <a:r>
+              <a:rPr lang="en-US" dirty="0"/>
+              <a:t>April 25, 2019</a:t>
+            </a:r>
+          </a:p>
+          <a:p>
+            <a:r>
+              <a:rPr lang="en-US" dirty="0"/>
+              <a:t>E&amp;EB 723</a:t>
             </a:r>
           </a:p>
         </p:txBody>
@@ -3547,7 +3445,7 @@
     </p:spTree>
     <p:extLst>
       <p:ext uri="{BB962C8B-B14F-4D97-AF65-F5344CB8AC3E}">
-        <p14:creationId xmlns:p14="http://schemas.microsoft.com/office/powerpoint/2010/main" val="1298375012"/>
+        <p14:creationId xmlns:p14="http://schemas.microsoft.com/office/powerpoint/2010/main" val="580200454"/>
       </p:ext>
     </p:extLst>
   </p:cSld>
@@ -3560,6 +3458,16 @@
 <file path=ppt/slides/slide10.xml><?xml version="1.0" encoding="utf-8"?>
 <p:sld xmlns:a="http://schemas.openxmlformats.org/drawingml/2006/main" xmlns:r="http://schemas.openxmlformats.org/officeDocument/2006/relationships" xmlns:p="http://schemas.openxmlformats.org/presentationml/2006/main">
   <p:cSld>
+    <p:bg>
+      <p:bgPr>
+        <a:solidFill>
+          <a:schemeClr val="bg1">
+            <a:lumMod val="95000"/>
+          </a:schemeClr>
+        </a:solidFill>
+        <a:effectLst/>
+      </p:bgPr>
+    </p:bg>
     <p:spTree>
       <p:nvGrpSpPr>
         <p:cNvPr id="1" name=""/>
@@ -3576,6 +3484,159 @@
       </p:grpSpPr>
       <p:sp>
         <p:nvSpPr>
+          <p:cNvPr id="2" name="Title 1">
+            <a:extLst>
+              <a:ext uri="{FF2B5EF4-FFF2-40B4-BE49-F238E27FC236}">
+                <a16:creationId xmlns:a16="http://schemas.microsoft.com/office/drawing/2014/main" id="{495C1407-BD65-4427-84EE-D1F4A565D946}"/>
+              </a:ext>
+            </a:extLst>
+          </p:cNvPr>
+          <p:cNvSpPr>
+            <a:spLocks noGrp="1"/>
+          </p:cNvSpPr>
+          <p:nvPr>
+            <p:ph type="title"/>
+          </p:nvPr>
+        </p:nvSpPr>
+        <p:spPr/>
+        <p:txBody>
+          <a:bodyPr/>
+          <a:lstStyle/>
+          <a:p>
+            <a:endParaRPr lang="en-US"/>
+          </a:p>
+        </p:txBody>
+      </p:sp>
+      <p:sp>
+        <p:nvSpPr>
+          <p:cNvPr id="3" name="Content Placeholder 2">
+            <a:extLst>
+              <a:ext uri="{FF2B5EF4-FFF2-40B4-BE49-F238E27FC236}">
+                <a16:creationId xmlns:a16="http://schemas.microsoft.com/office/drawing/2014/main" id="{2FE688D0-345F-4468-B5C6-AD2910AA28BD}"/>
+              </a:ext>
+            </a:extLst>
+          </p:cNvPr>
+          <p:cNvSpPr>
+            <a:spLocks noGrp="1"/>
+          </p:cNvSpPr>
+          <p:nvPr>
+            <p:ph idx="1"/>
+          </p:nvPr>
+        </p:nvSpPr>
+        <p:spPr/>
+        <p:txBody>
+          <a:bodyPr/>
+          <a:lstStyle/>
+          <a:p>
+            <a:endParaRPr lang="en-US"/>
+          </a:p>
+        </p:txBody>
+      </p:sp>
+      <p:graphicFrame>
+        <p:nvGraphicFramePr>
+          <p:cNvPr id="4" name="Object 3">
+            <a:extLst>
+              <a:ext uri="{FF2B5EF4-FFF2-40B4-BE49-F238E27FC236}">
+                <a16:creationId xmlns:a16="http://schemas.microsoft.com/office/drawing/2014/main" id="{A4763CA4-8D32-4D13-A3A5-04D432D51CA6}"/>
+              </a:ext>
+            </a:extLst>
+          </p:cNvPr>
+          <p:cNvGraphicFramePr>
+            <a:graphicFrameLocks noChangeAspect="1"/>
+          </p:cNvGraphicFramePr>
+          <p:nvPr>
+            <p:extLst>
+              <p:ext uri="{D42A27DB-BD31-4B8C-83A1-F6EECF244321}">
+                <p14:modId xmlns:p14="http://schemas.microsoft.com/office/powerpoint/2010/main" val="1398467181"/>
+              </p:ext>
+            </p:extLst>
+          </p:nvPr>
+        </p:nvGraphicFramePr>
+        <p:xfrm>
+          <a:off x="2036969" y="681037"/>
+          <a:ext cx="8118061" cy="5884021"/>
+        </p:xfrm>
+        <a:graphic>
+          <a:graphicData uri="http://schemas.openxmlformats.org/presentationml/2006/ole">
+            <mc:AlternateContent xmlns:mc="http://schemas.openxmlformats.org/markup-compatibility/2006">
+              <mc:Choice xmlns:v="urn:schemas-microsoft-com:vml" Requires="v">
+                <p:oleObj spid="_x0000_s2088" name="Acrobat Document" r:id="rId3" imgW="4914762" imgH="3562037" progId="AcroExch.Document.DC">
+                  <p:embed/>
+                </p:oleObj>
+              </mc:Choice>
+              <mc:Fallback>
+                <p:oleObj name="Acrobat Document" r:id="rId3" imgW="4914762" imgH="3562037" progId="AcroExch.Document.DC">
+                  <p:embed/>
+                  <p:pic>
+                    <p:nvPicPr>
+                      <p:cNvPr id="0" name=""/>
+                      <p:cNvPicPr/>
+                      <p:nvPr/>
+                    </p:nvPicPr>
+                    <p:blipFill>
+                      <a:blip r:embed="rId4"/>
+                      <a:stretch>
+                        <a:fillRect/>
+                      </a:stretch>
+                    </p:blipFill>
+                    <p:spPr>
+                      <a:xfrm>
+                        <a:off x="2036969" y="681037"/>
+                        <a:ext cx="8118061" cy="5884021"/>
+                      </a:xfrm>
+                      <a:prstGeom prst="rect">
+                        <a:avLst/>
+                      </a:prstGeom>
+                    </p:spPr>
+                  </p:pic>
+                </p:oleObj>
+              </mc:Fallback>
+            </mc:AlternateContent>
+          </a:graphicData>
+        </a:graphic>
+      </p:graphicFrame>
+    </p:spTree>
+    <p:extLst>
+      <p:ext uri="{BB962C8B-B14F-4D97-AF65-F5344CB8AC3E}">
+        <p14:creationId xmlns:p14="http://schemas.microsoft.com/office/powerpoint/2010/main" val="2872794351"/>
+      </p:ext>
+    </p:extLst>
+  </p:cSld>
+  <p:clrMapOvr>
+    <a:masterClrMapping/>
+  </p:clrMapOvr>
+</p:sld>
+</file>
+
+<file path=ppt/slides/slide11.xml><?xml version="1.0" encoding="utf-8"?>
+<p:sld xmlns:a="http://schemas.openxmlformats.org/drawingml/2006/main" xmlns:r="http://schemas.openxmlformats.org/officeDocument/2006/relationships" xmlns:p="http://schemas.openxmlformats.org/presentationml/2006/main">
+  <p:cSld>
+    <p:bg>
+      <p:bgPr>
+        <a:solidFill>
+          <a:schemeClr val="bg1">
+            <a:lumMod val="95000"/>
+          </a:schemeClr>
+        </a:solidFill>
+        <a:effectLst/>
+      </p:bgPr>
+    </p:bg>
+    <p:spTree>
+      <p:nvGrpSpPr>
+        <p:cNvPr id="1" name=""/>
+        <p:cNvGrpSpPr/>
+        <p:nvPr/>
+      </p:nvGrpSpPr>
+      <p:grpSpPr>
+        <a:xfrm>
+          <a:off x="0" y="0"/>
+          <a:ext cx="0" cy="0"/>
+          <a:chOff x="0" y="0"/>
+          <a:chExt cx="0" cy="0"/>
+        </a:xfrm>
+      </p:grpSpPr>
+      <p:sp>
+        <p:nvSpPr>
           <p:cNvPr id="3" name="Content Placeholder 2">
             <a:extLst>
               <a:ext uri="{FF2B5EF4-FFF2-40B4-BE49-F238E27FC236}">
@@ -3734,9 +3795,19 @@
 </p:sld>
 </file>
 
-<file path=ppt/slides/slide11.xml><?xml version="1.0" encoding="utf-8"?>
+<file path=ppt/slides/slide12.xml><?xml version="1.0" encoding="utf-8"?>
 <p:sld xmlns:a="http://schemas.openxmlformats.org/drawingml/2006/main" xmlns:r="http://schemas.openxmlformats.org/officeDocument/2006/relationships" xmlns:p="http://schemas.openxmlformats.org/presentationml/2006/main">
   <p:cSld>
+    <p:bg>
+      <p:bgPr>
+        <a:solidFill>
+          <a:schemeClr val="bg1">
+            <a:lumMod val="95000"/>
+          </a:schemeClr>
+        </a:solidFill>
+        <a:effectLst/>
+      </p:bgPr>
+    </p:bg>
     <p:spTree>
       <p:nvGrpSpPr>
         <p:cNvPr id="1" name=""/>
@@ -3844,9 +3915,19 @@
 </p:sld>
 </file>
 
-<file path=ppt/slides/slide12.xml><?xml version="1.0" encoding="utf-8"?>
+<file path=ppt/slides/slide13.xml><?xml version="1.0" encoding="utf-8"?>
 <p:sld xmlns:a="http://schemas.openxmlformats.org/drawingml/2006/main" xmlns:r="http://schemas.openxmlformats.org/officeDocument/2006/relationships" xmlns:p="http://schemas.openxmlformats.org/presentationml/2006/main">
   <p:cSld>
+    <p:bg>
+      <p:bgPr>
+        <a:solidFill>
+          <a:schemeClr val="bg1">
+            <a:lumMod val="95000"/>
+          </a:schemeClr>
+        </a:solidFill>
+        <a:effectLst/>
+      </p:bgPr>
+    </p:bg>
     <p:spTree>
       <p:nvGrpSpPr>
         <p:cNvPr id="1" name=""/>
@@ -3906,9 +3987,19 @@
 </p:sld>
 </file>
 
-<file path=ppt/slides/slide13.xml><?xml version="1.0" encoding="utf-8"?>
+<file path=ppt/slides/slide14.xml><?xml version="1.0" encoding="utf-8"?>
 <p:sld xmlns:a="http://schemas.openxmlformats.org/drawingml/2006/main" xmlns:r="http://schemas.openxmlformats.org/officeDocument/2006/relationships" xmlns:p="http://schemas.openxmlformats.org/presentationml/2006/main">
   <p:cSld>
+    <p:bg>
+      <p:bgPr>
+        <a:solidFill>
+          <a:schemeClr val="bg1">
+            <a:lumMod val="95000"/>
+          </a:schemeClr>
+        </a:solidFill>
+        <a:effectLst/>
+      </p:bgPr>
+    </p:bg>
     <p:spTree>
       <p:nvGrpSpPr>
         <p:cNvPr id="1" name=""/>
@@ -3966,9 +4057,19 @@
 </p:sld>
 </file>
 
-<file path=ppt/slides/slide14.xml><?xml version="1.0" encoding="utf-8"?>
+<file path=ppt/slides/slide15.xml><?xml version="1.0" encoding="utf-8"?>
 <p:sld xmlns:a="http://schemas.openxmlformats.org/drawingml/2006/main" xmlns:r="http://schemas.openxmlformats.org/officeDocument/2006/relationships" xmlns:p="http://schemas.openxmlformats.org/presentationml/2006/main">
   <p:cSld>
+    <p:bg>
+      <p:bgPr>
+        <a:solidFill>
+          <a:schemeClr val="bg1">
+            <a:lumMod val="95000"/>
+          </a:schemeClr>
+        </a:solidFill>
+        <a:effectLst/>
+      </p:bgPr>
+    </p:bg>
     <p:spTree>
       <p:nvGrpSpPr>
         <p:cNvPr id="1" name=""/>
@@ -4076,9 +4177,19 @@
 </p:sld>
 </file>
 
-<file path=ppt/slides/slide15.xml><?xml version="1.0" encoding="utf-8"?>
+<file path=ppt/slides/slide16.xml><?xml version="1.0" encoding="utf-8"?>
 <p:sld xmlns:a="http://schemas.openxmlformats.org/drawingml/2006/main" xmlns:r="http://schemas.openxmlformats.org/officeDocument/2006/relationships" xmlns:p="http://schemas.openxmlformats.org/presentationml/2006/main">
   <p:cSld>
+    <p:bg>
+      <p:bgPr>
+        <a:solidFill>
+          <a:schemeClr val="bg1">
+            <a:lumMod val="95000"/>
+          </a:schemeClr>
+        </a:solidFill>
+        <a:effectLst/>
+      </p:bgPr>
+    </p:bg>
     <p:spTree>
       <p:nvGrpSpPr>
         <p:cNvPr id="1" name=""/>
@@ -4142,9 +4253,19 @@
 </p:sld>
 </file>
 
-<file path=ppt/slides/slide16.xml><?xml version="1.0" encoding="utf-8"?>
+<file path=ppt/slides/slide17.xml><?xml version="1.0" encoding="utf-8"?>
 <p:sld xmlns:a="http://schemas.openxmlformats.org/drawingml/2006/main" xmlns:r="http://schemas.openxmlformats.org/officeDocument/2006/relationships" xmlns:p="http://schemas.openxmlformats.org/presentationml/2006/main">
   <p:cSld>
+    <p:bg>
+      <p:bgPr>
+        <a:solidFill>
+          <a:schemeClr val="bg1">
+            <a:lumMod val="95000"/>
+          </a:schemeClr>
+        </a:solidFill>
+        <a:effectLst/>
+      </p:bgPr>
+    </p:bg>
     <p:spTree>
       <p:nvGrpSpPr>
         <p:cNvPr id="1" name=""/>
@@ -4240,6 +4361,46 @@
           </a:xfrm>
         </p:spPr>
       </p:pic>
+      <p:sp>
+        <p:nvSpPr>
+          <p:cNvPr id="6" name="TextBox 5">
+            <a:extLst>
+              <a:ext uri="{FF2B5EF4-FFF2-40B4-BE49-F238E27FC236}">
+                <a16:creationId xmlns:a16="http://schemas.microsoft.com/office/drawing/2014/main" id="{B1E54EED-B280-4400-96EC-1904453C09E3}"/>
+              </a:ext>
+            </a:extLst>
+          </p:cNvPr>
+          <p:cNvSpPr txBox="1"/>
+          <p:nvPr/>
+        </p:nvSpPr>
+        <p:spPr>
+          <a:xfrm>
+            <a:off x="371983" y="1587599"/>
+            <a:ext cx="3664786" cy="400110"/>
+          </a:xfrm>
+          <a:prstGeom prst="rect">
+            <a:avLst/>
+          </a:prstGeom>
+          <a:noFill/>
+          <a:ln>
+            <a:solidFill>
+              <a:schemeClr val="tx1"/>
+            </a:solidFill>
+          </a:ln>
+        </p:spPr>
+        <p:txBody>
+          <a:bodyPr wrap="none" rtlCol="0">
+            <a:spAutoFit/>
+          </a:bodyPr>
+          <a:lstStyle/>
+          <a:p>
+            <a:r>
+              <a:rPr lang="en-US" sz="2000" b="1" dirty="0"/>
+              <a:t>16 Reference Genomes Analyzed</a:t>
+            </a:r>
+          </a:p>
+        </p:txBody>
+      </p:sp>
     </p:spTree>
     <p:extLst>
       <p:ext uri="{BB962C8B-B14F-4D97-AF65-F5344CB8AC3E}">
@@ -4253,9 +4414,19 @@
 </p:sld>
 </file>
 
-<file path=ppt/slides/slide17.xml><?xml version="1.0" encoding="utf-8"?>
+<file path=ppt/slides/slide18.xml><?xml version="1.0" encoding="utf-8"?>
 <p:sld xmlns:a="http://schemas.openxmlformats.org/drawingml/2006/main" xmlns:r="http://schemas.openxmlformats.org/officeDocument/2006/relationships" xmlns:p="http://schemas.openxmlformats.org/presentationml/2006/main">
   <p:cSld>
+    <p:bg>
+      <p:bgPr>
+        <a:solidFill>
+          <a:schemeClr val="bg1">
+            <a:lumMod val="95000"/>
+          </a:schemeClr>
+        </a:solidFill>
+        <a:effectLst/>
+      </p:bgPr>
+    </p:bg>
     <p:spTree>
       <p:nvGrpSpPr>
         <p:cNvPr id="1" name=""/>
@@ -4275,7 +4446,7 @@
           <p:cNvPr id="2" name="Title 1">
             <a:extLst>
               <a:ext uri="{FF2B5EF4-FFF2-40B4-BE49-F238E27FC236}">
-                <a16:creationId xmlns:a16="http://schemas.microsoft.com/office/drawing/2014/main" id="{D6054A5C-B595-46B8-9589-470E7CDB9EDB}"/>
+                <a16:creationId xmlns:a16="http://schemas.microsoft.com/office/drawing/2014/main" id="{4309C141-D331-42D9-8777-FFB51BFF2B54}"/>
               </a:ext>
             </a:extLst>
           </p:cNvPr>
@@ -4286,55 +4457,122 @@
             <p:ph type="title"/>
           </p:nvPr>
         </p:nvSpPr>
-        <p:spPr/>
-        <p:txBody>
-          <a:bodyPr/>
+        <p:spPr>
+          <a:xfrm>
+            <a:off x="371983" y="111906"/>
+            <a:ext cx="10515600" cy="1325563"/>
+          </a:xfrm>
+        </p:spPr>
+        <p:txBody>
+          <a:bodyPr>
+            <a:normAutofit/>
+          </a:bodyPr>
           <a:lstStyle/>
           <a:p>
             <a:r>
               <a:rPr lang="en-US" dirty="0"/>
-              <a:t>Depiction of </a:t>
+              <a:t>Similarity in Salmonella serovars with </a:t>
             </a:r>
             <a:r>
               <a:rPr lang="en-US" dirty="0" err="1"/>
-              <a:t>ClustAGE</a:t>
+              <a:t>iTOL</a:t>
             </a:r>
             <a:r>
               <a:rPr lang="en-US" dirty="0"/>
-              <a:t> Phylogenetic Relationships alongside Host Adaptation</a:t>
-            </a:r>
-          </a:p>
-        </p:txBody>
-      </p:sp>
-      <p:sp>
-        <p:nvSpPr>
-          <p:cNvPr id="3" name="Content Placeholder 2">
-            <a:extLst>
-              <a:ext uri="{FF2B5EF4-FFF2-40B4-BE49-F238E27FC236}">
-                <a16:creationId xmlns:a16="http://schemas.microsoft.com/office/drawing/2014/main" id="{6A9D549D-0502-452F-913A-B04F6274EEDE}"/>
-              </a:ext>
-            </a:extLst>
-          </p:cNvPr>
-          <p:cNvSpPr>
-            <a:spLocks noGrp="1"/>
-          </p:cNvSpPr>
-          <p:nvPr>
-            <p:ph idx="1"/>
-          </p:nvPr>
-        </p:nvSpPr>
-        <p:spPr/>
-        <p:txBody>
-          <a:bodyPr/>
-          <a:lstStyle/>
-          <a:p>
-            <a:endParaRPr lang="en-US" dirty="0"/>
+              <a:t>, larger dataset, includes “outlier” </a:t>
+            </a:r>
+            <a:r>
+              <a:rPr lang="en-US" i="1" dirty="0"/>
+              <a:t>S. </a:t>
+            </a:r>
+            <a:r>
+              <a:rPr lang="en-US" i="1" dirty="0" err="1"/>
+              <a:t>bongori</a:t>
+            </a:r>
+            <a:endParaRPr lang="en-US" i="1" dirty="0"/>
+          </a:p>
+        </p:txBody>
+      </p:sp>
+      <p:pic>
+        <p:nvPicPr>
+          <p:cNvPr id="6" name="Picture 5">
+            <a:extLst>
+              <a:ext uri="{FF2B5EF4-FFF2-40B4-BE49-F238E27FC236}">
+                <a16:creationId xmlns:a16="http://schemas.microsoft.com/office/drawing/2014/main" id="{9DF913E5-46AC-41C5-A8AC-EB543BA8B01B}"/>
+              </a:ext>
+            </a:extLst>
+          </p:cNvPr>
+          <p:cNvPicPr>
+            <a:picLocks noChangeAspect="1"/>
+          </p:cNvPicPr>
+          <p:nvPr/>
+        </p:nvPicPr>
+        <p:blipFill>
+          <a:blip r:embed="rId2">
+            <a:extLst>
+              <a:ext uri="{28A0092B-C50C-407E-A947-70E740481C1C}">
+                <a14:useLocalDpi xmlns:a14="http://schemas.microsoft.com/office/drawing/2010/main" val="0"/>
+              </a:ext>
+            </a:extLst>
+          </a:blip>
+          <a:stretch>
+            <a:fillRect/>
+          </a:stretch>
+        </p:blipFill>
+        <p:spPr>
+          <a:xfrm>
+            <a:off x="1990638" y="1437469"/>
+            <a:ext cx="8896945" cy="5217160"/>
+          </a:xfrm>
+          <a:prstGeom prst="rect">
+            <a:avLst/>
+          </a:prstGeom>
+        </p:spPr>
+      </p:pic>
+      <p:sp>
+        <p:nvSpPr>
+          <p:cNvPr id="7" name="TextBox 6">
+            <a:extLst>
+              <a:ext uri="{FF2B5EF4-FFF2-40B4-BE49-F238E27FC236}">
+                <a16:creationId xmlns:a16="http://schemas.microsoft.com/office/drawing/2014/main" id="{D6C9B23C-1347-45EA-8E1B-1AA0A640CA1F}"/>
+              </a:ext>
+            </a:extLst>
+          </p:cNvPr>
+          <p:cNvSpPr txBox="1"/>
+          <p:nvPr/>
+        </p:nvSpPr>
+        <p:spPr>
+          <a:xfrm>
+            <a:off x="371983" y="1587599"/>
+            <a:ext cx="4518609" cy="400110"/>
+          </a:xfrm>
+          <a:prstGeom prst="rect">
+            <a:avLst/>
+          </a:prstGeom>
+          <a:noFill/>
+          <a:ln>
+            <a:solidFill>
+              <a:schemeClr val="tx1"/>
+            </a:solidFill>
+          </a:ln>
+        </p:spPr>
+        <p:txBody>
+          <a:bodyPr wrap="none" rtlCol="0">
+            <a:spAutoFit/>
+          </a:bodyPr>
+          <a:lstStyle/>
+          <a:p>
+            <a:r>
+              <a:rPr lang="en-US" sz="2000" b="1" dirty="0"/>
+              <a:t>18 Reference, 2 Draft Genomes Analyzed</a:t>
+            </a:r>
           </a:p>
         </p:txBody>
       </p:sp>
     </p:spTree>
     <p:extLst>
       <p:ext uri="{BB962C8B-B14F-4D97-AF65-F5344CB8AC3E}">
-        <p14:creationId xmlns:p14="http://schemas.microsoft.com/office/powerpoint/2010/main" val="338791742"/>
+        <p14:creationId xmlns:p14="http://schemas.microsoft.com/office/powerpoint/2010/main" val="2408609269"/>
       </p:ext>
     </p:extLst>
   </p:cSld>
@@ -4344,9 +4582,19 @@
 </p:sld>
 </file>
 
-<file path=ppt/slides/slide18.xml><?xml version="1.0" encoding="utf-8"?>
+<file path=ppt/slides/slide19.xml><?xml version="1.0" encoding="utf-8"?>
 <p:sld xmlns:a="http://schemas.openxmlformats.org/drawingml/2006/main" xmlns:r="http://schemas.openxmlformats.org/officeDocument/2006/relationships" xmlns:p="http://schemas.openxmlformats.org/presentationml/2006/main">
   <p:cSld>
+    <p:bg>
+      <p:bgPr>
+        <a:solidFill>
+          <a:schemeClr val="bg1">
+            <a:lumMod val="95000"/>
+          </a:schemeClr>
+        </a:solidFill>
+        <a:effectLst/>
+      </p:bgPr>
+    </p:bg>
     <p:spTree>
       <p:nvGrpSpPr>
         <p:cNvPr id="1" name=""/>
@@ -4366,7 +4614,7 @@
           <p:cNvPr id="2" name="Title 1">
             <a:extLst>
               <a:ext uri="{FF2B5EF4-FFF2-40B4-BE49-F238E27FC236}">
-                <a16:creationId xmlns:a16="http://schemas.microsoft.com/office/drawing/2014/main" id="{16FD4388-182B-4A0D-A127-A6BF19C49727}"/>
+                <a16:creationId xmlns:a16="http://schemas.microsoft.com/office/drawing/2014/main" id="{D6054A5C-B595-46B8-9589-470E7CDB9EDB}"/>
               </a:ext>
             </a:extLst>
           </p:cNvPr>
@@ -4384,34 +4632,25 @@
           <a:p>
             <a:r>
               <a:rPr lang="en-US" dirty="0"/>
-              <a:t>Shared genes between all </a:t>
-            </a:r>
-            <a:r>
-              <a:rPr lang="en-US" i="1" dirty="0"/>
-              <a:t>Salmonella</a:t>
+              <a:t>Depiction of </a:t>
+            </a:r>
+            <a:r>
+              <a:rPr lang="en-US" dirty="0" err="1"/>
+              <a:t>ClustAGE</a:t>
             </a:r>
             <a:r>
               <a:rPr lang="en-US" dirty="0"/>
-              <a:t> sp. except </a:t>
-            </a:r>
-            <a:r>
-              <a:rPr lang="en-US" i="1" dirty="0"/>
-              <a:t>S. </a:t>
-            </a:r>
-            <a:r>
-              <a:rPr lang="en-US" i="1" dirty="0" err="1"/>
-              <a:t>bongori</a:t>
-            </a:r>
-            <a:endParaRPr lang="en-US" dirty="0"/>
+              <a:t> Phylogenetic Relationships alongside Host Adaptation</a:t>
+            </a:r>
           </a:p>
         </p:txBody>
       </p:sp>
       <p:pic>
         <p:nvPicPr>
-          <p:cNvPr id="5" name="Content Placeholder 4" descr="A screenshot of a cell phone&#10;&#10;Description automatically generated">
-            <a:extLst>
-              <a:ext uri="{FF2B5EF4-FFF2-40B4-BE49-F238E27FC236}">
-                <a16:creationId xmlns:a16="http://schemas.microsoft.com/office/drawing/2014/main" id="{F58417E9-F90B-4B8F-956A-1E09205B7981}"/>
+          <p:cNvPr id="5" name="Content Placeholder 4" descr="A close up of a building&#10;&#10;Description automatically generated">
+            <a:extLst>
+              <a:ext uri="{FF2B5EF4-FFF2-40B4-BE49-F238E27FC236}">
+                <a16:creationId xmlns:a16="http://schemas.microsoft.com/office/drawing/2014/main" id="{4DFEC2B2-6EDC-4658-9322-19095AA1AFD4}"/>
               </a:ext>
             </a:extLst>
           </p:cNvPr>
@@ -4436,17 +4675,17 @@
         </p:blipFill>
         <p:spPr>
           <a:xfrm>
-            <a:off x="838200" y="2521091"/>
-            <a:ext cx="9772377" cy="3786796"/>
+            <a:off x="103525" y="1958975"/>
+            <a:ext cx="6993850" cy="4351338"/>
           </a:xfrm>
         </p:spPr>
       </p:pic>
       <p:sp>
         <p:nvSpPr>
-          <p:cNvPr id="3" name="TextBox 2">
-            <a:extLst>
-              <a:ext uri="{FF2B5EF4-FFF2-40B4-BE49-F238E27FC236}">
-                <a16:creationId xmlns:a16="http://schemas.microsoft.com/office/drawing/2014/main" id="{CB5190C9-3731-475E-AB4E-5477DD3CC61C}"/>
+          <p:cNvPr id="11" name="TextBox 10">
+            <a:extLst>
+              <a:ext uri="{FF2B5EF4-FFF2-40B4-BE49-F238E27FC236}">
+                <a16:creationId xmlns:a16="http://schemas.microsoft.com/office/drawing/2014/main" id="{8C1C2565-8818-4199-AADF-06636866CCF2}"/>
               </a:ext>
             </a:extLst>
           </p:cNvPr>
@@ -4455,8 +4694,8 @@
         </p:nvSpPr>
         <p:spPr>
           <a:xfrm>
-            <a:off x="1741161" y="2151759"/>
-            <a:ext cx="8869416" cy="369332"/>
+            <a:off x="7349681" y="2208369"/>
+            <a:ext cx="1186543" cy="307777"/>
           </a:xfrm>
           <a:prstGeom prst="rect">
             <a:avLst/>
@@ -4470,20 +4709,2159 @@
           <a:lstStyle/>
           <a:p>
             <a:r>
-              <a:rPr lang="en-US" b="1" dirty="0"/>
-              <a:t>Type III Secretion System Effector Proteins </a:t>
-            </a:r>
-            <a:r>
-              <a:rPr lang="en-US" dirty="0"/>
-              <a:t>(necessary for virulence and invasion of host cells)</a:t>
-            </a:r>
+              <a:rPr lang="en-US" sz="1400" b="1" dirty="0"/>
+              <a:t>Cold-blooded</a:t>
+            </a:r>
+          </a:p>
+        </p:txBody>
+      </p:sp>
+      <p:sp>
+        <p:nvSpPr>
+          <p:cNvPr id="12" name="TextBox 11">
+            <a:extLst>
+              <a:ext uri="{FF2B5EF4-FFF2-40B4-BE49-F238E27FC236}">
+                <a16:creationId xmlns:a16="http://schemas.microsoft.com/office/drawing/2014/main" id="{E885129D-9C75-49B0-9D7F-03E0BA5F3ACA}"/>
+              </a:ext>
+            </a:extLst>
+          </p:cNvPr>
+          <p:cNvSpPr txBox="1"/>
+          <p:nvPr/>
+        </p:nvSpPr>
+        <p:spPr>
+          <a:xfrm>
+            <a:off x="7357026" y="2860182"/>
+            <a:ext cx="797013" cy="307777"/>
+          </a:xfrm>
+          <a:prstGeom prst="rect">
+            <a:avLst/>
+          </a:prstGeom>
+          <a:noFill/>
+        </p:spPr>
+        <p:txBody>
+          <a:bodyPr wrap="none" rtlCol="0">
+            <a:spAutoFit/>
+          </a:bodyPr>
+          <a:lstStyle/>
+          <a:p>
+            <a:r>
+              <a:rPr lang="en-US" sz="1400" b="1" dirty="0"/>
+              <a:t>Humans</a:t>
+            </a:r>
+          </a:p>
+        </p:txBody>
+      </p:sp>
+      <p:sp>
+        <p:nvSpPr>
+          <p:cNvPr id="13" name="TextBox 12">
+            <a:extLst>
+              <a:ext uri="{FF2B5EF4-FFF2-40B4-BE49-F238E27FC236}">
+                <a16:creationId xmlns:a16="http://schemas.microsoft.com/office/drawing/2014/main" id="{7E2D932A-E57E-4A6C-957C-1B06A1B148E0}"/>
+              </a:ext>
+            </a:extLst>
+          </p:cNvPr>
+          <p:cNvSpPr txBox="1"/>
+          <p:nvPr/>
+        </p:nvSpPr>
+        <p:spPr>
+          <a:xfrm>
+            <a:off x="7377353" y="3456208"/>
+            <a:ext cx="631840" cy="307777"/>
+          </a:xfrm>
+          <a:prstGeom prst="rect">
+            <a:avLst/>
+          </a:prstGeom>
+          <a:noFill/>
+        </p:spPr>
+        <p:txBody>
+          <a:bodyPr wrap="none" rtlCol="0">
+            <a:spAutoFit/>
+          </a:bodyPr>
+          <a:lstStyle/>
+          <a:p>
+            <a:r>
+              <a:rPr lang="en-US" sz="1400" b="1" dirty="0"/>
+              <a:t>Swine</a:t>
+            </a:r>
+          </a:p>
+        </p:txBody>
+      </p:sp>
+      <p:sp>
+        <p:nvSpPr>
+          <p:cNvPr id="15" name="TextBox 14">
+            <a:extLst>
+              <a:ext uri="{FF2B5EF4-FFF2-40B4-BE49-F238E27FC236}">
+                <a16:creationId xmlns:a16="http://schemas.microsoft.com/office/drawing/2014/main" id="{47FFE9DE-3840-4D34-B686-92667D9E25B4}"/>
+              </a:ext>
+            </a:extLst>
+          </p:cNvPr>
+          <p:cNvSpPr txBox="1"/>
+          <p:nvPr/>
+        </p:nvSpPr>
+        <p:spPr>
+          <a:xfrm>
+            <a:off x="7357025" y="3870750"/>
+            <a:ext cx="797013" cy="307777"/>
+          </a:xfrm>
+          <a:prstGeom prst="rect">
+            <a:avLst/>
+          </a:prstGeom>
+          <a:noFill/>
+        </p:spPr>
+        <p:txBody>
+          <a:bodyPr wrap="none" rtlCol="0">
+            <a:spAutoFit/>
+          </a:bodyPr>
+          <a:lstStyle/>
+          <a:p>
+            <a:r>
+              <a:rPr lang="en-US" sz="1400" b="1" dirty="0"/>
+              <a:t>Humans</a:t>
+            </a:r>
+          </a:p>
+        </p:txBody>
+      </p:sp>
+      <p:sp>
+        <p:nvSpPr>
+          <p:cNvPr id="17" name="Arrow: Right 16">
+            <a:extLst>
+              <a:ext uri="{FF2B5EF4-FFF2-40B4-BE49-F238E27FC236}">
+                <a16:creationId xmlns:a16="http://schemas.microsoft.com/office/drawing/2014/main" id="{FCC7E2FB-7FDE-4E5B-B5AD-D0BBD39F46F5}"/>
+              </a:ext>
+            </a:extLst>
+          </p:cNvPr>
+          <p:cNvSpPr/>
+          <p:nvPr/>
+        </p:nvSpPr>
+        <p:spPr>
+          <a:xfrm>
+            <a:off x="5106444" y="3526513"/>
+            <a:ext cx="2244186" cy="185037"/>
+          </a:xfrm>
+          <a:prstGeom prst="rightArrow">
+            <a:avLst>
+              <a:gd name="adj1" fmla="val 100000"/>
+              <a:gd name="adj2" fmla="val 123543"/>
+            </a:avLst>
+          </a:prstGeom>
+          <a:noFill/>
+          <a:ln w="19050">
+            <a:solidFill>
+              <a:schemeClr val="accent2"/>
+            </a:solidFill>
+          </a:ln>
+        </p:spPr>
+        <p:style>
+          <a:lnRef idx="2">
+            <a:schemeClr val="accent1">
+              <a:shade val="50000"/>
+            </a:schemeClr>
+          </a:lnRef>
+          <a:fillRef idx="1">
+            <a:schemeClr val="accent1"/>
+          </a:fillRef>
+          <a:effectRef idx="0">
+            <a:schemeClr val="accent1"/>
+          </a:effectRef>
+          <a:fontRef idx="minor">
+            <a:schemeClr val="lt1"/>
+          </a:fontRef>
+        </p:style>
+        <p:txBody>
+          <a:bodyPr rtlCol="0" anchor="ctr"/>
+          <a:lstStyle/>
+          <a:p>
+            <a:pPr algn="ctr"/>
+            <a:endParaRPr lang="en-US"/>
+          </a:p>
+        </p:txBody>
+      </p:sp>
+      <p:sp>
+        <p:nvSpPr>
+          <p:cNvPr id="18" name="Arrow: Right 17">
+            <a:extLst>
+              <a:ext uri="{FF2B5EF4-FFF2-40B4-BE49-F238E27FC236}">
+                <a16:creationId xmlns:a16="http://schemas.microsoft.com/office/drawing/2014/main" id="{0DC88DBD-F6AD-4DFA-A8C3-4AE6EEA8AA15}"/>
+              </a:ext>
+            </a:extLst>
+          </p:cNvPr>
+          <p:cNvSpPr/>
+          <p:nvPr/>
+        </p:nvSpPr>
+        <p:spPr>
+          <a:xfrm>
+            <a:off x="5100302" y="2253166"/>
+            <a:ext cx="2289101" cy="235658"/>
+          </a:xfrm>
+          <a:prstGeom prst="rightArrow">
+            <a:avLst>
+              <a:gd name="adj1" fmla="val 100000"/>
+              <a:gd name="adj2" fmla="val 116762"/>
+            </a:avLst>
+          </a:prstGeom>
+          <a:noFill/>
+          <a:ln w="19050">
+            <a:solidFill>
+              <a:schemeClr val="accent1"/>
+            </a:solidFill>
+          </a:ln>
+        </p:spPr>
+        <p:style>
+          <a:lnRef idx="2">
+            <a:schemeClr val="accent1">
+              <a:shade val="50000"/>
+            </a:schemeClr>
+          </a:lnRef>
+          <a:fillRef idx="1">
+            <a:schemeClr val="accent1"/>
+          </a:fillRef>
+          <a:effectRef idx="0">
+            <a:schemeClr val="accent1"/>
+          </a:effectRef>
+          <a:fontRef idx="minor">
+            <a:schemeClr val="lt1"/>
+          </a:fontRef>
+        </p:style>
+        <p:txBody>
+          <a:bodyPr rtlCol="0" anchor="ctr"/>
+          <a:lstStyle/>
+          <a:p>
+            <a:pPr algn="ctr"/>
+            <a:endParaRPr lang="en-US"/>
+          </a:p>
+        </p:txBody>
+      </p:sp>
+      <p:sp>
+        <p:nvSpPr>
+          <p:cNvPr id="20" name="Arrow: Right 19">
+            <a:extLst>
+              <a:ext uri="{FF2B5EF4-FFF2-40B4-BE49-F238E27FC236}">
+                <a16:creationId xmlns:a16="http://schemas.microsoft.com/office/drawing/2014/main" id="{1875BA64-9E2A-4161-8B78-D621E5024372}"/>
+              </a:ext>
+            </a:extLst>
+          </p:cNvPr>
+          <p:cNvSpPr/>
+          <p:nvPr/>
+        </p:nvSpPr>
+        <p:spPr>
+          <a:xfrm>
+            <a:off x="5100302" y="3747608"/>
+            <a:ext cx="2244186" cy="576742"/>
+          </a:xfrm>
+          <a:prstGeom prst="rightArrow">
+            <a:avLst>
+              <a:gd name="adj1" fmla="val 100000"/>
+              <a:gd name="adj2" fmla="val 38431"/>
+            </a:avLst>
+          </a:prstGeom>
+          <a:noFill/>
+          <a:ln w="19050">
+            <a:solidFill>
+              <a:srgbClr val="FF0000"/>
+            </a:solidFill>
+          </a:ln>
+        </p:spPr>
+        <p:style>
+          <a:lnRef idx="2">
+            <a:schemeClr val="accent1">
+              <a:shade val="50000"/>
+            </a:schemeClr>
+          </a:lnRef>
+          <a:fillRef idx="1">
+            <a:schemeClr val="accent1"/>
+          </a:fillRef>
+          <a:effectRef idx="0">
+            <a:schemeClr val="accent1"/>
+          </a:effectRef>
+          <a:fontRef idx="minor">
+            <a:schemeClr val="lt1"/>
+          </a:fontRef>
+        </p:style>
+        <p:txBody>
+          <a:bodyPr rtlCol="0" anchor="ctr"/>
+          <a:lstStyle/>
+          <a:p>
+            <a:pPr algn="ctr"/>
+            <a:endParaRPr lang="en-US"/>
+          </a:p>
+        </p:txBody>
+      </p:sp>
+      <p:sp>
+        <p:nvSpPr>
+          <p:cNvPr id="21" name="Arrow: Right 20">
+            <a:extLst>
+              <a:ext uri="{FF2B5EF4-FFF2-40B4-BE49-F238E27FC236}">
+                <a16:creationId xmlns:a16="http://schemas.microsoft.com/office/drawing/2014/main" id="{7E0155E1-6B26-4816-9D83-613CFFA90D27}"/>
+              </a:ext>
+            </a:extLst>
+          </p:cNvPr>
+          <p:cNvSpPr/>
+          <p:nvPr/>
+        </p:nvSpPr>
+        <p:spPr>
+          <a:xfrm>
+            <a:off x="5100301" y="4553211"/>
+            <a:ext cx="2244185" cy="410942"/>
+          </a:xfrm>
+          <a:prstGeom prst="rightArrow">
+            <a:avLst>
+              <a:gd name="adj1" fmla="val 100000"/>
+              <a:gd name="adj2" fmla="val 51643"/>
+            </a:avLst>
+          </a:prstGeom>
+          <a:noFill/>
+          <a:ln w="19050">
+            <a:solidFill>
+              <a:schemeClr val="tx1"/>
+            </a:solidFill>
+          </a:ln>
+        </p:spPr>
+        <p:style>
+          <a:lnRef idx="2">
+            <a:schemeClr val="accent1">
+              <a:shade val="50000"/>
+            </a:schemeClr>
+          </a:lnRef>
+          <a:fillRef idx="1">
+            <a:schemeClr val="accent1"/>
+          </a:fillRef>
+          <a:effectRef idx="0">
+            <a:schemeClr val="accent1"/>
+          </a:effectRef>
+          <a:fontRef idx="minor">
+            <a:schemeClr val="lt1"/>
+          </a:fontRef>
+        </p:style>
+        <p:txBody>
+          <a:bodyPr rtlCol="0" anchor="ctr"/>
+          <a:lstStyle/>
+          <a:p>
+            <a:pPr algn="ctr"/>
+            <a:endParaRPr lang="en-US"/>
+          </a:p>
+        </p:txBody>
+      </p:sp>
+      <p:sp>
+        <p:nvSpPr>
+          <p:cNvPr id="22" name="TextBox 21">
+            <a:extLst>
+              <a:ext uri="{FF2B5EF4-FFF2-40B4-BE49-F238E27FC236}">
+                <a16:creationId xmlns:a16="http://schemas.microsoft.com/office/drawing/2014/main" id="{AD99E1DB-4EE7-4B15-8ED0-C2A2F517DD11}"/>
+              </a:ext>
+            </a:extLst>
+          </p:cNvPr>
+          <p:cNvSpPr txBox="1"/>
+          <p:nvPr/>
+        </p:nvSpPr>
+        <p:spPr>
+          <a:xfrm>
+            <a:off x="7357025" y="4604794"/>
+            <a:ext cx="617798" cy="307777"/>
+          </a:xfrm>
+          <a:prstGeom prst="rect">
+            <a:avLst/>
+          </a:prstGeom>
+          <a:noFill/>
+        </p:spPr>
+        <p:txBody>
+          <a:bodyPr wrap="none" rtlCol="0">
+            <a:spAutoFit/>
+          </a:bodyPr>
+          <a:lstStyle/>
+          <a:p>
+            <a:r>
+              <a:rPr lang="en-US" sz="1400" dirty="0"/>
+              <a:t>Broad</a:t>
+            </a:r>
+          </a:p>
+        </p:txBody>
+      </p:sp>
+      <p:sp>
+        <p:nvSpPr>
+          <p:cNvPr id="23" name="Arrow: Right 22">
+            <a:extLst>
+              <a:ext uri="{FF2B5EF4-FFF2-40B4-BE49-F238E27FC236}">
+                <a16:creationId xmlns:a16="http://schemas.microsoft.com/office/drawing/2014/main" id="{4F3D6473-9071-493C-94C5-20E8F44E4EEE}"/>
+              </a:ext>
+            </a:extLst>
+          </p:cNvPr>
+          <p:cNvSpPr/>
+          <p:nvPr/>
+        </p:nvSpPr>
+        <p:spPr>
+          <a:xfrm>
+            <a:off x="5100302" y="2537713"/>
+            <a:ext cx="2289100" cy="952742"/>
+          </a:xfrm>
+          <a:prstGeom prst="rightArrow">
+            <a:avLst>
+              <a:gd name="adj1" fmla="val 100000"/>
+              <a:gd name="adj2" fmla="val 28649"/>
+            </a:avLst>
+          </a:prstGeom>
+          <a:noFill/>
+          <a:ln w="19050">
+            <a:solidFill>
+              <a:srgbClr val="FF0000"/>
+            </a:solidFill>
+          </a:ln>
+        </p:spPr>
+        <p:style>
+          <a:lnRef idx="2">
+            <a:schemeClr val="accent1">
+              <a:shade val="50000"/>
+            </a:schemeClr>
+          </a:lnRef>
+          <a:fillRef idx="1">
+            <a:schemeClr val="accent1"/>
+          </a:fillRef>
+          <a:effectRef idx="0">
+            <a:schemeClr val="accent1"/>
+          </a:effectRef>
+          <a:fontRef idx="minor">
+            <a:schemeClr val="lt1"/>
+          </a:fontRef>
+        </p:style>
+        <p:txBody>
+          <a:bodyPr rtlCol="0" anchor="ctr"/>
+          <a:lstStyle/>
+          <a:p>
+            <a:pPr algn="ctr"/>
+            <a:endParaRPr lang="en-US"/>
+          </a:p>
+        </p:txBody>
+      </p:sp>
+      <p:sp>
+        <p:nvSpPr>
+          <p:cNvPr id="24" name="TextBox 23">
+            <a:extLst>
+              <a:ext uri="{FF2B5EF4-FFF2-40B4-BE49-F238E27FC236}">
+                <a16:creationId xmlns:a16="http://schemas.microsoft.com/office/drawing/2014/main" id="{0589666F-6953-45EE-9F7E-F49BECB0FFA1}"/>
+              </a:ext>
+            </a:extLst>
+          </p:cNvPr>
+          <p:cNvSpPr txBox="1"/>
+          <p:nvPr/>
+        </p:nvSpPr>
+        <p:spPr>
+          <a:xfrm>
+            <a:off x="7363094" y="4911224"/>
+            <a:ext cx="797013" cy="307777"/>
+          </a:xfrm>
+          <a:prstGeom prst="rect">
+            <a:avLst/>
+          </a:prstGeom>
+          <a:noFill/>
+        </p:spPr>
+        <p:txBody>
+          <a:bodyPr wrap="none" rtlCol="0">
+            <a:spAutoFit/>
+          </a:bodyPr>
+          <a:lstStyle/>
+          <a:p>
+            <a:r>
+              <a:rPr lang="en-US" sz="1400" b="1" dirty="0"/>
+              <a:t>Humans</a:t>
+            </a:r>
+          </a:p>
+        </p:txBody>
+      </p:sp>
+      <p:sp>
+        <p:nvSpPr>
+          <p:cNvPr id="25" name="Arrow: Right 24">
+            <a:extLst>
+              <a:ext uri="{FF2B5EF4-FFF2-40B4-BE49-F238E27FC236}">
+                <a16:creationId xmlns:a16="http://schemas.microsoft.com/office/drawing/2014/main" id="{77B21553-FEAB-4B89-81CA-8D2D71D26980}"/>
+              </a:ext>
+            </a:extLst>
+          </p:cNvPr>
+          <p:cNvSpPr/>
+          <p:nvPr/>
+        </p:nvSpPr>
+        <p:spPr>
+          <a:xfrm>
+            <a:off x="5100300" y="4990461"/>
+            <a:ext cx="2244186" cy="143205"/>
+          </a:xfrm>
+          <a:prstGeom prst="rightArrow">
+            <a:avLst>
+              <a:gd name="adj1" fmla="val 100000"/>
+              <a:gd name="adj2" fmla="val 145387"/>
+            </a:avLst>
+          </a:prstGeom>
+          <a:noFill/>
+          <a:ln w="19050">
+            <a:solidFill>
+              <a:srgbClr val="FF0000"/>
+            </a:solidFill>
+          </a:ln>
+        </p:spPr>
+        <p:style>
+          <a:lnRef idx="2">
+            <a:schemeClr val="accent1">
+              <a:shade val="50000"/>
+            </a:schemeClr>
+          </a:lnRef>
+          <a:fillRef idx="1">
+            <a:schemeClr val="accent1"/>
+          </a:fillRef>
+          <a:effectRef idx="0">
+            <a:schemeClr val="accent1"/>
+          </a:effectRef>
+          <a:fontRef idx="minor">
+            <a:schemeClr val="lt1"/>
+          </a:fontRef>
+        </p:style>
+        <p:txBody>
+          <a:bodyPr rtlCol="0" anchor="ctr"/>
+          <a:lstStyle/>
+          <a:p>
+            <a:pPr algn="ctr"/>
+            <a:endParaRPr lang="en-US"/>
+          </a:p>
+        </p:txBody>
+      </p:sp>
+      <p:sp>
+        <p:nvSpPr>
+          <p:cNvPr id="26" name="TextBox 25">
+            <a:extLst>
+              <a:ext uri="{FF2B5EF4-FFF2-40B4-BE49-F238E27FC236}">
+                <a16:creationId xmlns:a16="http://schemas.microsoft.com/office/drawing/2014/main" id="{BC49A6F2-218F-46E4-972B-B8D96E1EB00B}"/>
+              </a:ext>
+            </a:extLst>
+          </p:cNvPr>
+          <p:cNvSpPr txBox="1"/>
+          <p:nvPr/>
+        </p:nvSpPr>
+        <p:spPr>
+          <a:xfrm>
+            <a:off x="7357920" y="5097050"/>
+            <a:ext cx="622286" cy="307777"/>
+          </a:xfrm>
+          <a:prstGeom prst="rect">
+            <a:avLst/>
+          </a:prstGeom>
+          <a:noFill/>
+        </p:spPr>
+        <p:txBody>
+          <a:bodyPr wrap="none" rtlCol="0">
+            <a:spAutoFit/>
+          </a:bodyPr>
+          <a:lstStyle/>
+          <a:p>
+            <a:r>
+              <a:rPr lang="en-US" sz="1400" b="1" dirty="0"/>
+              <a:t>Ovine</a:t>
+            </a:r>
+          </a:p>
+        </p:txBody>
+      </p:sp>
+      <p:sp>
+        <p:nvSpPr>
+          <p:cNvPr id="27" name="Arrow: Right 26">
+            <a:extLst>
+              <a:ext uri="{FF2B5EF4-FFF2-40B4-BE49-F238E27FC236}">
+                <a16:creationId xmlns:a16="http://schemas.microsoft.com/office/drawing/2014/main" id="{DA2B6D26-641C-4168-BB0C-2E6D0AC460FD}"/>
+              </a:ext>
+            </a:extLst>
+          </p:cNvPr>
+          <p:cNvSpPr/>
+          <p:nvPr/>
+        </p:nvSpPr>
+        <p:spPr>
+          <a:xfrm>
+            <a:off x="5087011" y="5167355"/>
+            <a:ext cx="2244186" cy="185037"/>
+          </a:xfrm>
+          <a:prstGeom prst="rightArrow">
+            <a:avLst>
+              <a:gd name="adj1" fmla="val 100000"/>
+              <a:gd name="adj2" fmla="val 102952"/>
+            </a:avLst>
+          </a:prstGeom>
+          <a:noFill/>
+          <a:ln w="19050">
+            <a:solidFill>
+              <a:srgbClr val="7030A0"/>
+            </a:solidFill>
+          </a:ln>
+        </p:spPr>
+        <p:style>
+          <a:lnRef idx="2">
+            <a:schemeClr val="accent1">
+              <a:shade val="50000"/>
+            </a:schemeClr>
+          </a:lnRef>
+          <a:fillRef idx="1">
+            <a:schemeClr val="accent1"/>
+          </a:fillRef>
+          <a:effectRef idx="0">
+            <a:schemeClr val="accent1"/>
+          </a:effectRef>
+          <a:fontRef idx="minor">
+            <a:schemeClr val="lt1"/>
+          </a:fontRef>
+        </p:style>
+        <p:txBody>
+          <a:bodyPr rtlCol="0" anchor="ctr"/>
+          <a:lstStyle/>
+          <a:p>
+            <a:pPr algn="ctr"/>
+            <a:endParaRPr lang="en-US"/>
+          </a:p>
+        </p:txBody>
+      </p:sp>
+      <p:graphicFrame>
+        <p:nvGraphicFramePr>
+          <p:cNvPr id="28" name="Table 27">
+            <a:extLst>
+              <a:ext uri="{FF2B5EF4-FFF2-40B4-BE49-F238E27FC236}">
+                <a16:creationId xmlns:a16="http://schemas.microsoft.com/office/drawing/2014/main" id="{926CDA89-C12C-4807-A844-A3BF0D4927EA}"/>
+              </a:ext>
+            </a:extLst>
+          </p:cNvPr>
+          <p:cNvGraphicFramePr>
+            <a:graphicFrameLocks noGrp="1"/>
+          </p:cNvGraphicFramePr>
+          <p:nvPr>
+            <p:extLst>
+              <p:ext uri="{D42A27DB-BD31-4B8C-83A1-F6EECF244321}">
+                <p14:modId xmlns:p14="http://schemas.microsoft.com/office/powerpoint/2010/main" val="3086080158"/>
+              </p:ext>
+            </p:extLst>
+          </p:nvPr>
+        </p:nvGraphicFramePr>
+        <p:xfrm>
+          <a:off x="9287714" y="1608644"/>
+          <a:ext cx="2904286" cy="5250944"/>
+        </p:xfrm>
+        <a:graphic>
+          <a:graphicData uri="http://schemas.openxmlformats.org/drawingml/2006/table">
+            <a:tbl>
+              <a:tblPr>
+                <a:tableStyleId>{5C22544A-7EE6-4342-B048-85BDC9FD1C3A}</a:tableStyleId>
+              </a:tblPr>
+              <a:tblGrid>
+                <a:gridCol w="1452143">
+                  <a:extLst>
+                    <a:ext uri="{9D8B030D-6E8A-4147-A177-3AD203B41FA5}">
+                      <a16:colId xmlns:a16="http://schemas.microsoft.com/office/drawing/2014/main" val="1073747643"/>
+                    </a:ext>
+                  </a:extLst>
+                </a:gridCol>
+                <a:gridCol w="1452143">
+                  <a:extLst>
+                    <a:ext uri="{9D8B030D-6E8A-4147-A177-3AD203B41FA5}">
+                      <a16:colId xmlns:a16="http://schemas.microsoft.com/office/drawing/2014/main" val="1021677949"/>
+                    </a:ext>
+                  </a:extLst>
+                </a:gridCol>
+              </a:tblGrid>
+              <a:tr h="141121">
+                <a:tc>
+                  <a:txBody>
+                    <a:bodyPr/>
+                    <a:lstStyle/>
+                    <a:p>
+                      <a:pPr algn="l" fontAlgn="b"/>
+                      <a:r>
+                        <a:rPr lang="en-US" sz="1200" u="none" strike="noStrike" baseline="0" dirty="0">
+                          <a:effectLst/>
+                        </a:rPr>
+                        <a:t>Strain</a:t>
+                      </a:r>
+                      <a:endParaRPr lang="en-US" sz="1200" b="0" i="0" u="none" strike="noStrike" baseline="0" dirty="0">
+                        <a:solidFill>
+                          <a:srgbClr val="000000"/>
+                        </a:solidFill>
+                        <a:effectLst/>
+                        <a:latin typeface="Calibri" panose="020F0502020204030204" pitchFamily="34" charset="0"/>
+                      </a:endParaRPr>
+                    </a:p>
+                  </a:txBody>
+                  <a:tcPr marL="4717" marR="4717" marT="4717" marB="0" anchor="b">
+                    <a:solidFill>
+                      <a:schemeClr val="accent6">
+                        <a:lumMod val="60000"/>
+                        <a:lumOff val="40000"/>
+                      </a:schemeClr>
+                    </a:solidFill>
+                  </a:tcPr>
+                </a:tc>
+                <a:tc>
+                  <a:txBody>
+                    <a:bodyPr/>
+                    <a:lstStyle/>
+                    <a:p>
+                      <a:pPr algn="l" fontAlgn="b"/>
+                      <a:r>
+                        <a:rPr lang="en-US" sz="1200" u="none" strike="noStrike" baseline="0" dirty="0">
+                          <a:effectLst/>
+                        </a:rPr>
+                        <a:t>Host Adaptation</a:t>
+                      </a:r>
+                      <a:endParaRPr lang="en-US" sz="1200" b="0" i="0" u="none" strike="noStrike" baseline="0" dirty="0">
+                        <a:solidFill>
+                          <a:srgbClr val="000000"/>
+                        </a:solidFill>
+                        <a:effectLst/>
+                        <a:latin typeface="Calibri" panose="020F0502020204030204" pitchFamily="34" charset="0"/>
+                      </a:endParaRPr>
+                    </a:p>
+                  </a:txBody>
+                  <a:tcPr marL="4717" marR="4717" marT="4717" marB="0" anchor="b">
+                    <a:solidFill>
+                      <a:schemeClr val="accent6"/>
+                    </a:solidFill>
+                  </a:tcPr>
+                </a:tc>
+                <a:extLst>
+                  <a:ext uri="{0D108BD9-81ED-4DB2-BD59-A6C34878D82A}">
+                    <a16:rowId xmlns:a16="http://schemas.microsoft.com/office/drawing/2014/main" val="367018593"/>
+                  </a:ext>
+                </a:extLst>
+              </a:tr>
+              <a:tr h="278693">
+                <a:tc>
+                  <a:txBody>
+                    <a:bodyPr/>
+                    <a:lstStyle/>
+                    <a:p>
+                      <a:pPr algn="l" fontAlgn="b"/>
+                      <a:r>
+                        <a:rPr lang="en-US" sz="1200" u="none" strike="noStrike" baseline="0" dirty="0">
+                          <a:effectLst/>
+                        </a:rPr>
+                        <a:t>S </a:t>
+                      </a:r>
+                      <a:r>
+                        <a:rPr lang="en-US" sz="1200" u="none" strike="noStrike" baseline="0" dirty="0" err="1">
+                          <a:effectLst/>
+                        </a:rPr>
+                        <a:t>Bongori</a:t>
+                      </a:r>
+                      <a:r>
+                        <a:rPr lang="en-US" sz="1200" u="none" strike="noStrike" baseline="0" dirty="0">
+                          <a:effectLst/>
+                        </a:rPr>
+                        <a:t> NCTC12419</a:t>
+                      </a:r>
+                      <a:endParaRPr lang="en-US" sz="1200" b="0" i="0" u="none" strike="noStrike" baseline="0" dirty="0">
+                        <a:solidFill>
+                          <a:srgbClr val="000000"/>
+                        </a:solidFill>
+                        <a:effectLst/>
+                        <a:latin typeface="Calibri" panose="020F0502020204030204" pitchFamily="34" charset="0"/>
+                      </a:endParaRPr>
+                    </a:p>
+                  </a:txBody>
+                  <a:tcPr marL="4717" marR="4717" marT="4717" marB="0" anchor="b"/>
+                </a:tc>
+                <a:tc>
+                  <a:txBody>
+                    <a:bodyPr/>
+                    <a:lstStyle/>
+                    <a:p>
+                      <a:pPr algn="l" fontAlgn="b"/>
+                      <a:r>
+                        <a:rPr lang="en-US" sz="1200" u="none" strike="noStrike" baseline="0">
+                          <a:effectLst/>
+                        </a:rPr>
+                        <a:t>Cold-blooded</a:t>
+                      </a:r>
+                      <a:endParaRPr lang="en-US" sz="1200" b="0" i="0" u="none" strike="noStrike" baseline="0">
+                        <a:solidFill>
+                          <a:srgbClr val="000000"/>
+                        </a:solidFill>
+                        <a:effectLst/>
+                        <a:latin typeface="Calibri" panose="020F0502020204030204" pitchFamily="34" charset="0"/>
+                      </a:endParaRPr>
+                    </a:p>
+                  </a:txBody>
+                  <a:tcPr marL="4717" marR="4717" marT="4717" marB="0" anchor="b"/>
+                </a:tc>
+                <a:extLst>
+                  <a:ext uri="{0D108BD9-81ED-4DB2-BD59-A6C34878D82A}">
+                    <a16:rowId xmlns:a16="http://schemas.microsoft.com/office/drawing/2014/main" val="144427752"/>
+                  </a:ext>
+                </a:extLst>
+              </a:tr>
+              <a:tr h="278693">
+                <a:tc>
+                  <a:txBody>
+                    <a:bodyPr/>
+                    <a:lstStyle/>
+                    <a:p>
+                      <a:pPr algn="l" fontAlgn="b"/>
+                      <a:r>
+                        <a:rPr lang="en-US" sz="1200" u="none" strike="noStrike" baseline="0">
+                          <a:effectLst/>
+                        </a:rPr>
+                        <a:t>S Schwarzengrund CVM19633</a:t>
+                      </a:r>
+                      <a:endParaRPr lang="en-US" sz="1200" b="0" i="0" u="none" strike="noStrike" baseline="0">
+                        <a:solidFill>
+                          <a:srgbClr val="000000"/>
+                        </a:solidFill>
+                        <a:effectLst/>
+                        <a:latin typeface="Calibri" panose="020F0502020204030204" pitchFamily="34" charset="0"/>
+                      </a:endParaRPr>
+                    </a:p>
+                  </a:txBody>
+                  <a:tcPr marL="4717" marR="4717" marT="4717" marB="0" anchor="b"/>
+                </a:tc>
+                <a:tc>
+                  <a:txBody>
+                    <a:bodyPr/>
+                    <a:lstStyle/>
+                    <a:p>
+                      <a:pPr algn="l" fontAlgn="b"/>
+                      <a:r>
+                        <a:rPr lang="en-US" sz="1200" u="none" strike="noStrike" baseline="0">
+                          <a:effectLst/>
+                        </a:rPr>
+                        <a:t>Humans</a:t>
+                      </a:r>
+                      <a:endParaRPr lang="en-US" sz="1200" b="0" i="0" u="none" strike="noStrike" baseline="0">
+                        <a:solidFill>
+                          <a:srgbClr val="000000"/>
+                        </a:solidFill>
+                        <a:effectLst/>
+                        <a:latin typeface="Calibri" panose="020F0502020204030204" pitchFamily="34" charset="0"/>
+                      </a:endParaRPr>
+                    </a:p>
+                  </a:txBody>
+                  <a:tcPr marL="4717" marR="4717" marT="4717" marB="0" anchor="b"/>
+                </a:tc>
+                <a:extLst>
+                  <a:ext uri="{0D108BD9-81ED-4DB2-BD59-A6C34878D82A}">
+                    <a16:rowId xmlns:a16="http://schemas.microsoft.com/office/drawing/2014/main" val="1491262466"/>
+                  </a:ext>
+                </a:extLst>
+              </a:tr>
+              <a:tr h="278693">
+                <a:tc>
+                  <a:txBody>
+                    <a:bodyPr/>
+                    <a:lstStyle/>
+                    <a:p>
+                      <a:pPr algn="l" fontAlgn="b"/>
+                      <a:r>
+                        <a:rPr lang="en-US" sz="1200" u="none" strike="noStrike" baseline="0">
+                          <a:effectLst/>
+                        </a:rPr>
+                        <a:t>S ParatyphiA AKU12601</a:t>
+                      </a:r>
+                      <a:endParaRPr lang="en-US" sz="1200" b="0" i="0" u="none" strike="noStrike" baseline="0">
+                        <a:solidFill>
+                          <a:srgbClr val="000000"/>
+                        </a:solidFill>
+                        <a:effectLst/>
+                        <a:latin typeface="Calibri" panose="020F0502020204030204" pitchFamily="34" charset="0"/>
+                      </a:endParaRPr>
+                    </a:p>
+                  </a:txBody>
+                  <a:tcPr marL="4717" marR="4717" marT="4717" marB="0" anchor="b"/>
+                </a:tc>
+                <a:tc>
+                  <a:txBody>
+                    <a:bodyPr/>
+                    <a:lstStyle/>
+                    <a:p>
+                      <a:pPr algn="l" fontAlgn="b"/>
+                      <a:r>
+                        <a:rPr lang="en-US" sz="1200" u="none" strike="noStrike" baseline="0">
+                          <a:effectLst/>
+                        </a:rPr>
+                        <a:t>Humans</a:t>
+                      </a:r>
+                      <a:endParaRPr lang="en-US" sz="1200" b="0" i="0" u="none" strike="noStrike" baseline="0">
+                        <a:solidFill>
+                          <a:srgbClr val="000000"/>
+                        </a:solidFill>
+                        <a:effectLst/>
+                        <a:latin typeface="Calibri" panose="020F0502020204030204" pitchFamily="34" charset="0"/>
+                      </a:endParaRPr>
+                    </a:p>
+                  </a:txBody>
+                  <a:tcPr marL="4717" marR="4717" marT="4717" marB="0" anchor="b"/>
+                </a:tc>
+                <a:extLst>
+                  <a:ext uri="{0D108BD9-81ED-4DB2-BD59-A6C34878D82A}">
+                    <a16:rowId xmlns:a16="http://schemas.microsoft.com/office/drawing/2014/main" val="374957252"/>
+                  </a:ext>
+                </a:extLst>
+              </a:tr>
+              <a:tr h="278693">
+                <a:tc>
+                  <a:txBody>
+                    <a:bodyPr/>
+                    <a:lstStyle/>
+                    <a:p>
+                      <a:pPr algn="l" fontAlgn="b"/>
+                      <a:r>
+                        <a:rPr lang="en-US" sz="1200" u="none" strike="noStrike" baseline="0">
+                          <a:effectLst/>
+                        </a:rPr>
+                        <a:t>S ParatyphiA ATCC9150</a:t>
+                      </a:r>
+                      <a:endParaRPr lang="en-US" sz="1200" b="0" i="0" u="none" strike="noStrike" baseline="0">
+                        <a:solidFill>
+                          <a:srgbClr val="000000"/>
+                        </a:solidFill>
+                        <a:effectLst/>
+                        <a:latin typeface="Calibri" panose="020F0502020204030204" pitchFamily="34" charset="0"/>
+                      </a:endParaRPr>
+                    </a:p>
+                  </a:txBody>
+                  <a:tcPr marL="4717" marR="4717" marT="4717" marB="0" anchor="b"/>
+                </a:tc>
+                <a:tc>
+                  <a:txBody>
+                    <a:bodyPr/>
+                    <a:lstStyle/>
+                    <a:p>
+                      <a:pPr algn="l" fontAlgn="b"/>
+                      <a:r>
+                        <a:rPr lang="en-US" sz="1200" u="none" strike="noStrike" baseline="0">
+                          <a:effectLst/>
+                        </a:rPr>
+                        <a:t>Humans</a:t>
+                      </a:r>
+                      <a:endParaRPr lang="en-US" sz="1200" b="0" i="0" u="none" strike="noStrike" baseline="0">
+                        <a:solidFill>
+                          <a:srgbClr val="000000"/>
+                        </a:solidFill>
+                        <a:effectLst/>
+                        <a:latin typeface="Calibri" panose="020F0502020204030204" pitchFamily="34" charset="0"/>
+                      </a:endParaRPr>
+                    </a:p>
+                  </a:txBody>
+                  <a:tcPr marL="4717" marR="4717" marT="4717" marB="0" anchor="b"/>
+                </a:tc>
+                <a:extLst>
+                  <a:ext uri="{0D108BD9-81ED-4DB2-BD59-A6C34878D82A}">
+                    <a16:rowId xmlns:a16="http://schemas.microsoft.com/office/drawing/2014/main" val="724890597"/>
+                  </a:ext>
+                </a:extLst>
+              </a:tr>
+              <a:tr h="141121">
+                <a:tc>
+                  <a:txBody>
+                    <a:bodyPr/>
+                    <a:lstStyle/>
+                    <a:p>
+                      <a:pPr algn="l" fontAlgn="b"/>
+                      <a:r>
+                        <a:rPr lang="en-US" sz="1200" u="none" strike="noStrike" baseline="0">
+                          <a:effectLst/>
+                        </a:rPr>
+                        <a:t>S Typhi CT18</a:t>
+                      </a:r>
+                      <a:endParaRPr lang="en-US" sz="1200" b="0" i="0" u="none" strike="noStrike" baseline="0">
+                        <a:solidFill>
+                          <a:srgbClr val="000000"/>
+                        </a:solidFill>
+                        <a:effectLst/>
+                        <a:latin typeface="Calibri" panose="020F0502020204030204" pitchFamily="34" charset="0"/>
+                      </a:endParaRPr>
+                    </a:p>
+                  </a:txBody>
+                  <a:tcPr marL="4717" marR="4717" marT="4717" marB="0" anchor="b"/>
+                </a:tc>
+                <a:tc>
+                  <a:txBody>
+                    <a:bodyPr/>
+                    <a:lstStyle/>
+                    <a:p>
+                      <a:pPr algn="l" fontAlgn="b"/>
+                      <a:r>
+                        <a:rPr lang="en-US" sz="1200" u="none" strike="noStrike" baseline="0">
+                          <a:effectLst/>
+                        </a:rPr>
+                        <a:t>Humans</a:t>
+                      </a:r>
+                      <a:endParaRPr lang="en-US" sz="1200" b="0" i="0" u="none" strike="noStrike" baseline="0">
+                        <a:solidFill>
+                          <a:srgbClr val="000000"/>
+                        </a:solidFill>
+                        <a:effectLst/>
+                        <a:latin typeface="Calibri" panose="020F0502020204030204" pitchFamily="34" charset="0"/>
+                      </a:endParaRPr>
+                    </a:p>
+                  </a:txBody>
+                  <a:tcPr marL="4717" marR="4717" marT="4717" marB="0" anchor="b"/>
+                </a:tc>
+                <a:extLst>
+                  <a:ext uri="{0D108BD9-81ED-4DB2-BD59-A6C34878D82A}">
+                    <a16:rowId xmlns:a16="http://schemas.microsoft.com/office/drawing/2014/main" val="2754757288"/>
+                  </a:ext>
+                </a:extLst>
+              </a:tr>
+              <a:tr h="141121">
+                <a:tc>
+                  <a:txBody>
+                    <a:bodyPr/>
+                    <a:lstStyle/>
+                    <a:p>
+                      <a:pPr algn="l" fontAlgn="b"/>
+                      <a:r>
+                        <a:rPr lang="en-US" sz="1200" u="none" strike="noStrike" baseline="0">
+                          <a:effectLst/>
+                        </a:rPr>
+                        <a:t>S Typhi Ty2</a:t>
+                      </a:r>
+                      <a:endParaRPr lang="en-US" sz="1200" b="0" i="0" u="none" strike="noStrike" baseline="0">
+                        <a:solidFill>
+                          <a:srgbClr val="000000"/>
+                        </a:solidFill>
+                        <a:effectLst/>
+                        <a:latin typeface="Calibri" panose="020F0502020204030204" pitchFamily="34" charset="0"/>
+                      </a:endParaRPr>
+                    </a:p>
+                  </a:txBody>
+                  <a:tcPr marL="4717" marR="4717" marT="4717" marB="0" anchor="b"/>
+                </a:tc>
+                <a:tc>
+                  <a:txBody>
+                    <a:bodyPr/>
+                    <a:lstStyle/>
+                    <a:p>
+                      <a:pPr algn="l" fontAlgn="b"/>
+                      <a:r>
+                        <a:rPr lang="en-US" sz="1200" u="none" strike="noStrike" baseline="0">
+                          <a:effectLst/>
+                        </a:rPr>
+                        <a:t>Humans</a:t>
+                      </a:r>
+                      <a:endParaRPr lang="en-US" sz="1200" b="0" i="0" u="none" strike="noStrike" baseline="0">
+                        <a:solidFill>
+                          <a:srgbClr val="000000"/>
+                        </a:solidFill>
+                        <a:effectLst/>
+                        <a:latin typeface="Calibri" panose="020F0502020204030204" pitchFamily="34" charset="0"/>
+                      </a:endParaRPr>
+                    </a:p>
+                  </a:txBody>
+                  <a:tcPr marL="4717" marR="4717" marT="4717" marB="0" anchor="b"/>
+                </a:tc>
+                <a:extLst>
+                  <a:ext uri="{0D108BD9-81ED-4DB2-BD59-A6C34878D82A}">
+                    <a16:rowId xmlns:a16="http://schemas.microsoft.com/office/drawing/2014/main" val="2277954180"/>
+                  </a:ext>
+                </a:extLst>
+              </a:tr>
+              <a:tr h="278693">
+                <a:tc>
+                  <a:txBody>
+                    <a:bodyPr/>
+                    <a:lstStyle/>
+                    <a:p>
+                      <a:pPr algn="l" fontAlgn="b"/>
+                      <a:r>
+                        <a:rPr lang="en-US" sz="1200" u="none" strike="noStrike" baseline="0">
+                          <a:effectLst/>
+                        </a:rPr>
+                        <a:t>S Choleraesuis SCB67</a:t>
+                      </a:r>
+                      <a:endParaRPr lang="en-US" sz="1200" b="0" i="0" u="none" strike="noStrike" baseline="0">
+                        <a:solidFill>
+                          <a:srgbClr val="000000"/>
+                        </a:solidFill>
+                        <a:effectLst/>
+                        <a:latin typeface="Calibri" panose="020F0502020204030204" pitchFamily="34" charset="0"/>
+                      </a:endParaRPr>
+                    </a:p>
+                  </a:txBody>
+                  <a:tcPr marL="4717" marR="4717" marT="4717" marB="0" anchor="b"/>
+                </a:tc>
+                <a:tc>
+                  <a:txBody>
+                    <a:bodyPr/>
+                    <a:lstStyle/>
+                    <a:p>
+                      <a:pPr algn="l" fontAlgn="b"/>
+                      <a:r>
+                        <a:rPr lang="en-US" sz="1200" u="none" strike="noStrike" baseline="0">
+                          <a:effectLst/>
+                        </a:rPr>
+                        <a:t>Swine</a:t>
+                      </a:r>
+                      <a:endParaRPr lang="en-US" sz="1200" b="0" i="0" u="none" strike="noStrike" baseline="0">
+                        <a:solidFill>
+                          <a:srgbClr val="000000"/>
+                        </a:solidFill>
+                        <a:effectLst/>
+                        <a:latin typeface="Calibri" panose="020F0502020204030204" pitchFamily="34" charset="0"/>
+                      </a:endParaRPr>
+                    </a:p>
+                  </a:txBody>
+                  <a:tcPr marL="4717" marR="4717" marT="4717" marB="0" anchor="b"/>
+                </a:tc>
+                <a:extLst>
+                  <a:ext uri="{0D108BD9-81ED-4DB2-BD59-A6C34878D82A}">
+                    <a16:rowId xmlns:a16="http://schemas.microsoft.com/office/drawing/2014/main" val="936522281"/>
+                  </a:ext>
+                </a:extLst>
+              </a:tr>
+              <a:tr h="278693">
+                <a:tc>
+                  <a:txBody>
+                    <a:bodyPr/>
+                    <a:lstStyle/>
+                    <a:p>
+                      <a:pPr algn="l" fontAlgn="b"/>
+                      <a:r>
+                        <a:rPr lang="en-US" sz="1200" u="none" strike="noStrike" baseline="0">
+                          <a:effectLst/>
+                        </a:rPr>
+                        <a:t>S ParatyphiC RKS4594</a:t>
+                      </a:r>
+                      <a:endParaRPr lang="en-US" sz="1200" b="0" i="0" u="none" strike="noStrike" baseline="0">
+                        <a:solidFill>
+                          <a:srgbClr val="000000"/>
+                        </a:solidFill>
+                        <a:effectLst/>
+                        <a:latin typeface="Calibri" panose="020F0502020204030204" pitchFamily="34" charset="0"/>
+                      </a:endParaRPr>
+                    </a:p>
+                  </a:txBody>
+                  <a:tcPr marL="4717" marR="4717" marT="4717" marB="0" anchor="b"/>
+                </a:tc>
+                <a:tc>
+                  <a:txBody>
+                    <a:bodyPr/>
+                    <a:lstStyle/>
+                    <a:p>
+                      <a:pPr algn="l" fontAlgn="b"/>
+                      <a:r>
+                        <a:rPr lang="en-US" sz="1200" u="none" strike="noStrike" baseline="0">
+                          <a:effectLst/>
+                        </a:rPr>
+                        <a:t>Humans</a:t>
+                      </a:r>
+                      <a:endParaRPr lang="en-US" sz="1200" b="0" i="0" u="none" strike="noStrike" baseline="0">
+                        <a:solidFill>
+                          <a:srgbClr val="000000"/>
+                        </a:solidFill>
+                        <a:effectLst/>
+                        <a:latin typeface="Calibri" panose="020F0502020204030204" pitchFamily="34" charset="0"/>
+                      </a:endParaRPr>
+                    </a:p>
+                  </a:txBody>
+                  <a:tcPr marL="4717" marR="4717" marT="4717" marB="0" anchor="b"/>
+                </a:tc>
+                <a:extLst>
+                  <a:ext uri="{0D108BD9-81ED-4DB2-BD59-A6C34878D82A}">
+                    <a16:rowId xmlns:a16="http://schemas.microsoft.com/office/drawing/2014/main" val="1452081325"/>
+                  </a:ext>
+                </a:extLst>
+              </a:tr>
+              <a:tr h="141121">
+                <a:tc>
+                  <a:txBody>
+                    <a:bodyPr/>
+                    <a:lstStyle/>
+                    <a:p>
+                      <a:pPr algn="l" fontAlgn="b"/>
+                      <a:r>
+                        <a:rPr lang="en-US" sz="1200" u="none" strike="noStrike" baseline="0">
+                          <a:effectLst/>
+                        </a:rPr>
+                        <a:t>S Newport SL254</a:t>
+                      </a:r>
+                      <a:endParaRPr lang="en-US" sz="1200" b="0" i="0" u="none" strike="noStrike" baseline="0">
+                        <a:solidFill>
+                          <a:srgbClr val="000000"/>
+                        </a:solidFill>
+                        <a:effectLst/>
+                        <a:latin typeface="Calibri" panose="020F0502020204030204" pitchFamily="34" charset="0"/>
+                      </a:endParaRPr>
+                    </a:p>
+                  </a:txBody>
+                  <a:tcPr marL="4717" marR="4717" marT="4717" marB="0" anchor="b"/>
+                </a:tc>
+                <a:tc>
+                  <a:txBody>
+                    <a:bodyPr/>
+                    <a:lstStyle/>
+                    <a:p>
+                      <a:pPr algn="l" fontAlgn="b"/>
+                      <a:r>
+                        <a:rPr lang="en-US" sz="1200" u="none" strike="noStrike" baseline="0">
+                          <a:effectLst/>
+                        </a:rPr>
+                        <a:t>Humans</a:t>
+                      </a:r>
+                      <a:endParaRPr lang="en-US" sz="1200" b="0" i="0" u="none" strike="noStrike" baseline="0">
+                        <a:solidFill>
+                          <a:srgbClr val="000000"/>
+                        </a:solidFill>
+                        <a:effectLst/>
+                        <a:latin typeface="Calibri" panose="020F0502020204030204" pitchFamily="34" charset="0"/>
+                      </a:endParaRPr>
+                    </a:p>
+                  </a:txBody>
+                  <a:tcPr marL="4717" marR="4717" marT="4717" marB="0" anchor="b"/>
+                </a:tc>
+                <a:extLst>
+                  <a:ext uri="{0D108BD9-81ED-4DB2-BD59-A6C34878D82A}">
+                    <a16:rowId xmlns:a16="http://schemas.microsoft.com/office/drawing/2014/main" val="3139672255"/>
+                  </a:ext>
+                </a:extLst>
+              </a:tr>
+              <a:tr h="141121">
+                <a:tc>
+                  <a:txBody>
+                    <a:bodyPr/>
+                    <a:lstStyle/>
+                    <a:p>
+                      <a:pPr algn="l" fontAlgn="b"/>
+                      <a:r>
+                        <a:rPr lang="en-US" sz="1200" u="none" strike="noStrike" baseline="0">
+                          <a:effectLst/>
+                        </a:rPr>
+                        <a:t>S Heidelberg SL476</a:t>
+                      </a:r>
+                      <a:endParaRPr lang="en-US" sz="1200" b="0" i="0" u="none" strike="noStrike" baseline="0">
+                        <a:solidFill>
+                          <a:srgbClr val="000000"/>
+                        </a:solidFill>
+                        <a:effectLst/>
+                        <a:latin typeface="Calibri" panose="020F0502020204030204" pitchFamily="34" charset="0"/>
+                      </a:endParaRPr>
+                    </a:p>
+                  </a:txBody>
+                  <a:tcPr marL="4717" marR="4717" marT="4717" marB="0" anchor="b"/>
+                </a:tc>
+                <a:tc>
+                  <a:txBody>
+                    <a:bodyPr/>
+                    <a:lstStyle/>
+                    <a:p>
+                      <a:pPr algn="l" fontAlgn="b"/>
+                      <a:r>
+                        <a:rPr lang="en-US" sz="1200" u="none" strike="noStrike" baseline="0">
+                          <a:effectLst/>
+                        </a:rPr>
+                        <a:t>Humans</a:t>
+                      </a:r>
+                      <a:endParaRPr lang="en-US" sz="1200" b="0" i="0" u="none" strike="noStrike" baseline="0">
+                        <a:solidFill>
+                          <a:srgbClr val="000000"/>
+                        </a:solidFill>
+                        <a:effectLst/>
+                        <a:latin typeface="Calibri" panose="020F0502020204030204" pitchFamily="34" charset="0"/>
+                      </a:endParaRPr>
+                    </a:p>
+                  </a:txBody>
+                  <a:tcPr marL="4717" marR="4717" marT="4717" marB="0" anchor="b"/>
+                </a:tc>
+                <a:extLst>
+                  <a:ext uri="{0D108BD9-81ED-4DB2-BD59-A6C34878D82A}">
+                    <a16:rowId xmlns:a16="http://schemas.microsoft.com/office/drawing/2014/main" val="3852896711"/>
+                  </a:ext>
+                </a:extLst>
+              </a:tr>
+              <a:tr h="198930">
+                <a:tc>
+                  <a:txBody>
+                    <a:bodyPr/>
+                    <a:lstStyle/>
+                    <a:p>
+                      <a:pPr algn="l" fontAlgn="b"/>
+                      <a:r>
+                        <a:rPr lang="en-US" sz="1200" u="none" strike="noStrike" baseline="0">
+                          <a:effectLst/>
+                        </a:rPr>
+                        <a:t>S Typhimurium LT2</a:t>
+                      </a:r>
+                      <a:endParaRPr lang="en-US" sz="1200" b="0" i="0" u="none" strike="noStrike" baseline="0">
+                        <a:solidFill>
+                          <a:srgbClr val="000000"/>
+                        </a:solidFill>
+                        <a:effectLst/>
+                        <a:latin typeface="Calibri" panose="020F0502020204030204" pitchFamily="34" charset="0"/>
+                      </a:endParaRPr>
+                    </a:p>
+                  </a:txBody>
+                  <a:tcPr marL="4717" marR="4717" marT="4717" marB="0" anchor="b"/>
+                </a:tc>
+                <a:tc>
+                  <a:txBody>
+                    <a:bodyPr/>
+                    <a:lstStyle/>
+                    <a:p>
+                      <a:pPr algn="l" fontAlgn="b"/>
+                      <a:r>
+                        <a:rPr lang="en-US" sz="1200" u="none" strike="noStrike" baseline="0">
+                          <a:effectLst/>
+                        </a:rPr>
+                        <a:t>Avirulent</a:t>
+                      </a:r>
+                      <a:endParaRPr lang="en-US" sz="1200" b="0" i="0" u="none" strike="noStrike" baseline="0">
+                        <a:solidFill>
+                          <a:srgbClr val="000000"/>
+                        </a:solidFill>
+                        <a:effectLst/>
+                        <a:latin typeface="Calibri" panose="020F0502020204030204" pitchFamily="34" charset="0"/>
+                      </a:endParaRPr>
+                    </a:p>
+                  </a:txBody>
+                  <a:tcPr marL="4717" marR="4717" marT="4717" marB="0" anchor="b"/>
+                </a:tc>
+                <a:extLst>
+                  <a:ext uri="{0D108BD9-81ED-4DB2-BD59-A6C34878D82A}">
+                    <a16:rowId xmlns:a16="http://schemas.microsoft.com/office/drawing/2014/main" val="4038678829"/>
+                  </a:ext>
+                </a:extLst>
+              </a:tr>
+              <a:tr h="278693">
+                <a:tc>
+                  <a:txBody>
+                    <a:bodyPr/>
+                    <a:lstStyle/>
+                    <a:p>
+                      <a:pPr algn="l" fontAlgn="b"/>
+                      <a:r>
+                        <a:rPr lang="en-US" sz="1200" u="none" strike="noStrike" baseline="0">
+                          <a:effectLst/>
+                        </a:rPr>
+                        <a:t>S Typhimurium ST313</a:t>
+                      </a:r>
+                      <a:endParaRPr lang="en-US" sz="1200" b="0" i="0" u="none" strike="noStrike" baseline="0">
+                        <a:solidFill>
+                          <a:srgbClr val="000000"/>
+                        </a:solidFill>
+                        <a:effectLst/>
+                        <a:latin typeface="Calibri" panose="020F0502020204030204" pitchFamily="34" charset="0"/>
+                      </a:endParaRPr>
+                    </a:p>
+                  </a:txBody>
+                  <a:tcPr marL="4717" marR="4717" marT="4717" marB="0" anchor="b"/>
+                </a:tc>
+                <a:tc>
+                  <a:txBody>
+                    <a:bodyPr/>
+                    <a:lstStyle/>
+                    <a:p>
+                      <a:pPr algn="l" fontAlgn="b"/>
+                      <a:r>
+                        <a:rPr lang="en-US" sz="1200" u="none" strike="noStrike" baseline="0">
+                          <a:effectLst/>
+                        </a:rPr>
+                        <a:t>Broad</a:t>
+                      </a:r>
+                      <a:endParaRPr lang="en-US" sz="1200" b="0" i="0" u="none" strike="noStrike" baseline="0">
+                        <a:solidFill>
+                          <a:srgbClr val="000000"/>
+                        </a:solidFill>
+                        <a:effectLst/>
+                        <a:latin typeface="Calibri" panose="020F0502020204030204" pitchFamily="34" charset="0"/>
+                      </a:endParaRPr>
+                    </a:p>
+                  </a:txBody>
+                  <a:tcPr marL="4717" marR="4717" marT="4717" marB="0" anchor="b"/>
+                </a:tc>
+                <a:extLst>
+                  <a:ext uri="{0D108BD9-81ED-4DB2-BD59-A6C34878D82A}">
+                    <a16:rowId xmlns:a16="http://schemas.microsoft.com/office/drawing/2014/main" val="2932325787"/>
+                  </a:ext>
+                </a:extLst>
+              </a:tr>
+              <a:tr h="278693">
+                <a:tc>
+                  <a:txBody>
+                    <a:bodyPr/>
+                    <a:lstStyle/>
+                    <a:p>
+                      <a:pPr algn="l" fontAlgn="b"/>
+                      <a:r>
+                        <a:rPr lang="en-US" sz="1200" u="none" strike="noStrike" baseline="0">
+                          <a:effectLst/>
+                        </a:rPr>
+                        <a:t>S Typhimurium SL1344</a:t>
+                      </a:r>
+                      <a:endParaRPr lang="en-US" sz="1200" b="0" i="0" u="none" strike="noStrike" baseline="0">
+                        <a:solidFill>
+                          <a:srgbClr val="000000"/>
+                        </a:solidFill>
+                        <a:effectLst/>
+                        <a:latin typeface="Calibri" panose="020F0502020204030204" pitchFamily="34" charset="0"/>
+                      </a:endParaRPr>
+                    </a:p>
+                  </a:txBody>
+                  <a:tcPr marL="4717" marR="4717" marT="4717" marB="0" anchor="b"/>
+                </a:tc>
+                <a:tc>
+                  <a:txBody>
+                    <a:bodyPr/>
+                    <a:lstStyle/>
+                    <a:p>
+                      <a:pPr algn="l" fontAlgn="b"/>
+                      <a:r>
+                        <a:rPr lang="en-US" sz="1200" u="none" strike="noStrike" baseline="0">
+                          <a:effectLst/>
+                        </a:rPr>
+                        <a:t>Broad</a:t>
+                      </a:r>
+                      <a:endParaRPr lang="en-US" sz="1200" b="0" i="0" u="none" strike="noStrike" baseline="0">
+                        <a:solidFill>
+                          <a:srgbClr val="000000"/>
+                        </a:solidFill>
+                        <a:effectLst/>
+                        <a:latin typeface="Calibri" panose="020F0502020204030204" pitchFamily="34" charset="0"/>
+                      </a:endParaRPr>
+                    </a:p>
+                  </a:txBody>
+                  <a:tcPr marL="4717" marR="4717" marT="4717" marB="0" anchor="b"/>
+                </a:tc>
+                <a:extLst>
+                  <a:ext uri="{0D108BD9-81ED-4DB2-BD59-A6C34878D82A}">
+                    <a16:rowId xmlns:a16="http://schemas.microsoft.com/office/drawing/2014/main" val="3891909894"/>
+                  </a:ext>
+                </a:extLst>
+              </a:tr>
+              <a:tr h="141121">
+                <a:tc>
+                  <a:txBody>
+                    <a:bodyPr/>
+                    <a:lstStyle/>
+                    <a:p>
+                      <a:pPr algn="l" fontAlgn="b"/>
+                      <a:r>
+                        <a:rPr lang="en-US" sz="1200" u="none" strike="noStrike" baseline="0">
+                          <a:effectLst/>
+                        </a:rPr>
+                        <a:t>S ParatyphiB SPB7</a:t>
+                      </a:r>
+                      <a:endParaRPr lang="en-US" sz="1200" b="0" i="0" u="none" strike="noStrike" baseline="0">
+                        <a:solidFill>
+                          <a:srgbClr val="000000"/>
+                        </a:solidFill>
+                        <a:effectLst/>
+                        <a:latin typeface="Calibri" panose="020F0502020204030204" pitchFamily="34" charset="0"/>
+                      </a:endParaRPr>
+                    </a:p>
+                  </a:txBody>
+                  <a:tcPr marL="4717" marR="4717" marT="4717" marB="0" anchor="b"/>
+                </a:tc>
+                <a:tc>
+                  <a:txBody>
+                    <a:bodyPr/>
+                    <a:lstStyle/>
+                    <a:p>
+                      <a:pPr algn="l" fontAlgn="b"/>
+                      <a:r>
+                        <a:rPr lang="en-US" sz="1200" u="none" strike="noStrike" baseline="0">
+                          <a:effectLst/>
+                        </a:rPr>
+                        <a:t>Humans</a:t>
+                      </a:r>
+                      <a:endParaRPr lang="en-US" sz="1200" b="0" i="0" u="none" strike="noStrike" baseline="0">
+                        <a:solidFill>
+                          <a:srgbClr val="000000"/>
+                        </a:solidFill>
+                        <a:effectLst/>
+                        <a:latin typeface="Calibri" panose="020F0502020204030204" pitchFamily="34" charset="0"/>
+                      </a:endParaRPr>
+                    </a:p>
+                  </a:txBody>
+                  <a:tcPr marL="4717" marR="4717" marT="4717" marB="0" anchor="b"/>
+                </a:tc>
+                <a:extLst>
+                  <a:ext uri="{0D108BD9-81ED-4DB2-BD59-A6C34878D82A}">
+                    <a16:rowId xmlns:a16="http://schemas.microsoft.com/office/drawing/2014/main" val="3472762204"/>
+                  </a:ext>
+                </a:extLst>
+              </a:tr>
+              <a:tr h="198930">
+                <a:tc>
+                  <a:txBody>
+                    <a:bodyPr/>
+                    <a:lstStyle/>
+                    <a:p>
+                      <a:pPr algn="l" fontAlgn="b"/>
+                      <a:r>
+                        <a:rPr lang="en-US" sz="1200" u="none" strike="noStrike" baseline="0">
+                          <a:effectLst/>
+                        </a:rPr>
+                        <a:t>S Abortusovis SR44</a:t>
+                      </a:r>
+                      <a:endParaRPr lang="en-US" sz="1200" b="0" i="0" u="none" strike="noStrike" baseline="0">
+                        <a:solidFill>
+                          <a:srgbClr val="000000"/>
+                        </a:solidFill>
+                        <a:effectLst/>
+                        <a:latin typeface="Calibri" panose="020F0502020204030204" pitchFamily="34" charset="0"/>
+                      </a:endParaRPr>
+                    </a:p>
+                  </a:txBody>
+                  <a:tcPr marL="4717" marR="4717" marT="4717" marB="0" anchor="b"/>
+                </a:tc>
+                <a:tc>
+                  <a:txBody>
+                    <a:bodyPr/>
+                    <a:lstStyle/>
+                    <a:p>
+                      <a:pPr algn="l" fontAlgn="b"/>
+                      <a:r>
+                        <a:rPr lang="en-US" sz="1200" u="none" strike="noStrike" baseline="0">
+                          <a:effectLst/>
+                        </a:rPr>
+                        <a:t>Ovine</a:t>
+                      </a:r>
+                      <a:endParaRPr lang="en-US" sz="1200" b="0" i="0" u="none" strike="noStrike" baseline="0">
+                        <a:solidFill>
+                          <a:srgbClr val="000000"/>
+                        </a:solidFill>
+                        <a:effectLst/>
+                        <a:latin typeface="Calibri" panose="020F0502020204030204" pitchFamily="34" charset="0"/>
+                      </a:endParaRPr>
+                    </a:p>
+                  </a:txBody>
+                  <a:tcPr marL="4717" marR="4717" marT="4717" marB="0" anchor="b"/>
+                </a:tc>
+                <a:extLst>
+                  <a:ext uri="{0D108BD9-81ED-4DB2-BD59-A6C34878D82A}">
+                    <a16:rowId xmlns:a16="http://schemas.microsoft.com/office/drawing/2014/main" val="2136148152"/>
+                  </a:ext>
+                </a:extLst>
+              </a:tr>
+              <a:tr h="141121">
+                <a:tc>
+                  <a:txBody>
+                    <a:bodyPr/>
+                    <a:lstStyle/>
+                    <a:p>
+                      <a:pPr algn="l" fontAlgn="b"/>
+                      <a:r>
+                        <a:rPr lang="en-US" sz="1200" u="none" strike="noStrike" baseline="0">
+                          <a:effectLst/>
+                        </a:rPr>
+                        <a:t>S Agona SL483</a:t>
+                      </a:r>
+                      <a:endParaRPr lang="en-US" sz="1200" b="0" i="0" u="none" strike="noStrike" baseline="0">
+                        <a:solidFill>
+                          <a:srgbClr val="000000"/>
+                        </a:solidFill>
+                        <a:effectLst/>
+                        <a:latin typeface="Calibri" panose="020F0502020204030204" pitchFamily="34" charset="0"/>
+                      </a:endParaRPr>
+                    </a:p>
+                  </a:txBody>
+                  <a:tcPr marL="4717" marR="4717" marT="4717" marB="0" anchor="b"/>
+                </a:tc>
+                <a:tc>
+                  <a:txBody>
+                    <a:bodyPr/>
+                    <a:lstStyle/>
+                    <a:p>
+                      <a:pPr algn="l" fontAlgn="b"/>
+                      <a:r>
+                        <a:rPr lang="en-US" sz="1200" u="none" strike="noStrike" baseline="0">
+                          <a:effectLst/>
+                        </a:rPr>
+                        <a:t>Swine</a:t>
+                      </a:r>
+                      <a:endParaRPr lang="en-US" sz="1200" b="0" i="0" u="none" strike="noStrike" baseline="0">
+                        <a:solidFill>
+                          <a:srgbClr val="000000"/>
+                        </a:solidFill>
+                        <a:effectLst/>
+                        <a:latin typeface="Calibri" panose="020F0502020204030204" pitchFamily="34" charset="0"/>
+                      </a:endParaRPr>
+                    </a:p>
+                  </a:txBody>
+                  <a:tcPr marL="4717" marR="4717" marT="4717" marB="0" anchor="b"/>
+                </a:tc>
+                <a:extLst>
+                  <a:ext uri="{0D108BD9-81ED-4DB2-BD59-A6C34878D82A}">
+                    <a16:rowId xmlns:a16="http://schemas.microsoft.com/office/drawing/2014/main" val="2968750525"/>
+                  </a:ext>
+                </a:extLst>
+              </a:tr>
+              <a:tr h="278693">
+                <a:tc>
+                  <a:txBody>
+                    <a:bodyPr/>
+                    <a:lstStyle/>
+                    <a:p>
+                      <a:pPr algn="l" fontAlgn="b"/>
+                      <a:r>
+                        <a:rPr lang="en-US" sz="1200" u="none" strike="noStrike" baseline="0">
+                          <a:effectLst/>
+                        </a:rPr>
+                        <a:t>S Dublin CT02021853</a:t>
+                      </a:r>
+                      <a:endParaRPr lang="en-US" sz="1200" b="0" i="0" u="none" strike="noStrike" baseline="0">
+                        <a:solidFill>
+                          <a:srgbClr val="000000"/>
+                        </a:solidFill>
+                        <a:effectLst/>
+                        <a:latin typeface="Calibri" panose="020F0502020204030204" pitchFamily="34" charset="0"/>
+                      </a:endParaRPr>
+                    </a:p>
+                  </a:txBody>
+                  <a:tcPr marL="4717" marR="4717" marT="4717" marB="0" anchor="b"/>
+                </a:tc>
+                <a:tc>
+                  <a:txBody>
+                    <a:bodyPr/>
+                    <a:lstStyle/>
+                    <a:p>
+                      <a:pPr algn="l" fontAlgn="b"/>
+                      <a:r>
+                        <a:rPr lang="en-US" sz="1200" u="none" strike="noStrike" baseline="0">
+                          <a:effectLst/>
+                        </a:rPr>
+                        <a:t>Bovine</a:t>
+                      </a:r>
+                      <a:endParaRPr lang="en-US" sz="1200" b="0" i="0" u="none" strike="noStrike" baseline="0">
+                        <a:solidFill>
+                          <a:srgbClr val="000000"/>
+                        </a:solidFill>
+                        <a:effectLst/>
+                        <a:latin typeface="Calibri" panose="020F0502020204030204" pitchFamily="34" charset="0"/>
+                      </a:endParaRPr>
+                    </a:p>
+                  </a:txBody>
+                  <a:tcPr marL="4717" marR="4717" marT="4717" marB="0" anchor="b"/>
+                </a:tc>
+                <a:extLst>
+                  <a:ext uri="{0D108BD9-81ED-4DB2-BD59-A6C34878D82A}">
+                    <a16:rowId xmlns:a16="http://schemas.microsoft.com/office/drawing/2014/main" val="3725009058"/>
+                  </a:ext>
+                </a:extLst>
+              </a:tr>
+              <a:tr h="278693">
+                <a:tc>
+                  <a:txBody>
+                    <a:bodyPr/>
+                    <a:lstStyle/>
+                    <a:p>
+                      <a:pPr algn="l" fontAlgn="b"/>
+                      <a:r>
+                        <a:rPr lang="en-US" sz="1200" u="none" strike="noStrike" baseline="0">
+                          <a:effectLst/>
+                        </a:rPr>
+                        <a:t>S Enteritidis P125109</a:t>
+                      </a:r>
+                      <a:endParaRPr lang="en-US" sz="1200" b="0" i="0" u="none" strike="noStrike" baseline="0">
+                        <a:solidFill>
+                          <a:srgbClr val="000000"/>
+                        </a:solidFill>
+                        <a:effectLst/>
+                        <a:latin typeface="Calibri" panose="020F0502020204030204" pitchFamily="34" charset="0"/>
+                      </a:endParaRPr>
+                    </a:p>
+                  </a:txBody>
+                  <a:tcPr marL="4717" marR="4717" marT="4717" marB="0" anchor="b"/>
+                </a:tc>
+                <a:tc>
+                  <a:txBody>
+                    <a:bodyPr/>
+                    <a:lstStyle/>
+                    <a:p>
+                      <a:pPr algn="l" fontAlgn="b"/>
+                      <a:r>
+                        <a:rPr lang="en-US" sz="1200" u="none" strike="noStrike" baseline="0">
+                          <a:effectLst/>
+                        </a:rPr>
+                        <a:t>Broad</a:t>
+                      </a:r>
+                      <a:endParaRPr lang="en-US" sz="1200" b="0" i="0" u="none" strike="noStrike" baseline="0">
+                        <a:solidFill>
+                          <a:srgbClr val="000000"/>
+                        </a:solidFill>
+                        <a:effectLst/>
+                        <a:latin typeface="Calibri" panose="020F0502020204030204" pitchFamily="34" charset="0"/>
+                      </a:endParaRPr>
+                    </a:p>
+                  </a:txBody>
+                  <a:tcPr marL="4717" marR="4717" marT="4717" marB="0" anchor="b"/>
+                </a:tc>
+                <a:extLst>
+                  <a:ext uri="{0D108BD9-81ED-4DB2-BD59-A6C34878D82A}">
+                    <a16:rowId xmlns:a16="http://schemas.microsoft.com/office/drawing/2014/main" val="2126088743"/>
+                  </a:ext>
+                </a:extLst>
+              </a:tr>
+              <a:tr h="198930">
+                <a:tc>
+                  <a:txBody>
+                    <a:bodyPr/>
+                    <a:lstStyle/>
+                    <a:p>
+                      <a:pPr algn="l" fontAlgn="b"/>
+                      <a:r>
+                        <a:rPr lang="en-US" sz="1200" u="none" strike="noStrike" baseline="0">
+                          <a:effectLst/>
+                        </a:rPr>
+                        <a:t>S Gallinarum 28791</a:t>
+                      </a:r>
+                      <a:endParaRPr lang="en-US" sz="1200" b="0" i="0" u="none" strike="noStrike" baseline="0">
+                        <a:solidFill>
+                          <a:srgbClr val="000000"/>
+                        </a:solidFill>
+                        <a:effectLst/>
+                        <a:latin typeface="Calibri" panose="020F0502020204030204" pitchFamily="34" charset="0"/>
+                      </a:endParaRPr>
+                    </a:p>
+                  </a:txBody>
+                  <a:tcPr marL="4717" marR="4717" marT="4717" marB="0" anchor="b"/>
+                </a:tc>
+                <a:tc>
+                  <a:txBody>
+                    <a:bodyPr/>
+                    <a:lstStyle/>
+                    <a:p>
+                      <a:pPr algn="l" fontAlgn="b"/>
+                      <a:r>
+                        <a:rPr lang="en-US" sz="1200" u="none" strike="noStrike" baseline="0">
+                          <a:effectLst/>
+                        </a:rPr>
+                        <a:t>Chicken/Fowl</a:t>
+                      </a:r>
+                      <a:endParaRPr lang="en-US" sz="1200" b="0" i="0" u="none" strike="noStrike" baseline="0">
+                        <a:solidFill>
+                          <a:srgbClr val="000000"/>
+                        </a:solidFill>
+                        <a:effectLst/>
+                        <a:latin typeface="Calibri" panose="020F0502020204030204" pitchFamily="34" charset="0"/>
+                      </a:endParaRPr>
+                    </a:p>
+                  </a:txBody>
+                  <a:tcPr marL="4717" marR="4717" marT="4717" marB="0" anchor="b"/>
+                </a:tc>
+                <a:extLst>
+                  <a:ext uri="{0D108BD9-81ED-4DB2-BD59-A6C34878D82A}">
+                    <a16:rowId xmlns:a16="http://schemas.microsoft.com/office/drawing/2014/main" val="2497821798"/>
+                  </a:ext>
+                </a:extLst>
+              </a:tr>
+              <a:tr h="278693">
+                <a:tc>
+                  <a:txBody>
+                    <a:bodyPr/>
+                    <a:lstStyle/>
+                    <a:p>
+                      <a:pPr algn="l" fontAlgn="b"/>
+                      <a:r>
+                        <a:rPr lang="en-US" sz="1200" u="none" strike="noStrike" baseline="0" dirty="0">
+                          <a:effectLst/>
+                        </a:rPr>
+                        <a:t>S Gall Pullorum RKS5078</a:t>
+                      </a:r>
+                      <a:endParaRPr lang="en-US" sz="1200" b="0" i="0" u="none" strike="noStrike" baseline="0" dirty="0">
+                        <a:solidFill>
+                          <a:srgbClr val="000000"/>
+                        </a:solidFill>
+                        <a:effectLst/>
+                        <a:latin typeface="Calibri" panose="020F0502020204030204" pitchFamily="34" charset="0"/>
+                      </a:endParaRPr>
+                    </a:p>
+                  </a:txBody>
+                  <a:tcPr marL="4717" marR="4717" marT="4717" marB="0" anchor="b"/>
+                </a:tc>
+                <a:tc>
+                  <a:txBody>
+                    <a:bodyPr/>
+                    <a:lstStyle/>
+                    <a:p>
+                      <a:pPr algn="l" fontAlgn="b"/>
+                      <a:r>
+                        <a:rPr lang="en-US" sz="1200" u="none" strike="noStrike" baseline="0" dirty="0">
+                          <a:effectLst/>
+                        </a:rPr>
+                        <a:t>Chicken/Fowl</a:t>
+                      </a:r>
+                      <a:endParaRPr lang="en-US" sz="1200" b="0" i="0" u="none" strike="noStrike" baseline="0" dirty="0">
+                        <a:solidFill>
+                          <a:srgbClr val="000000"/>
+                        </a:solidFill>
+                        <a:effectLst/>
+                        <a:latin typeface="Calibri" panose="020F0502020204030204" pitchFamily="34" charset="0"/>
+                      </a:endParaRPr>
+                    </a:p>
+                  </a:txBody>
+                  <a:tcPr marL="4717" marR="4717" marT="4717" marB="0" anchor="b"/>
+                </a:tc>
+                <a:extLst>
+                  <a:ext uri="{0D108BD9-81ED-4DB2-BD59-A6C34878D82A}">
+                    <a16:rowId xmlns:a16="http://schemas.microsoft.com/office/drawing/2014/main" val="196876218"/>
+                  </a:ext>
+                </a:extLst>
+              </a:tr>
+            </a:tbl>
+          </a:graphicData>
+        </a:graphic>
+      </p:graphicFrame>
+      <p:sp>
+        <p:nvSpPr>
+          <p:cNvPr id="29" name="TextBox 28">
+            <a:extLst>
+              <a:ext uri="{FF2B5EF4-FFF2-40B4-BE49-F238E27FC236}">
+                <a16:creationId xmlns:a16="http://schemas.microsoft.com/office/drawing/2014/main" id="{AE167680-6A0B-4FE9-A366-3ED176D6F3CC}"/>
+              </a:ext>
+            </a:extLst>
+          </p:cNvPr>
+          <p:cNvSpPr txBox="1"/>
+          <p:nvPr/>
+        </p:nvSpPr>
+        <p:spPr>
+          <a:xfrm>
+            <a:off x="7375177" y="5312902"/>
+            <a:ext cx="631840" cy="307777"/>
+          </a:xfrm>
+          <a:prstGeom prst="rect">
+            <a:avLst/>
+          </a:prstGeom>
+          <a:noFill/>
+        </p:spPr>
+        <p:txBody>
+          <a:bodyPr wrap="none" rtlCol="0">
+            <a:spAutoFit/>
+          </a:bodyPr>
+          <a:lstStyle/>
+          <a:p>
+            <a:r>
+              <a:rPr lang="en-US" sz="1400" b="1" dirty="0"/>
+              <a:t>Swine</a:t>
+            </a:r>
+          </a:p>
+        </p:txBody>
+      </p:sp>
+      <p:sp>
+        <p:nvSpPr>
+          <p:cNvPr id="30" name="Arrow: Right 29">
+            <a:extLst>
+              <a:ext uri="{FF2B5EF4-FFF2-40B4-BE49-F238E27FC236}">
+                <a16:creationId xmlns:a16="http://schemas.microsoft.com/office/drawing/2014/main" id="{1AA1F839-324E-4585-A30A-E1CF2264AFC0}"/>
+              </a:ext>
+            </a:extLst>
+          </p:cNvPr>
+          <p:cNvSpPr/>
+          <p:nvPr/>
+        </p:nvSpPr>
+        <p:spPr>
+          <a:xfrm>
+            <a:off x="5104268" y="5383207"/>
+            <a:ext cx="2244186" cy="185037"/>
+          </a:xfrm>
+          <a:prstGeom prst="rightArrow">
+            <a:avLst>
+              <a:gd name="adj1" fmla="val 100000"/>
+              <a:gd name="adj2" fmla="val 123543"/>
+            </a:avLst>
+          </a:prstGeom>
+          <a:noFill/>
+          <a:ln w="19050">
+            <a:solidFill>
+              <a:schemeClr val="accent2"/>
+            </a:solidFill>
+          </a:ln>
+        </p:spPr>
+        <p:style>
+          <a:lnRef idx="2">
+            <a:schemeClr val="accent1">
+              <a:shade val="50000"/>
+            </a:schemeClr>
+          </a:lnRef>
+          <a:fillRef idx="1">
+            <a:schemeClr val="accent1"/>
+          </a:fillRef>
+          <a:effectRef idx="0">
+            <a:schemeClr val="accent1"/>
+          </a:effectRef>
+          <a:fontRef idx="minor">
+            <a:schemeClr val="lt1"/>
+          </a:fontRef>
+        </p:style>
+        <p:txBody>
+          <a:bodyPr rtlCol="0" anchor="ctr"/>
+          <a:lstStyle/>
+          <a:p>
+            <a:pPr algn="ctr"/>
+            <a:endParaRPr lang="en-US"/>
+          </a:p>
+        </p:txBody>
+      </p:sp>
+      <p:sp>
+        <p:nvSpPr>
+          <p:cNvPr id="31" name="TextBox 30">
+            <a:extLst>
+              <a:ext uri="{FF2B5EF4-FFF2-40B4-BE49-F238E27FC236}">
+                <a16:creationId xmlns:a16="http://schemas.microsoft.com/office/drawing/2014/main" id="{F4E3740F-53C3-4DAC-A887-7CC2598C830D}"/>
+              </a:ext>
+            </a:extLst>
+          </p:cNvPr>
+          <p:cNvSpPr txBox="1"/>
+          <p:nvPr/>
+        </p:nvSpPr>
+        <p:spPr>
+          <a:xfrm>
+            <a:off x="7375177" y="5515707"/>
+            <a:ext cx="697114" cy="307777"/>
+          </a:xfrm>
+          <a:prstGeom prst="rect">
+            <a:avLst/>
+          </a:prstGeom>
+          <a:noFill/>
+        </p:spPr>
+        <p:txBody>
+          <a:bodyPr wrap="none" rtlCol="0">
+            <a:spAutoFit/>
+          </a:bodyPr>
+          <a:lstStyle/>
+          <a:p>
+            <a:r>
+              <a:rPr lang="en-US" sz="1400" b="1" dirty="0"/>
+              <a:t>Bovine</a:t>
+            </a:r>
+          </a:p>
+        </p:txBody>
+      </p:sp>
+      <p:sp>
+        <p:nvSpPr>
+          <p:cNvPr id="32" name="Arrow: Right 31">
+            <a:extLst>
+              <a:ext uri="{FF2B5EF4-FFF2-40B4-BE49-F238E27FC236}">
+                <a16:creationId xmlns:a16="http://schemas.microsoft.com/office/drawing/2014/main" id="{C1AC7076-FEB9-49C2-A28B-60685EEE85D3}"/>
+              </a:ext>
+            </a:extLst>
+          </p:cNvPr>
+          <p:cNvSpPr/>
+          <p:nvPr/>
+        </p:nvSpPr>
+        <p:spPr>
+          <a:xfrm>
+            <a:off x="5104268" y="5586012"/>
+            <a:ext cx="2244186" cy="185037"/>
+          </a:xfrm>
+          <a:prstGeom prst="rightArrow">
+            <a:avLst>
+              <a:gd name="adj1" fmla="val 100000"/>
+              <a:gd name="adj2" fmla="val 123543"/>
+            </a:avLst>
+          </a:prstGeom>
+          <a:noFill/>
+          <a:ln w="19050">
+            <a:solidFill>
+              <a:schemeClr val="accent6">
+                <a:lumMod val="75000"/>
+              </a:schemeClr>
+            </a:solidFill>
+          </a:ln>
+        </p:spPr>
+        <p:style>
+          <a:lnRef idx="2">
+            <a:schemeClr val="accent1">
+              <a:shade val="50000"/>
+            </a:schemeClr>
+          </a:lnRef>
+          <a:fillRef idx="1">
+            <a:schemeClr val="accent1"/>
+          </a:fillRef>
+          <a:effectRef idx="0">
+            <a:schemeClr val="accent1"/>
+          </a:effectRef>
+          <a:fontRef idx="minor">
+            <a:schemeClr val="lt1"/>
+          </a:fontRef>
+        </p:style>
+        <p:txBody>
+          <a:bodyPr rtlCol="0" anchor="ctr"/>
+          <a:lstStyle/>
+          <a:p>
+            <a:pPr algn="ctr"/>
+            <a:endParaRPr lang="en-US"/>
+          </a:p>
+        </p:txBody>
+      </p:sp>
+      <p:sp>
+        <p:nvSpPr>
+          <p:cNvPr id="33" name="Arrow: Right 32">
+            <a:extLst>
+              <a:ext uri="{FF2B5EF4-FFF2-40B4-BE49-F238E27FC236}">
+                <a16:creationId xmlns:a16="http://schemas.microsoft.com/office/drawing/2014/main" id="{8C48DF4B-859C-455E-9A65-AB7525EBB39E}"/>
+              </a:ext>
+            </a:extLst>
+          </p:cNvPr>
+          <p:cNvSpPr/>
+          <p:nvPr/>
+        </p:nvSpPr>
+        <p:spPr>
+          <a:xfrm>
+            <a:off x="5100300" y="5796173"/>
+            <a:ext cx="2244185" cy="151990"/>
+          </a:xfrm>
+          <a:prstGeom prst="rightArrow">
+            <a:avLst>
+              <a:gd name="adj1" fmla="val 100000"/>
+              <a:gd name="adj2" fmla="val 139379"/>
+            </a:avLst>
+          </a:prstGeom>
+          <a:noFill/>
+          <a:ln w="19050">
+            <a:solidFill>
+              <a:schemeClr val="tx1"/>
+            </a:solidFill>
+          </a:ln>
+        </p:spPr>
+        <p:style>
+          <a:lnRef idx="2">
+            <a:schemeClr val="accent1">
+              <a:shade val="50000"/>
+            </a:schemeClr>
+          </a:lnRef>
+          <a:fillRef idx="1">
+            <a:schemeClr val="accent1"/>
+          </a:fillRef>
+          <a:effectRef idx="0">
+            <a:schemeClr val="accent1"/>
+          </a:effectRef>
+          <a:fontRef idx="minor">
+            <a:schemeClr val="lt1"/>
+          </a:fontRef>
+        </p:style>
+        <p:txBody>
+          <a:bodyPr rtlCol="0" anchor="ctr"/>
+          <a:lstStyle/>
+          <a:p>
+            <a:pPr algn="ctr"/>
+            <a:endParaRPr lang="en-US"/>
+          </a:p>
+        </p:txBody>
+      </p:sp>
+      <p:sp>
+        <p:nvSpPr>
+          <p:cNvPr id="34" name="TextBox 33">
+            <a:extLst>
+              <a:ext uri="{FF2B5EF4-FFF2-40B4-BE49-F238E27FC236}">
+                <a16:creationId xmlns:a16="http://schemas.microsoft.com/office/drawing/2014/main" id="{11CAABB3-CF92-46CD-85D5-EBCE6245E71D}"/>
+              </a:ext>
+            </a:extLst>
+          </p:cNvPr>
+          <p:cNvSpPr txBox="1"/>
+          <p:nvPr/>
+        </p:nvSpPr>
+        <p:spPr>
+          <a:xfrm>
+            <a:off x="7383112" y="5731559"/>
+            <a:ext cx="617798" cy="307777"/>
+          </a:xfrm>
+          <a:prstGeom prst="rect">
+            <a:avLst/>
+          </a:prstGeom>
+          <a:noFill/>
+        </p:spPr>
+        <p:txBody>
+          <a:bodyPr wrap="none" rtlCol="0">
+            <a:spAutoFit/>
+          </a:bodyPr>
+          <a:lstStyle/>
+          <a:p>
+            <a:r>
+              <a:rPr lang="en-US" sz="1400" dirty="0"/>
+              <a:t>Broad</a:t>
+            </a:r>
+          </a:p>
+        </p:txBody>
+      </p:sp>
+      <p:sp>
+        <p:nvSpPr>
+          <p:cNvPr id="35" name="TextBox 34">
+            <a:extLst>
+              <a:ext uri="{FF2B5EF4-FFF2-40B4-BE49-F238E27FC236}">
+                <a16:creationId xmlns:a16="http://schemas.microsoft.com/office/drawing/2014/main" id="{279080A9-157E-4676-94F0-C4F7FD3EC1EF}"/>
+              </a:ext>
+            </a:extLst>
+          </p:cNvPr>
+          <p:cNvSpPr txBox="1"/>
+          <p:nvPr/>
+        </p:nvSpPr>
+        <p:spPr>
+          <a:xfrm>
+            <a:off x="7349101" y="6011285"/>
+            <a:ext cx="1193532" cy="307777"/>
+          </a:xfrm>
+          <a:prstGeom prst="rect">
+            <a:avLst/>
+          </a:prstGeom>
+          <a:noFill/>
+        </p:spPr>
+        <p:txBody>
+          <a:bodyPr wrap="none" rtlCol="0">
+            <a:spAutoFit/>
+          </a:bodyPr>
+          <a:lstStyle/>
+          <a:p>
+            <a:r>
+              <a:rPr lang="en-US" sz="1400" b="1" dirty="0"/>
+              <a:t>Chicken/Fowl</a:t>
+            </a:r>
+          </a:p>
+        </p:txBody>
+      </p:sp>
+      <p:sp>
+        <p:nvSpPr>
+          <p:cNvPr id="36" name="Arrow: Right 35">
+            <a:extLst>
+              <a:ext uri="{FF2B5EF4-FFF2-40B4-BE49-F238E27FC236}">
+                <a16:creationId xmlns:a16="http://schemas.microsoft.com/office/drawing/2014/main" id="{202DD786-63CD-448D-8B21-71B98B76502F}"/>
+              </a:ext>
+            </a:extLst>
+          </p:cNvPr>
+          <p:cNvSpPr/>
+          <p:nvPr/>
+        </p:nvSpPr>
+        <p:spPr>
+          <a:xfrm>
+            <a:off x="5090628" y="5986343"/>
+            <a:ext cx="2244186" cy="372859"/>
+          </a:xfrm>
+          <a:prstGeom prst="rightArrow">
+            <a:avLst>
+              <a:gd name="adj1" fmla="val 100000"/>
+              <a:gd name="adj2" fmla="val 53292"/>
+            </a:avLst>
+          </a:prstGeom>
+          <a:noFill/>
+          <a:ln w="19050">
+            <a:solidFill>
+              <a:srgbClr val="FFFF00"/>
+            </a:solidFill>
+          </a:ln>
+        </p:spPr>
+        <p:style>
+          <a:lnRef idx="2">
+            <a:schemeClr val="accent1">
+              <a:shade val="50000"/>
+            </a:schemeClr>
+          </a:lnRef>
+          <a:fillRef idx="1">
+            <a:schemeClr val="accent1"/>
+          </a:fillRef>
+          <a:effectRef idx="0">
+            <a:schemeClr val="accent1"/>
+          </a:effectRef>
+          <a:fontRef idx="minor">
+            <a:schemeClr val="lt1"/>
+          </a:fontRef>
+        </p:style>
+        <p:txBody>
+          <a:bodyPr rtlCol="0" anchor="ctr"/>
+          <a:lstStyle/>
+          <a:p>
+            <a:pPr algn="ctr"/>
+            <a:endParaRPr lang="en-US"/>
           </a:p>
         </p:txBody>
       </p:sp>
     </p:spTree>
     <p:extLst>
       <p:ext uri="{BB962C8B-B14F-4D97-AF65-F5344CB8AC3E}">
-        <p14:creationId xmlns:p14="http://schemas.microsoft.com/office/powerpoint/2010/main" val="729264468"/>
+        <p14:creationId xmlns:p14="http://schemas.microsoft.com/office/powerpoint/2010/main" val="338791742"/>
       </p:ext>
     </p:extLst>
   </p:cSld>
@@ -4493,9 +6871,19 @@
 </p:sld>
 </file>
 
-<file path=ppt/slides/slide19.xml><?xml version="1.0" encoding="utf-8"?>
+<file path=ppt/slides/slide2.xml><?xml version="1.0" encoding="utf-8"?>
 <p:sld xmlns:a="http://schemas.openxmlformats.org/drawingml/2006/main" xmlns:r="http://schemas.openxmlformats.org/officeDocument/2006/relationships" xmlns:p="http://schemas.openxmlformats.org/presentationml/2006/main">
   <p:cSld>
+    <p:bg>
+      <p:bgPr>
+        <a:solidFill>
+          <a:schemeClr val="bg1">
+            <a:lumMod val="95000"/>
+          </a:schemeClr>
+        </a:solidFill>
+        <a:effectLst/>
+      </p:bgPr>
+    </p:bg>
     <p:spTree>
       <p:nvGrpSpPr>
         <p:cNvPr id="1" name=""/>
@@ -4515,7 +6903,7 @@
           <p:cNvPr id="2" name="Title 1">
             <a:extLst>
               <a:ext uri="{FF2B5EF4-FFF2-40B4-BE49-F238E27FC236}">
-                <a16:creationId xmlns:a16="http://schemas.microsoft.com/office/drawing/2014/main" id="{0D26D5DC-7AED-4BF1-94B6-735BB92209A0}"/>
+                <a16:creationId xmlns:a16="http://schemas.microsoft.com/office/drawing/2014/main" id="{01A76F32-DFE4-47C8-AEA2-4265CB61F1DA}"/>
               </a:ext>
             </a:extLst>
           </p:cNvPr>
@@ -4526,47 +6914,114 @@
             <p:ph type="title"/>
           </p:nvPr>
         </p:nvSpPr>
-        <p:spPr/>
-        <p:txBody>
-          <a:bodyPr/>
+        <p:spPr>
+          <a:xfrm>
+            <a:off x="648929" y="629266"/>
+            <a:ext cx="3651467" cy="1676603"/>
+          </a:xfrm>
+        </p:spPr>
+        <p:txBody>
+          <a:bodyPr>
+            <a:normAutofit/>
+          </a:bodyPr>
           <a:lstStyle/>
           <a:p>
             <a:r>
               <a:rPr lang="en-US" i="1" dirty="0"/>
-              <a:t>Salmonella enterica </a:t>
-            </a:r>
-            <a:r>
-              <a:rPr lang="en-US" dirty="0"/>
-              <a:t>serovar </a:t>
-            </a:r>
-            <a:r>
-              <a:rPr lang="en-US" dirty="0" err="1"/>
-              <a:t>Abortusovis</a:t>
-            </a:r>
-            <a:r>
-              <a:rPr lang="en-US" dirty="0"/>
-              <a:t> SR44, new unique gene set?</a:t>
-            </a:r>
-          </a:p>
-        </p:txBody>
-      </p:sp>
-      <p:pic>
-        <p:nvPicPr>
-          <p:cNvPr id="5" name="Content Placeholder 4" descr="A screenshot of a social media post&#10;&#10;Description automatically generated">
-            <a:extLst>
-              <a:ext uri="{FF2B5EF4-FFF2-40B4-BE49-F238E27FC236}">
-                <a16:creationId xmlns:a16="http://schemas.microsoft.com/office/drawing/2014/main" id="{A92664BE-916F-4AB0-B988-EA086ADCA29B}"/>
-              </a:ext>
-            </a:extLst>
-          </p:cNvPr>
-          <p:cNvPicPr>
-            <a:picLocks noGrp="1" noChangeAspect="1"/>
-          </p:cNvPicPr>
+              <a:t>Salmonella enterica</a:t>
+            </a:r>
+          </a:p>
+        </p:txBody>
+      </p:sp>
+      <p:sp>
+        <p:nvSpPr>
+          <p:cNvPr id="3" name="Content Placeholder 2">
+            <a:extLst>
+              <a:ext uri="{FF2B5EF4-FFF2-40B4-BE49-F238E27FC236}">
+                <a16:creationId xmlns:a16="http://schemas.microsoft.com/office/drawing/2014/main" id="{71E6DF57-B48C-47A7-8E53-F6831229337E}"/>
+              </a:ext>
+            </a:extLst>
+          </p:cNvPr>
+          <p:cNvSpPr>
+            <a:spLocks noGrp="1"/>
+          </p:cNvSpPr>
           <p:nvPr>
             <p:ph idx="1"/>
           </p:nvPr>
+        </p:nvSpPr>
+        <p:spPr>
+          <a:xfrm>
+            <a:off x="648931" y="2438400"/>
+            <a:ext cx="3651466" cy="3008243"/>
+          </a:xfrm>
+        </p:spPr>
+        <p:txBody>
+          <a:bodyPr>
+            <a:normAutofit/>
+          </a:bodyPr>
+          <a:lstStyle/>
+          <a:p>
+            <a:r>
+              <a:rPr lang="en-US" sz="2000" dirty="0"/>
+              <a:t>Gram (-) Bacteria</a:t>
+            </a:r>
+          </a:p>
+          <a:p>
+            <a:r>
+              <a:rPr lang="en-US" sz="2000" dirty="0"/>
+              <a:t>1.2 million cases of Salmonella related illness/year in U.S. alone</a:t>
+            </a:r>
+          </a:p>
+          <a:p>
+            <a:r>
+              <a:rPr lang="en-US" sz="2000" dirty="0"/>
+              <a:t>Three types of sicknesses:</a:t>
+            </a:r>
+          </a:p>
+          <a:p>
+            <a:pPr marL="457200" lvl="1" indent="0">
+              <a:buNone/>
+            </a:pPr>
+            <a:r>
+              <a:rPr lang="en-US" sz="2000" dirty="0"/>
+              <a:t>1) Salmonellosis (non paratyphoid/ typhoid)</a:t>
+            </a:r>
+          </a:p>
+          <a:p>
+            <a:pPr marL="457200" lvl="1" indent="0">
+              <a:buNone/>
+            </a:pPr>
+            <a:r>
+              <a:rPr lang="en-US" sz="2000" dirty="0"/>
+              <a:t>2) Paratyphoid fever</a:t>
+            </a:r>
+          </a:p>
+          <a:p>
+            <a:pPr marL="457200" lvl="1" indent="0">
+              <a:buNone/>
+            </a:pPr>
+            <a:r>
+              <a:rPr lang="en-US" sz="2000" dirty="0"/>
+              <a:t>3) Typhoid fever</a:t>
+            </a:r>
+          </a:p>
+        </p:txBody>
+      </p:sp>
+      <p:pic>
+        <p:nvPicPr>
+          <p:cNvPr id="5122" name="Picture 2" descr="Salmonella">
+            <a:extLst>
+              <a:ext uri="{FF2B5EF4-FFF2-40B4-BE49-F238E27FC236}">
+                <a16:creationId xmlns:a16="http://schemas.microsoft.com/office/drawing/2014/main" id="{2E5E1A03-C024-4DD9-9AFD-D9A00A96C04C}"/>
+              </a:ext>
+            </a:extLst>
+          </p:cNvPr>
+          <p:cNvPicPr>
+            <a:picLocks noChangeAspect="1" noChangeArrowheads="1"/>
+          </p:cNvPicPr>
+          <p:nvPr/>
         </p:nvPicPr>
-        <p:blipFill>
+        <p:blipFill rotWithShape="1">
           <a:blip r:embed="rId2">
             <a:extLst>
               <a:ext uri="{28A0092B-C50C-407E-A947-70E740481C1C}">
@@ -4574,48 +7029,60 @@
               </a:ext>
             </a:extLst>
           </a:blip>
-          <a:stretch>
-            <a:fillRect/>
-          </a:stretch>
+          <a:srcRect l="1247" r="-2" b="-2"/>
+          <a:stretch/>
         </p:blipFill>
-        <p:spPr>
+        <p:spPr bwMode="auto">
           <a:xfrm>
-            <a:off x="938266" y="2454723"/>
-            <a:ext cx="9772377" cy="3786796"/>
-          </a:xfrm>
-        </p:spPr>
-      </p:pic>
-      <p:sp>
-        <p:nvSpPr>
-          <p:cNvPr id="3" name="TextBox 2">
-            <a:extLst>
-              <a:ext uri="{FF2B5EF4-FFF2-40B4-BE49-F238E27FC236}">
-                <a16:creationId xmlns:a16="http://schemas.microsoft.com/office/drawing/2014/main" id="{96714CCA-E636-4CDB-9A5B-CEBB74F372E3}"/>
-              </a:ext>
-            </a:extLst>
-          </p:cNvPr>
-          <p:cNvSpPr txBox="1"/>
-          <p:nvPr/>
-        </p:nvSpPr>
-        <p:spPr>
-          <a:xfrm>
-            <a:off x="5115339" y="2040044"/>
-            <a:ext cx="2448363" cy="369332"/>
+            <a:off x="4639056" y="10"/>
+            <a:ext cx="7552944" cy="6857990"/>
           </a:xfrm>
           <a:prstGeom prst="rect">
             <a:avLst/>
           </a:prstGeom>
           <a:noFill/>
-        </p:spPr>
-        <p:txBody>
-          <a:bodyPr wrap="none" rtlCol="0">
+          <a:effectLst/>
+          <a:extLst>
+            <a:ext uri="{909E8E84-426E-40DD-AFC4-6F175D3DCCD1}">
+              <a14:hiddenFill xmlns:a14="http://schemas.microsoft.com/office/drawing/2010/main">
+                <a:solidFill>
+                  <a:srgbClr val="FFFFFF"/>
+                </a:solidFill>
+              </a14:hiddenFill>
+            </a:ext>
+          </a:extLst>
+        </p:spPr>
+      </p:pic>
+      <p:sp>
+        <p:nvSpPr>
+          <p:cNvPr id="4" name="Rectangle 3">
+            <a:extLst>
+              <a:ext uri="{FF2B5EF4-FFF2-40B4-BE49-F238E27FC236}">
+                <a16:creationId xmlns:a16="http://schemas.microsoft.com/office/drawing/2014/main" id="{E5B601C6-36F3-4C38-BAEF-80EFE4CD5514}"/>
+              </a:ext>
+            </a:extLst>
+          </p:cNvPr>
+          <p:cNvSpPr/>
+          <p:nvPr/>
+        </p:nvSpPr>
+        <p:spPr>
+          <a:xfrm>
+            <a:off x="0" y="6356350"/>
+            <a:ext cx="4595038" cy="461665"/>
+          </a:xfrm>
+          <a:prstGeom prst="rect">
+            <a:avLst/>
+          </a:prstGeom>
+        </p:spPr>
+        <p:txBody>
+          <a:bodyPr wrap="square">
             <a:spAutoFit/>
           </a:bodyPr>
           <a:lstStyle/>
           <a:p>
             <a:r>
-              <a:rPr lang="en-US" dirty="0"/>
-              <a:t>“Hypothetical Proteins” </a:t>
+              <a:rPr lang="en-US" sz="1200" dirty="0"/>
+              <a:t>http://www.cidrap.umn.edu/news-perspective/2016/12/cdc-resistant-salmonella-causes-6200-illnesses-year</a:t>
             </a:r>
           </a:p>
         </p:txBody>
@@ -4623,7 +7090,7 @@
     </p:spTree>
     <p:extLst>
       <p:ext uri="{BB962C8B-B14F-4D97-AF65-F5344CB8AC3E}">
-        <p14:creationId xmlns:p14="http://schemas.microsoft.com/office/powerpoint/2010/main" val="3306919570"/>
+        <p14:creationId xmlns:p14="http://schemas.microsoft.com/office/powerpoint/2010/main" val="1298375012"/>
       </p:ext>
     </p:extLst>
   </p:cSld>
@@ -4633,9 +7100,19 @@
 </p:sld>
 </file>
 
-<file path=ppt/slides/slide2.xml><?xml version="1.0" encoding="utf-8"?>
+<file path=ppt/slides/slide20.xml><?xml version="1.0" encoding="utf-8"?>
 <p:sld xmlns:a="http://schemas.openxmlformats.org/drawingml/2006/main" xmlns:r="http://schemas.openxmlformats.org/officeDocument/2006/relationships" xmlns:p="http://schemas.openxmlformats.org/presentationml/2006/main">
   <p:cSld>
+    <p:bg>
+      <p:bgPr>
+        <a:solidFill>
+          <a:schemeClr val="bg1">
+            <a:lumMod val="95000"/>
+          </a:schemeClr>
+        </a:solidFill>
+        <a:effectLst/>
+      </p:bgPr>
+    </p:bg>
     <p:spTree>
       <p:nvGrpSpPr>
         <p:cNvPr id="1" name=""/>
@@ -4650,42 +7127,92 @@
           <a:chExt cx="0" cy="0"/>
         </a:xfrm>
       </p:grpSpPr>
+      <p:sp>
+        <p:nvSpPr>
+          <p:cNvPr id="2" name="Title 1">
+            <a:extLst>
+              <a:ext uri="{FF2B5EF4-FFF2-40B4-BE49-F238E27FC236}">
+                <a16:creationId xmlns:a16="http://schemas.microsoft.com/office/drawing/2014/main" id="{16FD4388-182B-4A0D-A127-A6BF19C49727}"/>
+              </a:ext>
+            </a:extLst>
+          </p:cNvPr>
+          <p:cNvSpPr>
+            <a:spLocks noGrp="1"/>
+          </p:cNvSpPr>
+          <p:nvPr>
+            <p:ph type="title"/>
+          </p:nvPr>
+        </p:nvSpPr>
+        <p:spPr/>
+        <p:txBody>
+          <a:bodyPr/>
+          <a:lstStyle/>
+          <a:p>
+            <a:r>
+              <a:rPr lang="en-US" dirty="0"/>
+              <a:t>Shared genes between all </a:t>
+            </a:r>
+            <a:r>
+              <a:rPr lang="en-US" i="1" dirty="0"/>
+              <a:t>Salmonella</a:t>
+            </a:r>
+            <a:r>
+              <a:rPr lang="en-US" dirty="0"/>
+              <a:t> sp. except </a:t>
+            </a:r>
+            <a:r>
+              <a:rPr lang="en-US" i="1" dirty="0"/>
+              <a:t>S. </a:t>
+            </a:r>
+            <a:r>
+              <a:rPr lang="en-US" i="1" dirty="0" err="1"/>
+              <a:t>bongori</a:t>
+            </a:r>
+            <a:endParaRPr lang="en-US" dirty="0"/>
+          </a:p>
+        </p:txBody>
+      </p:sp>
       <p:pic>
         <p:nvPicPr>
-          <p:cNvPr id="5" name="Picture 4">
-            <a:extLst>
-              <a:ext uri="{FF2B5EF4-FFF2-40B4-BE49-F238E27FC236}">
-                <a16:creationId xmlns:a16="http://schemas.microsoft.com/office/drawing/2014/main" id="{7EBE794F-A93C-4D1B-B2A4-FB24BE695ED2}"/>
+          <p:cNvPr id="5" name="Content Placeholder 4" descr="A screenshot of a cell phone&#10;&#10;Description automatically generated">
+            <a:extLst>
+              <a:ext uri="{FF2B5EF4-FFF2-40B4-BE49-F238E27FC236}">
+                <a16:creationId xmlns:a16="http://schemas.microsoft.com/office/drawing/2014/main" id="{F58417E9-F90B-4B8F-956A-1E09205B7981}"/>
               </a:ext>
             </a:extLst>
           </p:cNvPr>
           <p:cNvPicPr>
-            <a:picLocks noChangeAspect="1"/>
+            <a:picLocks noGrp="1" noChangeAspect="1"/>
           </p:cNvPicPr>
-          <p:nvPr/>
+          <p:nvPr>
+            <p:ph idx="1"/>
+          </p:nvPr>
         </p:nvPicPr>
         <p:blipFill>
-          <a:blip r:embed="rId2"/>
+          <a:blip r:embed="rId2">
+            <a:extLst>
+              <a:ext uri="{28A0092B-C50C-407E-A947-70E740481C1C}">
+                <a14:useLocalDpi xmlns:a14="http://schemas.microsoft.com/office/drawing/2010/main" val="0"/>
+              </a:ext>
+            </a:extLst>
+          </a:blip>
           <a:stretch>
             <a:fillRect/>
           </a:stretch>
         </p:blipFill>
         <p:spPr>
           <a:xfrm>
-            <a:off x="2569352" y="80963"/>
-            <a:ext cx="7672274" cy="6858000"/>
-          </a:xfrm>
-          <a:prstGeom prst="rect">
-            <a:avLst/>
-          </a:prstGeom>
+            <a:off x="838200" y="2521091"/>
+            <a:ext cx="9772377" cy="3786796"/>
+          </a:xfrm>
         </p:spPr>
       </p:pic>
       <p:sp>
         <p:nvSpPr>
-          <p:cNvPr id="7" name="TextBox 6">
-            <a:extLst>
-              <a:ext uri="{FF2B5EF4-FFF2-40B4-BE49-F238E27FC236}">
-                <a16:creationId xmlns:a16="http://schemas.microsoft.com/office/drawing/2014/main" id="{49B30982-090F-4A95-B09F-D92053E1848C}"/>
+          <p:cNvPr id="3" name="TextBox 2">
+            <a:extLst>
+              <a:ext uri="{FF2B5EF4-FFF2-40B4-BE49-F238E27FC236}">
+                <a16:creationId xmlns:a16="http://schemas.microsoft.com/office/drawing/2014/main" id="{CB5190C9-3731-475E-AB4E-5477DD3CC61C}"/>
               </a:ext>
             </a:extLst>
           </p:cNvPr>
@@ -4694,8 +7221,8 @@
         </p:nvSpPr>
         <p:spPr>
           <a:xfrm>
-            <a:off x="10277180" y="6084148"/>
-            <a:ext cx="1914820" cy="646331"/>
+            <a:off x="1741161" y="2151759"/>
+            <a:ext cx="8869416" cy="369332"/>
           </a:xfrm>
           <a:prstGeom prst="rect">
             <a:avLst/>
@@ -4709,26 +7236,12 @@
           <a:lstStyle/>
           <a:p>
             <a:r>
-              <a:rPr lang="en-US" dirty="0" err="1"/>
-              <a:t>Feasey</a:t>
+              <a:rPr lang="en-US" b="1" dirty="0"/>
+              <a:t>Type III Secretion System Effector Proteins </a:t>
             </a:r>
             <a:r>
               <a:rPr lang="en-US" dirty="0"/>
-              <a:t> et al. </a:t>
-            </a:r>
-          </a:p>
-          <a:p>
-            <a:r>
-              <a:rPr lang="en-US" dirty="0"/>
-              <a:t>(</a:t>
-            </a:r>
-            <a:r>
-              <a:rPr lang="en-US" i="1" dirty="0"/>
-              <a:t>The Lancet</a:t>
-            </a:r>
-            <a:r>
-              <a:rPr lang="en-US" dirty="0"/>
-              <a:t>, 2012)</a:t>
+              <a:t>(necessary for virulence and invasion of host cells)</a:t>
             </a:r>
           </a:p>
         </p:txBody>
@@ -4736,7 +7249,7 @@
     </p:spTree>
     <p:extLst>
       <p:ext uri="{BB962C8B-B14F-4D97-AF65-F5344CB8AC3E}">
-        <p14:creationId xmlns:p14="http://schemas.microsoft.com/office/powerpoint/2010/main" val="3042011893"/>
+        <p14:creationId xmlns:p14="http://schemas.microsoft.com/office/powerpoint/2010/main" val="729264468"/>
       </p:ext>
     </p:extLst>
   </p:cSld>
@@ -4746,9 +7259,19 @@
 </p:sld>
 </file>
 
-<file path=ppt/slides/slide20.xml><?xml version="1.0" encoding="utf-8"?>
+<file path=ppt/slides/slide21.xml><?xml version="1.0" encoding="utf-8"?>
 <p:sld xmlns:a="http://schemas.openxmlformats.org/drawingml/2006/main" xmlns:r="http://schemas.openxmlformats.org/officeDocument/2006/relationships" xmlns:p="http://schemas.openxmlformats.org/presentationml/2006/main">
   <p:cSld>
+    <p:bg>
+      <p:bgPr>
+        <a:solidFill>
+          <a:schemeClr val="bg1">
+            <a:lumMod val="95000"/>
+          </a:schemeClr>
+        </a:solidFill>
+        <a:effectLst/>
+      </p:bgPr>
+    </p:bg>
     <p:spTree>
       <p:nvGrpSpPr>
         <p:cNvPr id="1" name=""/>
@@ -4768,7 +7291,7 @@
           <p:cNvPr id="2" name="Title 1">
             <a:extLst>
               <a:ext uri="{FF2B5EF4-FFF2-40B4-BE49-F238E27FC236}">
-                <a16:creationId xmlns:a16="http://schemas.microsoft.com/office/drawing/2014/main" id="{21409146-FD05-4552-990A-0FBEC104B494}"/>
+                <a16:creationId xmlns:a16="http://schemas.microsoft.com/office/drawing/2014/main" id="{0D26D5DC-7AED-4BF1-94B6-735BB92209A0}"/>
               </a:ext>
             </a:extLst>
           </p:cNvPr>
@@ -4785,18 +7308,30 @@
           <a:lstStyle/>
           <a:p>
             <a:r>
+              <a:rPr lang="en-US" i="1" dirty="0"/>
+              <a:t>Salmonella enterica </a:t>
+            </a:r>
+            <a:r>
               <a:rPr lang="en-US" dirty="0"/>
-              <a:t>Chloramphenicol resistance (continued)</a:t>
+              <a:t>serovar </a:t>
+            </a:r>
+            <a:r>
+              <a:rPr lang="en-US" dirty="0" err="1"/>
+              <a:t>Abortusovis</a:t>
+            </a:r>
+            <a:r>
+              <a:rPr lang="en-US" dirty="0"/>
+              <a:t> SR44, new unique gene set?</a:t>
             </a:r>
           </a:p>
         </p:txBody>
       </p:sp>
       <p:pic>
         <p:nvPicPr>
-          <p:cNvPr id="5" name="Content Placeholder 4" descr="A screenshot of a cell phone&#10;&#10;Description automatically generated">
-            <a:extLst>
-              <a:ext uri="{FF2B5EF4-FFF2-40B4-BE49-F238E27FC236}">
-                <a16:creationId xmlns:a16="http://schemas.microsoft.com/office/drawing/2014/main" id="{5FB7A9B5-36E2-49A4-977B-0FF80C93700F}"/>
+          <p:cNvPr id="5" name="Content Placeholder 4" descr="A screenshot of a social media post&#10;&#10;Description automatically generated">
+            <a:extLst>
+              <a:ext uri="{FF2B5EF4-FFF2-40B4-BE49-F238E27FC236}">
+                <a16:creationId xmlns:a16="http://schemas.microsoft.com/office/drawing/2014/main" id="{A92664BE-916F-4AB0-B988-EA086ADCA29B}"/>
               </a:ext>
             </a:extLst>
           </p:cNvPr>
@@ -4821,31 +7356,169 @@
         </p:blipFill>
         <p:spPr>
           <a:xfrm>
-            <a:off x="1318306" y="2516428"/>
-            <a:ext cx="9343353" cy="3620549"/>
+            <a:off x="1209811" y="2409376"/>
+            <a:ext cx="9772377" cy="3786796"/>
           </a:xfrm>
         </p:spPr>
       </p:pic>
       <p:sp>
         <p:nvSpPr>
-          <p:cNvPr id="3" name="Rectangle 2">
-            <a:extLst>
-              <a:ext uri="{FF2B5EF4-FFF2-40B4-BE49-F238E27FC236}">
-                <a16:creationId xmlns:a16="http://schemas.microsoft.com/office/drawing/2014/main" id="{23891935-48FD-4197-B597-6BAB5BB077BF}"/>
-              </a:ext>
-            </a:extLst>
-          </p:cNvPr>
-          <p:cNvSpPr/>
+          <p:cNvPr id="3" name="TextBox 2">
+            <a:extLst>
+              <a:ext uri="{FF2B5EF4-FFF2-40B4-BE49-F238E27FC236}">
+                <a16:creationId xmlns:a16="http://schemas.microsoft.com/office/drawing/2014/main" id="{96714CCA-E636-4CDB-9A5B-CEBB74F372E3}"/>
+              </a:ext>
+            </a:extLst>
+          </p:cNvPr>
+          <p:cNvSpPr txBox="1"/>
           <p:nvPr/>
         </p:nvSpPr>
         <p:spPr>
           <a:xfrm>
-            <a:off x="7441791" y="1755572"/>
-            <a:ext cx="1744772" cy="923330"/>
+            <a:off x="4960595" y="1947711"/>
+            <a:ext cx="3198633" cy="461665"/>
           </a:xfrm>
           <a:prstGeom prst="rect">
             <a:avLst/>
           </a:prstGeom>
+          <a:noFill/>
+        </p:spPr>
+        <p:txBody>
+          <a:bodyPr wrap="none" rtlCol="0">
+            <a:spAutoFit/>
+          </a:bodyPr>
+          <a:lstStyle/>
+          <a:p>
+            <a:r>
+              <a:rPr lang="en-US" sz="2400" dirty="0"/>
+              <a:t>“Hypothetical Proteins” </a:t>
+            </a:r>
+          </a:p>
+        </p:txBody>
+      </p:sp>
+    </p:spTree>
+    <p:extLst>
+      <p:ext uri="{BB962C8B-B14F-4D97-AF65-F5344CB8AC3E}">
+        <p14:creationId xmlns:p14="http://schemas.microsoft.com/office/powerpoint/2010/main" val="3306919570"/>
+      </p:ext>
+    </p:extLst>
+  </p:cSld>
+  <p:clrMapOvr>
+    <a:masterClrMapping/>
+  </p:clrMapOvr>
+</p:sld>
+</file>
+
+<file path=ppt/slides/slide22.xml><?xml version="1.0" encoding="utf-8"?>
+<p:sld xmlns:a="http://schemas.openxmlformats.org/drawingml/2006/main" xmlns:r="http://schemas.openxmlformats.org/officeDocument/2006/relationships" xmlns:p="http://schemas.openxmlformats.org/presentationml/2006/main">
+  <p:cSld>
+    <p:bg>
+      <p:bgPr>
+        <a:solidFill>
+          <a:schemeClr val="bg1">
+            <a:lumMod val="95000"/>
+          </a:schemeClr>
+        </a:solidFill>
+        <a:effectLst/>
+      </p:bgPr>
+    </p:bg>
+    <p:spTree>
+      <p:nvGrpSpPr>
+        <p:cNvPr id="1" name=""/>
+        <p:cNvGrpSpPr/>
+        <p:nvPr/>
+      </p:nvGrpSpPr>
+      <p:grpSpPr>
+        <a:xfrm>
+          <a:off x="0" y="0"/>
+          <a:ext cx="0" cy="0"/>
+          <a:chOff x="0" y="0"/>
+          <a:chExt cx="0" cy="0"/>
+        </a:xfrm>
+      </p:grpSpPr>
+      <p:sp>
+        <p:nvSpPr>
+          <p:cNvPr id="2" name="Title 1">
+            <a:extLst>
+              <a:ext uri="{FF2B5EF4-FFF2-40B4-BE49-F238E27FC236}">
+                <a16:creationId xmlns:a16="http://schemas.microsoft.com/office/drawing/2014/main" id="{21409146-FD05-4552-990A-0FBEC104B494}"/>
+              </a:ext>
+            </a:extLst>
+          </p:cNvPr>
+          <p:cNvSpPr>
+            <a:spLocks noGrp="1"/>
+          </p:cNvSpPr>
+          <p:nvPr>
+            <p:ph type="title"/>
+          </p:nvPr>
+        </p:nvSpPr>
+        <p:spPr/>
+        <p:txBody>
+          <a:bodyPr/>
+          <a:lstStyle/>
+          <a:p>
+            <a:r>
+              <a:rPr lang="en-US" dirty="0"/>
+              <a:t>Chloramphenicol resistance (continued)</a:t>
+            </a:r>
+          </a:p>
+        </p:txBody>
+      </p:sp>
+      <p:pic>
+        <p:nvPicPr>
+          <p:cNvPr id="5" name="Content Placeholder 4" descr="A screenshot of a cell phone&#10;&#10;Description automatically generated">
+            <a:extLst>
+              <a:ext uri="{FF2B5EF4-FFF2-40B4-BE49-F238E27FC236}">
+                <a16:creationId xmlns:a16="http://schemas.microsoft.com/office/drawing/2014/main" id="{5FB7A9B5-36E2-49A4-977B-0FF80C93700F}"/>
+              </a:ext>
+            </a:extLst>
+          </p:cNvPr>
+          <p:cNvPicPr>
+            <a:picLocks noGrp="1" noChangeAspect="1"/>
+          </p:cNvPicPr>
+          <p:nvPr>
+            <p:ph idx="1"/>
+          </p:nvPr>
+        </p:nvPicPr>
+        <p:blipFill>
+          <a:blip r:embed="rId2">
+            <a:extLst>
+              <a:ext uri="{28A0092B-C50C-407E-A947-70E740481C1C}">
+                <a14:useLocalDpi xmlns:a14="http://schemas.microsoft.com/office/drawing/2010/main" val="0"/>
+              </a:ext>
+            </a:extLst>
+          </a:blip>
+          <a:stretch>
+            <a:fillRect/>
+          </a:stretch>
+        </p:blipFill>
+        <p:spPr>
+          <a:xfrm>
+            <a:off x="1318306" y="2516428"/>
+            <a:ext cx="9343353" cy="3620549"/>
+          </a:xfrm>
+        </p:spPr>
+      </p:pic>
+      <p:sp>
+        <p:nvSpPr>
+          <p:cNvPr id="3" name="Rectangle 2">
+            <a:extLst>
+              <a:ext uri="{FF2B5EF4-FFF2-40B4-BE49-F238E27FC236}">
+                <a16:creationId xmlns:a16="http://schemas.microsoft.com/office/drawing/2014/main" id="{23891935-48FD-4197-B597-6BAB5BB077BF}"/>
+              </a:ext>
+            </a:extLst>
+          </p:cNvPr>
+          <p:cNvSpPr/>
+          <p:nvPr/>
+        </p:nvSpPr>
+        <p:spPr>
+          <a:xfrm>
+            <a:off x="7469926" y="1303948"/>
+            <a:ext cx="1744772" cy="923330"/>
+          </a:xfrm>
+          <a:prstGeom prst="rect">
+            <a:avLst/>
+          </a:prstGeom>
         </p:spPr>
         <p:txBody>
           <a:bodyPr wrap="none">
@@ -4902,7 +7575,7 @@
         </p:nvSpPr>
         <p:spPr>
           <a:xfrm>
-            <a:off x="4310896" y="1755572"/>
+            <a:off x="4310896" y="1303948"/>
             <a:ext cx="1785104" cy="923330"/>
           </a:xfrm>
           <a:prstGeom prst="rect">
@@ -4934,6 +7607,114 @@
               <a:rPr lang="en-US" dirty="0"/>
               <a:t>acetyltransferase</a:t>
             </a:r>
+          </a:p>
+        </p:txBody>
+      </p:sp>
+      <p:sp>
+        <p:nvSpPr>
+          <p:cNvPr id="4" name="Arrow: Down 3">
+            <a:extLst>
+              <a:ext uri="{FF2B5EF4-FFF2-40B4-BE49-F238E27FC236}">
+                <a16:creationId xmlns:a16="http://schemas.microsoft.com/office/drawing/2014/main" id="{3D51EE5C-E90C-44E5-8F68-02A41CB820F4}"/>
+              </a:ext>
+            </a:extLst>
+          </p:cNvPr>
+          <p:cNvSpPr/>
+          <p:nvPr/>
+        </p:nvSpPr>
+        <p:spPr>
+          <a:xfrm>
+            <a:off x="5203448" y="2227278"/>
+            <a:ext cx="45719" cy="459651"/>
+          </a:xfrm>
+          <a:prstGeom prst="downArrow">
+            <a:avLst/>
+          </a:prstGeom>
+          <a:solidFill>
+            <a:schemeClr val="tx1"/>
+          </a:solidFill>
+          <a:ln>
+            <a:solidFill>
+              <a:schemeClr val="tx1"/>
+            </a:solidFill>
+          </a:ln>
+        </p:spPr>
+        <p:style>
+          <a:lnRef idx="2">
+            <a:schemeClr val="accent1">
+              <a:shade val="50000"/>
+            </a:schemeClr>
+          </a:lnRef>
+          <a:fillRef idx="1">
+            <a:schemeClr val="accent1"/>
+          </a:fillRef>
+          <a:effectRef idx="0">
+            <a:schemeClr val="accent1"/>
+          </a:effectRef>
+          <a:fontRef idx="minor">
+            <a:schemeClr val="lt1"/>
+          </a:fontRef>
+        </p:style>
+        <p:txBody>
+          <a:bodyPr rtlCol="0" anchor="ctr"/>
+          <a:lstStyle/>
+          <a:p>
+            <a:pPr algn="ctr"/>
+            <a:endParaRPr lang="en-US"/>
+          </a:p>
+        </p:txBody>
+      </p:sp>
+      <p:sp>
+        <p:nvSpPr>
+          <p:cNvPr id="7" name="Arrow: Down 6">
+            <a:extLst>
+              <a:ext uri="{FF2B5EF4-FFF2-40B4-BE49-F238E27FC236}">
+                <a16:creationId xmlns:a16="http://schemas.microsoft.com/office/drawing/2014/main" id="{C56D29AF-E230-46A1-A9A5-2E9BED3A38DD}"/>
+              </a:ext>
+            </a:extLst>
+          </p:cNvPr>
+          <p:cNvSpPr/>
+          <p:nvPr/>
+        </p:nvSpPr>
+        <p:spPr>
+          <a:xfrm>
+            <a:off x="8296593" y="2194478"/>
+            <a:ext cx="45719" cy="459651"/>
+          </a:xfrm>
+          <a:prstGeom prst="downArrow">
+            <a:avLst/>
+          </a:prstGeom>
+          <a:solidFill>
+            <a:schemeClr val="tx1"/>
+          </a:solidFill>
+          <a:ln>
+            <a:solidFill>
+              <a:schemeClr val="tx1"/>
+            </a:solidFill>
+          </a:ln>
+        </p:spPr>
+        <p:style>
+          <a:lnRef idx="2">
+            <a:schemeClr val="accent1">
+              <a:shade val="50000"/>
+            </a:schemeClr>
+          </a:lnRef>
+          <a:fillRef idx="1">
+            <a:schemeClr val="accent1"/>
+          </a:fillRef>
+          <a:effectRef idx="0">
+            <a:schemeClr val="accent1"/>
+          </a:effectRef>
+          <a:fontRef idx="minor">
+            <a:schemeClr val="lt1"/>
+          </a:fontRef>
+        </p:style>
+        <p:txBody>
+          <a:bodyPr rtlCol="0" anchor="ctr"/>
+          <a:lstStyle/>
+          <a:p>
+            <a:pPr algn="ctr"/>
+            <a:endParaRPr lang="en-US"/>
           </a:p>
         </p:txBody>
       </p:sp>
@@ -4950,9 +7731,19 @@
 </p:sld>
 </file>
 
-<file path=ppt/slides/slide21.xml><?xml version="1.0" encoding="utf-8"?>
+<file path=ppt/slides/slide23.xml><?xml version="1.0" encoding="utf-8"?>
 <p:sld xmlns:a="http://schemas.openxmlformats.org/drawingml/2006/main" xmlns:r="http://schemas.openxmlformats.org/officeDocument/2006/relationships" xmlns:p="http://schemas.openxmlformats.org/presentationml/2006/main">
   <p:cSld>
+    <p:bg>
+      <p:bgPr>
+        <a:solidFill>
+          <a:schemeClr val="bg1">
+            <a:lumMod val="95000"/>
+          </a:schemeClr>
+        </a:solidFill>
+        <a:effectLst/>
+      </p:bgPr>
+    </p:bg>
     <p:spTree>
       <p:nvGrpSpPr>
         <p:cNvPr id="1" name=""/>
@@ -5253,9 +8044,19 @@
 </p:sld>
 </file>
 
-<file path=ppt/slides/slide22.xml><?xml version="1.0" encoding="utf-8"?>
+<file path=ppt/slides/slide24.xml><?xml version="1.0" encoding="utf-8"?>
 <p:sld xmlns:a="http://schemas.openxmlformats.org/drawingml/2006/main" xmlns:r="http://schemas.openxmlformats.org/officeDocument/2006/relationships" xmlns:p="http://schemas.openxmlformats.org/presentationml/2006/main">
   <p:cSld>
+    <p:bg>
+      <p:bgPr>
+        <a:solidFill>
+          <a:schemeClr val="bg1">
+            <a:lumMod val="95000"/>
+          </a:schemeClr>
+        </a:solidFill>
+        <a:effectLst/>
+      </p:bgPr>
+    </p:bg>
     <p:spTree>
       <p:nvGrpSpPr>
         <p:cNvPr id="1" name=""/>
@@ -5362,7 +8163,7 @@
         </p:nvSpPr>
         <p:spPr>
           <a:xfrm>
-            <a:off x="4574436" y="2266016"/>
+            <a:off x="4490030" y="1778653"/>
             <a:ext cx="4249112" cy="369332"/>
           </a:xfrm>
           <a:prstGeom prst="rect">
@@ -5391,6 +8192,60 @@
               <a:rPr lang="en-US" dirty="0"/>
               <a:t> family efflux transporter (putative)</a:t>
             </a:r>
+          </a:p>
+        </p:txBody>
+      </p:sp>
+      <p:sp>
+        <p:nvSpPr>
+          <p:cNvPr id="6" name="Arrow: Down 5">
+            <a:extLst>
+              <a:ext uri="{FF2B5EF4-FFF2-40B4-BE49-F238E27FC236}">
+                <a16:creationId xmlns:a16="http://schemas.microsoft.com/office/drawing/2014/main" id="{A395923F-784D-4147-B05F-3D963159EA76}"/>
+              </a:ext>
+            </a:extLst>
+          </p:cNvPr>
+          <p:cNvSpPr/>
+          <p:nvPr/>
+        </p:nvSpPr>
+        <p:spPr>
+          <a:xfrm>
+            <a:off x="6385135" y="2175697"/>
+            <a:ext cx="45719" cy="459651"/>
+          </a:xfrm>
+          <a:prstGeom prst="downArrow">
+            <a:avLst/>
+          </a:prstGeom>
+          <a:solidFill>
+            <a:schemeClr val="tx1"/>
+          </a:solidFill>
+          <a:ln>
+            <a:solidFill>
+              <a:schemeClr val="tx1"/>
+            </a:solidFill>
+          </a:ln>
+        </p:spPr>
+        <p:style>
+          <a:lnRef idx="2">
+            <a:schemeClr val="accent1">
+              <a:shade val="50000"/>
+            </a:schemeClr>
+          </a:lnRef>
+          <a:fillRef idx="1">
+            <a:schemeClr val="accent1"/>
+          </a:fillRef>
+          <a:effectRef idx="0">
+            <a:schemeClr val="accent1"/>
+          </a:effectRef>
+          <a:fontRef idx="minor">
+            <a:schemeClr val="lt1"/>
+          </a:fontRef>
+        </p:style>
+        <p:txBody>
+          <a:bodyPr rtlCol="0" anchor="ctr"/>
+          <a:lstStyle/>
+          <a:p>
+            <a:pPr algn="ctr"/>
+            <a:endParaRPr lang="en-US"/>
           </a:p>
         </p:txBody>
       </p:sp>
@@ -5410,6 +8265,139 @@
 <file path=ppt/slides/slide3.xml><?xml version="1.0" encoding="utf-8"?>
 <p:sld xmlns:a="http://schemas.openxmlformats.org/drawingml/2006/main" xmlns:r="http://schemas.openxmlformats.org/officeDocument/2006/relationships" xmlns:p="http://schemas.openxmlformats.org/presentationml/2006/main">
   <p:cSld>
+    <p:bg>
+      <p:bgPr>
+        <a:solidFill>
+          <a:schemeClr val="bg1">
+            <a:lumMod val="95000"/>
+          </a:schemeClr>
+        </a:solidFill>
+        <a:effectLst/>
+      </p:bgPr>
+    </p:bg>
+    <p:spTree>
+      <p:nvGrpSpPr>
+        <p:cNvPr id="1" name=""/>
+        <p:cNvGrpSpPr/>
+        <p:nvPr/>
+      </p:nvGrpSpPr>
+      <p:grpSpPr>
+        <a:xfrm>
+          <a:off x="0" y="0"/>
+          <a:ext cx="0" cy="0"/>
+          <a:chOff x="0" y="0"/>
+          <a:chExt cx="0" cy="0"/>
+        </a:xfrm>
+      </p:grpSpPr>
+      <p:pic>
+        <p:nvPicPr>
+          <p:cNvPr id="5" name="Picture 4">
+            <a:extLst>
+              <a:ext uri="{FF2B5EF4-FFF2-40B4-BE49-F238E27FC236}">
+                <a16:creationId xmlns:a16="http://schemas.microsoft.com/office/drawing/2014/main" id="{7EBE794F-A93C-4D1B-B2A4-FB24BE695ED2}"/>
+              </a:ext>
+            </a:extLst>
+          </p:cNvPr>
+          <p:cNvPicPr>
+            <a:picLocks noChangeAspect="1"/>
+          </p:cNvPicPr>
+          <p:nvPr/>
+        </p:nvPicPr>
+        <p:blipFill>
+          <a:blip r:embed="rId2"/>
+          <a:stretch>
+            <a:fillRect/>
+          </a:stretch>
+        </p:blipFill>
+        <p:spPr>
+          <a:xfrm>
+            <a:off x="2569352" y="80963"/>
+            <a:ext cx="7672274" cy="6858000"/>
+          </a:xfrm>
+          <a:prstGeom prst="rect">
+            <a:avLst/>
+          </a:prstGeom>
+        </p:spPr>
+      </p:pic>
+      <p:sp>
+        <p:nvSpPr>
+          <p:cNvPr id="7" name="TextBox 6">
+            <a:extLst>
+              <a:ext uri="{FF2B5EF4-FFF2-40B4-BE49-F238E27FC236}">
+                <a16:creationId xmlns:a16="http://schemas.microsoft.com/office/drawing/2014/main" id="{49B30982-090F-4A95-B09F-D92053E1848C}"/>
+              </a:ext>
+            </a:extLst>
+          </p:cNvPr>
+          <p:cNvSpPr txBox="1"/>
+          <p:nvPr/>
+        </p:nvSpPr>
+        <p:spPr>
+          <a:xfrm>
+            <a:off x="10277180" y="6084148"/>
+            <a:ext cx="1914820" cy="646331"/>
+          </a:xfrm>
+          <a:prstGeom prst="rect">
+            <a:avLst/>
+          </a:prstGeom>
+          <a:noFill/>
+        </p:spPr>
+        <p:txBody>
+          <a:bodyPr wrap="none" rtlCol="0">
+            <a:spAutoFit/>
+          </a:bodyPr>
+          <a:lstStyle/>
+          <a:p>
+            <a:r>
+              <a:rPr lang="en-US" dirty="0" err="1"/>
+              <a:t>Feasey</a:t>
+            </a:r>
+            <a:r>
+              <a:rPr lang="en-US" dirty="0"/>
+              <a:t> et al. </a:t>
+            </a:r>
+          </a:p>
+          <a:p>
+            <a:r>
+              <a:rPr lang="en-US" dirty="0"/>
+              <a:t>(</a:t>
+            </a:r>
+            <a:r>
+              <a:rPr lang="en-US" i="1" dirty="0"/>
+              <a:t>The Lancet</a:t>
+            </a:r>
+            <a:r>
+              <a:rPr lang="en-US" dirty="0"/>
+              <a:t>, 2012)</a:t>
+            </a:r>
+          </a:p>
+        </p:txBody>
+      </p:sp>
+    </p:spTree>
+    <p:extLst>
+      <p:ext uri="{BB962C8B-B14F-4D97-AF65-F5344CB8AC3E}">
+        <p14:creationId xmlns:p14="http://schemas.microsoft.com/office/powerpoint/2010/main" val="3042011893"/>
+      </p:ext>
+    </p:extLst>
+  </p:cSld>
+  <p:clrMapOvr>
+    <a:masterClrMapping/>
+  </p:clrMapOvr>
+</p:sld>
+</file>
+
+<file path=ppt/slides/slide4.xml><?xml version="1.0" encoding="utf-8"?>
+<p:sld xmlns:a="http://schemas.openxmlformats.org/drawingml/2006/main" xmlns:r="http://schemas.openxmlformats.org/officeDocument/2006/relationships" xmlns:p="http://schemas.openxmlformats.org/presentationml/2006/main">
+  <p:cSld>
+    <p:bg>
+      <p:bgPr>
+        <a:solidFill>
+          <a:schemeClr val="bg1">
+            <a:lumMod val="95000"/>
+          </a:schemeClr>
+        </a:solidFill>
+        <a:effectLst/>
+      </p:bgPr>
+    </p:bg>
     <p:spTree>
       <p:nvGrpSpPr>
         <p:cNvPr id="1" name=""/>
@@ -5503,7 +8491,7 @@
           <a:graphicData uri="http://schemas.openxmlformats.org/presentationml/2006/ole">
             <mc:AlternateContent xmlns:mc="http://schemas.openxmlformats.org/markup-compatibility/2006">
               <mc:Choice xmlns:v="urn:schemas-microsoft-com:vml" Requires="v">
-                <p:oleObj spid="_x0000_s4115" name="Presentation" r:id="rId3" imgW="5038285" imgH="3777990" progId="PowerPoint.Show.8">
+                <p:oleObj spid="_x0000_s4132" name="Presentation" r:id="rId3" imgW="5038285" imgH="3777990" progId="PowerPoint.Show.8">
                   <p:embed/>
                 </p:oleObj>
               </mc:Choice>
@@ -5558,9 +8546,19 @@
 </p:sld>
 </file>
 
-<file path=ppt/slides/slide4.xml><?xml version="1.0" encoding="utf-8"?>
+<file path=ppt/slides/slide5.xml><?xml version="1.0" encoding="utf-8"?>
 <p:sld xmlns:a="http://schemas.openxmlformats.org/drawingml/2006/main" xmlns:r="http://schemas.openxmlformats.org/officeDocument/2006/relationships" xmlns:p="http://schemas.openxmlformats.org/presentationml/2006/main">
   <p:cSld>
+    <p:bg>
+      <p:bgPr>
+        <a:solidFill>
+          <a:schemeClr val="bg1">
+            <a:lumMod val="95000"/>
+          </a:schemeClr>
+        </a:solidFill>
+        <a:effectLst/>
+      </p:bgPr>
+    </p:bg>
     <p:spTree>
       <p:nvGrpSpPr>
         <p:cNvPr id="1" name=""/>
@@ -5716,9 +8714,19 @@
 </p:sld>
 </file>
 
-<file path=ppt/slides/slide5.xml><?xml version="1.0" encoding="utf-8"?>
+<file path=ppt/slides/slide6.xml><?xml version="1.0" encoding="utf-8"?>
 <p:sld xmlns:a="http://schemas.openxmlformats.org/drawingml/2006/main" xmlns:r="http://schemas.openxmlformats.org/officeDocument/2006/relationships" xmlns:p="http://schemas.openxmlformats.org/presentationml/2006/main">
   <p:cSld>
+    <p:bg>
+      <p:bgPr>
+        <a:solidFill>
+          <a:schemeClr val="bg1">
+            <a:lumMod val="95000"/>
+          </a:schemeClr>
+        </a:solidFill>
+        <a:effectLst/>
+      </p:bgPr>
+    </p:bg>
     <p:spTree>
       <p:nvGrpSpPr>
         <p:cNvPr id="1" name=""/>
@@ -6522,8 +9530,8 @@
         </p:nvSpPr>
         <p:spPr>
           <a:xfrm>
-            <a:off x="3748343" y="4782698"/>
-            <a:ext cx="2592954" cy="369332"/>
+            <a:off x="3669139" y="4620699"/>
+            <a:ext cx="1612673" cy="646331"/>
           </a:xfrm>
           <a:prstGeom prst="rect">
             <a:avLst/>
@@ -6531,11 +9539,12 @@
           <a:noFill/>
         </p:spPr>
         <p:txBody>
-          <a:bodyPr wrap="none" rtlCol="0">
+          <a:bodyPr wrap="square" rtlCol="0">
             <a:spAutoFit/>
           </a:bodyPr>
           <a:lstStyle/>
           <a:p>
+            <a:pPr algn="ctr"/>
             <a:r>
               <a:rPr lang="en-US" dirty="0"/>
               <a:t>Annotated draft genomes</a:t>
@@ -6594,6 +9603,130 @@
           </a:p>
         </p:txBody>
       </p:sp>
+      <p:sp>
+        <p:nvSpPr>
+          <p:cNvPr id="22" name="Arrow: Right 21">
+            <a:extLst>
+              <a:ext uri="{FF2B5EF4-FFF2-40B4-BE49-F238E27FC236}">
+                <a16:creationId xmlns:a16="http://schemas.microsoft.com/office/drawing/2014/main" id="{55C3C00C-D6EF-4C7B-8A3F-515C8B7E1C7A}"/>
+              </a:ext>
+            </a:extLst>
+          </p:cNvPr>
+          <p:cNvSpPr/>
+          <p:nvPr/>
+        </p:nvSpPr>
+        <p:spPr>
+          <a:xfrm>
+            <a:off x="5379899" y="6242091"/>
+            <a:ext cx="1046921" cy="250784"/>
+          </a:xfrm>
+          <a:prstGeom prst="rightArrow">
+            <a:avLst/>
+          </a:prstGeom>
+          <a:solidFill>
+            <a:srgbClr val="00B050"/>
+          </a:solidFill>
+          <a:ln>
+            <a:solidFill>
+              <a:schemeClr val="tx1"/>
+            </a:solidFill>
+          </a:ln>
+        </p:spPr>
+        <p:style>
+          <a:lnRef idx="2">
+            <a:schemeClr val="accent1">
+              <a:shade val="50000"/>
+            </a:schemeClr>
+          </a:lnRef>
+          <a:fillRef idx="1">
+            <a:schemeClr val="accent1"/>
+          </a:fillRef>
+          <a:effectRef idx="0">
+            <a:schemeClr val="accent1"/>
+          </a:effectRef>
+          <a:fontRef idx="minor">
+            <a:schemeClr val="lt1"/>
+          </a:fontRef>
+        </p:style>
+        <p:txBody>
+          <a:bodyPr rtlCol="0" anchor="ctr"/>
+          <a:lstStyle/>
+          <a:p>
+            <a:pPr algn="ctr"/>
+            <a:endParaRPr lang="en-US"/>
+          </a:p>
+        </p:txBody>
+      </p:sp>
+      <p:sp>
+        <p:nvSpPr>
+          <p:cNvPr id="3" name="TextBox 2">
+            <a:extLst>
+              <a:ext uri="{FF2B5EF4-FFF2-40B4-BE49-F238E27FC236}">
+                <a16:creationId xmlns:a16="http://schemas.microsoft.com/office/drawing/2014/main" id="{CCE36CA2-75F9-40DB-8B9B-FD52968978A9}"/>
+              </a:ext>
+            </a:extLst>
+          </p:cNvPr>
+          <p:cNvSpPr txBox="1"/>
+          <p:nvPr/>
+        </p:nvSpPr>
+        <p:spPr>
+          <a:xfrm>
+            <a:off x="5333488" y="5827977"/>
+            <a:ext cx="1069460" cy="461665"/>
+          </a:xfrm>
+          <a:prstGeom prst="rect">
+            <a:avLst/>
+          </a:prstGeom>
+          <a:noFill/>
+        </p:spPr>
+        <p:txBody>
+          <a:bodyPr wrap="none" rtlCol="0">
+            <a:spAutoFit/>
+          </a:bodyPr>
+          <a:lstStyle/>
+          <a:p>
+            <a:r>
+              <a:rPr lang="en-US" sz="2400" b="1" dirty="0"/>
+              <a:t>QUAST</a:t>
+            </a:r>
+          </a:p>
+        </p:txBody>
+      </p:sp>
+      <p:sp>
+        <p:nvSpPr>
+          <p:cNvPr id="6" name="TextBox 5">
+            <a:extLst>
+              <a:ext uri="{FF2B5EF4-FFF2-40B4-BE49-F238E27FC236}">
+                <a16:creationId xmlns:a16="http://schemas.microsoft.com/office/drawing/2014/main" id="{B58EBF9F-DDEA-49A8-9C5D-613A7C310919}"/>
+              </a:ext>
+            </a:extLst>
+          </p:cNvPr>
+          <p:cNvSpPr txBox="1"/>
+          <p:nvPr/>
+        </p:nvSpPr>
+        <p:spPr>
+          <a:xfrm>
+            <a:off x="6595657" y="6041602"/>
+            <a:ext cx="2602523" cy="646331"/>
+          </a:xfrm>
+          <a:prstGeom prst="rect">
+            <a:avLst/>
+          </a:prstGeom>
+          <a:noFill/>
+        </p:spPr>
+        <p:txBody>
+          <a:bodyPr wrap="square" rtlCol="0">
+            <a:spAutoFit/>
+          </a:bodyPr>
+          <a:lstStyle/>
+          <a:p>
+            <a:r>
+              <a:rPr lang="en-US" dirty="0"/>
+              <a:t>Quality Control Analysis of assembled genome</a:t>
+            </a:r>
+          </a:p>
+        </p:txBody>
+      </p:sp>
     </p:spTree>
     <p:extLst>
       <p:ext uri="{BB962C8B-B14F-4D97-AF65-F5344CB8AC3E}">
@@ -6607,9 +9740,19 @@
 </p:sld>
 </file>
 
-<file path=ppt/slides/slide6.xml><?xml version="1.0" encoding="utf-8"?>
+<file path=ppt/slides/slide7.xml><?xml version="1.0" encoding="utf-8"?>
 <p:sld xmlns:a="http://schemas.openxmlformats.org/drawingml/2006/main" xmlns:r="http://schemas.openxmlformats.org/officeDocument/2006/relationships" xmlns:p="http://schemas.openxmlformats.org/presentationml/2006/main">
   <p:cSld>
+    <p:bg>
+      <p:bgPr>
+        <a:solidFill>
+          <a:schemeClr val="bg1">
+            <a:lumMod val="95000"/>
+          </a:schemeClr>
+        </a:solidFill>
+        <a:effectLst/>
+      </p:bgPr>
+    </p:bg>
     <p:spTree>
       <p:nvGrpSpPr>
         <p:cNvPr id="1" name=""/>
@@ -6673,7 +9816,7 @@
         </p:blipFill>
         <p:spPr>
           <a:xfrm>
-            <a:off x="3602412" y="1690688"/>
+            <a:off x="6366625" y="1690688"/>
             <a:ext cx="4987175" cy="5271184"/>
           </a:xfrm>
           <a:prstGeom prst="rect">
@@ -6703,8 +9846,73 @@
         </p:blipFill>
         <p:spPr>
           <a:xfrm>
-            <a:off x="387627" y="151606"/>
+            <a:off x="218815" y="151606"/>
             <a:ext cx="7210425" cy="1752600"/>
+          </a:xfrm>
+          <a:prstGeom prst="rect">
+            <a:avLst/>
+          </a:prstGeom>
+        </p:spPr>
+      </p:pic>
+      <p:sp>
+        <p:nvSpPr>
+          <p:cNvPr id="3" name="TextBox 2">
+            <a:extLst>
+              <a:ext uri="{FF2B5EF4-FFF2-40B4-BE49-F238E27FC236}">
+                <a16:creationId xmlns:a16="http://schemas.microsoft.com/office/drawing/2014/main" id="{B426BF97-EC72-4409-8A82-A6B413ED053D}"/>
+              </a:ext>
+            </a:extLst>
+          </p:cNvPr>
+          <p:cNvSpPr txBox="1"/>
+          <p:nvPr/>
+        </p:nvSpPr>
+        <p:spPr>
+          <a:xfrm>
+            <a:off x="2016690" y="2267211"/>
+            <a:ext cx="1846146" cy="369332"/>
+          </a:xfrm>
+          <a:prstGeom prst="rect">
+            <a:avLst/>
+          </a:prstGeom>
+          <a:noFill/>
+        </p:spPr>
+        <p:txBody>
+          <a:bodyPr wrap="none" rtlCol="0">
+            <a:spAutoFit/>
+          </a:bodyPr>
+          <a:lstStyle/>
+          <a:p>
+            <a:r>
+              <a:rPr lang="en-US" dirty="0"/>
+              <a:t>On genome from:</a:t>
+            </a:r>
+          </a:p>
+        </p:txBody>
+      </p:sp>
+      <p:pic>
+        <p:nvPicPr>
+          <p:cNvPr id="6" name="Picture 5">
+            <a:extLst>
+              <a:ext uri="{FF2B5EF4-FFF2-40B4-BE49-F238E27FC236}">
+                <a16:creationId xmlns:a16="http://schemas.microsoft.com/office/drawing/2014/main" id="{CBB67A6A-A297-4EB4-A73B-5F541C7CABAA}"/>
+              </a:ext>
+            </a:extLst>
+          </p:cNvPr>
+          <p:cNvPicPr>
+            <a:picLocks noChangeAspect="1"/>
+          </p:cNvPicPr>
+          <p:nvPr/>
+        </p:nvPicPr>
+        <p:blipFill>
+          <a:blip r:embed="rId4"/>
+          <a:stretch>
+            <a:fillRect/>
+          </a:stretch>
+        </p:blipFill>
+        <p:spPr>
+          <a:xfrm>
+            <a:off x="-26742" y="2761693"/>
+            <a:ext cx="6638925" cy="1564587"/>
           </a:xfrm>
           <a:prstGeom prst="rect">
             <a:avLst/>
@@ -6721,12 +9929,97 @@
   <p:clrMapOvr>
     <a:masterClrMapping/>
   </p:clrMapOvr>
+  <p:timing>
+    <p:tnLst>
+      <p:par>
+        <p:cTn id="1" dur="indefinite" restart="never" nodeType="tmRoot">
+          <p:childTnLst>
+            <p:seq concurrent="1" nextAc="seek">
+              <p:cTn id="2" dur="indefinite" nodeType="mainSeq">
+                <p:childTnLst>
+                  <p:par>
+                    <p:cTn id="3" fill="hold">
+                      <p:stCondLst>
+                        <p:cond delay="indefinite"/>
+                      </p:stCondLst>
+                      <p:childTnLst>
+                        <p:par>
+                          <p:cTn id="4" fill="hold">
+                            <p:stCondLst>
+                              <p:cond delay="0"/>
+                            </p:stCondLst>
+                            <p:childTnLst>
+                              <p:par>
+                                <p:cTn id="5" presetID="1" presetClass="entr" presetSubtype="0" fill="hold" nodeType="clickEffect">
+                                  <p:stCondLst>
+                                    <p:cond delay="0"/>
+                                  </p:stCondLst>
+                                  <p:childTnLst>
+                                    <p:set>
+                                      <p:cBhvr>
+                                        <p:cTn id="6" dur="1" fill="hold">
+                                          <p:stCondLst>
+                                            <p:cond delay="0"/>
+                                          </p:stCondLst>
+                                        </p:cTn>
+                                        <p:tgtEl>
+                                          <p:spTgt spid="4"/>
+                                        </p:tgtEl>
+                                        <p:attrNameLst>
+                                          <p:attrName>style.visibility</p:attrName>
+                                        </p:attrNameLst>
+                                      </p:cBhvr>
+                                      <p:to>
+                                        <p:strVal val="visible"/>
+                                      </p:to>
+                                    </p:set>
+                                  </p:childTnLst>
+                                </p:cTn>
+                              </p:par>
+                            </p:childTnLst>
+                          </p:cTn>
+                        </p:par>
+                      </p:childTnLst>
+                    </p:cTn>
+                  </p:par>
+                </p:childTnLst>
+              </p:cTn>
+              <p:prevCondLst>
+                <p:cond evt="onPrev" delay="0">
+                  <p:tgtEl>
+                    <p:sldTgt/>
+                  </p:tgtEl>
+                </p:cond>
+              </p:prevCondLst>
+              <p:nextCondLst>
+                <p:cond evt="onNext" delay="0">
+                  <p:tgtEl>
+                    <p:sldTgt/>
+                  </p:tgtEl>
+                </p:cond>
+              </p:nextCondLst>
+            </p:seq>
+          </p:childTnLst>
+        </p:cTn>
+      </p:par>
+    </p:tnLst>
+  </p:timing>
 </p:sld>
 </file>
 
-<file path=ppt/slides/slide7.xml><?xml version="1.0" encoding="utf-8"?>
+<file path=ppt/slides/slide8.xml><?xml version="1.0" encoding="utf-8"?>
 <p:sld xmlns:a="http://schemas.openxmlformats.org/drawingml/2006/main" xmlns:r="http://schemas.openxmlformats.org/officeDocument/2006/relationships" xmlns:p="http://schemas.openxmlformats.org/presentationml/2006/main">
   <p:cSld>
+    <p:bg>
+      <p:bgPr>
+        <a:solidFill>
+          <a:schemeClr val="bg1">
+            <a:lumMod val="95000"/>
+          </a:schemeClr>
+        </a:solidFill>
+        <a:effectLst/>
+      </p:bgPr>
+    </p:bg>
     <p:spTree>
       <p:nvGrpSpPr>
         <p:cNvPr id="1" name=""/>
@@ -6819,7 +10112,7 @@
           <a:graphicData uri="http://schemas.openxmlformats.org/presentationml/2006/ole">
             <mc:AlternateContent xmlns:mc="http://schemas.openxmlformats.org/markup-compatibility/2006">
               <mc:Choice xmlns:v="urn:schemas-microsoft-com:vml" Requires="v">
-                <p:oleObj spid="_x0000_s3094" name="Acrobat Document" r:id="rId3" imgW="4800230" imgH="3562037" progId="AcroExch.Document.DC">
+                <p:oleObj spid="_x0000_s3111" name="Acrobat Document" r:id="rId3" imgW="4800230" imgH="3562037" progId="AcroExch.Document.DC">
                   <p:embed/>
                 </p:oleObj>
               </mc:Choice>
@@ -6867,9 +10160,19 @@
 </p:sld>
 </file>
 
-<file path=ppt/slides/slide8.xml><?xml version="1.0" encoding="utf-8"?>
+<file path=ppt/slides/slide9.xml><?xml version="1.0" encoding="utf-8"?>
 <p:sld xmlns:a="http://schemas.openxmlformats.org/drawingml/2006/main" xmlns:r="http://schemas.openxmlformats.org/officeDocument/2006/relationships" xmlns:p="http://schemas.openxmlformats.org/presentationml/2006/main">
   <p:cSld>
+    <p:bg>
+      <p:bgPr>
+        <a:solidFill>
+          <a:schemeClr val="bg1">
+            <a:lumMod val="95000"/>
+          </a:schemeClr>
+        </a:solidFill>
+        <a:effectLst/>
+      </p:bgPr>
+    </p:bg>
     <p:spTree>
       <p:nvGrpSpPr>
         <p:cNvPr id="1" name=""/>
@@ -6962,7 +10265,7 @@
           <a:graphicData uri="http://schemas.openxmlformats.org/presentationml/2006/ole">
             <mc:AlternateContent xmlns:mc="http://schemas.openxmlformats.org/markup-compatibility/2006">
               <mc:Choice xmlns:v="urn:schemas-microsoft-com:vml" Requires="v">
-                <p:oleObj spid="_x0000_s1047" name="Acrobat Document" r:id="rId3" imgW="4552639" imgH="3562037" progId="AcroExch.Document.DC">
+                <p:oleObj spid="_x0000_s1064" name="Acrobat Document" r:id="rId3" imgW="4552639" imgH="3562037" progId="AcroExch.Document.DC">
                   <p:embed/>
                 </p:oleObj>
               </mc:Choice>
@@ -7001,149 +10304,6 @@
     <p:extLst>
       <p:ext uri="{BB962C8B-B14F-4D97-AF65-F5344CB8AC3E}">
         <p14:creationId xmlns:p14="http://schemas.microsoft.com/office/powerpoint/2010/main" val="286847316"/>
-      </p:ext>
-    </p:extLst>
-  </p:cSld>
-  <p:clrMapOvr>
-    <a:masterClrMapping/>
-  </p:clrMapOvr>
-</p:sld>
-</file>
-
-<file path=ppt/slides/slide9.xml><?xml version="1.0" encoding="utf-8"?>
-<p:sld xmlns:a="http://schemas.openxmlformats.org/drawingml/2006/main" xmlns:r="http://schemas.openxmlformats.org/officeDocument/2006/relationships" xmlns:p="http://schemas.openxmlformats.org/presentationml/2006/main">
-  <p:cSld>
-    <p:spTree>
-      <p:nvGrpSpPr>
-        <p:cNvPr id="1" name=""/>
-        <p:cNvGrpSpPr/>
-        <p:nvPr/>
-      </p:nvGrpSpPr>
-      <p:grpSpPr>
-        <a:xfrm>
-          <a:off x="0" y="0"/>
-          <a:ext cx="0" cy="0"/>
-          <a:chOff x="0" y="0"/>
-          <a:chExt cx="0" cy="0"/>
-        </a:xfrm>
-      </p:grpSpPr>
-      <p:sp>
-        <p:nvSpPr>
-          <p:cNvPr id="2" name="Title 1">
-            <a:extLst>
-              <a:ext uri="{FF2B5EF4-FFF2-40B4-BE49-F238E27FC236}">
-                <a16:creationId xmlns:a16="http://schemas.microsoft.com/office/drawing/2014/main" id="{495C1407-BD65-4427-84EE-D1F4A565D946}"/>
-              </a:ext>
-            </a:extLst>
-          </p:cNvPr>
-          <p:cNvSpPr>
-            <a:spLocks noGrp="1"/>
-          </p:cNvSpPr>
-          <p:nvPr>
-            <p:ph type="title"/>
-          </p:nvPr>
-        </p:nvSpPr>
-        <p:spPr/>
-        <p:txBody>
-          <a:bodyPr/>
-          <a:lstStyle/>
-          <a:p>
-            <a:endParaRPr lang="en-US"/>
-          </a:p>
-        </p:txBody>
-      </p:sp>
-      <p:sp>
-        <p:nvSpPr>
-          <p:cNvPr id="3" name="Content Placeholder 2">
-            <a:extLst>
-              <a:ext uri="{FF2B5EF4-FFF2-40B4-BE49-F238E27FC236}">
-                <a16:creationId xmlns:a16="http://schemas.microsoft.com/office/drawing/2014/main" id="{2FE688D0-345F-4468-B5C6-AD2910AA28BD}"/>
-              </a:ext>
-            </a:extLst>
-          </p:cNvPr>
-          <p:cNvSpPr>
-            <a:spLocks noGrp="1"/>
-          </p:cNvSpPr>
-          <p:nvPr>
-            <p:ph idx="1"/>
-          </p:nvPr>
-        </p:nvSpPr>
-        <p:spPr/>
-        <p:txBody>
-          <a:bodyPr/>
-          <a:lstStyle/>
-          <a:p>
-            <a:endParaRPr lang="en-US"/>
-          </a:p>
-        </p:txBody>
-      </p:sp>
-      <p:graphicFrame>
-        <p:nvGraphicFramePr>
-          <p:cNvPr id="4" name="Object 3">
-            <a:extLst>
-              <a:ext uri="{FF2B5EF4-FFF2-40B4-BE49-F238E27FC236}">
-                <a16:creationId xmlns:a16="http://schemas.microsoft.com/office/drawing/2014/main" id="{A4763CA4-8D32-4D13-A3A5-04D432D51CA6}"/>
-              </a:ext>
-            </a:extLst>
-          </p:cNvPr>
-          <p:cNvGraphicFramePr>
-            <a:graphicFrameLocks noChangeAspect="1"/>
-          </p:cNvGraphicFramePr>
-          <p:nvPr>
-            <p:extLst>
-              <p:ext uri="{D42A27DB-BD31-4B8C-83A1-F6EECF244321}">
-                <p14:modId xmlns:p14="http://schemas.microsoft.com/office/powerpoint/2010/main" val="1398467181"/>
-              </p:ext>
-            </p:extLst>
-          </p:nvPr>
-        </p:nvGraphicFramePr>
-        <p:xfrm>
-          <a:off x="2036969" y="681037"/>
-          <a:ext cx="8118061" cy="5884021"/>
-        </p:xfrm>
-        <a:graphic>
-          <a:graphicData uri="http://schemas.openxmlformats.org/presentationml/2006/ole">
-            <mc:AlternateContent xmlns:mc="http://schemas.openxmlformats.org/markup-compatibility/2006">
-              <mc:Choice xmlns:v="urn:schemas-microsoft-com:vml" Requires="v">
-                <p:oleObj spid="_x0000_s2071" name="Acrobat Document" r:id="rId3" imgW="4914762" imgH="3562037" progId="AcroExch.Document.DC">
-                  <p:embed/>
-                </p:oleObj>
-              </mc:Choice>
-              <mc:Fallback>
-                <p:oleObj name="Acrobat Document" r:id="rId3" imgW="4914762" imgH="3562037" progId="AcroExch.Document.DC">
-                  <p:embed/>
-                  <p:pic>
-                    <p:nvPicPr>
-                      <p:cNvPr id="0" name=""/>
-                      <p:cNvPicPr/>
-                      <p:nvPr/>
-                    </p:nvPicPr>
-                    <p:blipFill>
-                      <a:blip r:embed="rId4"/>
-                      <a:stretch>
-                        <a:fillRect/>
-                      </a:stretch>
-                    </p:blipFill>
-                    <p:spPr>
-                      <a:xfrm>
-                        <a:off x="2036969" y="681037"/>
-                        <a:ext cx="8118061" cy="5884021"/>
-                      </a:xfrm>
-                      <a:prstGeom prst="rect">
-                        <a:avLst/>
-                      </a:prstGeom>
-                    </p:spPr>
-                  </p:pic>
-                </p:oleObj>
-              </mc:Fallback>
-            </mc:AlternateContent>
-          </a:graphicData>
-        </a:graphic>
-      </p:graphicFrame>
-    </p:spTree>
-    <p:extLst>
-      <p:ext uri="{BB962C8B-B14F-4D97-AF65-F5344CB8AC3E}">
-        <p14:creationId xmlns:p14="http://schemas.microsoft.com/office/powerpoint/2010/main" val="2872794351"/>
       </p:ext>
     </p:extLst>
   </p:cSld>

</xml_diff>

<commit_message>
Added to ppt done?
</commit_message>
<xml_diff>
--- a/190425_Verdegaal_EEB723_project.pptx
+++ b/190425_Verdegaal_EEB723_project.pptx
@@ -20,15 +20,19 @@
     <p:sldId id="258" r:id="rId14"/>
     <p:sldId id="257" r:id="rId15"/>
     <p:sldId id="271" r:id="rId16"/>
-    <p:sldId id="259" r:id="rId17"/>
-    <p:sldId id="273" r:id="rId18"/>
-    <p:sldId id="281" r:id="rId19"/>
-    <p:sldId id="274" r:id="rId20"/>
-    <p:sldId id="262" r:id="rId21"/>
-    <p:sldId id="263" r:id="rId22"/>
-    <p:sldId id="261" r:id="rId23"/>
-    <p:sldId id="275" r:id="rId24"/>
-    <p:sldId id="260" r:id="rId25"/>
+    <p:sldId id="282" r:id="rId17"/>
+    <p:sldId id="259" r:id="rId18"/>
+    <p:sldId id="273" r:id="rId19"/>
+    <p:sldId id="281" r:id="rId20"/>
+    <p:sldId id="274" r:id="rId21"/>
+    <p:sldId id="262" r:id="rId22"/>
+    <p:sldId id="263" r:id="rId23"/>
+    <p:sldId id="261" r:id="rId24"/>
+    <p:sldId id="275" r:id="rId25"/>
+    <p:sldId id="260" r:id="rId26"/>
+    <p:sldId id="284" r:id="rId27"/>
+    <p:sldId id="283" r:id="rId28"/>
+    <p:sldId id="285" r:id="rId29"/>
   </p:sldIdLst>
   <p:sldSz cx="12192000" cy="6858000"/>
   <p:notesSz cx="6858000" cy="9144000"/>
@@ -3560,7 +3564,7 @@
           <a:graphicData uri="http://schemas.openxmlformats.org/presentationml/2006/ole">
             <mc:AlternateContent xmlns:mc="http://schemas.openxmlformats.org/markup-compatibility/2006">
               <mc:Choice xmlns:v="urn:schemas-microsoft-com:vml" Requires="v">
-                <p:oleObj spid="_x0000_s2088" name="Acrobat Document" r:id="rId3" imgW="4914762" imgH="3562037" progId="AcroExch.Document.DC">
+                <p:oleObj spid="_x0000_s2101" name="Acrobat Document" r:id="rId3" imgW="4914762" imgH="3562037" progId="AcroExch.Document.DC">
                   <p:embed/>
                 </p:oleObj>
               </mc:Choice>
@@ -3847,31 +3851,6 @@
           </a:p>
         </p:txBody>
       </p:sp>
-      <p:sp>
-        <p:nvSpPr>
-          <p:cNvPr id="3" name="Content Placeholder 2">
-            <a:extLst>
-              <a:ext uri="{FF2B5EF4-FFF2-40B4-BE49-F238E27FC236}">
-                <a16:creationId xmlns:a16="http://schemas.microsoft.com/office/drawing/2014/main" id="{25E32652-4C30-4BF1-A9B1-2B1BD17E5E0D}"/>
-              </a:ext>
-            </a:extLst>
-          </p:cNvPr>
-          <p:cNvSpPr>
-            <a:spLocks noGrp="1"/>
-          </p:cNvSpPr>
-          <p:nvPr>
-            <p:ph idx="1"/>
-          </p:nvPr>
-        </p:nvSpPr>
-        <p:spPr/>
-        <p:txBody>
-          <a:bodyPr/>
-          <a:lstStyle/>
-          <a:p>
-            <a:endParaRPr lang="en-US"/>
-          </a:p>
-        </p:txBody>
-      </p:sp>
       <p:pic>
         <p:nvPicPr>
           <p:cNvPr id="4" name="Picture 3">
@@ -3894,7 +3873,7 @@
         </p:blipFill>
         <p:spPr>
           <a:xfrm>
-            <a:off x="838200" y="156542"/>
+            <a:off x="838200" y="213353"/>
             <a:ext cx="7200900" cy="2171700"/>
           </a:xfrm>
           <a:prstGeom prst="rect">
@@ -3902,6 +3881,660 @@
           </a:prstGeom>
         </p:spPr>
       </p:pic>
+      <p:sp>
+        <p:nvSpPr>
+          <p:cNvPr id="5" name="TextBox 4">
+            <a:extLst>
+              <a:ext uri="{FF2B5EF4-FFF2-40B4-BE49-F238E27FC236}">
+                <a16:creationId xmlns:a16="http://schemas.microsoft.com/office/drawing/2014/main" id="{691CED1E-864E-4AB6-BCDD-4E77681DAB1E}"/>
+              </a:ext>
+            </a:extLst>
+          </p:cNvPr>
+          <p:cNvSpPr txBox="1"/>
+          <p:nvPr/>
+        </p:nvSpPr>
+        <p:spPr>
+          <a:xfrm>
+            <a:off x="2045823" y="2966950"/>
+            <a:ext cx="1991507" cy="923330"/>
+          </a:xfrm>
+          <a:prstGeom prst="rect">
+            <a:avLst/>
+          </a:prstGeom>
+          <a:noFill/>
+        </p:spPr>
+        <p:txBody>
+          <a:bodyPr wrap="none" rtlCol="0">
+            <a:spAutoFit/>
+          </a:bodyPr>
+          <a:lstStyle/>
+          <a:p>
+            <a:pPr algn="ctr"/>
+            <a:r>
+              <a:rPr lang="en-US" dirty="0"/>
+              <a:t>18 </a:t>
+            </a:r>
+            <a:r>
+              <a:rPr lang="en-US" i="1" dirty="0"/>
+              <a:t>Salmonella</a:t>
+            </a:r>
+            <a:r>
+              <a:rPr lang="en-US" dirty="0"/>
+              <a:t> </a:t>
+            </a:r>
+          </a:p>
+          <a:p>
+            <a:pPr algn="ctr"/>
+            <a:r>
+              <a:rPr lang="en-US" dirty="0"/>
+              <a:t>reference genomes</a:t>
+            </a:r>
+          </a:p>
+          <a:p>
+            <a:pPr algn="ctr"/>
+            <a:r>
+              <a:rPr lang="en-US" dirty="0"/>
+              <a:t>(NCBI Database)</a:t>
+            </a:r>
+          </a:p>
+        </p:txBody>
+      </p:sp>
+      <p:sp>
+        <p:nvSpPr>
+          <p:cNvPr id="6" name="TextBox 5">
+            <a:extLst>
+              <a:ext uri="{FF2B5EF4-FFF2-40B4-BE49-F238E27FC236}">
+                <a16:creationId xmlns:a16="http://schemas.microsoft.com/office/drawing/2014/main" id="{A3722324-0B44-4D4C-A143-1C3EF71FBD46}"/>
+              </a:ext>
+            </a:extLst>
+          </p:cNvPr>
+          <p:cNvSpPr txBox="1"/>
+          <p:nvPr/>
+        </p:nvSpPr>
+        <p:spPr>
+          <a:xfrm>
+            <a:off x="5338336" y="3096925"/>
+            <a:ext cx="2809462" cy="646331"/>
+          </a:xfrm>
+          <a:prstGeom prst="rect">
+            <a:avLst/>
+          </a:prstGeom>
+          <a:noFill/>
+        </p:spPr>
+        <p:txBody>
+          <a:bodyPr wrap="square" rtlCol="0">
+            <a:spAutoFit/>
+          </a:bodyPr>
+          <a:lstStyle/>
+          <a:p>
+            <a:r>
+              <a:rPr lang="en-US" dirty="0"/>
+              <a:t>Determine core genome components</a:t>
+            </a:r>
+          </a:p>
+        </p:txBody>
+      </p:sp>
+      <p:sp>
+        <p:nvSpPr>
+          <p:cNvPr id="7" name="Arrow: Right 6">
+            <a:extLst>
+              <a:ext uri="{FF2B5EF4-FFF2-40B4-BE49-F238E27FC236}">
+                <a16:creationId xmlns:a16="http://schemas.microsoft.com/office/drawing/2014/main" id="{D406B710-D490-47FD-B966-3F6032F32EA4}"/>
+              </a:ext>
+            </a:extLst>
+          </p:cNvPr>
+          <p:cNvSpPr/>
+          <p:nvPr/>
+        </p:nvSpPr>
+        <p:spPr>
+          <a:xfrm>
+            <a:off x="4234712" y="3294699"/>
+            <a:ext cx="1046921" cy="250784"/>
+          </a:xfrm>
+          <a:prstGeom prst="rightArrow">
+            <a:avLst/>
+          </a:prstGeom>
+          <a:ln>
+            <a:solidFill>
+              <a:schemeClr val="tx1"/>
+            </a:solidFill>
+          </a:ln>
+        </p:spPr>
+        <p:style>
+          <a:lnRef idx="2">
+            <a:schemeClr val="accent1">
+              <a:shade val="50000"/>
+            </a:schemeClr>
+          </a:lnRef>
+          <a:fillRef idx="1">
+            <a:schemeClr val="accent1"/>
+          </a:fillRef>
+          <a:effectRef idx="0">
+            <a:schemeClr val="accent1"/>
+          </a:effectRef>
+          <a:fontRef idx="minor">
+            <a:schemeClr val="lt1"/>
+          </a:fontRef>
+        </p:style>
+        <p:txBody>
+          <a:bodyPr rtlCol="0" anchor="ctr"/>
+          <a:lstStyle/>
+          <a:p>
+            <a:pPr algn="ctr"/>
+            <a:endParaRPr lang="en-US" dirty="0"/>
+          </a:p>
+        </p:txBody>
+      </p:sp>
+      <p:sp>
+        <p:nvSpPr>
+          <p:cNvPr id="9" name="Rectangle 8">
+            <a:extLst>
+              <a:ext uri="{FF2B5EF4-FFF2-40B4-BE49-F238E27FC236}">
+                <a16:creationId xmlns:a16="http://schemas.microsoft.com/office/drawing/2014/main" id="{11B7B5AF-62F2-4DA1-B44E-6E8BFACCE4EF}"/>
+              </a:ext>
+            </a:extLst>
+          </p:cNvPr>
+          <p:cNvSpPr/>
+          <p:nvPr/>
+        </p:nvSpPr>
+        <p:spPr>
+          <a:xfrm>
+            <a:off x="9005134" y="2995611"/>
+            <a:ext cx="2281007" cy="923330"/>
+          </a:xfrm>
+          <a:prstGeom prst="rect">
+            <a:avLst/>
+          </a:prstGeom>
+        </p:spPr>
+        <p:txBody>
+          <a:bodyPr wrap="square">
+            <a:spAutoFit/>
+          </a:bodyPr>
+          <a:lstStyle/>
+          <a:p>
+            <a:r>
+              <a:rPr lang="en-US" dirty="0"/>
+              <a:t>Determine </a:t>
+            </a:r>
+            <a:r>
+              <a:rPr lang="en-US" i="1" dirty="0"/>
+              <a:t>A</a:t>
+            </a:r>
+            <a:r>
+              <a:rPr lang="en-US" dirty="0"/>
+              <a:t>ccessory </a:t>
+            </a:r>
+            <a:r>
+              <a:rPr lang="en-US" i="1" dirty="0"/>
+              <a:t>G</a:t>
+            </a:r>
+            <a:r>
+              <a:rPr lang="en-US" dirty="0"/>
+              <a:t>enomic </a:t>
+            </a:r>
+            <a:r>
+              <a:rPr lang="en-US" i="1" dirty="0"/>
+              <a:t>E</a:t>
+            </a:r>
+            <a:r>
+              <a:rPr lang="en-US" dirty="0"/>
+              <a:t>lements (AGE)</a:t>
+            </a:r>
+          </a:p>
+        </p:txBody>
+      </p:sp>
+      <p:sp>
+        <p:nvSpPr>
+          <p:cNvPr id="11" name="TextBox 10">
+            <a:extLst>
+              <a:ext uri="{FF2B5EF4-FFF2-40B4-BE49-F238E27FC236}">
+                <a16:creationId xmlns:a16="http://schemas.microsoft.com/office/drawing/2014/main" id="{9EA983FF-6E56-48F3-B866-0DFE789C6691}"/>
+              </a:ext>
+            </a:extLst>
+          </p:cNvPr>
+          <p:cNvSpPr txBox="1"/>
+          <p:nvPr/>
+        </p:nvSpPr>
+        <p:spPr>
+          <a:xfrm>
+            <a:off x="838200" y="5219930"/>
+            <a:ext cx="1248290" cy="584775"/>
+          </a:xfrm>
+          <a:prstGeom prst="rect">
+            <a:avLst/>
+          </a:prstGeom>
+          <a:noFill/>
+        </p:spPr>
+        <p:txBody>
+          <a:bodyPr wrap="none" rtlCol="0">
+            <a:spAutoFit/>
+          </a:bodyPr>
+          <a:lstStyle/>
+          <a:p>
+            <a:r>
+              <a:rPr lang="en-US" sz="3200" b="1" dirty="0" err="1"/>
+              <a:t>AGEnt</a:t>
+            </a:r>
+            <a:endParaRPr lang="en-US" sz="3200" b="1" dirty="0"/>
+          </a:p>
+        </p:txBody>
+      </p:sp>
+      <p:sp>
+        <p:nvSpPr>
+          <p:cNvPr id="12" name="Rectangle 11">
+            <a:extLst>
+              <a:ext uri="{FF2B5EF4-FFF2-40B4-BE49-F238E27FC236}">
+                <a16:creationId xmlns:a16="http://schemas.microsoft.com/office/drawing/2014/main" id="{3D97BA10-9514-41AF-B42B-158224789117}"/>
+              </a:ext>
+            </a:extLst>
+          </p:cNvPr>
+          <p:cNvSpPr/>
+          <p:nvPr/>
+        </p:nvSpPr>
+        <p:spPr>
+          <a:xfrm>
+            <a:off x="8810272" y="5100532"/>
+            <a:ext cx="2281007" cy="923330"/>
+          </a:xfrm>
+          <a:prstGeom prst="rect">
+            <a:avLst/>
+          </a:prstGeom>
+        </p:spPr>
+        <p:txBody>
+          <a:bodyPr wrap="square">
+            <a:spAutoFit/>
+          </a:bodyPr>
+          <a:lstStyle/>
+          <a:p>
+            <a:r>
+              <a:rPr lang="en-US" dirty="0"/>
+              <a:t>Determine </a:t>
+            </a:r>
+            <a:r>
+              <a:rPr lang="en-US" i="1" dirty="0"/>
+              <a:t>A</a:t>
+            </a:r>
+            <a:r>
+              <a:rPr lang="en-US" dirty="0"/>
+              <a:t>ccessory </a:t>
+            </a:r>
+            <a:r>
+              <a:rPr lang="en-US" i="1" dirty="0"/>
+              <a:t>G</a:t>
+            </a:r>
+            <a:r>
+              <a:rPr lang="en-US" dirty="0"/>
+              <a:t>enomic </a:t>
+            </a:r>
+            <a:r>
+              <a:rPr lang="en-US" i="1" dirty="0"/>
+              <a:t>E</a:t>
+            </a:r>
+            <a:r>
+              <a:rPr lang="en-US" dirty="0"/>
+              <a:t>lements (AGE)</a:t>
+            </a:r>
+          </a:p>
+        </p:txBody>
+      </p:sp>
+      <p:sp>
+        <p:nvSpPr>
+          <p:cNvPr id="13" name="TextBox 12">
+            <a:extLst>
+              <a:ext uri="{FF2B5EF4-FFF2-40B4-BE49-F238E27FC236}">
+                <a16:creationId xmlns:a16="http://schemas.microsoft.com/office/drawing/2014/main" id="{A189F44E-5E28-4909-86C9-6C804853A0A3}"/>
+              </a:ext>
+            </a:extLst>
+          </p:cNvPr>
+          <p:cNvSpPr txBox="1"/>
+          <p:nvPr/>
+        </p:nvSpPr>
+        <p:spPr>
+          <a:xfrm>
+            <a:off x="2241224" y="5057763"/>
+            <a:ext cx="1837583" cy="923330"/>
+          </a:xfrm>
+          <a:prstGeom prst="rect">
+            <a:avLst/>
+          </a:prstGeom>
+          <a:noFill/>
+        </p:spPr>
+        <p:txBody>
+          <a:bodyPr wrap="square" rtlCol="0">
+            <a:spAutoFit/>
+          </a:bodyPr>
+          <a:lstStyle/>
+          <a:p>
+            <a:pPr algn="ctr"/>
+            <a:r>
+              <a:rPr lang="en-US" dirty="0"/>
+              <a:t>Annotated draft genomes</a:t>
+            </a:r>
+          </a:p>
+          <a:p>
+            <a:pPr algn="ctr"/>
+            <a:r>
+              <a:rPr lang="en-US" dirty="0"/>
+              <a:t>(ST313 and SR44)</a:t>
+            </a:r>
+          </a:p>
+        </p:txBody>
+      </p:sp>
+      <p:sp>
+        <p:nvSpPr>
+          <p:cNvPr id="14" name="Arrow: Right 13">
+            <a:extLst>
+              <a:ext uri="{FF2B5EF4-FFF2-40B4-BE49-F238E27FC236}">
+                <a16:creationId xmlns:a16="http://schemas.microsoft.com/office/drawing/2014/main" id="{61891EA5-0DEE-4ADF-80A9-3F6C318B6D06}"/>
+              </a:ext>
+            </a:extLst>
+          </p:cNvPr>
+          <p:cNvSpPr/>
+          <p:nvPr/>
+        </p:nvSpPr>
+        <p:spPr>
+          <a:xfrm>
+            <a:off x="4233541" y="5386925"/>
+            <a:ext cx="907692" cy="250784"/>
+          </a:xfrm>
+          <a:prstGeom prst="rightArrow">
+            <a:avLst/>
+          </a:prstGeom>
+          <a:ln>
+            <a:solidFill>
+              <a:schemeClr val="tx1"/>
+            </a:solidFill>
+          </a:ln>
+        </p:spPr>
+        <p:style>
+          <a:lnRef idx="2">
+            <a:schemeClr val="accent1">
+              <a:shade val="50000"/>
+            </a:schemeClr>
+          </a:lnRef>
+          <a:fillRef idx="1">
+            <a:schemeClr val="accent1"/>
+          </a:fillRef>
+          <a:effectRef idx="0">
+            <a:schemeClr val="accent1"/>
+          </a:effectRef>
+          <a:fontRef idx="minor">
+            <a:schemeClr val="lt1"/>
+          </a:fontRef>
+        </p:style>
+        <p:txBody>
+          <a:bodyPr rtlCol="0" anchor="ctr"/>
+          <a:lstStyle/>
+          <a:p>
+            <a:pPr algn="ctr"/>
+            <a:endParaRPr lang="en-US"/>
+          </a:p>
+        </p:txBody>
+      </p:sp>
+      <p:cxnSp>
+        <p:nvCxnSpPr>
+          <p:cNvPr id="18" name="Straight Connector 17">
+            <a:extLst>
+              <a:ext uri="{FF2B5EF4-FFF2-40B4-BE49-F238E27FC236}">
+                <a16:creationId xmlns:a16="http://schemas.microsoft.com/office/drawing/2014/main" id="{DBD0CB5D-0251-4103-9AA8-4699CE15D8E3}"/>
+              </a:ext>
+            </a:extLst>
+          </p:cNvPr>
+          <p:cNvCxnSpPr/>
+          <p:nvPr/>
+        </p:nvCxnSpPr>
+        <p:spPr>
+          <a:xfrm>
+            <a:off x="1152939" y="4528900"/>
+            <a:ext cx="9621078" cy="0"/>
+          </a:xfrm>
+          <a:prstGeom prst="line">
+            <a:avLst/>
+          </a:prstGeom>
+          <a:ln w="38100">
+            <a:solidFill>
+              <a:schemeClr val="tx1"/>
+            </a:solidFill>
+          </a:ln>
+        </p:spPr>
+        <p:style>
+          <a:lnRef idx="1">
+            <a:schemeClr val="accent1"/>
+          </a:lnRef>
+          <a:fillRef idx="0">
+            <a:schemeClr val="accent1"/>
+          </a:fillRef>
+          <a:effectRef idx="0">
+            <a:schemeClr val="accent1"/>
+          </a:effectRef>
+          <a:fontRef idx="minor">
+            <a:schemeClr val="tx1"/>
+          </a:fontRef>
+        </p:style>
+      </p:cxnSp>
+      <p:sp>
+        <p:nvSpPr>
+          <p:cNvPr id="19" name="TextBox 18">
+            <a:extLst>
+              <a:ext uri="{FF2B5EF4-FFF2-40B4-BE49-F238E27FC236}">
+                <a16:creationId xmlns:a16="http://schemas.microsoft.com/office/drawing/2014/main" id="{321C4256-F10C-42A7-8B70-500C9455F629}"/>
+              </a:ext>
+            </a:extLst>
+          </p:cNvPr>
+          <p:cNvSpPr txBox="1"/>
+          <p:nvPr/>
+        </p:nvSpPr>
+        <p:spPr>
+          <a:xfrm>
+            <a:off x="838433" y="3111661"/>
+            <a:ext cx="1125629" cy="584775"/>
+          </a:xfrm>
+          <a:prstGeom prst="rect">
+            <a:avLst/>
+          </a:prstGeom>
+          <a:noFill/>
+        </p:spPr>
+        <p:txBody>
+          <a:bodyPr wrap="none" rtlCol="0">
+            <a:spAutoFit/>
+          </a:bodyPr>
+          <a:lstStyle/>
+          <a:p>
+            <a:r>
+              <a:rPr lang="en-US" sz="3200" b="1" dirty="0"/>
+              <a:t>Spine</a:t>
+            </a:r>
+          </a:p>
+        </p:txBody>
+      </p:sp>
+      <p:sp>
+        <p:nvSpPr>
+          <p:cNvPr id="20" name="Arrow: Right 19">
+            <a:extLst>
+              <a:ext uri="{FF2B5EF4-FFF2-40B4-BE49-F238E27FC236}">
+                <a16:creationId xmlns:a16="http://schemas.microsoft.com/office/drawing/2014/main" id="{0278E361-15F5-44B8-93B6-039883BC7EE4}"/>
+              </a:ext>
+            </a:extLst>
+          </p:cNvPr>
+          <p:cNvSpPr/>
+          <p:nvPr/>
+        </p:nvSpPr>
+        <p:spPr>
+          <a:xfrm>
+            <a:off x="7864424" y="3287589"/>
+            <a:ext cx="1046921" cy="250784"/>
+          </a:xfrm>
+          <a:prstGeom prst="rightArrow">
+            <a:avLst/>
+          </a:prstGeom>
+          <a:ln>
+            <a:solidFill>
+              <a:schemeClr val="tx1"/>
+            </a:solidFill>
+          </a:ln>
+        </p:spPr>
+        <p:style>
+          <a:lnRef idx="2">
+            <a:schemeClr val="accent1">
+              <a:shade val="50000"/>
+            </a:schemeClr>
+          </a:lnRef>
+          <a:fillRef idx="1">
+            <a:schemeClr val="accent1"/>
+          </a:fillRef>
+          <a:effectRef idx="0">
+            <a:schemeClr val="accent1"/>
+          </a:effectRef>
+          <a:fontRef idx="minor">
+            <a:schemeClr val="lt1"/>
+          </a:fontRef>
+        </p:style>
+        <p:txBody>
+          <a:bodyPr rtlCol="0" anchor="ctr"/>
+          <a:lstStyle/>
+          <a:p>
+            <a:pPr algn="ctr"/>
+            <a:endParaRPr lang="en-US" dirty="0"/>
+          </a:p>
+        </p:txBody>
+      </p:sp>
+      <p:sp>
+        <p:nvSpPr>
+          <p:cNvPr id="21" name="TextBox 20">
+            <a:extLst>
+              <a:ext uri="{FF2B5EF4-FFF2-40B4-BE49-F238E27FC236}">
+                <a16:creationId xmlns:a16="http://schemas.microsoft.com/office/drawing/2014/main" id="{ADA47CD7-AFE8-413E-B612-62A456C871DF}"/>
+              </a:ext>
+            </a:extLst>
+          </p:cNvPr>
+          <p:cNvSpPr txBox="1"/>
+          <p:nvPr/>
+        </p:nvSpPr>
+        <p:spPr>
+          <a:xfrm>
+            <a:off x="5141233" y="5225912"/>
+            <a:ext cx="2809462" cy="646331"/>
+          </a:xfrm>
+          <a:prstGeom prst="rect">
+            <a:avLst/>
+          </a:prstGeom>
+          <a:noFill/>
+        </p:spPr>
+        <p:txBody>
+          <a:bodyPr wrap="square" rtlCol="0">
+            <a:spAutoFit/>
+          </a:bodyPr>
+          <a:lstStyle/>
+          <a:p>
+            <a:r>
+              <a:rPr lang="en-US" dirty="0"/>
+              <a:t>In silico Core genome components comparison</a:t>
+            </a:r>
+          </a:p>
+        </p:txBody>
+      </p:sp>
+      <p:sp>
+        <p:nvSpPr>
+          <p:cNvPr id="22" name="Arrow: Right 21">
+            <a:extLst>
+              <a:ext uri="{FF2B5EF4-FFF2-40B4-BE49-F238E27FC236}">
+                <a16:creationId xmlns:a16="http://schemas.microsoft.com/office/drawing/2014/main" id="{3D7F2802-64E8-4A58-B2F7-2DEC8A578380}"/>
+              </a:ext>
+            </a:extLst>
+          </p:cNvPr>
+          <p:cNvSpPr/>
+          <p:nvPr/>
+        </p:nvSpPr>
+        <p:spPr>
+          <a:xfrm>
+            <a:off x="7763351" y="5361365"/>
+            <a:ext cx="1046921" cy="250784"/>
+          </a:xfrm>
+          <a:prstGeom prst="rightArrow">
+            <a:avLst/>
+          </a:prstGeom>
+          <a:ln>
+            <a:solidFill>
+              <a:schemeClr val="tx1"/>
+            </a:solidFill>
+          </a:ln>
+        </p:spPr>
+        <p:style>
+          <a:lnRef idx="2">
+            <a:schemeClr val="accent1">
+              <a:shade val="50000"/>
+            </a:schemeClr>
+          </a:lnRef>
+          <a:fillRef idx="1">
+            <a:schemeClr val="accent1"/>
+          </a:fillRef>
+          <a:effectRef idx="0">
+            <a:schemeClr val="accent1"/>
+          </a:effectRef>
+          <a:fontRef idx="minor">
+            <a:schemeClr val="lt1"/>
+          </a:fontRef>
+        </p:style>
+        <p:txBody>
+          <a:bodyPr rtlCol="0" anchor="ctr"/>
+          <a:lstStyle/>
+          <a:p>
+            <a:pPr algn="ctr"/>
+            <a:endParaRPr lang="en-US" dirty="0"/>
+          </a:p>
+        </p:txBody>
+      </p:sp>
+      <p:sp>
+        <p:nvSpPr>
+          <p:cNvPr id="23" name="Arrow: Right 22">
+            <a:extLst>
+              <a:ext uri="{FF2B5EF4-FFF2-40B4-BE49-F238E27FC236}">
+                <a16:creationId xmlns:a16="http://schemas.microsoft.com/office/drawing/2014/main" id="{8E80E208-B8A7-464F-A078-69A849CD5A8E}"/>
+              </a:ext>
+            </a:extLst>
+          </p:cNvPr>
+          <p:cNvSpPr/>
+          <p:nvPr/>
+        </p:nvSpPr>
+        <p:spPr>
+          <a:xfrm rot="5400000">
+            <a:off x="5711108" y="4329736"/>
+            <a:ext cx="1046921" cy="250784"/>
+          </a:xfrm>
+          <a:prstGeom prst="rightArrow">
+            <a:avLst/>
+          </a:prstGeom>
+          <a:ln>
+            <a:solidFill>
+              <a:schemeClr val="tx1"/>
+            </a:solidFill>
+          </a:ln>
+        </p:spPr>
+        <p:style>
+          <a:lnRef idx="2">
+            <a:schemeClr val="accent1">
+              <a:shade val="50000"/>
+            </a:schemeClr>
+          </a:lnRef>
+          <a:fillRef idx="1">
+            <a:schemeClr val="accent1"/>
+          </a:fillRef>
+          <a:effectRef idx="0">
+            <a:schemeClr val="accent1"/>
+          </a:effectRef>
+          <a:fontRef idx="minor">
+            <a:schemeClr val="lt1"/>
+          </a:fontRef>
+        </p:style>
+        <p:txBody>
+          <a:bodyPr rtlCol="0" anchor="ctr"/>
+          <a:lstStyle/>
+          <a:p>
+            <a:pPr algn="ctr"/>
+            <a:endParaRPr lang="en-US" dirty="0"/>
+          </a:p>
+        </p:txBody>
+      </p:sp>
     </p:spTree>
     <p:extLst>
       <p:ext uri="{BB962C8B-B14F-4D97-AF65-F5344CB8AC3E}">
@@ -4109,31 +4742,6 @@
           </a:p>
         </p:txBody>
       </p:sp>
-      <p:sp>
-        <p:nvSpPr>
-          <p:cNvPr id="3" name="Content Placeholder 2">
-            <a:extLst>
-              <a:ext uri="{FF2B5EF4-FFF2-40B4-BE49-F238E27FC236}">
-                <a16:creationId xmlns:a16="http://schemas.microsoft.com/office/drawing/2014/main" id="{EE07B58A-E355-44B6-BD3F-28CFB311B8E5}"/>
-              </a:ext>
-            </a:extLst>
-          </p:cNvPr>
-          <p:cNvSpPr>
-            <a:spLocks noGrp="1"/>
-          </p:cNvSpPr>
-          <p:nvPr>
-            <p:ph idx="1"/>
-          </p:nvPr>
-        </p:nvSpPr>
-        <p:spPr/>
-        <p:txBody>
-          <a:bodyPr/>
-          <a:lstStyle/>
-          <a:p>
-            <a:endParaRPr lang="en-US"/>
-          </a:p>
-        </p:txBody>
-      </p:sp>
       <p:pic>
         <p:nvPicPr>
           <p:cNvPr id="4" name="Picture 3">
@@ -4156,7 +4764,7 @@
         </p:blipFill>
         <p:spPr>
           <a:xfrm>
-            <a:off x="838200" y="116371"/>
+            <a:off x="838200" y="365125"/>
             <a:ext cx="7362825" cy="2305050"/>
           </a:xfrm>
           <a:prstGeom prst="rect">
@@ -4164,6 +4772,192 @@
           </a:prstGeom>
         </p:spPr>
       </p:pic>
+      <p:sp>
+        <p:nvSpPr>
+          <p:cNvPr id="6" name="Rectangle 5">
+            <a:extLst>
+              <a:ext uri="{FF2B5EF4-FFF2-40B4-BE49-F238E27FC236}">
+                <a16:creationId xmlns:a16="http://schemas.microsoft.com/office/drawing/2014/main" id="{5F4629C9-E667-4587-9949-0918A4E1D4CD}"/>
+              </a:ext>
+            </a:extLst>
+          </p:cNvPr>
+          <p:cNvSpPr/>
+          <p:nvPr/>
+        </p:nvSpPr>
+        <p:spPr>
+          <a:xfrm>
+            <a:off x="2707246" y="3587661"/>
+            <a:ext cx="2281007" cy="1200329"/>
+          </a:xfrm>
+          <a:prstGeom prst="rect">
+            <a:avLst/>
+          </a:prstGeom>
+        </p:spPr>
+        <p:txBody>
+          <a:bodyPr wrap="square">
+            <a:spAutoFit/>
+          </a:bodyPr>
+          <a:lstStyle/>
+          <a:p>
+            <a:r>
+              <a:rPr lang="en-US" i="1" dirty="0"/>
+              <a:t>Annotated A</a:t>
+            </a:r>
+            <a:r>
+              <a:rPr lang="en-US" dirty="0"/>
+              <a:t>ccessory </a:t>
+            </a:r>
+            <a:r>
+              <a:rPr lang="en-US" i="1" dirty="0"/>
+              <a:t>G</a:t>
+            </a:r>
+            <a:r>
+              <a:rPr lang="en-US" dirty="0"/>
+              <a:t>enomic </a:t>
+            </a:r>
+            <a:r>
+              <a:rPr lang="en-US" i="1" dirty="0"/>
+              <a:t>E</a:t>
+            </a:r>
+            <a:r>
+              <a:rPr lang="en-US" dirty="0"/>
+              <a:t>lements (AGE)</a:t>
+            </a:r>
+          </a:p>
+          <a:p>
+            <a:r>
+              <a:rPr lang="en-US" dirty="0"/>
+              <a:t>Reference + Draft</a:t>
+            </a:r>
+          </a:p>
+        </p:txBody>
+      </p:sp>
+      <p:sp>
+        <p:nvSpPr>
+          <p:cNvPr id="9" name="Arrow: Right 8">
+            <a:extLst>
+              <a:ext uri="{FF2B5EF4-FFF2-40B4-BE49-F238E27FC236}">
+                <a16:creationId xmlns:a16="http://schemas.microsoft.com/office/drawing/2014/main" id="{16366B17-90D7-4230-BA02-EFE82B44A1D4}"/>
+              </a:ext>
+            </a:extLst>
+          </p:cNvPr>
+          <p:cNvSpPr/>
+          <p:nvPr/>
+        </p:nvSpPr>
+        <p:spPr>
+          <a:xfrm>
+            <a:off x="5327477" y="4005828"/>
+            <a:ext cx="1298610" cy="363996"/>
+          </a:xfrm>
+          <a:prstGeom prst="rightArrow">
+            <a:avLst/>
+          </a:prstGeom>
+          <a:solidFill>
+            <a:schemeClr val="accent2"/>
+          </a:solidFill>
+          <a:ln>
+            <a:solidFill>
+              <a:schemeClr val="tx1"/>
+            </a:solidFill>
+          </a:ln>
+        </p:spPr>
+        <p:style>
+          <a:lnRef idx="2">
+            <a:schemeClr val="accent1">
+              <a:shade val="50000"/>
+            </a:schemeClr>
+          </a:lnRef>
+          <a:fillRef idx="1">
+            <a:schemeClr val="accent1"/>
+          </a:fillRef>
+          <a:effectRef idx="0">
+            <a:schemeClr val="accent1"/>
+          </a:effectRef>
+          <a:fontRef idx="minor">
+            <a:schemeClr val="lt1"/>
+          </a:fontRef>
+        </p:style>
+        <p:txBody>
+          <a:bodyPr rtlCol="0" anchor="ctr"/>
+          <a:lstStyle/>
+          <a:p>
+            <a:pPr algn="ctr"/>
+            <a:endParaRPr lang="en-US"/>
+          </a:p>
+        </p:txBody>
+      </p:sp>
+      <p:sp>
+        <p:nvSpPr>
+          <p:cNvPr id="11" name="TextBox 10">
+            <a:extLst>
+              <a:ext uri="{FF2B5EF4-FFF2-40B4-BE49-F238E27FC236}">
+                <a16:creationId xmlns:a16="http://schemas.microsoft.com/office/drawing/2014/main" id="{6B7449ED-7246-48D7-B41E-7557BACC22FD}"/>
+              </a:ext>
+            </a:extLst>
+          </p:cNvPr>
+          <p:cNvSpPr txBox="1"/>
+          <p:nvPr/>
+        </p:nvSpPr>
+        <p:spPr>
+          <a:xfrm>
+            <a:off x="6992436" y="3008456"/>
+            <a:ext cx="3195877" cy="2862322"/>
+          </a:xfrm>
+          <a:prstGeom prst="rect">
+            <a:avLst/>
+          </a:prstGeom>
+          <a:noFill/>
+        </p:spPr>
+        <p:txBody>
+          <a:bodyPr wrap="square" rtlCol="0">
+            <a:spAutoFit/>
+          </a:bodyPr>
+          <a:lstStyle/>
+          <a:p>
+            <a:pPr marL="285750" indent="-285750">
+              <a:buFont typeface="Arial" panose="020B0604020202020204" pitchFamily="34" charset="0"/>
+              <a:buChar char="•"/>
+            </a:pPr>
+            <a:r>
+              <a:rPr lang="en-US" dirty="0"/>
+              <a:t>Create bins of accessory elements shared (or not) between serovars</a:t>
+            </a:r>
+          </a:p>
+          <a:p>
+            <a:endParaRPr lang="en-US" dirty="0"/>
+          </a:p>
+          <a:p>
+            <a:pPr marL="285750" indent="-285750">
+              <a:buFont typeface="Arial" panose="020B0604020202020204" pitchFamily="34" charset="0"/>
+              <a:buChar char="•"/>
+            </a:pPr>
+            <a:r>
+              <a:rPr lang="en-US" dirty="0"/>
+              <a:t>Comparison of AGE’s with one another</a:t>
+            </a:r>
+          </a:p>
+          <a:p>
+            <a:pPr marL="285750" indent="-285750">
+              <a:buFont typeface="Arial" panose="020B0604020202020204" pitchFamily="34" charset="0"/>
+              <a:buChar char="•"/>
+            </a:pPr>
+            <a:endParaRPr lang="en-US" dirty="0"/>
+          </a:p>
+          <a:p>
+            <a:pPr marL="285750" indent="-285750">
+              <a:buFont typeface="Arial" panose="020B0604020202020204" pitchFamily="34" charset="0"/>
+              <a:buChar char="•"/>
+            </a:pPr>
+            <a:r>
+              <a:rPr lang="en-US" dirty="0"/>
+              <a:t>Create phylogenetic relationships based on AGE</a:t>
+            </a:r>
+          </a:p>
+          <a:p>
+            <a:endParaRPr lang="en-US" dirty="0"/>
+          </a:p>
+        </p:txBody>
+      </p:sp>
     </p:spTree>
     <p:extLst>
       <p:ext uri="{BB962C8B-B14F-4D97-AF65-F5344CB8AC3E}">
@@ -4204,12 +4998,37 @@
           <a:chExt cx="0" cy="0"/>
         </a:xfrm>
       </p:grpSpPr>
+      <p:sp>
+        <p:nvSpPr>
+          <p:cNvPr id="2" name="Title 1">
+            <a:extLst>
+              <a:ext uri="{FF2B5EF4-FFF2-40B4-BE49-F238E27FC236}">
+                <a16:creationId xmlns:a16="http://schemas.microsoft.com/office/drawing/2014/main" id="{1BFA6E77-6747-44EA-8BBE-B06166AF6E84}"/>
+              </a:ext>
+            </a:extLst>
+          </p:cNvPr>
+          <p:cNvSpPr>
+            <a:spLocks noGrp="1"/>
+          </p:cNvSpPr>
+          <p:nvPr>
+            <p:ph type="title"/>
+          </p:nvPr>
+        </p:nvSpPr>
+        <p:spPr/>
+        <p:txBody>
+          <a:bodyPr/>
+          <a:lstStyle/>
+          <a:p>
+            <a:endParaRPr lang="en-US"/>
+          </a:p>
+        </p:txBody>
+      </p:sp>
       <p:pic>
         <p:nvPicPr>
-          <p:cNvPr id="5" name="Picture 4" descr="A close up of a logo&#10;&#10;Description automatically generated">
-            <a:extLst>
-              <a:ext uri="{FF2B5EF4-FFF2-40B4-BE49-F238E27FC236}">
-                <a16:creationId xmlns:a16="http://schemas.microsoft.com/office/drawing/2014/main" id="{4F6DE934-EA58-4B19-B6F8-79E04891FFEA}"/>
+          <p:cNvPr id="4" name="Picture 3">
+            <a:extLst>
+              <a:ext uri="{FF2B5EF4-FFF2-40B4-BE49-F238E27FC236}">
+                <a16:creationId xmlns:a16="http://schemas.microsoft.com/office/drawing/2014/main" id="{006A46AB-6958-4518-A05B-ABA0A6564853}"/>
               </a:ext>
             </a:extLst>
           </p:cNvPr>
@@ -4219,21 +5038,45 @@
           <p:nvPr/>
         </p:nvPicPr>
         <p:blipFill>
-          <a:blip r:embed="rId2">
-            <a:extLst>
-              <a:ext uri="{28A0092B-C50C-407E-A947-70E740481C1C}">
-                <a14:useLocalDpi xmlns:a14="http://schemas.microsoft.com/office/drawing/2010/main" val="0"/>
-              </a:ext>
-            </a:extLst>
-          </a:blip>
+          <a:blip r:embed="rId2"/>
           <a:stretch>
             <a:fillRect/>
           </a:stretch>
         </p:blipFill>
         <p:spPr>
           <a:xfrm>
-            <a:off x="2514497" y="0"/>
-            <a:ext cx="6858000" cy="6858000"/>
+            <a:off x="0" y="0"/>
+            <a:ext cx="4234133" cy="1325563"/>
+          </a:xfrm>
+          <a:prstGeom prst="rect">
+            <a:avLst/>
+          </a:prstGeom>
+        </p:spPr>
+      </p:pic>
+      <p:pic>
+        <p:nvPicPr>
+          <p:cNvPr id="3" name="Picture 2">
+            <a:extLst>
+              <a:ext uri="{FF2B5EF4-FFF2-40B4-BE49-F238E27FC236}">
+                <a16:creationId xmlns:a16="http://schemas.microsoft.com/office/drawing/2014/main" id="{FD6222C8-B2EA-46ED-8332-29AC49BB1C0C}"/>
+              </a:ext>
+            </a:extLst>
+          </p:cNvPr>
+          <p:cNvPicPr>
+            <a:picLocks noChangeAspect="1"/>
+          </p:cNvPicPr>
+          <p:nvPr/>
+        </p:nvPicPr>
+        <p:blipFill>
+          <a:blip r:embed="rId3"/>
+          <a:stretch>
+            <a:fillRect/>
+          </a:stretch>
+        </p:blipFill>
+        <p:spPr>
+          <a:xfrm>
+            <a:off x="5072333" y="191692"/>
+            <a:ext cx="5112676" cy="6474615"/>
           </a:xfrm>
           <a:prstGeom prst="rect">
             <a:avLst/>
@@ -4243,7 +5086,7 @@
     </p:spTree>
     <p:extLst>
       <p:ext uri="{BB962C8B-B14F-4D97-AF65-F5344CB8AC3E}">
-        <p14:creationId xmlns:p14="http://schemas.microsoft.com/office/powerpoint/2010/main" val="3075136631"/>
+        <p14:creationId xmlns:p14="http://schemas.microsoft.com/office/powerpoint/2010/main" val="3809208356"/>
       </p:ext>
     </p:extLst>
   </p:cSld>
@@ -4280,67 +5123,19 @@
           <a:chExt cx="0" cy="0"/>
         </a:xfrm>
       </p:grpSpPr>
-      <p:sp>
-        <p:nvSpPr>
-          <p:cNvPr id="2" name="Title 1">
-            <a:extLst>
-              <a:ext uri="{FF2B5EF4-FFF2-40B4-BE49-F238E27FC236}">
-                <a16:creationId xmlns:a16="http://schemas.microsoft.com/office/drawing/2014/main" id="{4309C141-D331-42D9-8777-FFB51BFF2B54}"/>
-              </a:ext>
-            </a:extLst>
-          </p:cNvPr>
-          <p:cNvSpPr>
-            <a:spLocks noGrp="1"/>
-          </p:cNvSpPr>
-          <p:nvPr>
-            <p:ph type="title"/>
-          </p:nvPr>
-        </p:nvSpPr>
-        <p:spPr>
-          <a:xfrm>
-            <a:off x="371983" y="111906"/>
-            <a:ext cx="10515600" cy="1325563"/>
-          </a:xfrm>
-        </p:spPr>
-        <p:txBody>
-          <a:bodyPr/>
-          <a:lstStyle/>
-          <a:p>
-            <a:r>
-              <a:rPr lang="en-US" dirty="0"/>
-              <a:t>Viewing </a:t>
-            </a:r>
-            <a:r>
-              <a:rPr lang="en-US" dirty="0" err="1"/>
-              <a:t>ClustAGE</a:t>
-            </a:r>
-            <a:r>
-              <a:rPr lang="en-US" dirty="0"/>
-              <a:t> Analysis of Similarity in Salmonella serovars with </a:t>
-            </a:r>
-            <a:r>
-              <a:rPr lang="en-US" dirty="0" err="1"/>
-              <a:t>iTOL</a:t>
-            </a:r>
-            <a:endParaRPr lang="en-US" dirty="0"/>
-          </a:p>
-        </p:txBody>
-      </p:sp>
       <p:pic>
         <p:nvPicPr>
-          <p:cNvPr id="5" name="Content Placeholder 4" descr="A screenshot of a cell phone&#10;&#10;Description automatically generated">
-            <a:extLst>
-              <a:ext uri="{FF2B5EF4-FFF2-40B4-BE49-F238E27FC236}">
-                <a16:creationId xmlns:a16="http://schemas.microsoft.com/office/drawing/2014/main" id="{3EA231A8-3ADB-466C-855D-2D93F556D0A1}"/>
+          <p:cNvPr id="5" name="Picture 4" descr="A close up of a logo&#10;&#10;Description automatically generated">
+            <a:extLst>
+              <a:ext uri="{FF2B5EF4-FFF2-40B4-BE49-F238E27FC236}">
+                <a16:creationId xmlns:a16="http://schemas.microsoft.com/office/drawing/2014/main" id="{4F6DE934-EA58-4B19-B6F8-79E04891FFEA}"/>
               </a:ext>
             </a:extLst>
           </p:cNvPr>
           <p:cNvPicPr>
-            <a:picLocks noGrp="1" noChangeAspect="1"/>
+            <a:picLocks noChangeAspect="1"/>
           </p:cNvPicPr>
-          <p:nvPr>
-            <p:ph idx="1"/>
-          </p:nvPr>
+          <p:nvPr/>
         </p:nvPicPr>
         <p:blipFill>
           <a:blip r:embed="rId2">
@@ -4356,55 +5151,18 @@
         </p:blipFill>
         <p:spPr>
           <a:xfrm>
-            <a:off x="966386" y="774687"/>
-            <a:ext cx="10259227" cy="5774781"/>
-          </a:xfrm>
-        </p:spPr>
-      </p:pic>
-      <p:sp>
-        <p:nvSpPr>
-          <p:cNvPr id="6" name="TextBox 5">
-            <a:extLst>
-              <a:ext uri="{FF2B5EF4-FFF2-40B4-BE49-F238E27FC236}">
-                <a16:creationId xmlns:a16="http://schemas.microsoft.com/office/drawing/2014/main" id="{B1E54EED-B280-4400-96EC-1904453C09E3}"/>
-              </a:ext>
-            </a:extLst>
-          </p:cNvPr>
-          <p:cNvSpPr txBox="1"/>
-          <p:nvPr/>
-        </p:nvSpPr>
-        <p:spPr>
-          <a:xfrm>
-            <a:off x="371983" y="1587599"/>
-            <a:ext cx="3664786" cy="400110"/>
+            <a:off x="2514497" y="0"/>
+            <a:ext cx="6858000" cy="6858000"/>
           </a:xfrm>
           <a:prstGeom prst="rect">
             <a:avLst/>
           </a:prstGeom>
-          <a:noFill/>
-          <a:ln>
-            <a:solidFill>
-              <a:schemeClr val="tx1"/>
-            </a:solidFill>
-          </a:ln>
-        </p:spPr>
-        <p:txBody>
-          <a:bodyPr wrap="none" rtlCol="0">
-            <a:spAutoFit/>
-          </a:bodyPr>
-          <a:lstStyle/>
-          <a:p>
-            <a:r>
-              <a:rPr lang="en-US" sz="2000" b="1" dirty="0"/>
-              <a:t>16 Reference Genomes Analyzed</a:t>
-            </a:r>
-          </a:p>
-        </p:txBody>
-      </p:sp>
+        </p:spPr>
+      </p:pic>
     </p:spTree>
     <p:extLst>
       <p:ext uri="{BB962C8B-B14F-4D97-AF65-F5344CB8AC3E}">
-        <p14:creationId xmlns:p14="http://schemas.microsoft.com/office/powerpoint/2010/main" val="3746403430"/>
+        <p14:creationId xmlns:p14="http://schemas.microsoft.com/office/powerpoint/2010/main" val="3075136631"/>
       </p:ext>
     </p:extLst>
   </p:cSld>
@@ -4464,48 +5222,52 @@
           </a:xfrm>
         </p:spPr>
         <p:txBody>
-          <a:bodyPr>
-            <a:normAutofit/>
-          </a:bodyPr>
+          <a:bodyPr/>
           <a:lstStyle/>
           <a:p>
             <a:r>
               <a:rPr lang="en-US" dirty="0"/>
-              <a:t>Similarity in Salmonella serovars with </a:t>
+              <a:t>Viewing </a:t>
+            </a:r>
+            <a:r>
+              <a:rPr lang="en-US" dirty="0" err="1"/>
+              <a:t>ClustAGE</a:t>
+            </a:r>
+            <a:r>
+              <a:rPr lang="en-US" dirty="0"/>
+              <a:t> Analysis of Similarity in </a:t>
+            </a:r>
+            <a:r>
+              <a:rPr lang="en-US" i="1" dirty="0"/>
+              <a:t>Salmonella</a:t>
+            </a:r>
+            <a:r>
+              <a:rPr lang="en-US" dirty="0"/>
+              <a:t> serovars with </a:t>
             </a:r>
             <a:r>
               <a:rPr lang="en-US" dirty="0" err="1"/>
               <a:t>iTOL</a:t>
             </a:r>
-            <a:r>
-              <a:rPr lang="en-US" dirty="0"/>
-              <a:t>, larger dataset, includes “outlier” </a:t>
-            </a:r>
-            <a:r>
-              <a:rPr lang="en-US" i="1" dirty="0"/>
-              <a:t>S. </a:t>
-            </a:r>
-            <a:r>
-              <a:rPr lang="en-US" i="1" dirty="0" err="1"/>
-              <a:t>bongori</a:t>
-            </a:r>
-            <a:endParaRPr lang="en-US" i="1" dirty="0"/>
+            <a:endParaRPr lang="en-US" dirty="0"/>
           </a:p>
         </p:txBody>
       </p:sp>
       <p:pic>
         <p:nvPicPr>
-          <p:cNvPr id="6" name="Picture 5">
-            <a:extLst>
-              <a:ext uri="{FF2B5EF4-FFF2-40B4-BE49-F238E27FC236}">
-                <a16:creationId xmlns:a16="http://schemas.microsoft.com/office/drawing/2014/main" id="{9DF913E5-46AC-41C5-A8AC-EB543BA8B01B}"/>
+          <p:cNvPr id="5" name="Content Placeholder 4" descr="A screenshot of a cell phone&#10;&#10;Description automatically generated">
+            <a:extLst>
+              <a:ext uri="{FF2B5EF4-FFF2-40B4-BE49-F238E27FC236}">
+                <a16:creationId xmlns:a16="http://schemas.microsoft.com/office/drawing/2014/main" id="{3EA231A8-3ADB-466C-855D-2D93F556D0A1}"/>
               </a:ext>
             </a:extLst>
           </p:cNvPr>
           <p:cNvPicPr>
-            <a:picLocks noChangeAspect="1"/>
+            <a:picLocks noGrp="1" noChangeAspect="1"/>
           </p:cNvPicPr>
-          <p:nvPr/>
+          <p:nvPr>
+            <p:ph idx="1"/>
+          </p:nvPr>
         </p:nvPicPr>
         <p:blipFill>
           <a:blip r:embed="rId2">
@@ -4521,20 +5283,17 @@
         </p:blipFill>
         <p:spPr>
           <a:xfrm>
-            <a:off x="1990638" y="1437469"/>
-            <a:ext cx="8896945" cy="5217160"/>
-          </a:xfrm>
-          <a:prstGeom prst="rect">
-            <a:avLst/>
-          </a:prstGeom>
+            <a:off x="966386" y="774687"/>
+            <a:ext cx="10259227" cy="5774781"/>
+          </a:xfrm>
         </p:spPr>
       </p:pic>
       <p:sp>
         <p:nvSpPr>
-          <p:cNvPr id="7" name="TextBox 6">
-            <a:extLst>
-              <a:ext uri="{FF2B5EF4-FFF2-40B4-BE49-F238E27FC236}">
-                <a16:creationId xmlns:a16="http://schemas.microsoft.com/office/drawing/2014/main" id="{D6C9B23C-1347-45EA-8E1B-1AA0A640CA1F}"/>
+          <p:cNvPr id="6" name="TextBox 5">
+            <a:extLst>
+              <a:ext uri="{FF2B5EF4-FFF2-40B4-BE49-F238E27FC236}">
+                <a16:creationId xmlns:a16="http://schemas.microsoft.com/office/drawing/2014/main" id="{B1E54EED-B280-4400-96EC-1904453C09E3}"/>
               </a:ext>
             </a:extLst>
           </p:cNvPr>
@@ -4544,7 +5303,7 @@
         <p:spPr>
           <a:xfrm>
             <a:off x="371983" y="1587599"/>
-            <a:ext cx="4518609" cy="400110"/>
+            <a:ext cx="3664786" cy="400110"/>
           </a:xfrm>
           <a:prstGeom prst="rect">
             <a:avLst/>
@@ -4564,7 +5323,7 @@
           <a:p>
             <a:r>
               <a:rPr lang="en-US" sz="2000" b="1" dirty="0"/>
-              <a:t>18 Reference, 2 Draft Genomes Analyzed</a:t>
+              <a:t>16 Reference Genomes Analyzed</a:t>
             </a:r>
           </a:p>
         </p:txBody>
@@ -4572,7 +5331,7 @@
     </p:spTree>
     <p:extLst>
       <p:ext uri="{BB962C8B-B14F-4D97-AF65-F5344CB8AC3E}">
-        <p14:creationId xmlns:p14="http://schemas.microsoft.com/office/powerpoint/2010/main" val="2408609269"/>
+        <p14:creationId xmlns:p14="http://schemas.microsoft.com/office/powerpoint/2010/main" val="3746403430"/>
       </p:ext>
     </p:extLst>
   </p:cSld>
@@ -4614,6 +5373,411 @@
           <p:cNvPr id="2" name="Title 1">
             <a:extLst>
               <a:ext uri="{FF2B5EF4-FFF2-40B4-BE49-F238E27FC236}">
+                <a16:creationId xmlns:a16="http://schemas.microsoft.com/office/drawing/2014/main" id="{4309C141-D331-42D9-8777-FFB51BFF2B54}"/>
+              </a:ext>
+            </a:extLst>
+          </p:cNvPr>
+          <p:cNvSpPr>
+            <a:spLocks noGrp="1"/>
+          </p:cNvSpPr>
+          <p:nvPr>
+            <p:ph type="title"/>
+          </p:nvPr>
+        </p:nvSpPr>
+        <p:spPr>
+          <a:xfrm>
+            <a:off x="371983" y="111906"/>
+            <a:ext cx="10515600" cy="1325563"/>
+          </a:xfrm>
+        </p:spPr>
+        <p:txBody>
+          <a:bodyPr>
+            <a:normAutofit/>
+          </a:bodyPr>
+          <a:lstStyle/>
+          <a:p>
+            <a:r>
+              <a:rPr lang="en-US" dirty="0"/>
+              <a:t>Similarity in </a:t>
+            </a:r>
+            <a:r>
+              <a:rPr lang="en-US" i="1" dirty="0"/>
+              <a:t>Salmonella</a:t>
+            </a:r>
+            <a:r>
+              <a:rPr lang="en-US" dirty="0"/>
+              <a:t> serovars with </a:t>
+            </a:r>
+            <a:r>
+              <a:rPr lang="en-US" dirty="0" err="1"/>
+              <a:t>iTOL</a:t>
+            </a:r>
+            <a:r>
+              <a:rPr lang="en-US" dirty="0"/>
+              <a:t>, larger dataset, includes “outlier” </a:t>
+            </a:r>
+            <a:r>
+              <a:rPr lang="en-US" i="1" dirty="0"/>
+              <a:t>S. </a:t>
+            </a:r>
+            <a:r>
+              <a:rPr lang="en-US" i="1" dirty="0" err="1"/>
+              <a:t>bongori</a:t>
+            </a:r>
+            <a:endParaRPr lang="en-US" i="1" dirty="0"/>
+          </a:p>
+        </p:txBody>
+      </p:sp>
+      <p:pic>
+        <p:nvPicPr>
+          <p:cNvPr id="6" name="Picture 5">
+            <a:extLst>
+              <a:ext uri="{FF2B5EF4-FFF2-40B4-BE49-F238E27FC236}">
+                <a16:creationId xmlns:a16="http://schemas.microsoft.com/office/drawing/2014/main" id="{9DF913E5-46AC-41C5-A8AC-EB543BA8B01B}"/>
+              </a:ext>
+            </a:extLst>
+          </p:cNvPr>
+          <p:cNvPicPr>
+            <a:picLocks noChangeAspect="1"/>
+          </p:cNvPicPr>
+          <p:nvPr/>
+        </p:nvPicPr>
+        <p:blipFill>
+          <a:blip r:embed="rId2">
+            <a:extLst>
+              <a:ext uri="{28A0092B-C50C-407E-A947-70E740481C1C}">
+                <a14:useLocalDpi xmlns:a14="http://schemas.microsoft.com/office/drawing/2010/main" val="0"/>
+              </a:ext>
+            </a:extLst>
+          </a:blip>
+          <a:stretch>
+            <a:fillRect/>
+          </a:stretch>
+        </p:blipFill>
+        <p:spPr>
+          <a:xfrm>
+            <a:off x="1990638" y="1437469"/>
+            <a:ext cx="8896945" cy="5217160"/>
+          </a:xfrm>
+          <a:prstGeom prst="rect">
+            <a:avLst/>
+          </a:prstGeom>
+        </p:spPr>
+      </p:pic>
+      <p:sp>
+        <p:nvSpPr>
+          <p:cNvPr id="7" name="TextBox 6">
+            <a:extLst>
+              <a:ext uri="{FF2B5EF4-FFF2-40B4-BE49-F238E27FC236}">
+                <a16:creationId xmlns:a16="http://schemas.microsoft.com/office/drawing/2014/main" id="{D6C9B23C-1347-45EA-8E1B-1AA0A640CA1F}"/>
+              </a:ext>
+            </a:extLst>
+          </p:cNvPr>
+          <p:cNvSpPr txBox="1"/>
+          <p:nvPr/>
+        </p:nvSpPr>
+        <p:spPr>
+          <a:xfrm>
+            <a:off x="371983" y="1587599"/>
+            <a:ext cx="4518609" cy="400110"/>
+          </a:xfrm>
+          <a:prstGeom prst="rect">
+            <a:avLst/>
+          </a:prstGeom>
+          <a:noFill/>
+          <a:ln>
+            <a:solidFill>
+              <a:schemeClr val="tx1"/>
+            </a:solidFill>
+          </a:ln>
+        </p:spPr>
+        <p:txBody>
+          <a:bodyPr wrap="none" rtlCol="0">
+            <a:spAutoFit/>
+          </a:bodyPr>
+          <a:lstStyle/>
+          <a:p>
+            <a:r>
+              <a:rPr lang="en-US" sz="2000" b="1" dirty="0"/>
+              <a:t>18 Reference, 2 Draft Genomes Analyzed</a:t>
+            </a:r>
+          </a:p>
+        </p:txBody>
+      </p:sp>
+    </p:spTree>
+    <p:extLst>
+      <p:ext uri="{BB962C8B-B14F-4D97-AF65-F5344CB8AC3E}">
+        <p14:creationId xmlns:p14="http://schemas.microsoft.com/office/powerpoint/2010/main" val="2408609269"/>
+      </p:ext>
+    </p:extLst>
+  </p:cSld>
+  <p:clrMapOvr>
+    <a:masterClrMapping/>
+  </p:clrMapOvr>
+</p:sld>
+</file>
+
+<file path=ppt/slides/slide2.xml><?xml version="1.0" encoding="utf-8"?>
+<p:sld xmlns:a="http://schemas.openxmlformats.org/drawingml/2006/main" xmlns:r="http://schemas.openxmlformats.org/officeDocument/2006/relationships" xmlns:p="http://schemas.openxmlformats.org/presentationml/2006/main">
+  <p:cSld>
+    <p:bg>
+      <p:bgPr>
+        <a:solidFill>
+          <a:schemeClr val="bg1">
+            <a:lumMod val="95000"/>
+          </a:schemeClr>
+        </a:solidFill>
+        <a:effectLst/>
+      </p:bgPr>
+    </p:bg>
+    <p:spTree>
+      <p:nvGrpSpPr>
+        <p:cNvPr id="1" name=""/>
+        <p:cNvGrpSpPr/>
+        <p:nvPr/>
+      </p:nvGrpSpPr>
+      <p:grpSpPr>
+        <a:xfrm>
+          <a:off x="0" y="0"/>
+          <a:ext cx="0" cy="0"/>
+          <a:chOff x="0" y="0"/>
+          <a:chExt cx="0" cy="0"/>
+        </a:xfrm>
+      </p:grpSpPr>
+      <p:sp>
+        <p:nvSpPr>
+          <p:cNvPr id="2" name="Title 1">
+            <a:extLst>
+              <a:ext uri="{FF2B5EF4-FFF2-40B4-BE49-F238E27FC236}">
+                <a16:creationId xmlns:a16="http://schemas.microsoft.com/office/drawing/2014/main" id="{01A76F32-DFE4-47C8-AEA2-4265CB61F1DA}"/>
+              </a:ext>
+            </a:extLst>
+          </p:cNvPr>
+          <p:cNvSpPr>
+            <a:spLocks noGrp="1"/>
+          </p:cNvSpPr>
+          <p:nvPr>
+            <p:ph type="title"/>
+          </p:nvPr>
+        </p:nvSpPr>
+        <p:spPr>
+          <a:xfrm>
+            <a:off x="648929" y="629266"/>
+            <a:ext cx="3651467" cy="1676603"/>
+          </a:xfrm>
+        </p:spPr>
+        <p:txBody>
+          <a:bodyPr>
+            <a:normAutofit/>
+          </a:bodyPr>
+          <a:lstStyle/>
+          <a:p>
+            <a:r>
+              <a:rPr lang="en-US" i="1" dirty="0"/>
+              <a:t>Salmonella enterica</a:t>
+            </a:r>
+          </a:p>
+        </p:txBody>
+      </p:sp>
+      <p:sp>
+        <p:nvSpPr>
+          <p:cNvPr id="3" name="Content Placeholder 2">
+            <a:extLst>
+              <a:ext uri="{FF2B5EF4-FFF2-40B4-BE49-F238E27FC236}">
+                <a16:creationId xmlns:a16="http://schemas.microsoft.com/office/drawing/2014/main" id="{71E6DF57-B48C-47A7-8E53-F6831229337E}"/>
+              </a:ext>
+            </a:extLst>
+          </p:cNvPr>
+          <p:cNvSpPr>
+            <a:spLocks noGrp="1"/>
+          </p:cNvSpPr>
+          <p:nvPr>
+            <p:ph idx="1"/>
+          </p:nvPr>
+        </p:nvSpPr>
+        <p:spPr>
+          <a:xfrm>
+            <a:off x="648931" y="2438400"/>
+            <a:ext cx="3651466" cy="3008243"/>
+          </a:xfrm>
+        </p:spPr>
+        <p:txBody>
+          <a:bodyPr>
+            <a:normAutofit/>
+          </a:bodyPr>
+          <a:lstStyle/>
+          <a:p>
+            <a:r>
+              <a:rPr lang="en-US" sz="2000" dirty="0"/>
+              <a:t>Gram (-) Bacteria</a:t>
+            </a:r>
+          </a:p>
+          <a:p>
+            <a:r>
+              <a:rPr lang="en-US" sz="2000" dirty="0"/>
+              <a:t>1.2 million cases of Salmonella related illness/year in U.S. alone</a:t>
+            </a:r>
+          </a:p>
+          <a:p>
+            <a:r>
+              <a:rPr lang="en-US" sz="2000" dirty="0"/>
+              <a:t>Three types of sicknesses:</a:t>
+            </a:r>
+          </a:p>
+          <a:p>
+            <a:pPr marL="457200" lvl="1" indent="0">
+              <a:buNone/>
+            </a:pPr>
+            <a:r>
+              <a:rPr lang="en-US" sz="2000" dirty="0"/>
+              <a:t>1) Salmonellosis (non paratyphoid/ typhoid)</a:t>
+            </a:r>
+          </a:p>
+          <a:p>
+            <a:pPr marL="457200" lvl="1" indent="0">
+              <a:buNone/>
+            </a:pPr>
+            <a:r>
+              <a:rPr lang="en-US" sz="2000" dirty="0"/>
+              <a:t>2) Paratyphoid fever</a:t>
+            </a:r>
+          </a:p>
+          <a:p>
+            <a:pPr marL="457200" lvl="1" indent="0">
+              <a:buNone/>
+            </a:pPr>
+            <a:r>
+              <a:rPr lang="en-US" sz="2000" dirty="0"/>
+              <a:t>3) Typhoid fever</a:t>
+            </a:r>
+          </a:p>
+        </p:txBody>
+      </p:sp>
+      <p:pic>
+        <p:nvPicPr>
+          <p:cNvPr id="5122" name="Picture 2" descr="Salmonella">
+            <a:extLst>
+              <a:ext uri="{FF2B5EF4-FFF2-40B4-BE49-F238E27FC236}">
+                <a16:creationId xmlns:a16="http://schemas.microsoft.com/office/drawing/2014/main" id="{2E5E1A03-C024-4DD9-9AFD-D9A00A96C04C}"/>
+              </a:ext>
+            </a:extLst>
+          </p:cNvPr>
+          <p:cNvPicPr>
+            <a:picLocks noChangeAspect="1" noChangeArrowheads="1"/>
+          </p:cNvPicPr>
+          <p:nvPr/>
+        </p:nvPicPr>
+        <p:blipFill rotWithShape="1">
+          <a:blip r:embed="rId2">
+            <a:extLst>
+              <a:ext uri="{28A0092B-C50C-407E-A947-70E740481C1C}">
+                <a14:useLocalDpi xmlns:a14="http://schemas.microsoft.com/office/drawing/2010/main" val="0"/>
+              </a:ext>
+            </a:extLst>
+          </a:blip>
+          <a:srcRect l="1247" r="-2" b="-2"/>
+          <a:stretch/>
+        </p:blipFill>
+        <p:spPr bwMode="auto">
+          <a:xfrm>
+            <a:off x="4639056" y="10"/>
+            <a:ext cx="7552944" cy="6857990"/>
+          </a:xfrm>
+          <a:prstGeom prst="rect">
+            <a:avLst/>
+          </a:prstGeom>
+          <a:noFill/>
+          <a:effectLst/>
+          <a:extLst>
+            <a:ext uri="{909E8E84-426E-40DD-AFC4-6F175D3DCCD1}">
+              <a14:hiddenFill xmlns:a14="http://schemas.microsoft.com/office/drawing/2010/main">
+                <a:solidFill>
+                  <a:srgbClr val="FFFFFF"/>
+                </a:solidFill>
+              </a14:hiddenFill>
+            </a:ext>
+          </a:extLst>
+        </p:spPr>
+      </p:pic>
+      <p:sp>
+        <p:nvSpPr>
+          <p:cNvPr id="4" name="Rectangle 3">
+            <a:extLst>
+              <a:ext uri="{FF2B5EF4-FFF2-40B4-BE49-F238E27FC236}">
+                <a16:creationId xmlns:a16="http://schemas.microsoft.com/office/drawing/2014/main" id="{E5B601C6-36F3-4C38-BAEF-80EFE4CD5514}"/>
+              </a:ext>
+            </a:extLst>
+          </p:cNvPr>
+          <p:cNvSpPr/>
+          <p:nvPr/>
+        </p:nvSpPr>
+        <p:spPr>
+          <a:xfrm>
+            <a:off x="0" y="6356350"/>
+            <a:ext cx="4595038" cy="461665"/>
+          </a:xfrm>
+          <a:prstGeom prst="rect">
+            <a:avLst/>
+          </a:prstGeom>
+        </p:spPr>
+        <p:txBody>
+          <a:bodyPr wrap="square">
+            <a:spAutoFit/>
+          </a:bodyPr>
+          <a:lstStyle/>
+          <a:p>
+            <a:r>
+              <a:rPr lang="en-US" sz="1200" dirty="0"/>
+              <a:t>http://www.cidrap.umn.edu/news-perspective/2016/12/cdc-resistant-salmonella-causes-6200-illnesses-year</a:t>
+            </a:r>
+          </a:p>
+        </p:txBody>
+      </p:sp>
+    </p:spTree>
+    <p:extLst>
+      <p:ext uri="{BB962C8B-B14F-4D97-AF65-F5344CB8AC3E}">
+        <p14:creationId xmlns:p14="http://schemas.microsoft.com/office/powerpoint/2010/main" val="1298375012"/>
+      </p:ext>
+    </p:extLst>
+  </p:cSld>
+  <p:clrMapOvr>
+    <a:masterClrMapping/>
+  </p:clrMapOvr>
+</p:sld>
+</file>
+
+<file path=ppt/slides/slide20.xml><?xml version="1.0" encoding="utf-8"?>
+<p:sld xmlns:a="http://schemas.openxmlformats.org/drawingml/2006/main" xmlns:r="http://schemas.openxmlformats.org/officeDocument/2006/relationships" xmlns:p="http://schemas.openxmlformats.org/presentationml/2006/main">
+  <p:cSld>
+    <p:bg>
+      <p:bgPr>
+        <a:solidFill>
+          <a:schemeClr val="bg1">
+            <a:lumMod val="95000"/>
+          </a:schemeClr>
+        </a:solidFill>
+        <a:effectLst/>
+      </p:bgPr>
+    </p:bg>
+    <p:spTree>
+      <p:nvGrpSpPr>
+        <p:cNvPr id="1" name=""/>
+        <p:cNvGrpSpPr/>
+        <p:nvPr/>
+      </p:nvGrpSpPr>
+      <p:grpSpPr>
+        <a:xfrm>
+          <a:off x="0" y="0"/>
+          <a:ext cx="0" cy="0"/>
+          <a:chOff x="0" y="0"/>
+          <a:chExt cx="0" cy="0"/>
+        </a:xfrm>
+      </p:grpSpPr>
+      <p:sp>
+        <p:nvSpPr>
+          <p:cNvPr id="2" name="Title 1">
+            <a:extLst>
+              <a:ext uri="{FF2B5EF4-FFF2-40B4-BE49-F238E27FC236}">
                 <a16:creationId xmlns:a16="http://schemas.microsoft.com/office/drawing/2014/main" id="{D6054A5C-B595-46B8-9589-470E7CDB9EDB}"/>
               </a:ext>
             </a:extLst>
@@ -4844,7 +6008,7 @@
             </a:avLst>
           </a:prstGeom>
           <a:noFill/>
-          <a:ln w="19050">
+          <a:ln w="28575">
             <a:solidFill>
               <a:schemeClr val="accent2"/>
             </a:solidFill>
@@ -4899,7 +6063,7 @@
             </a:avLst>
           </a:prstGeom>
           <a:noFill/>
-          <a:ln w="19050">
+          <a:ln w="28575">
             <a:solidFill>
               <a:schemeClr val="accent1"/>
             </a:solidFill>
@@ -4954,7 +6118,7 @@
             </a:avLst>
           </a:prstGeom>
           <a:noFill/>
-          <a:ln w="19050">
+          <a:ln w="28575">
             <a:solidFill>
               <a:srgbClr val="FF0000"/>
             </a:solidFill>
@@ -5009,7 +6173,7 @@
             </a:avLst>
           </a:prstGeom>
           <a:noFill/>
-          <a:ln w="19050">
+          <a:ln w="28575">
             <a:solidFill>
               <a:schemeClr val="tx1"/>
             </a:solidFill>
@@ -5099,7 +6263,7 @@
             </a:avLst>
           </a:prstGeom>
           <a:noFill/>
-          <a:ln w="19050">
+          <a:ln w="28575">
             <a:solidFill>
               <a:srgbClr val="FF0000"/>
             </a:solidFill>
@@ -5189,7 +6353,7 @@
             </a:avLst>
           </a:prstGeom>
           <a:noFill/>
-          <a:ln w="19050">
+          <a:ln w="28575">
             <a:solidFill>
               <a:srgbClr val="FF0000"/>
             </a:solidFill>
@@ -5279,7 +6443,7 @@
             </a:avLst>
           </a:prstGeom>
           <a:noFill/>
-          <a:ln w="19050">
+          <a:ln w="28575">
             <a:solidFill>
               <a:srgbClr val="7030A0"/>
             </a:solidFill>
@@ -6555,7 +7719,7 @@
             </a:avLst>
           </a:prstGeom>
           <a:noFill/>
-          <a:ln w="19050">
+          <a:ln w="28575">
             <a:solidFill>
               <a:schemeClr val="accent2"/>
             </a:solidFill>
@@ -6645,7 +7809,7 @@
             </a:avLst>
           </a:prstGeom>
           <a:noFill/>
-          <a:ln w="19050">
+          <a:ln w="28575">
             <a:solidFill>
               <a:schemeClr val="accent6">
                 <a:lumMod val="75000"/>
@@ -6702,7 +7866,7 @@
             </a:avLst>
           </a:prstGeom>
           <a:noFill/>
-          <a:ln w="19050">
+          <a:ln w="28575">
             <a:solidFill>
               <a:schemeClr val="tx1"/>
             </a:solidFill>
@@ -6827,7 +7991,7 @@
             </a:avLst>
           </a:prstGeom>
           <a:noFill/>
-          <a:ln w="19050">
+          <a:ln w="28575">
             <a:solidFill>
               <a:srgbClr val="FFFF00"/>
             </a:solidFill>
@@ -6862,394 +8026,6 @@
     <p:extLst>
       <p:ext uri="{BB962C8B-B14F-4D97-AF65-F5344CB8AC3E}">
         <p14:creationId xmlns:p14="http://schemas.microsoft.com/office/powerpoint/2010/main" val="338791742"/>
-      </p:ext>
-    </p:extLst>
-  </p:cSld>
-  <p:clrMapOvr>
-    <a:masterClrMapping/>
-  </p:clrMapOvr>
-</p:sld>
-</file>
-
-<file path=ppt/slides/slide2.xml><?xml version="1.0" encoding="utf-8"?>
-<p:sld xmlns:a="http://schemas.openxmlformats.org/drawingml/2006/main" xmlns:r="http://schemas.openxmlformats.org/officeDocument/2006/relationships" xmlns:p="http://schemas.openxmlformats.org/presentationml/2006/main">
-  <p:cSld>
-    <p:bg>
-      <p:bgPr>
-        <a:solidFill>
-          <a:schemeClr val="bg1">
-            <a:lumMod val="95000"/>
-          </a:schemeClr>
-        </a:solidFill>
-        <a:effectLst/>
-      </p:bgPr>
-    </p:bg>
-    <p:spTree>
-      <p:nvGrpSpPr>
-        <p:cNvPr id="1" name=""/>
-        <p:cNvGrpSpPr/>
-        <p:nvPr/>
-      </p:nvGrpSpPr>
-      <p:grpSpPr>
-        <a:xfrm>
-          <a:off x="0" y="0"/>
-          <a:ext cx="0" cy="0"/>
-          <a:chOff x="0" y="0"/>
-          <a:chExt cx="0" cy="0"/>
-        </a:xfrm>
-      </p:grpSpPr>
-      <p:sp>
-        <p:nvSpPr>
-          <p:cNvPr id="2" name="Title 1">
-            <a:extLst>
-              <a:ext uri="{FF2B5EF4-FFF2-40B4-BE49-F238E27FC236}">
-                <a16:creationId xmlns:a16="http://schemas.microsoft.com/office/drawing/2014/main" id="{01A76F32-DFE4-47C8-AEA2-4265CB61F1DA}"/>
-              </a:ext>
-            </a:extLst>
-          </p:cNvPr>
-          <p:cNvSpPr>
-            <a:spLocks noGrp="1"/>
-          </p:cNvSpPr>
-          <p:nvPr>
-            <p:ph type="title"/>
-          </p:nvPr>
-        </p:nvSpPr>
-        <p:spPr>
-          <a:xfrm>
-            <a:off x="648929" y="629266"/>
-            <a:ext cx="3651467" cy="1676603"/>
-          </a:xfrm>
-        </p:spPr>
-        <p:txBody>
-          <a:bodyPr>
-            <a:normAutofit/>
-          </a:bodyPr>
-          <a:lstStyle/>
-          <a:p>
-            <a:r>
-              <a:rPr lang="en-US" i="1" dirty="0"/>
-              <a:t>Salmonella enterica</a:t>
-            </a:r>
-          </a:p>
-        </p:txBody>
-      </p:sp>
-      <p:sp>
-        <p:nvSpPr>
-          <p:cNvPr id="3" name="Content Placeholder 2">
-            <a:extLst>
-              <a:ext uri="{FF2B5EF4-FFF2-40B4-BE49-F238E27FC236}">
-                <a16:creationId xmlns:a16="http://schemas.microsoft.com/office/drawing/2014/main" id="{71E6DF57-B48C-47A7-8E53-F6831229337E}"/>
-              </a:ext>
-            </a:extLst>
-          </p:cNvPr>
-          <p:cNvSpPr>
-            <a:spLocks noGrp="1"/>
-          </p:cNvSpPr>
-          <p:nvPr>
-            <p:ph idx="1"/>
-          </p:nvPr>
-        </p:nvSpPr>
-        <p:spPr>
-          <a:xfrm>
-            <a:off x="648931" y="2438400"/>
-            <a:ext cx="3651466" cy="3008243"/>
-          </a:xfrm>
-        </p:spPr>
-        <p:txBody>
-          <a:bodyPr>
-            <a:normAutofit/>
-          </a:bodyPr>
-          <a:lstStyle/>
-          <a:p>
-            <a:r>
-              <a:rPr lang="en-US" sz="2000" dirty="0"/>
-              <a:t>Gram (-) Bacteria</a:t>
-            </a:r>
-          </a:p>
-          <a:p>
-            <a:r>
-              <a:rPr lang="en-US" sz="2000" dirty="0"/>
-              <a:t>1.2 million cases of Salmonella related illness/year in U.S. alone</a:t>
-            </a:r>
-          </a:p>
-          <a:p>
-            <a:r>
-              <a:rPr lang="en-US" sz="2000" dirty="0"/>
-              <a:t>Three types of sicknesses:</a:t>
-            </a:r>
-          </a:p>
-          <a:p>
-            <a:pPr marL="457200" lvl="1" indent="0">
-              <a:buNone/>
-            </a:pPr>
-            <a:r>
-              <a:rPr lang="en-US" sz="2000" dirty="0"/>
-              <a:t>1) Salmonellosis (non paratyphoid/ typhoid)</a:t>
-            </a:r>
-          </a:p>
-          <a:p>
-            <a:pPr marL="457200" lvl="1" indent="0">
-              <a:buNone/>
-            </a:pPr>
-            <a:r>
-              <a:rPr lang="en-US" sz="2000" dirty="0"/>
-              <a:t>2) Paratyphoid fever</a:t>
-            </a:r>
-          </a:p>
-          <a:p>
-            <a:pPr marL="457200" lvl="1" indent="0">
-              <a:buNone/>
-            </a:pPr>
-            <a:r>
-              <a:rPr lang="en-US" sz="2000" dirty="0"/>
-              <a:t>3) Typhoid fever</a:t>
-            </a:r>
-          </a:p>
-        </p:txBody>
-      </p:sp>
-      <p:pic>
-        <p:nvPicPr>
-          <p:cNvPr id="5122" name="Picture 2" descr="Salmonella">
-            <a:extLst>
-              <a:ext uri="{FF2B5EF4-FFF2-40B4-BE49-F238E27FC236}">
-                <a16:creationId xmlns:a16="http://schemas.microsoft.com/office/drawing/2014/main" id="{2E5E1A03-C024-4DD9-9AFD-D9A00A96C04C}"/>
-              </a:ext>
-            </a:extLst>
-          </p:cNvPr>
-          <p:cNvPicPr>
-            <a:picLocks noChangeAspect="1" noChangeArrowheads="1"/>
-          </p:cNvPicPr>
-          <p:nvPr/>
-        </p:nvPicPr>
-        <p:blipFill rotWithShape="1">
-          <a:blip r:embed="rId2">
-            <a:extLst>
-              <a:ext uri="{28A0092B-C50C-407E-A947-70E740481C1C}">
-                <a14:useLocalDpi xmlns:a14="http://schemas.microsoft.com/office/drawing/2010/main" val="0"/>
-              </a:ext>
-            </a:extLst>
-          </a:blip>
-          <a:srcRect l="1247" r="-2" b="-2"/>
-          <a:stretch/>
-        </p:blipFill>
-        <p:spPr bwMode="auto">
-          <a:xfrm>
-            <a:off x="4639056" y="10"/>
-            <a:ext cx="7552944" cy="6857990"/>
-          </a:xfrm>
-          <a:prstGeom prst="rect">
-            <a:avLst/>
-          </a:prstGeom>
-          <a:noFill/>
-          <a:effectLst/>
-          <a:extLst>
-            <a:ext uri="{909E8E84-426E-40DD-AFC4-6F175D3DCCD1}">
-              <a14:hiddenFill xmlns:a14="http://schemas.microsoft.com/office/drawing/2010/main">
-                <a:solidFill>
-                  <a:srgbClr val="FFFFFF"/>
-                </a:solidFill>
-              </a14:hiddenFill>
-            </a:ext>
-          </a:extLst>
-        </p:spPr>
-      </p:pic>
-      <p:sp>
-        <p:nvSpPr>
-          <p:cNvPr id="4" name="Rectangle 3">
-            <a:extLst>
-              <a:ext uri="{FF2B5EF4-FFF2-40B4-BE49-F238E27FC236}">
-                <a16:creationId xmlns:a16="http://schemas.microsoft.com/office/drawing/2014/main" id="{E5B601C6-36F3-4C38-BAEF-80EFE4CD5514}"/>
-              </a:ext>
-            </a:extLst>
-          </p:cNvPr>
-          <p:cNvSpPr/>
-          <p:nvPr/>
-        </p:nvSpPr>
-        <p:spPr>
-          <a:xfrm>
-            <a:off x="0" y="6356350"/>
-            <a:ext cx="4595038" cy="461665"/>
-          </a:xfrm>
-          <a:prstGeom prst="rect">
-            <a:avLst/>
-          </a:prstGeom>
-        </p:spPr>
-        <p:txBody>
-          <a:bodyPr wrap="square">
-            <a:spAutoFit/>
-          </a:bodyPr>
-          <a:lstStyle/>
-          <a:p>
-            <a:r>
-              <a:rPr lang="en-US" sz="1200" dirty="0"/>
-              <a:t>http://www.cidrap.umn.edu/news-perspective/2016/12/cdc-resistant-salmonella-causes-6200-illnesses-year</a:t>
-            </a:r>
-          </a:p>
-        </p:txBody>
-      </p:sp>
-    </p:spTree>
-    <p:extLst>
-      <p:ext uri="{BB962C8B-B14F-4D97-AF65-F5344CB8AC3E}">
-        <p14:creationId xmlns:p14="http://schemas.microsoft.com/office/powerpoint/2010/main" val="1298375012"/>
-      </p:ext>
-    </p:extLst>
-  </p:cSld>
-  <p:clrMapOvr>
-    <a:masterClrMapping/>
-  </p:clrMapOvr>
-</p:sld>
-</file>
-
-<file path=ppt/slides/slide20.xml><?xml version="1.0" encoding="utf-8"?>
-<p:sld xmlns:a="http://schemas.openxmlformats.org/drawingml/2006/main" xmlns:r="http://schemas.openxmlformats.org/officeDocument/2006/relationships" xmlns:p="http://schemas.openxmlformats.org/presentationml/2006/main">
-  <p:cSld>
-    <p:bg>
-      <p:bgPr>
-        <a:solidFill>
-          <a:schemeClr val="bg1">
-            <a:lumMod val="95000"/>
-          </a:schemeClr>
-        </a:solidFill>
-        <a:effectLst/>
-      </p:bgPr>
-    </p:bg>
-    <p:spTree>
-      <p:nvGrpSpPr>
-        <p:cNvPr id="1" name=""/>
-        <p:cNvGrpSpPr/>
-        <p:nvPr/>
-      </p:nvGrpSpPr>
-      <p:grpSpPr>
-        <a:xfrm>
-          <a:off x="0" y="0"/>
-          <a:ext cx="0" cy="0"/>
-          <a:chOff x="0" y="0"/>
-          <a:chExt cx="0" cy="0"/>
-        </a:xfrm>
-      </p:grpSpPr>
-      <p:sp>
-        <p:nvSpPr>
-          <p:cNvPr id="2" name="Title 1">
-            <a:extLst>
-              <a:ext uri="{FF2B5EF4-FFF2-40B4-BE49-F238E27FC236}">
-                <a16:creationId xmlns:a16="http://schemas.microsoft.com/office/drawing/2014/main" id="{16FD4388-182B-4A0D-A127-A6BF19C49727}"/>
-              </a:ext>
-            </a:extLst>
-          </p:cNvPr>
-          <p:cNvSpPr>
-            <a:spLocks noGrp="1"/>
-          </p:cNvSpPr>
-          <p:nvPr>
-            <p:ph type="title"/>
-          </p:nvPr>
-        </p:nvSpPr>
-        <p:spPr/>
-        <p:txBody>
-          <a:bodyPr/>
-          <a:lstStyle/>
-          <a:p>
-            <a:r>
-              <a:rPr lang="en-US" dirty="0"/>
-              <a:t>Shared genes between all </a:t>
-            </a:r>
-            <a:r>
-              <a:rPr lang="en-US" i="1" dirty="0"/>
-              <a:t>Salmonella</a:t>
-            </a:r>
-            <a:r>
-              <a:rPr lang="en-US" dirty="0"/>
-              <a:t> sp. except </a:t>
-            </a:r>
-            <a:r>
-              <a:rPr lang="en-US" i="1" dirty="0"/>
-              <a:t>S. </a:t>
-            </a:r>
-            <a:r>
-              <a:rPr lang="en-US" i="1" dirty="0" err="1"/>
-              <a:t>bongori</a:t>
-            </a:r>
-            <a:endParaRPr lang="en-US" dirty="0"/>
-          </a:p>
-        </p:txBody>
-      </p:sp>
-      <p:pic>
-        <p:nvPicPr>
-          <p:cNvPr id="5" name="Content Placeholder 4" descr="A screenshot of a cell phone&#10;&#10;Description automatically generated">
-            <a:extLst>
-              <a:ext uri="{FF2B5EF4-FFF2-40B4-BE49-F238E27FC236}">
-                <a16:creationId xmlns:a16="http://schemas.microsoft.com/office/drawing/2014/main" id="{F58417E9-F90B-4B8F-956A-1E09205B7981}"/>
-              </a:ext>
-            </a:extLst>
-          </p:cNvPr>
-          <p:cNvPicPr>
-            <a:picLocks noGrp="1" noChangeAspect="1"/>
-          </p:cNvPicPr>
-          <p:nvPr>
-            <p:ph idx="1"/>
-          </p:nvPr>
-        </p:nvPicPr>
-        <p:blipFill>
-          <a:blip r:embed="rId2">
-            <a:extLst>
-              <a:ext uri="{28A0092B-C50C-407E-A947-70E740481C1C}">
-                <a14:useLocalDpi xmlns:a14="http://schemas.microsoft.com/office/drawing/2010/main" val="0"/>
-              </a:ext>
-            </a:extLst>
-          </a:blip>
-          <a:stretch>
-            <a:fillRect/>
-          </a:stretch>
-        </p:blipFill>
-        <p:spPr>
-          <a:xfrm>
-            <a:off x="838200" y="2521091"/>
-            <a:ext cx="9772377" cy="3786796"/>
-          </a:xfrm>
-        </p:spPr>
-      </p:pic>
-      <p:sp>
-        <p:nvSpPr>
-          <p:cNvPr id="3" name="TextBox 2">
-            <a:extLst>
-              <a:ext uri="{FF2B5EF4-FFF2-40B4-BE49-F238E27FC236}">
-                <a16:creationId xmlns:a16="http://schemas.microsoft.com/office/drawing/2014/main" id="{CB5190C9-3731-475E-AB4E-5477DD3CC61C}"/>
-              </a:ext>
-            </a:extLst>
-          </p:cNvPr>
-          <p:cNvSpPr txBox="1"/>
-          <p:nvPr/>
-        </p:nvSpPr>
-        <p:spPr>
-          <a:xfrm>
-            <a:off x="1741161" y="2151759"/>
-            <a:ext cx="8869416" cy="369332"/>
-          </a:xfrm>
-          <a:prstGeom prst="rect">
-            <a:avLst/>
-          </a:prstGeom>
-          <a:noFill/>
-        </p:spPr>
-        <p:txBody>
-          <a:bodyPr wrap="none" rtlCol="0">
-            <a:spAutoFit/>
-          </a:bodyPr>
-          <a:lstStyle/>
-          <a:p>
-            <a:r>
-              <a:rPr lang="en-US" b="1" dirty="0"/>
-              <a:t>Type III Secretion System Effector Proteins </a:t>
-            </a:r>
-            <a:r>
-              <a:rPr lang="en-US" dirty="0"/>
-              <a:t>(necessary for virulence and invasion of host cells)</a:t>
-            </a:r>
-          </a:p>
-        </p:txBody>
-      </p:sp>
-    </p:spTree>
-    <p:extLst>
-      <p:ext uri="{BB962C8B-B14F-4D97-AF65-F5344CB8AC3E}">
-        <p14:creationId xmlns:p14="http://schemas.microsoft.com/office/powerpoint/2010/main" val="729264468"/>
       </p:ext>
     </p:extLst>
   </p:cSld>
@@ -7291,7 +8067,7 @@
           <p:cNvPr id="2" name="Title 1">
             <a:extLst>
               <a:ext uri="{FF2B5EF4-FFF2-40B4-BE49-F238E27FC236}">
-                <a16:creationId xmlns:a16="http://schemas.microsoft.com/office/drawing/2014/main" id="{0D26D5DC-7AED-4BF1-94B6-735BB92209A0}"/>
+                <a16:creationId xmlns:a16="http://schemas.microsoft.com/office/drawing/2014/main" id="{16FD4388-182B-4A0D-A127-A6BF19C49727}"/>
               </a:ext>
             </a:extLst>
           </p:cNvPr>
@@ -7308,30 +8084,35 @@
           <a:lstStyle/>
           <a:p>
             <a:r>
+              <a:rPr lang="en-US" dirty="0"/>
+              <a:t>Shared genes between all </a:t>
+            </a:r>
+            <a:r>
               <a:rPr lang="en-US" i="1" dirty="0"/>
-              <a:t>Salmonella enterica </a:t>
+              <a:t>Salmonella</a:t>
             </a:r>
             <a:r>
               <a:rPr lang="en-US" dirty="0"/>
-              <a:t>serovar </a:t>
-            </a:r>
-            <a:r>
-              <a:rPr lang="en-US" dirty="0" err="1"/>
-              <a:t>Abortusovis</a:t>
-            </a:r>
-            <a:r>
-              <a:rPr lang="en-US" dirty="0"/>
-              <a:t> SR44, new unique gene set?</a:t>
-            </a:r>
+              <a:t> sp. except </a:t>
+            </a:r>
+            <a:r>
+              <a:rPr lang="en-US" i="1" dirty="0"/>
+              <a:t>S. </a:t>
+            </a:r>
+            <a:r>
+              <a:rPr lang="en-US" i="1" dirty="0" err="1"/>
+              <a:t>bongori</a:t>
+            </a:r>
+            <a:endParaRPr lang="en-US" dirty="0"/>
           </a:p>
         </p:txBody>
       </p:sp>
       <p:pic>
         <p:nvPicPr>
-          <p:cNvPr id="5" name="Content Placeholder 4" descr="A screenshot of a social media post&#10;&#10;Description automatically generated">
-            <a:extLst>
-              <a:ext uri="{FF2B5EF4-FFF2-40B4-BE49-F238E27FC236}">
-                <a16:creationId xmlns:a16="http://schemas.microsoft.com/office/drawing/2014/main" id="{A92664BE-916F-4AB0-B988-EA086ADCA29B}"/>
+          <p:cNvPr id="5" name="Content Placeholder 4" descr="A screenshot of a cell phone&#10;&#10;Description automatically generated">
+            <a:extLst>
+              <a:ext uri="{FF2B5EF4-FFF2-40B4-BE49-F238E27FC236}">
+                <a16:creationId xmlns:a16="http://schemas.microsoft.com/office/drawing/2014/main" id="{F58417E9-F90B-4B8F-956A-1E09205B7981}"/>
               </a:ext>
             </a:extLst>
           </p:cNvPr>
@@ -7356,7 +8137,7 @@
         </p:blipFill>
         <p:spPr>
           <a:xfrm>
-            <a:off x="1209811" y="2409376"/>
+            <a:off x="838200" y="2521091"/>
             <a:ext cx="9772377" cy="3786796"/>
           </a:xfrm>
         </p:spPr>
@@ -7366,7 +8147,7 @@
           <p:cNvPr id="3" name="TextBox 2">
             <a:extLst>
               <a:ext uri="{FF2B5EF4-FFF2-40B4-BE49-F238E27FC236}">
-                <a16:creationId xmlns:a16="http://schemas.microsoft.com/office/drawing/2014/main" id="{96714CCA-E636-4CDB-9A5B-CEBB74F372E3}"/>
+                <a16:creationId xmlns:a16="http://schemas.microsoft.com/office/drawing/2014/main" id="{CB5190C9-3731-475E-AB4E-5477DD3CC61C}"/>
               </a:ext>
             </a:extLst>
           </p:cNvPr>
@@ -7375,8 +8156,8 @@
         </p:nvSpPr>
         <p:spPr>
           <a:xfrm>
-            <a:off x="4960595" y="1947711"/>
-            <a:ext cx="3198633" cy="461665"/>
+            <a:off x="1741161" y="2151759"/>
+            <a:ext cx="8869416" cy="369332"/>
           </a:xfrm>
           <a:prstGeom prst="rect">
             <a:avLst/>
@@ -7390,8 +8171,12 @@
           <a:lstStyle/>
           <a:p>
             <a:r>
-              <a:rPr lang="en-US" sz="2400" dirty="0"/>
-              <a:t>“Hypothetical Proteins” </a:t>
+              <a:rPr lang="en-US" b="1" dirty="0"/>
+              <a:t>Type III Secretion System Effector Proteins </a:t>
+            </a:r>
+            <a:r>
+              <a:rPr lang="en-US" dirty="0"/>
+              <a:t>(necessary for virulence and invasion of host cells)</a:t>
             </a:r>
           </a:p>
         </p:txBody>
@@ -7399,7 +8184,7 @@
     </p:spTree>
     <p:extLst>
       <p:ext uri="{BB962C8B-B14F-4D97-AF65-F5344CB8AC3E}">
-        <p14:creationId xmlns:p14="http://schemas.microsoft.com/office/powerpoint/2010/main" val="3306919570"/>
+        <p14:creationId xmlns:p14="http://schemas.microsoft.com/office/powerpoint/2010/main" val="729264468"/>
       </p:ext>
     </p:extLst>
   </p:cSld>
@@ -7441,7 +8226,7 @@
           <p:cNvPr id="2" name="Title 1">
             <a:extLst>
               <a:ext uri="{FF2B5EF4-FFF2-40B4-BE49-F238E27FC236}">
-                <a16:creationId xmlns:a16="http://schemas.microsoft.com/office/drawing/2014/main" id="{21409146-FD05-4552-990A-0FBEC104B494}"/>
+                <a16:creationId xmlns:a16="http://schemas.microsoft.com/office/drawing/2014/main" id="{0D26D5DC-7AED-4BF1-94B6-735BB92209A0}"/>
               </a:ext>
             </a:extLst>
           </p:cNvPr>
@@ -7458,12 +8243,134 @@
           <a:lstStyle/>
           <a:p>
             <a:r>
+              <a:rPr lang="en-US" i="1" dirty="0"/>
+              <a:t>Salmonella enterica </a:t>
+            </a:r>
+            <a:r>
               <a:rPr lang="en-US" dirty="0"/>
-              <a:t>Chloramphenicol resistance (continued)</a:t>
-            </a:r>
-          </a:p>
-        </p:txBody>
-      </p:sp>
+              <a:t>serovar </a:t>
+            </a:r>
+            <a:r>
+              <a:rPr lang="en-US" dirty="0" err="1"/>
+              <a:t>Abortusovis</a:t>
+            </a:r>
+            <a:r>
+              <a:rPr lang="en-US" dirty="0"/>
+              <a:t> SR44, new unique gene set?</a:t>
+            </a:r>
+          </a:p>
+        </p:txBody>
+      </p:sp>
+      <p:pic>
+        <p:nvPicPr>
+          <p:cNvPr id="5" name="Content Placeholder 4" descr="A screenshot of a social media post&#10;&#10;Description automatically generated">
+            <a:extLst>
+              <a:ext uri="{FF2B5EF4-FFF2-40B4-BE49-F238E27FC236}">
+                <a16:creationId xmlns:a16="http://schemas.microsoft.com/office/drawing/2014/main" id="{A92664BE-916F-4AB0-B988-EA086ADCA29B}"/>
+              </a:ext>
+            </a:extLst>
+          </p:cNvPr>
+          <p:cNvPicPr>
+            <a:picLocks noGrp="1" noChangeAspect="1"/>
+          </p:cNvPicPr>
+          <p:nvPr>
+            <p:ph idx="1"/>
+          </p:nvPr>
+        </p:nvPicPr>
+        <p:blipFill>
+          <a:blip r:embed="rId2">
+            <a:extLst>
+              <a:ext uri="{28A0092B-C50C-407E-A947-70E740481C1C}">
+                <a14:useLocalDpi xmlns:a14="http://schemas.microsoft.com/office/drawing/2010/main" val="0"/>
+              </a:ext>
+            </a:extLst>
+          </a:blip>
+          <a:stretch>
+            <a:fillRect/>
+          </a:stretch>
+        </p:blipFill>
+        <p:spPr>
+          <a:xfrm>
+            <a:off x="1209811" y="2409376"/>
+            <a:ext cx="9772377" cy="3786796"/>
+          </a:xfrm>
+        </p:spPr>
+      </p:pic>
+      <p:sp>
+        <p:nvSpPr>
+          <p:cNvPr id="3" name="TextBox 2">
+            <a:extLst>
+              <a:ext uri="{FF2B5EF4-FFF2-40B4-BE49-F238E27FC236}">
+                <a16:creationId xmlns:a16="http://schemas.microsoft.com/office/drawing/2014/main" id="{96714CCA-E636-4CDB-9A5B-CEBB74F372E3}"/>
+              </a:ext>
+            </a:extLst>
+          </p:cNvPr>
+          <p:cNvSpPr txBox="1"/>
+          <p:nvPr/>
+        </p:nvSpPr>
+        <p:spPr>
+          <a:xfrm>
+            <a:off x="4960595" y="1947711"/>
+            <a:ext cx="3198633" cy="461665"/>
+          </a:xfrm>
+          <a:prstGeom prst="rect">
+            <a:avLst/>
+          </a:prstGeom>
+          <a:noFill/>
+        </p:spPr>
+        <p:txBody>
+          <a:bodyPr wrap="none" rtlCol="0">
+            <a:spAutoFit/>
+          </a:bodyPr>
+          <a:lstStyle/>
+          <a:p>
+            <a:r>
+              <a:rPr lang="en-US" sz="2400" dirty="0"/>
+              <a:t>“Hypothetical Proteins” </a:t>
+            </a:r>
+          </a:p>
+        </p:txBody>
+      </p:sp>
+    </p:spTree>
+    <p:extLst>
+      <p:ext uri="{BB962C8B-B14F-4D97-AF65-F5344CB8AC3E}">
+        <p14:creationId xmlns:p14="http://schemas.microsoft.com/office/powerpoint/2010/main" val="3306919570"/>
+      </p:ext>
+    </p:extLst>
+  </p:cSld>
+  <p:clrMapOvr>
+    <a:masterClrMapping/>
+  </p:clrMapOvr>
+</p:sld>
+</file>
+
+<file path=ppt/slides/slide23.xml><?xml version="1.0" encoding="utf-8"?>
+<p:sld xmlns:a="http://schemas.openxmlformats.org/drawingml/2006/main" xmlns:r="http://schemas.openxmlformats.org/officeDocument/2006/relationships" xmlns:p="http://schemas.openxmlformats.org/presentationml/2006/main">
+  <p:cSld>
+    <p:bg>
+      <p:bgPr>
+        <a:solidFill>
+          <a:schemeClr val="bg1">
+            <a:lumMod val="95000"/>
+          </a:schemeClr>
+        </a:solidFill>
+        <a:effectLst/>
+      </p:bgPr>
+    </p:bg>
+    <p:spTree>
+      <p:nvGrpSpPr>
+        <p:cNvPr id="1" name=""/>
+        <p:cNvGrpSpPr/>
+        <p:nvPr/>
+      </p:nvGrpSpPr>
+      <p:grpSpPr>
+        <a:xfrm>
+          <a:off x="0" y="0"/>
+          <a:ext cx="0" cy="0"/>
+          <a:chOff x="0" y="0"/>
+          <a:chExt cx="0" cy="0"/>
+        </a:xfrm>
+      </p:grpSpPr>
       <p:pic>
         <p:nvPicPr>
           <p:cNvPr id="5" name="Content Placeholder 4" descr="A screenshot of a cell phone&#10;&#10;Description automatically generated">
@@ -7718,6 +8625,65 @@
           </a:p>
         </p:txBody>
       </p:sp>
+      <p:sp>
+        <p:nvSpPr>
+          <p:cNvPr id="9" name="Title 1">
+            <a:extLst>
+              <a:ext uri="{FF2B5EF4-FFF2-40B4-BE49-F238E27FC236}">
+                <a16:creationId xmlns:a16="http://schemas.microsoft.com/office/drawing/2014/main" id="{6DB4D8DB-6FEA-4BF3-8948-6A10D050A9EA}"/>
+              </a:ext>
+            </a:extLst>
+          </p:cNvPr>
+          <p:cNvSpPr>
+            <a:spLocks noGrp="1"/>
+          </p:cNvSpPr>
+          <p:nvPr>
+            <p:ph type="title"/>
+          </p:nvPr>
+        </p:nvSpPr>
+        <p:spPr>
+          <a:xfrm>
+            <a:off x="692426" y="0"/>
+            <a:ext cx="10515600" cy="1660623"/>
+          </a:xfrm>
+        </p:spPr>
+        <p:txBody>
+          <a:bodyPr>
+            <a:normAutofit fontScale="90000"/>
+          </a:bodyPr>
+          <a:lstStyle/>
+          <a:p>
+            <a:r>
+              <a:rPr lang="en-US" dirty="0"/>
+              <a:t>Chloramphenicol resistance: </a:t>
+            </a:r>
+            <a:br>
+              <a:rPr lang="en-US" dirty="0"/>
+            </a:br>
+            <a:r>
+              <a:rPr lang="en-US" sz="3600" dirty="0"/>
+              <a:t>Shared by </a:t>
+            </a:r>
+            <a:r>
+              <a:rPr lang="en-US" sz="3600" dirty="0" err="1"/>
+              <a:t>Choleraesuis</a:t>
+            </a:r>
+            <a:r>
+              <a:rPr lang="en-US" sz="3600" dirty="0"/>
+              <a:t> SCB67 and </a:t>
+            </a:r>
+            <a:r>
+              <a:rPr lang="en-US" sz="3600" dirty="0" err="1"/>
+              <a:t>Schwarzengrund</a:t>
+            </a:r>
+            <a:r>
+              <a:rPr lang="en-US" sz="3600" dirty="0"/>
+              <a:t> CVM19633</a:t>
+            </a:r>
+            <a:endParaRPr lang="en-US" dirty="0"/>
+          </a:p>
+        </p:txBody>
+      </p:sp>
     </p:spTree>
     <p:extLst>
       <p:ext uri="{BB962C8B-B14F-4D97-AF65-F5344CB8AC3E}">
@@ -7731,7 +8697,7 @@
 </p:sld>
 </file>
 
-<file path=ppt/slides/slide23.xml><?xml version="1.0" encoding="utf-8"?>
+<file path=ppt/slides/slide24.xml><?xml version="1.0" encoding="utf-8"?>
 <p:sld xmlns:a="http://schemas.openxmlformats.org/drawingml/2006/main" xmlns:r="http://schemas.openxmlformats.org/officeDocument/2006/relationships" xmlns:p="http://schemas.openxmlformats.org/presentationml/2006/main">
   <p:cSld>
     <p:bg>
@@ -8044,7 +9010,7 @@
 </p:sld>
 </file>
 
-<file path=ppt/slides/slide24.xml><?xml version="1.0" encoding="utf-8"?>
+<file path=ppt/slides/slide25.xml><?xml version="1.0" encoding="utf-8"?>
 <p:sld xmlns:a="http://schemas.openxmlformats.org/drawingml/2006/main" xmlns:r="http://schemas.openxmlformats.org/officeDocument/2006/relationships" xmlns:p="http://schemas.openxmlformats.org/presentationml/2006/main">
   <p:cSld>
     <p:bg>
@@ -8071,49 +9037,6 @@
           <a:chExt cx="0" cy="0"/>
         </a:xfrm>
       </p:grpSpPr>
-      <p:sp>
-        <p:nvSpPr>
-          <p:cNvPr id="2" name="Title 1">
-            <a:extLst>
-              <a:ext uri="{FF2B5EF4-FFF2-40B4-BE49-F238E27FC236}">
-                <a16:creationId xmlns:a16="http://schemas.microsoft.com/office/drawing/2014/main" id="{B8A73EC2-D547-4DDF-818F-F356ABCC64D1}"/>
-              </a:ext>
-            </a:extLst>
-          </p:cNvPr>
-          <p:cNvSpPr>
-            <a:spLocks noGrp="1"/>
-          </p:cNvSpPr>
-          <p:nvPr>
-            <p:ph type="title"/>
-          </p:nvPr>
-        </p:nvSpPr>
-        <p:spPr>
-          <a:xfrm>
-            <a:off x="692426" y="0"/>
-            <a:ext cx="10515600" cy="1660623"/>
-          </a:xfrm>
-        </p:spPr>
-        <p:txBody>
-          <a:bodyPr>
-            <a:normAutofit fontScale="90000"/>
-          </a:bodyPr>
-          <a:lstStyle/>
-          <a:p>
-            <a:r>
-              <a:rPr lang="en-US"/>
-              <a:t>Chloramphenicol resistance: </a:t>
-            </a:r>
-            <a:br>
-              <a:rPr lang="en-US"/>
-            </a:br>
-            <a:r>
-              <a:rPr lang="en-US" sz="3600"/>
-              <a:t>Shared by Choleraesuis SCB67 and Schwarzengrund CVM19633</a:t>
-            </a:r>
-            <a:endParaRPr lang="en-US" dirty="0"/>
-          </a:p>
-        </p:txBody>
-      </p:sp>
       <p:pic>
         <p:nvPicPr>
           <p:cNvPr id="5" name="Content Placeholder 4" descr="A screenshot of a cell phone&#10;&#10;Description automatically generated">
@@ -8249,10 +9172,451 @@
           </a:p>
         </p:txBody>
       </p:sp>
+      <p:sp>
+        <p:nvSpPr>
+          <p:cNvPr id="7" name="Title 1">
+            <a:extLst>
+              <a:ext uri="{FF2B5EF4-FFF2-40B4-BE49-F238E27FC236}">
+                <a16:creationId xmlns:a16="http://schemas.microsoft.com/office/drawing/2014/main" id="{D72AA806-6A3A-4DE2-890E-71F520F4921A}"/>
+              </a:ext>
+            </a:extLst>
+          </p:cNvPr>
+          <p:cNvSpPr txBox="1">
+            <a:spLocks/>
+          </p:cNvSpPr>
+          <p:nvPr/>
+        </p:nvSpPr>
+        <p:spPr>
+          <a:xfrm>
+            <a:off x="838200" y="365125"/>
+            <a:ext cx="10515600" cy="1325563"/>
+          </a:xfrm>
+          <a:prstGeom prst="rect">
+            <a:avLst/>
+          </a:prstGeom>
+        </p:spPr>
+        <p:txBody>
+          <a:bodyPr vert="horz" lIns="91440" tIns="45720" rIns="91440" bIns="45720" rtlCol="0" anchor="ctr">
+            <a:normAutofit/>
+          </a:bodyPr>
+          <a:lstStyle>
+            <a:lvl1pPr algn="l" defTabSz="914400" rtl="0" eaLnBrk="1" latinLnBrk="0" hangingPunct="1">
+              <a:lnSpc>
+                <a:spcPct val="90000"/>
+              </a:lnSpc>
+              <a:spcBef>
+                <a:spcPct val="0"/>
+              </a:spcBef>
+              <a:buNone/>
+              <a:defRPr sz="4400" kern="1200">
+                <a:solidFill>
+                  <a:schemeClr val="tx1"/>
+                </a:solidFill>
+                <a:latin typeface="+mj-lt"/>
+                <a:ea typeface="+mj-ea"/>
+                <a:cs typeface="+mj-cs"/>
+              </a:defRPr>
+            </a:lvl1pPr>
+          </a:lstStyle>
+          <a:p>
+            <a:r>
+              <a:rPr lang="en-US"/>
+              <a:t>Chloramphenicol resistance (continued)</a:t>
+            </a:r>
+            <a:endParaRPr lang="en-US" dirty="0"/>
+          </a:p>
+        </p:txBody>
+      </p:sp>
     </p:spTree>
     <p:extLst>
       <p:ext uri="{BB962C8B-B14F-4D97-AF65-F5344CB8AC3E}">
         <p14:creationId xmlns:p14="http://schemas.microsoft.com/office/powerpoint/2010/main" val="3226484819"/>
+      </p:ext>
+    </p:extLst>
+  </p:cSld>
+  <p:clrMapOvr>
+    <a:masterClrMapping/>
+  </p:clrMapOvr>
+</p:sld>
+</file>
+
+<file path=ppt/slides/slide26.xml><?xml version="1.0" encoding="utf-8"?>
+<p:sld xmlns:a="http://schemas.openxmlformats.org/drawingml/2006/main" xmlns:r="http://schemas.openxmlformats.org/officeDocument/2006/relationships" xmlns:p="http://schemas.openxmlformats.org/presentationml/2006/main">
+  <p:cSld>
+    <p:bg>
+      <p:bgPr>
+        <a:solidFill>
+          <a:schemeClr val="bg1">
+            <a:lumMod val="95000"/>
+          </a:schemeClr>
+        </a:solidFill>
+        <a:effectLst/>
+      </p:bgPr>
+    </p:bg>
+    <p:spTree>
+      <p:nvGrpSpPr>
+        <p:cNvPr id="1" name=""/>
+        <p:cNvGrpSpPr/>
+        <p:nvPr/>
+      </p:nvGrpSpPr>
+      <p:grpSpPr>
+        <a:xfrm>
+          <a:off x="0" y="0"/>
+          <a:ext cx="0" cy="0"/>
+          <a:chOff x="0" y="0"/>
+          <a:chExt cx="0" cy="0"/>
+        </a:xfrm>
+      </p:grpSpPr>
+      <p:sp>
+        <p:nvSpPr>
+          <p:cNvPr id="2" name="Title 1">
+            <a:extLst>
+              <a:ext uri="{FF2B5EF4-FFF2-40B4-BE49-F238E27FC236}">
+                <a16:creationId xmlns:a16="http://schemas.microsoft.com/office/drawing/2014/main" id="{5C631BF1-F486-4129-82A6-19D4EA9A7673}"/>
+              </a:ext>
+            </a:extLst>
+          </p:cNvPr>
+          <p:cNvSpPr>
+            <a:spLocks noGrp="1"/>
+          </p:cNvSpPr>
+          <p:nvPr>
+            <p:ph type="title"/>
+          </p:nvPr>
+        </p:nvSpPr>
+        <p:spPr/>
+        <p:txBody>
+          <a:bodyPr/>
+          <a:lstStyle/>
+          <a:p>
+            <a:r>
+              <a:rPr lang="en-US" dirty="0"/>
+              <a:t>Challenges/ Difficulties/ Caveats</a:t>
+            </a:r>
+          </a:p>
+        </p:txBody>
+      </p:sp>
+      <p:sp>
+        <p:nvSpPr>
+          <p:cNvPr id="3" name="Content Placeholder 2">
+            <a:extLst>
+              <a:ext uri="{FF2B5EF4-FFF2-40B4-BE49-F238E27FC236}">
+                <a16:creationId xmlns:a16="http://schemas.microsoft.com/office/drawing/2014/main" id="{C1A6110F-B865-4334-B83A-7BC61CC3316D}"/>
+              </a:ext>
+            </a:extLst>
+          </p:cNvPr>
+          <p:cNvSpPr>
+            <a:spLocks noGrp="1"/>
+          </p:cNvSpPr>
+          <p:nvPr>
+            <p:ph idx="1"/>
+          </p:nvPr>
+        </p:nvSpPr>
+        <p:spPr/>
+        <p:txBody>
+          <a:bodyPr>
+            <a:normAutofit fontScale="92500" lnSpcReduction="20000"/>
+          </a:bodyPr>
+          <a:lstStyle/>
+          <a:p>
+            <a:r>
+              <a:rPr lang="en-US" dirty="0"/>
+              <a:t>Experimental</a:t>
+            </a:r>
+          </a:p>
+          <a:p>
+            <a:pPr lvl="1"/>
+            <a:r>
+              <a:rPr lang="en-US" dirty="0"/>
+              <a:t>Some virulence genes may be “house-keeping” essential genes </a:t>
+            </a:r>
+          </a:p>
+          <a:p>
+            <a:pPr lvl="1"/>
+            <a:r>
+              <a:rPr lang="en-US" dirty="0"/>
+              <a:t>Can run into issues with draft genome assembly/ coverage</a:t>
+            </a:r>
+          </a:p>
+          <a:p>
+            <a:pPr lvl="2"/>
+            <a:r>
+              <a:rPr lang="en-US" dirty="0"/>
+              <a:t>Show as missing an AGE, when in reality it may share it</a:t>
+            </a:r>
+          </a:p>
+          <a:p>
+            <a:pPr lvl="1"/>
+            <a:r>
+              <a:rPr lang="en-US" dirty="0"/>
+              <a:t>HGT in bacteria makes genomic comparison and evolutionary relationships difficult (or does it?)</a:t>
+            </a:r>
+          </a:p>
+          <a:p>
+            <a:endParaRPr lang="en-US" dirty="0"/>
+          </a:p>
+          <a:p>
+            <a:r>
+              <a:rPr lang="en-US" dirty="0"/>
+              <a:t>Computing Side</a:t>
+            </a:r>
+          </a:p>
+          <a:p>
+            <a:pPr lvl="1"/>
+            <a:r>
+              <a:rPr lang="en-US" dirty="0"/>
+              <a:t>Programs don’t want to run sometimes</a:t>
+            </a:r>
+          </a:p>
+          <a:p>
+            <a:pPr lvl="1"/>
+            <a:r>
+              <a:rPr lang="en-US" dirty="0"/>
+              <a:t>Missing dependencies/ working on WSL instead of Linux OS/ Issues navigating</a:t>
+            </a:r>
+          </a:p>
+          <a:p>
+            <a:pPr lvl="1"/>
+            <a:r>
+              <a:rPr lang="en-US" dirty="0"/>
+              <a:t>Could be more efficient with better automation/ shell scripts</a:t>
+            </a:r>
+          </a:p>
+          <a:p>
+            <a:pPr lvl="1"/>
+            <a:r>
+              <a:rPr lang="en-US" dirty="0"/>
+              <a:t>Limited personal knowledge of software available, what is accepted to use, caveats of each program</a:t>
+            </a:r>
+          </a:p>
+        </p:txBody>
+      </p:sp>
+    </p:spTree>
+    <p:extLst>
+      <p:ext uri="{BB962C8B-B14F-4D97-AF65-F5344CB8AC3E}">
+        <p14:creationId xmlns:p14="http://schemas.microsoft.com/office/powerpoint/2010/main" val="3352845037"/>
+      </p:ext>
+    </p:extLst>
+  </p:cSld>
+  <p:clrMapOvr>
+    <a:masterClrMapping/>
+  </p:clrMapOvr>
+</p:sld>
+</file>
+
+<file path=ppt/slides/slide27.xml><?xml version="1.0" encoding="utf-8"?>
+<p:sld xmlns:a="http://schemas.openxmlformats.org/drawingml/2006/main" xmlns:r="http://schemas.openxmlformats.org/officeDocument/2006/relationships" xmlns:p="http://schemas.openxmlformats.org/presentationml/2006/main">
+  <p:cSld>
+    <p:bg>
+      <p:bgPr>
+        <a:solidFill>
+          <a:schemeClr val="bg1">
+            <a:lumMod val="95000"/>
+          </a:schemeClr>
+        </a:solidFill>
+        <a:effectLst/>
+      </p:bgPr>
+    </p:bg>
+    <p:spTree>
+      <p:nvGrpSpPr>
+        <p:cNvPr id="1" name=""/>
+        <p:cNvGrpSpPr/>
+        <p:nvPr/>
+      </p:nvGrpSpPr>
+      <p:grpSpPr>
+        <a:xfrm>
+          <a:off x="0" y="0"/>
+          <a:ext cx="0" cy="0"/>
+          <a:chOff x="0" y="0"/>
+          <a:chExt cx="0" cy="0"/>
+        </a:xfrm>
+      </p:grpSpPr>
+      <p:sp>
+        <p:nvSpPr>
+          <p:cNvPr id="2" name="Title 1">
+            <a:extLst>
+              <a:ext uri="{FF2B5EF4-FFF2-40B4-BE49-F238E27FC236}">
+                <a16:creationId xmlns:a16="http://schemas.microsoft.com/office/drawing/2014/main" id="{5C631BF1-F486-4129-82A6-19D4EA9A7673}"/>
+              </a:ext>
+            </a:extLst>
+          </p:cNvPr>
+          <p:cNvSpPr>
+            <a:spLocks noGrp="1"/>
+          </p:cNvSpPr>
+          <p:nvPr>
+            <p:ph type="title"/>
+          </p:nvPr>
+        </p:nvSpPr>
+        <p:spPr/>
+        <p:txBody>
+          <a:bodyPr/>
+          <a:lstStyle/>
+          <a:p>
+            <a:r>
+              <a:rPr lang="en-US" dirty="0"/>
+              <a:t>Conclusions and Moving Forward</a:t>
+            </a:r>
+          </a:p>
+        </p:txBody>
+      </p:sp>
+      <p:sp>
+        <p:nvSpPr>
+          <p:cNvPr id="3" name="Content Placeholder 2">
+            <a:extLst>
+              <a:ext uri="{FF2B5EF4-FFF2-40B4-BE49-F238E27FC236}">
+                <a16:creationId xmlns:a16="http://schemas.microsoft.com/office/drawing/2014/main" id="{C1A6110F-B865-4334-B83A-7BC61CC3316D}"/>
+              </a:ext>
+            </a:extLst>
+          </p:cNvPr>
+          <p:cNvSpPr>
+            <a:spLocks noGrp="1"/>
+          </p:cNvSpPr>
+          <p:nvPr>
+            <p:ph idx="1"/>
+          </p:nvPr>
+        </p:nvSpPr>
+        <p:spPr/>
+        <p:txBody>
+          <a:bodyPr/>
+          <a:lstStyle/>
+          <a:p>
+            <a:r>
+              <a:rPr lang="en-US" dirty="0"/>
+              <a:t>Strong pipeline to analyze pathogenic bacteria with many genomes available</a:t>
+            </a:r>
+          </a:p>
+          <a:p>
+            <a:r>
+              <a:rPr lang="en-US" dirty="0"/>
+              <a:t>Ability to analyze new draft genomes and find relationships based on accessory genome components not shared between closely related strains</a:t>
+            </a:r>
+          </a:p>
+          <a:p>
+            <a:r>
+              <a:rPr lang="en-US" dirty="0"/>
+              <a:t>Can use the data I found to:</a:t>
+            </a:r>
+          </a:p>
+          <a:p>
+            <a:pPr lvl="1"/>
+            <a:r>
+              <a:rPr lang="en-US" dirty="0"/>
+              <a:t>Discover relationships between </a:t>
+            </a:r>
+            <a:r>
+              <a:rPr lang="en-US" i="1" dirty="0"/>
+              <a:t>Salmonella </a:t>
+            </a:r>
+            <a:r>
+              <a:rPr lang="en-US" dirty="0"/>
+              <a:t> serovars</a:t>
+            </a:r>
+          </a:p>
+          <a:p>
+            <a:pPr lvl="1"/>
+            <a:r>
+              <a:rPr lang="en-US" dirty="0"/>
+              <a:t>Find shared or novel genes or regulatory regions affecting bacterial host-specific pathogenesis</a:t>
+            </a:r>
+          </a:p>
+        </p:txBody>
+      </p:sp>
+    </p:spTree>
+    <p:extLst>
+      <p:ext uri="{BB962C8B-B14F-4D97-AF65-F5344CB8AC3E}">
+        <p14:creationId xmlns:p14="http://schemas.microsoft.com/office/powerpoint/2010/main" val="3962565379"/>
+      </p:ext>
+    </p:extLst>
+  </p:cSld>
+  <p:clrMapOvr>
+    <a:masterClrMapping/>
+  </p:clrMapOvr>
+</p:sld>
+</file>
+
+<file path=ppt/slides/slide28.xml><?xml version="1.0" encoding="utf-8"?>
+<p:sld xmlns:a="http://schemas.openxmlformats.org/drawingml/2006/main" xmlns:r="http://schemas.openxmlformats.org/officeDocument/2006/relationships" xmlns:p="http://schemas.openxmlformats.org/presentationml/2006/main">
+  <p:cSld>
+    <p:bg>
+      <p:bgPr>
+        <a:solidFill>
+          <a:schemeClr val="bg1">
+            <a:lumMod val="95000"/>
+          </a:schemeClr>
+        </a:solidFill>
+        <a:effectLst/>
+      </p:bgPr>
+    </p:bg>
+    <p:spTree>
+      <p:nvGrpSpPr>
+        <p:cNvPr id="1" name=""/>
+        <p:cNvGrpSpPr/>
+        <p:nvPr/>
+      </p:nvGrpSpPr>
+      <p:grpSpPr>
+        <a:xfrm>
+          <a:off x="0" y="0"/>
+          <a:ext cx="0" cy="0"/>
+          <a:chOff x="0" y="0"/>
+          <a:chExt cx="0" cy="0"/>
+        </a:xfrm>
+      </p:grpSpPr>
+      <p:sp>
+        <p:nvSpPr>
+          <p:cNvPr id="2" name="Title 1">
+            <a:extLst>
+              <a:ext uri="{FF2B5EF4-FFF2-40B4-BE49-F238E27FC236}">
+                <a16:creationId xmlns:a16="http://schemas.microsoft.com/office/drawing/2014/main" id="{5C631BF1-F486-4129-82A6-19D4EA9A7673}"/>
+              </a:ext>
+            </a:extLst>
+          </p:cNvPr>
+          <p:cNvSpPr>
+            <a:spLocks noGrp="1"/>
+          </p:cNvSpPr>
+          <p:nvPr>
+            <p:ph type="title"/>
+          </p:nvPr>
+        </p:nvSpPr>
+        <p:spPr/>
+        <p:txBody>
+          <a:bodyPr/>
+          <a:lstStyle/>
+          <a:p>
+            <a:r>
+              <a:rPr lang="en-US" dirty="0"/>
+              <a:t>Thank you!</a:t>
+            </a:r>
+          </a:p>
+        </p:txBody>
+      </p:sp>
+      <p:sp>
+        <p:nvSpPr>
+          <p:cNvPr id="5" name="Content Placeholder 4">
+            <a:extLst>
+              <a:ext uri="{FF2B5EF4-FFF2-40B4-BE49-F238E27FC236}">
+                <a16:creationId xmlns:a16="http://schemas.microsoft.com/office/drawing/2014/main" id="{668D9C98-9BD1-47F5-8DBE-421A1AD557DD}"/>
+              </a:ext>
+            </a:extLst>
+          </p:cNvPr>
+          <p:cNvSpPr>
+            <a:spLocks noGrp="1"/>
+          </p:cNvSpPr>
+          <p:nvPr>
+            <p:ph idx="1"/>
+          </p:nvPr>
+        </p:nvSpPr>
+        <p:spPr/>
+        <p:txBody>
+          <a:bodyPr/>
+          <a:lstStyle/>
+          <a:p>
+            <a:endParaRPr lang="en-US"/>
+          </a:p>
+        </p:txBody>
+      </p:sp>
+    </p:spTree>
+    <p:extLst>
+      <p:ext uri="{BB962C8B-B14F-4D97-AF65-F5344CB8AC3E}">
+        <p14:creationId xmlns:p14="http://schemas.microsoft.com/office/powerpoint/2010/main" val="1750220034"/>
       </p:ext>
     </p:extLst>
   </p:cSld>
@@ -8491,7 +9855,7 @@
           <a:graphicData uri="http://schemas.openxmlformats.org/presentationml/2006/ole">
             <mc:AlternateContent xmlns:mc="http://schemas.openxmlformats.org/markup-compatibility/2006">
               <mc:Choice xmlns:v="urn:schemas-microsoft-com:vml" Requires="v">
-                <p:oleObj spid="_x0000_s4132" name="Presentation" r:id="rId3" imgW="5038285" imgH="3777990" progId="PowerPoint.Show.8">
+                <p:oleObj spid="_x0000_s4145" name="Presentation" r:id="rId3" imgW="5038285" imgH="3777990" progId="PowerPoint.Show.8">
                   <p:embed/>
                 </p:oleObj>
               </mc:Choice>
@@ -10112,7 +11476,7 @@
           <a:graphicData uri="http://schemas.openxmlformats.org/presentationml/2006/ole">
             <mc:AlternateContent xmlns:mc="http://schemas.openxmlformats.org/markup-compatibility/2006">
               <mc:Choice xmlns:v="urn:schemas-microsoft-com:vml" Requires="v">
-                <p:oleObj spid="_x0000_s3111" name="Acrobat Document" r:id="rId3" imgW="4800230" imgH="3562037" progId="AcroExch.Document.DC">
+                <p:oleObj spid="_x0000_s3124" name="Acrobat Document" r:id="rId3" imgW="4800230" imgH="3562037" progId="AcroExch.Document.DC">
                   <p:embed/>
                 </p:oleObj>
               </mc:Choice>
@@ -10265,7 +11629,7 @@
           <a:graphicData uri="http://schemas.openxmlformats.org/presentationml/2006/ole">
             <mc:AlternateContent xmlns:mc="http://schemas.openxmlformats.org/markup-compatibility/2006">
               <mc:Choice xmlns:v="urn:schemas-microsoft-com:vml" Requires="v">
-                <p:oleObj spid="_x0000_s1064" name="Acrobat Document" r:id="rId3" imgW="4552639" imgH="3562037" progId="AcroExch.Document.DC">
+                <p:oleObj spid="_x0000_s1077" name="Acrobat Document" r:id="rId3" imgW="4552639" imgH="3562037" progId="AcroExch.Document.DC">
                   <p:embed/>
                 </p:oleObj>
               </mc:Choice>

</xml_diff>

<commit_message>
Updated ppt; Updated Readme file (citations, methods, results, data, issues)
</commit_message>
<xml_diff>
--- a/190425_Verdegaal_EEB723_project.pptx
+++ b/190425_Verdegaal_EEB723_project.pptx
@@ -31,8 +31,9 @@
     <p:sldId id="275" r:id="rId25"/>
     <p:sldId id="260" r:id="rId26"/>
     <p:sldId id="284" r:id="rId27"/>
-    <p:sldId id="283" r:id="rId28"/>
-    <p:sldId id="285" r:id="rId29"/>
+    <p:sldId id="286" r:id="rId28"/>
+    <p:sldId id="283" r:id="rId29"/>
+    <p:sldId id="285" r:id="rId30"/>
   </p:sldIdLst>
   <p:sldSz cx="12192000" cy="6858000"/>
   <p:notesSz cx="6858000" cy="9144000"/>
@@ -286,7 +287,7 @@
           <a:p>
             <a:fld id="{324A5D12-1C84-4738-8CCF-DFBF95DC265C}" type="datetimeFigureOut">
               <a:rPr lang="en-US" smtClean="0"/>
-              <a:t>4/20/2019</a:t>
+              <a:t>4/21/2019</a:t>
             </a:fld>
             <a:endParaRPr lang="en-US"/>
           </a:p>
@@ -484,7 +485,7 @@
           <a:p>
             <a:fld id="{324A5D12-1C84-4738-8CCF-DFBF95DC265C}" type="datetimeFigureOut">
               <a:rPr lang="en-US" smtClean="0"/>
-              <a:t>4/20/2019</a:t>
+              <a:t>4/21/2019</a:t>
             </a:fld>
             <a:endParaRPr lang="en-US"/>
           </a:p>
@@ -692,7 +693,7 @@
           <a:p>
             <a:fld id="{324A5D12-1C84-4738-8CCF-DFBF95DC265C}" type="datetimeFigureOut">
               <a:rPr lang="en-US" smtClean="0"/>
-              <a:t>4/20/2019</a:t>
+              <a:t>4/21/2019</a:t>
             </a:fld>
             <a:endParaRPr lang="en-US"/>
           </a:p>
@@ -890,7 +891,7 @@
           <a:p>
             <a:fld id="{324A5D12-1C84-4738-8CCF-DFBF95DC265C}" type="datetimeFigureOut">
               <a:rPr lang="en-US" smtClean="0"/>
-              <a:t>4/20/2019</a:t>
+              <a:t>4/21/2019</a:t>
             </a:fld>
             <a:endParaRPr lang="en-US"/>
           </a:p>
@@ -1165,7 +1166,7 @@
           <a:p>
             <a:fld id="{324A5D12-1C84-4738-8CCF-DFBF95DC265C}" type="datetimeFigureOut">
               <a:rPr lang="en-US" smtClean="0"/>
-              <a:t>4/20/2019</a:t>
+              <a:t>4/21/2019</a:t>
             </a:fld>
             <a:endParaRPr lang="en-US"/>
           </a:p>
@@ -1430,7 +1431,7 @@
           <a:p>
             <a:fld id="{324A5D12-1C84-4738-8CCF-DFBF95DC265C}" type="datetimeFigureOut">
               <a:rPr lang="en-US" smtClean="0"/>
-              <a:t>4/20/2019</a:t>
+              <a:t>4/21/2019</a:t>
             </a:fld>
             <a:endParaRPr lang="en-US"/>
           </a:p>
@@ -1842,7 +1843,7 @@
           <a:p>
             <a:fld id="{324A5D12-1C84-4738-8CCF-DFBF95DC265C}" type="datetimeFigureOut">
               <a:rPr lang="en-US" smtClean="0"/>
-              <a:t>4/20/2019</a:t>
+              <a:t>4/21/2019</a:t>
             </a:fld>
             <a:endParaRPr lang="en-US"/>
           </a:p>
@@ -1983,7 +1984,7 @@
           <a:p>
             <a:fld id="{324A5D12-1C84-4738-8CCF-DFBF95DC265C}" type="datetimeFigureOut">
               <a:rPr lang="en-US" smtClean="0"/>
-              <a:t>4/20/2019</a:t>
+              <a:t>4/21/2019</a:t>
             </a:fld>
             <a:endParaRPr lang="en-US"/>
           </a:p>
@@ -2096,7 +2097,7 @@
           <a:p>
             <a:fld id="{324A5D12-1C84-4738-8CCF-DFBF95DC265C}" type="datetimeFigureOut">
               <a:rPr lang="en-US" smtClean="0"/>
-              <a:t>4/20/2019</a:t>
+              <a:t>4/21/2019</a:t>
             </a:fld>
             <a:endParaRPr lang="en-US"/>
           </a:p>
@@ -2407,7 +2408,7 @@
           <a:p>
             <a:fld id="{324A5D12-1C84-4738-8CCF-DFBF95DC265C}" type="datetimeFigureOut">
               <a:rPr lang="en-US" smtClean="0"/>
-              <a:t>4/20/2019</a:t>
+              <a:t>4/21/2019</a:t>
             </a:fld>
             <a:endParaRPr lang="en-US"/>
           </a:p>
@@ -2695,7 +2696,7 @@
           <a:p>
             <a:fld id="{324A5D12-1C84-4738-8CCF-DFBF95DC265C}" type="datetimeFigureOut">
               <a:rPr lang="en-US" smtClean="0"/>
-              <a:t>4/20/2019</a:t>
+              <a:t>4/21/2019</a:t>
             </a:fld>
             <a:endParaRPr lang="en-US"/>
           </a:p>
@@ -2936,7 +2937,7 @@
           <a:p>
             <a:fld id="{324A5D12-1C84-4738-8CCF-DFBF95DC265C}" type="datetimeFigureOut">
               <a:rPr lang="en-US" smtClean="0"/>
-              <a:t>4/20/2019</a:t>
+              <a:t>4/21/2019</a:t>
             </a:fld>
             <a:endParaRPr lang="en-US"/>
           </a:p>
@@ -3564,7 +3565,7 @@
           <a:graphicData uri="http://schemas.openxmlformats.org/presentationml/2006/ole">
             <mc:AlternateContent xmlns:mc="http://schemas.openxmlformats.org/markup-compatibility/2006">
               <mc:Choice xmlns:v="urn:schemas-microsoft-com:vml" Requires="v">
-                <p:oleObj spid="_x0000_s2101" name="Acrobat Document" r:id="rId3" imgW="4914762" imgH="3562037" progId="AcroExch.Document.DC">
+                <p:oleObj spid="_x0000_s2110" name="Acrobat Document" r:id="rId3" imgW="4914762" imgH="3562037" progId="AcroExch.Document.DC">
                   <p:embed/>
                 </p:oleObj>
               </mc:Choice>
@@ -9311,15 +9312,23 @@
             <p:ph idx="1"/>
           </p:nvPr>
         </p:nvSpPr>
-        <p:spPr/>
+        <p:spPr>
+          <a:xfrm>
+            <a:off x="838200" y="2461730"/>
+            <a:ext cx="10515600" cy="4667250"/>
+          </a:xfrm>
+        </p:spPr>
         <p:txBody>
           <a:bodyPr>
-            <a:normAutofit fontScale="92500" lnSpcReduction="20000"/>
+            <a:normAutofit/>
           </a:bodyPr>
           <a:lstStyle/>
           <a:p>
-            <a:r>
-              <a:rPr lang="en-US" dirty="0"/>
+            <a:pPr marL="0" indent="0">
+              <a:buNone/>
+            </a:pPr>
+            <a:r>
+              <a:rPr lang="en-US" b="1" dirty="0"/>
               <a:t>Experimental</a:t>
             </a:r>
           </a:p>
@@ -9353,40 +9362,6 @@
           </a:p>
           <a:p>
             <a:endParaRPr lang="en-US" dirty="0"/>
-          </a:p>
-          <a:p>
-            <a:r>
-              <a:rPr lang="en-US" dirty="0"/>
-              <a:t>Computing Side</a:t>
-            </a:r>
-          </a:p>
-          <a:p>
-            <a:pPr lvl="1"/>
-            <a:r>
-              <a:rPr lang="en-US" dirty="0"/>
-              <a:t>Programs don’t want to run sometimes</a:t>
-            </a:r>
-          </a:p>
-          <a:p>
-            <a:pPr lvl="1"/>
-            <a:r>
-              <a:rPr lang="en-US" dirty="0"/>
-              <a:t>Missing dependencies/ working on WSL instead of Linux OS/ Issues navigating</a:t>
-            </a:r>
-          </a:p>
-          <a:p>
-            <a:pPr lvl="1"/>
-            <a:r>
-              <a:rPr lang="en-US" dirty="0"/>
-              <a:t>Could be more efficient with better automation/ shell scripts</a:t>
-            </a:r>
-          </a:p>
-          <a:p>
-            <a:pPr lvl="1"/>
-            <a:r>
-              <a:rPr lang="en-US" dirty="0"/>
-              <a:t>Limited personal knowledge of software available, what is accepted to use, caveats of each program</a:t>
-            </a:r>
           </a:p>
         </p:txBody>
       </p:sp>
@@ -9453,7 +9428,7 @@
           <a:p>
             <a:r>
               <a:rPr lang="en-US" dirty="0"/>
-              <a:t>Conclusions and Moving Forward</a:t>
+              <a:t>Challenges/ Difficulties/ Caveats</a:t>
             </a:r>
           </a:p>
         </p:txBody>
@@ -9474,56 +9449,152 @@
             <p:ph idx="1"/>
           </p:nvPr>
         </p:nvSpPr>
-        <p:spPr/>
-        <p:txBody>
-          <a:bodyPr/>
-          <a:lstStyle/>
-          <a:p>
-            <a:r>
-              <a:rPr lang="en-US" dirty="0"/>
-              <a:t>Strong pipeline to analyze pathogenic bacteria with many genomes available</a:t>
-            </a:r>
-          </a:p>
-          <a:p>
-            <a:r>
-              <a:rPr lang="en-US" dirty="0"/>
-              <a:t>Ability to analyze new draft genomes and find relationships based on accessory genome components not shared between closely related strains</a:t>
-            </a:r>
-          </a:p>
-          <a:p>
-            <a:r>
-              <a:rPr lang="en-US" dirty="0"/>
-              <a:t>Can use the data I found to:</a:t>
+        <p:spPr>
+          <a:xfrm>
+            <a:off x="665922" y="1690688"/>
+            <a:ext cx="11181522" cy="4667250"/>
+          </a:xfrm>
+        </p:spPr>
+        <p:txBody>
+          <a:bodyPr>
+            <a:normAutofit lnSpcReduction="10000"/>
+          </a:bodyPr>
+          <a:lstStyle/>
+          <a:p>
+            <a:pPr marL="0" indent="0">
+              <a:buNone/>
+            </a:pPr>
+            <a:r>
+              <a:rPr lang="en-US" b="1" dirty="0"/>
+              <a:t>Computing</a:t>
             </a:r>
           </a:p>
           <a:p>
             <a:pPr lvl="1"/>
             <a:r>
               <a:rPr lang="en-US" dirty="0"/>
-              <a:t>Discover relationships between </a:t>
-            </a:r>
-            <a:r>
-              <a:rPr lang="en-US" i="1" dirty="0"/>
-              <a:t>Salmonella </a:t>
-            </a:r>
-            <a:r>
-              <a:rPr lang="en-US" dirty="0"/>
-              <a:t> serovars</a:t>
+              <a:t>Programs don’t want to run sometimes</a:t>
             </a:r>
           </a:p>
           <a:p>
             <a:pPr lvl="1"/>
             <a:r>
               <a:rPr lang="en-US" dirty="0"/>
-              <a:t>Find shared or novel genes or regulatory regions affecting bacterial host-specific pathogenesis</a:t>
-            </a:r>
+              <a:t>Missing dependencies/ working on WSL instead of a Unix OS/ Issues navigating</a:t>
+            </a:r>
+          </a:p>
+          <a:p>
+            <a:pPr lvl="1"/>
+            <a:r>
+              <a:rPr lang="en-US" dirty="0"/>
+              <a:t>Could be more efficient with better automation/ shell scripts</a:t>
+            </a:r>
+          </a:p>
+          <a:p>
+            <a:pPr lvl="1"/>
+            <a:r>
+              <a:rPr lang="en-US" dirty="0"/>
+              <a:t>Starting with limited personal knowledge of software available</a:t>
+            </a:r>
+          </a:p>
+          <a:p>
+            <a:pPr lvl="2"/>
+            <a:r>
+              <a:rPr lang="en-US" dirty="0"/>
+              <a:t>Limited knowledge of parameters and nuances of the various programs</a:t>
+            </a:r>
+          </a:p>
+          <a:p>
+            <a:pPr lvl="2"/>
+            <a:r>
+              <a:rPr lang="en-US" dirty="0" err="1"/>
+              <a:t>ie</a:t>
+            </a:r>
+            <a:r>
+              <a:rPr lang="en-US" dirty="0"/>
+              <a:t>: Ineffective use of Ray and/or Velvet from misunderstanding of how to get a good analysis from it</a:t>
+            </a:r>
+          </a:p>
+          <a:p>
+            <a:pPr lvl="1"/>
+            <a:endParaRPr lang="en-US" dirty="0"/>
+          </a:p>
+          <a:p>
+            <a:pPr lvl="1"/>
+            <a:r>
+              <a:rPr lang="en-US" dirty="0"/>
+              <a:t>Originally:</a:t>
+            </a:r>
+          </a:p>
+          <a:p>
+            <a:pPr lvl="2"/>
+            <a:r>
+              <a:rPr lang="en-US" dirty="0"/>
+              <a:t>Trying to follow different path</a:t>
+            </a:r>
+          </a:p>
+          <a:p>
+            <a:pPr lvl="2"/>
+            <a:r>
+              <a:rPr lang="en-US" dirty="0"/>
+              <a:t>Used/ attempted to implement MANY other programs (ultimately unfruitful effort)</a:t>
+            </a:r>
+          </a:p>
+          <a:p>
+            <a:pPr lvl="3"/>
+            <a:r>
+              <a:rPr lang="en-US" dirty="0" err="1"/>
+              <a:t>ie</a:t>
+            </a:r>
+            <a:r>
+              <a:rPr lang="en-US" dirty="0"/>
+              <a:t>: Multiple genome alignment programs (MAFFT, </a:t>
+            </a:r>
+            <a:r>
+              <a:rPr lang="en-US" dirty="0" err="1"/>
+              <a:t>progressiveMauve</a:t>
+            </a:r>
+            <a:r>
+              <a:rPr lang="en-US" dirty="0"/>
+              <a:t>)</a:t>
+            </a:r>
+          </a:p>
+          <a:p>
+            <a:pPr lvl="3"/>
+            <a:r>
+              <a:rPr lang="en-US" dirty="0" err="1"/>
+              <a:t>ie</a:t>
+            </a:r>
+            <a:r>
+              <a:rPr lang="en-US" dirty="0"/>
+              <a:t>: Phylogenetic analyses software (</a:t>
+            </a:r>
+            <a:r>
+              <a:rPr lang="en-US" dirty="0" err="1"/>
+              <a:t>FastTree</a:t>
+            </a:r>
+            <a:r>
+              <a:rPr lang="en-US" dirty="0"/>
+              <a:t>, </a:t>
+            </a:r>
+            <a:r>
+              <a:rPr lang="en-US" dirty="0" err="1"/>
+              <a:t>PhyML</a:t>
+            </a:r>
+            <a:r>
+              <a:rPr lang="en-US" dirty="0"/>
+              <a:t>, etc.)</a:t>
+            </a:r>
+          </a:p>
+          <a:p>
+            <a:endParaRPr lang="en-US" dirty="0"/>
           </a:p>
         </p:txBody>
       </p:sp>
     </p:spTree>
     <p:extLst>
       <p:ext uri="{BB962C8B-B14F-4D97-AF65-F5344CB8AC3E}">
-        <p14:creationId xmlns:p14="http://schemas.microsoft.com/office/powerpoint/2010/main" val="3962565379"/>
+        <p14:creationId xmlns:p14="http://schemas.microsoft.com/office/powerpoint/2010/main" val="4107512287"/>
       </p:ext>
     </p:extLst>
   </p:cSld>
@@ -9583,17 +9654,17 @@
           <a:p>
             <a:r>
               <a:rPr lang="en-US" dirty="0"/>
-              <a:t>Thank you!</a:t>
-            </a:r>
-          </a:p>
-        </p:txBody>
-      </p:sp>
-      <p:sp>
-        <p:nvSpPr>
-          <p:cNvPr id="5" name="Content Placeholder 4">
-            <a:extLst>
-              <a:ext uri="{FF2B5EF4-FFF2-40B4-BE49-F238E27FC236}">
-                <a16:creationId xmlns:a16="http://schemas.microsoft.com/office/drawing/2014/main" id="{668D9C98-9BD1-47F5-8DBE-421A1AD557DD}"/>
+              <a:t>Conclusions and Moving Forward</a:t>
+            </a:r>
+          </a:p>
+        </p:txBody>
+      </p:sp>
+      <p:sp>
+        <p:nvSpPr>
+          <p:cNvPr id="3" name="Content Placeholder 2">
+            <a:extLst>
+              <a:ext uri="{FF2B5EF4-FFF2-40B4-BE49-F238E27FC236}">
+                <a16:creationId xmlns:a16="http://schemas.microsoft.com/office/drawing/2014/main" id="{C1A6110F-B865-4334-B83A-7BC61CC3316D}"/>
               </a:ext>
             </a:extLst>
           </p:cNvPr>
@@ -9609,7 +9680,112 @@
           <a:bodyPr/>
           <a:lstStyle/>
           <a:p>
-            <a:endParaRPr lang="en-US"/>
+            <a:r>
+              <a:rPr lang="en-US" dirty="0"/>
+              <a:t>Strong pipeline to analyze pathogenic bacteria with many genomes available</a:t>
+            </a:r>
+          </a:p>
+          <a:p>
+            <a:r>
+              <a:rPr lang="en-US" dirty="0"/>
+              <a:t>Ability to analyze new draft genomes and find relationships based on accessory genome components not shared between closely related strains</a:t>
+            </a:r>
+          </a:p>
+          <a:p>
+            <a:r>
+              <a:rPr lang="en-US" dirty="0"/>
+              <a:t>Can use the data I found to:</a:t>
+            </a:r>
+          </a:p>
+          <a:p>
+            <a:pPr lvl="1"/>
+            <a:r>
+              <a:rPr lang="en-US" dirty="0"/>
+              <a:t>Discover relationships between </a:t>
+            </a:r>
+            <a:r>
+              <a:rPr lang="en-US" i="1" dirty="0"/>
+              <a:t>Salmonella </a:t>
+            </a:r>
+            <a:r>
+              <a:rPr lang="en-US" dirty="0"/>
+              <a:t> serovars</a:t>
+            </a:r>
+          </a:p>
+          <a:p>
+            <a:pPr lvl="1"/>
+            <a:r>
+              <a:rPr lang="en-US" dirty="0"/>
+              <a:t>Find shared or novel genes or regulatory regions affecting bacterial host-specific pathogenesis</a:t>
+            </a:r>
+          </a:p>
+        </p:txBody>
+      </p:sp>
+    </p:spTree>
+    <p:extLst>
+      <p:ext uri="{BB962C8B-B14F-4D97-AF65-F5344CB8AC3E}">
+        <p14:creationId xmlns:p14="http://schemas.microsoft.com/office/powerpoint/2010/main" val="3962565379"/>
+      </p:ext>
+    </p:extLst>
+  </p:cSld>
+  <p:clrMapOvr>
+    <a:masterClrMapping/>
+  </p:clrMapOvr>
+</p:sld>
+</file>
+
+<file path=ppt/slides/slide29.xml><?xml version="1.0" encoding="utf-8"?>
+<p:sld xmlns:a="http://schemas.openxmlformats.org/drawingml/2006/main" xmlns:r="http://schemas.openxmlformats.org/officeDocument/2006/relationships" xmlns:p="http://schemas.openxmlformats.org/presentationml/2006/main">
+  <p:cSld>
+    <p:bg>
+      <p:bgPr>
+        <a:solidFill>
+          <a:schemeClr val="bg1">
+            <a:lumMod val="95000"/>
+          </a:schemeClr>
+        </a:solidFill>
+        <a:effectLst/>
+      </p:bgPr>
+    </p:bg>
+    <p:spTree>
+      <p:nvGrpSpPr>
+        <p:cNvPr id="1" name=""/>
+        <p:cNvGrpSpPr/>
+        <p:nvPr/>
+      </p:nvGrpSpPr>
+      <p:grpSpPr>
+        <a:xfrm>
+          <a:off x="0" y="0"/>
+          <a:ext cx="0" cy="0"/>
+          <a:chOff x="0" y="0"/>
+          <a:chExt cx="0" cy="0"/>
+        </a:xfrm>
+      </p:grpSpPr>
+      <p:sp>
+        <p:nvSpPr>
+          <p:cNvPr id="2" name="Title 1">
+            <a:extLst>
+              <a:ext uri="{FF2B5EF4-FFF2-40B4-BE49-F238E27FC236}">
+                <a16:creationId xmlns:a16="http://schemas.microsoft.com/office/drawing/2014/main" id="{5C631BF1-F486-4129-82A6-19D4EA9A7673}"/>
+              </a:ext>
+            </a:extLst>
+          </p:cNvPr>
+          <p:cNvSpPr>
+            <a:spLocks noGrp="1"/>
+          </p:cNvSpPr>
+          <p:nvPr>
+            <p:ph type="title"/>
+          </p:nvPr>
+        </p:nvSpPr>
+        <p:spPr/>
+        <p:txBody>
+          <a:bodyPr/>
+          <a:lstStyle/>
+          <a:p>
+            <a:r>
+              <a:rPr lang="en-US" dirty="0"/>
+              <a:t>Thank you!</a:t>
+            </a:r>
           </a:p>
         </p:txBody>
       </p:sp>
@@ -9855,7 +10031,7 @@
           <a:graphicData uri="http://schemas.openxmlformats.org/presentationml/2006/ole">
             <mc:AlternateContent xmlns:mc="http://schemas.openxmlformats.org/markup-compatibility/2006">
               <mc:Choice xmlns:v="urn:schemas-microsoft-com:vml" Requires="v">
-                <p:oleObj spid="_x0000_s4145" name="Presentation" r:id="rId3" imgW="5038285" imgH="3777990" progId="PowerPoint.Show.8">
+                <p:oleObj spid="_x0000_s4154" name="Presentation" r:id="rId3" imgW="5038285" imgH="3777990" progId="PowerPoint.Show.8">
                   <p:embed/>
                 </p:oleObj>
               </mc:Choice>
@@ -11476,7 +11652,7 @@
           <a:graphicData uri="http://schemas.openxmlformats.org/presentationml/2006/ole">
             <mc:AlternateContent xmlns:mc="http://schemas.openxmlformats.org/markup-compatibility/2006">
               <mc:Choice xmlns:v="urn:schemas-microsoft-com:vml" Requires="v">
-                <p:oleObj spid="_x0000_s3124" name="Acrobat Document" r:id="rId3" imgW="4800230" imgH="3562037" progId="AcroExch.Document.DC">
+                <p:oleObj spid="_x0000_s3133" name="Acrobat Document" r:id="rId3" imgW="4800230" imgH="3562037" progId="AcroExch.Document.DC">
                   <p:embed/>
                 </p:oleObj>
               </mc:Choice>
@@ -11629,7 +11805,7 @@
           <a:graphicData uri="http://schemas.openxmlformats.org/presentationml/2006/ole">
             <mc:AlternateContent xmlns:mc="http://schemas.openxmlformats.org/markup-compatibility/2006">
               <mc:Choice xmlns:v="urn:schemas-microsoft-com:vml" Requires="v">
-                <p:oleObj spid="_x0000_s1077" name="Acrobat Document" r:id="rId3" imgW="4552639" imgH="3562037" progId="AcroExch.Document.DC">
+                <p:oleObj spid="_x0000_s1086" name="Acrobat Document" r:id="rId3" imgW="4552639" imgH="3562037" progId="AcroExch.Document.DC">
                   <p:embed/>
                 </p:oleObj>
               </mc:Choice>

</xml_diff>

<commit_message>
Fixed some ppt; Added to readme (methods, citations)
</commit_message>
<xml_diff>
--- a/190425_Verdegaal_EEB723_project.pptx
+++ b/190425_Verdegaal_EEB723_project.pptx
@@ -3565,7 +3565,7 @@
           <a:graphicData uri="http://schemas.openxmlformats.org/presentationml/2006/ole">
             <mc:AlternateContent xmlns:mc="http://schemas.openxmlformats.org/markup-compatibility/2006">
               <mc:Choice xmlns:v="urn:schemas-microsoft-com:vml" Requires="v">
-                <p:oleObj spid="_x0000_s2110" name="Acrobat Document" r:id="rId3" imgW="4914762" imgH="3562037" progId="AcroExch.Document.DC">
+                <p:oleObj spid="_x0000_s2112" name="Acrobat Document" r:id="rId3" imgW="4914762" imgH="3562037" progId="AcroExch.Document.DC">
                   <p:embed/>
                 </p:oleObj>
               </mc:Choice>
@@ -5244,13 +5244,8 @@
             </a:r>
             <a:r>
               <a:rPr lang="en-US" dirty="0"/>
-              <a:t> serovars with </a:t>
-            </a:r>
-            <a:r>
-              <a:rPr lang="en-US" dirty="0" err="1"/>
-              <a:t>iTOL</a:t>
-            </a:r>
-            <a:endParaRPr lang="en-US" dirty="0"/>
+              <a:t> serovars</a:t>
+            </a:r>
           </a:p>
         </p:txBody>
       </p:sp>
@@ -5326,6 +5321,52 @@
               <a:rPr lang="en-US" sz="2000" b="1" dirty="0"/>
               <a:t>16 Reference Genomes Analyzed</a:t>
             </a:r>
+          </a:p>
+        </p:txBody>
+      </p:sp>
+      <p:sp>
+        <p:nvSpPr>
+          <p:cNvPr id="3" name="TextBox 2">
+            <a:extLst>
+              <a:ext uri="{FF2B5EF4-FFF2-40B4-BE49-F238E27FC236}">
+                <a16:creationId xmlns:a16="http://schemas.microsoft.com/office/drawing/2014/main" id="{4E768CD8-4213-42C3-889A-A8C7FC59DCBA}"/>
+              </a:ext>
+            </a:extLst>
+          </p:cNvPr>
+          <p:cNvSpPr txBox="1"/>
+          <p:nvPr/>
+        </p:nvSpPr>
+        <p:spPr>
+          <a:xfrm>
+            <a:off x="120190" y="6180136"/>
+            <a:ext cx="2677400" cy="646331"/>
+          </a:xfrm>
+          <a:prstGeom prst="rect">
+            <a:avLst/>
+          </a:prstGeom>
+          <a:noFill/>
+        </p:spPr>
+        <p:txBody>
+          <a:bodyPr wrap="none" rtlCol="0">
+            <a:spAutoFit/>
+          </a:bodyPr>
+          <a:lstStyle/>
+          <a:p>
+            <a:r>
+              <a:rPr lang="en-US" dirty="0"/>
+              <a:t>Tree software: Phylip3.695</a:t>
+            </a:r>
+          </a:p>
+          <a:p>
+            <a:r>
+              <a:rPr lang="en-US" dirty="0"/>
+              <a:t>Visualization: </a:t>
+            </a:r>
+            <a:r>
+              <a:rPr lang="en-US"/>
+              <a:t>iTOL</a:t>
+            </a:r>
+            <a:endParaRPr lang="en-US" dirty="0"/>
           </a:p>
         </p:txBody>
       </p:sp>
@@ -10031,7 +10072,7 @@
           <a:graphicData uri="http://schemas.openxmlformats.org/presentationml/2006/ole">
             <mc:AlternateContent xmlns:mc="http://schemas.openxmlformats.org/markup-compatibility/2006">
               <mc:Choice xmlns:v="urn:schemas-microsoft-com:vml" Requires="v">
-                <p:oleObj spid="_x0000_s4154" name="Presentation" r:id="rId3" imgW="5038285" imgH="3777990" progId="PowerPoint.Show.8">
+                <p:oleObj spid="_x0000_s4156" name="Presentation" r:id="rId3" imgW="5038285" imgH="3777990" progId="PowerPoint.Show.8">
                   <p:embed/>
                 </p:oleObj>
               </mc:Choice>
@@ -11652,7 +11693,7 @@
           <a:graphicData uri="http://schemas.openxmlformats.org/presentationml/2006/ole">
             <mc:AlternateContent xmlns:mc="http://schemas.openxmlformats.org/markup-compatibility/2006">
               <mc:Choice xmlns:v="urn:schemas-microsoft-com:vml" Requires="v">
-                <p:oleObj spid="_x0000_s3133" name="Acrobat Document" r:id="rId3" imgW="4800230" imgH="3562037" progId="AcroExch.Document.DC">
+                <p:oleObj spid="_x0000_s3135" name="Acrobat Document" r:id="rId3" imgW="4800230" imgH="3562037" progId="AcroExch.Document.DC">
                   <p:embed/>
                 </p:oleObj>
               </mc:Choice>
@@ -11805,7 +11846,7 @@
           <a:graphicData uri="http://schemas.openxmlformats.org/presentationml/2006/ole">
             <mc:AlternateContent xmlns:mc="http://schemas.openxmlformats.org/markup-compatibility/2006">
               <mc:Choice xmlns:v="urn:schemas-microsoft-com:vml" Requires="v">
-                <p:oleObj spid="_x0000_s1086" name="Acrobat Document" r:id="rId3" imgW="4552639" imgH="3562037" progId="AcroExch.Document.DC">
+                <p:oleObj spid="_x0000_s1088" name="Acrobat Document" r:id="rId3" imgW="4552639" imgH="3562037" progId="AcroExch.Document.DC">
                   <p:embed/>
                 </p:oleObj>
               </mc:Choice>

</xml_diff>